<commit_message>
adicionando primeira versão do LLD do projeto
</commit_message>
<xml_diff>
--- a/documentacao/HLD_LLD.pptx
+++ b/documentacao/HLD_LLD.pptx
@@ -106,6 +106,11 @@
       </a:defRPr>
     </a:lvl9pPr>
   </p:defaultTextStyle>
+  <p:extLst>
+    <p:ext uri="{EFAFB233-063F-42B5-8137-9DF3F51BA10A}">
+      <p15:sldGuideLst xmlns:p15="http://schemas.microsoft.com/office/powerpoint/2012/main"/>
+    </p:ext>
+  </p:extLst>
 </p:presentation>
 </file>
 
@@ -3417,7 +3422,7 @@
         </p:nvSpPr>
         <p:spPr>
           <a:xfrm>
-            <a:off x="5019624" y="252875"/>
+            <a:off x="5019624" y="226370"/>
             <a:ext cx="3165475" cy="1661795"/>
           </a:xfrm>
           <a:prstGeom prst="cloud">
@@ -3477,8 +3482,8 @@
         </p:nvSpPr>
         <p:spPr bwMode="auto">
           <a:xfrm>
-            <a:off x="5804962" y="634486"/>
-            <a:ext cx="1696620" cy="495300"/>
+            <a:off x="5970783" y="609664"/>
+            <a:ext cx="1126108" cy="495300"/>
           </a:xfrm>
           <a:prstGeom prst="rect">
             <a:avLst/>
@@ -3559,7 +3564,7 @@
         </p:blipFill>
         <p:spPr bwMode="auto">
           <a:xfrm>
-            <a:off x="7194084" y="325876"/>
+            <a:off x="7194084" y="312624"/>
             <a:ext cx="617220" cy="617220"/>
           </a:xfrm>
           <a:prstGeom prst="rect">
@@ -3705,7 +3710,7 @@
         </p:blipFill>
         <p:spPr>
           <a:xfrm>
-            <a:off x="5332266" y="850484"/>
+            <a:off x="5478484" y="688404"/>
             <a:ext cx="337820" cy="337820"/>
           </a:xfrm>
           <a:prstGeom prst="rect">
@@ -4470,7 +4475,7 @@
         </p:nvSpPr>
         <p:spPr>
           <a:xfrm>
-            <a:off x="3851358" y="3396960"/>
+            <a:off x="3862701" y="3396960"/>
             <a:ext cx="2076716" cy="1324924"/>
           </a:xfrm>
           <a:prstGeom prst="roundRect">
@@ -4540,7 +4545,7 @@
         </p:blipFill>
         <p:spPr>
           <a:xfrm>
-            <a:off x="5313319" y="3580687"/>
+            <a:off x="5287984" y="3580688"/>
             <a:ext cx="381000" cy="381000"/>
           </a:xfrm>
           <a:prstGeom prst="rect">
@@ -5162,7 +5167,7 @@
         </p:blipFill>
         <p:spPr bwMode="auto">
           <a:xfrm>
-            <a:off x="8513377" y="5180606"/>
+            <a:off x="8465104" y="5190441"/>
             <a:ext cx="550545" cy="550545"/>
           </a:xfrm>
           <a:prstGeom prst="rect">
@@ -5293,7 +5298,7 @@
         </p:nvSpPr>
         <p:spPr>
           <a:xfrm>
-            <a:off x="5181878" y="5699499"/>
+            <a:off x="5176633" y="5699498"/>
             <a:ext cx="1939290" cy="183515"/>
           </a:xfrm>
           <a:prstGeom prst="leftRightArrow">
@@ -5495,7 +5500,7 @@
         </p:nvSpPr>
         <p:spPr>
           <a:xfrm rot="10800000" flipV="1">
-            <a:off x="6719113" y="4430395"/>
+            <a:off x="6729887" y="4447214"/>
             <a:ext cx="458563" cy="1129910"/>
           </a:xfrm>
           <a:prstGeom prst="leftUpArrow">
@@ -6053,6 +6058,3458 @@
           <a:chExt cx="0" cy="0"/>
         </a:xfrm>
       </p:grpSpPr>
+      <p:sp>
+        <p:nvSpPr>
+          <p:cNvPr id="2" name="Nuvem 1">
+            <a:extLst>
+              <a:ext uri="{FF2B5EF4-FFF2-40B4-BE49-F238E27FC236}">
+                <a16:creationId xmlns:a16="http://schemas.microsoft.com/office/drawing/2014/main" id="{77EA65EE-32AE-4A54-9600-6D64DE9F32D1}"/>
+              </a:ext>
+            </a:extLst>
+          </p:cNvPr>
+          <p:cNvSpPr/>
+          <p:nvPr/>
+        </p:nvSpPr>
+        <p:spPr>
+          <a:xfrm>
+            <a:off x="3995980" y="57444"/>
+            <a:ext cx="3165475" cy="1661795"/>
+          </a:xfrm>
+          <a:prstGeom prst="cloud">
+            <a:avLst/>
+          </a:prstGeom>
+          <a:noFill/>
+          <a:ln w="9525" cap="flat" cmpd="sng" algn="ctr">
+            <a:solidFill>
+              <a:schemeClr val="dk1"/>
+            </a:solidFill>
+            <a:prstDash val="solid"/>
+            <a:round/>
+            <a:headEnd type="none" w="med" len="med"/>
+            <a:tailEnd type="none" w="med" len="med"/>
+          </a:ln>
+        </p:spPr>
+        <p:style>
+          <a:lnRef idx="0">
+            <a:scrgbClr r="0" g="0" b="0"/>
+          </a:lnRef>
+          <a:fillRef idx="0">
+            <a:scrgbClr r="0" g="0" b="0"/>
+          </a:fillRef>
+          <a:effectRef idx="0">
+            <a:scrgbClr r="0" g="0" b="0"/>
+          </a:effectRef>
+          <a:fontRef idx="minor">
+            <a:schemeClr val="dk1"/>
+          </a:fontRef>
+        </p:style>
+        <p:txBody>
+          <a:bodyPr rot="0" spcFirstLastPara="0" vert="horz" wrap="square" lIns="91440" tIns="45720" rIns="91440" bIns="45720" numCol="1" spcCol="0" rtlCol="0" fromWordArt="0" anchor="ctr" anchorCtr="0" forceAA="0" compatLnSpc="1">
+            <a:prstTxWarp prst="textNoShape">
+              <a:avLst/>
+            </a:prstTxWarp>
+            <a:noAutofit/>
+          </a:bodyPr>
+          <a:lstStyle/>
+          <a:p>
+            <a:endParaRPr lang="pt-BR"/>
+          </a:p>
+        </p:txBody>
+      </p:sp>
+      <p:pic>
+        <p:nvPicPr>
+          <p:cNvPr id="4" name="Imagem 3">
+            <a:extLst>
+              <a:ext uri="{FF2B5EF4-FFF2-40B4-BE49-F238E27FC236}">
+                <a16:creationId xmlns:a16="http://schemas.microsoft.com/office/drawing/2014/main" id="{EBCC98CD-CBE8-482B-A8A9-6B276BB7763D}"/>
+              </a:ext>
+            </a:extLst>
+          </p:cNvPr>
+          <p:cNvPicPr/>
+          <p:nvPr/>
+        </p:nvPicPr>
+        <p:blipFill>
+          <a:blip r:embed="rId2" cstate="print">
+            <a:extLst>
+              <a:ext uri="{28A0092B-C50C-407E-A947-70E740481C1C}">
+                <a14:useLocalDpi xmlns:a14="http://schemas.microsoft.com/office/drawing/2010/main" val="0"/>
+              </a:ext>
+            </a:extLst>
+          </a:blip>
+          <a:srcRect/>
+          <a:stretch>
+            <a:fillRect/>
+          </a:stretch>
+        </p:blipFill>
+        <p:spPr bwMode="auto">
+          <a:xfrm>
+            <a:off x="5332507" y="214652"/>
+            <a:ext cx="617220" cy="617220"/>
+          </a:xfrm>
+          <a:prstGeom prst="rect">
+            <a:avLst/>
+          </a:prstGeom>
+          <a:noFill/>
+          <a:ln>
+            <a:noFill/>
+          </a:ln>
+        </p:spPr>
+      </p:pic>
+      <p:pic>
+        <p:nvPicPr>
+          <p:cNvPr id="5" name="Imagem 4" descr="Forma&#10;&#10;Descrição gerada automaticamente com confiança baixa">
+            <a:extLst>
+              <a:ext uri="{FF2B5EF4-FFF2-40B4-BE49-F238E27FC236}">
+                <a16:creationId xmlns:a16="http://schemas.microsoft.com/office/drawing/2014/main" id="{D6E45DE5-2E32-4018-89C2-96A3D85E8437}"/>
+              </a:ext>
+            </a:extLst>
+          </p:cNvPr>
+          <p:cNvPicPr/>
+          <p:nvPr/>
+        </p:nvPicPr>
+        <p:blipFill>
+          <a:blip r:embed="rId3" cstate="print">
+            <a:extLst>
+              <a:ext uri="{28A0092B-C50C-407E-A947-70E740481C1C}">
+                <a14:useLocalDpi xmlns:a14="http://schemas.microsoft.com/office/drawing/2010/main" val="0"/>
+              </a:ext>
+            </a:extLst>
+          </a:blip>
+          <a:stretch>
+            <a:fillRect/>
+          </a:stretch>
+        </p:blipFill>
+        <p:spPr>
+          <a:xfrm>
+            <a:off x="4386187" y="680195"/>
+            <a:ext cx="325120" cy="364013"/>
+          </a:xfrm>
+          <a:prstGeom prst="rect">
+            <a:avLst/>
+          </a:prstGeom>
+        </p:spPr>
+      </p:pic>
+      <p:pic>
+        <p:nvPicPr>
+          <p:cNvPr id="6" name="Imagem 5" descr="Forma&#10;&#10;Descrição gerada automaticamente com confiança baixa">
+            <a:extLst>
+              <a:ext uri="{FF2B5EF4-FFF2-40B4-BE49-F238E27FC236}">
+                <a16:creationId xmlns:a16="http://schemas.microsoft.com/office/drawing/2014/main" id="{18593F09-92BA-42F2-ACD5-77043A4B8665}"/>
+              </a:ext>
+            </a:extLst>
+          </p:cNvPr>
+          <p:cNvPicPr/>
+          <p:nvPr/>
+        </p:nvPicPr>
+        <p:blipFill>
+          <a:blip r:embed="rId4" cstate="print">
+            <a:extLst>
+              <a:ext uri="{28A0092B-C50C-407E-A947-70E740481C1C}">
+                <a14:useLocalDpi xmlns:a14="http://schemas.microsoft.com/office/drawing/2010/main" val="0"/>
+              </a:ext>
+            </a:extLst>
+          </a:blip>
+          <a:stretch>
+            <a:fillRect/>
+          </a:stretch>
+        </p:blipFill>
+        <p:spPr>
+          <a:xfrm>
+            <a:off x="6118483" y="982579"/>
+            <a:ext cx="381328" cy="353537"/>
+          </a:xfrm>
+          <a:prstGeom prst="rect">
+            <a:avLst/>
+          </a:prstGeom>
+        </p:spPr>
+      </p:pic>
+      <p:pic>
+        <p:nvPicPr>
+          <p:cNvPr id="7" name="Imagem 6" descr="Forma&#10;&#10;Descrição gerada automaticamente com confiança baixa">
+            <a:extLst>
+              <a:ext uri="{FF2B5EF4-FFF2-40B4-BE49-F238E27FC236}">
+                <a16:creationId xmlns:a16="http://schemas.microsoft.com/office/drawing/2014/main" id="{BFE80EC8-72A8-4B27-A865-8F5652F230FA}"/>
+              </a:ext>
+            </a:extLst>
+          </p:cNvPr>
+          <p:cNvPicPr/>
+          <p:nvPr/>
+        </p:nvPicPr>
+        <p:blipFill>
+          <a:blip r:embed="rId5" cstate="print">
+            <a:extLst>
+              <a:ext uri="{28A0092B-C50C-407E-A947-70E740481C1C}">
+                <a14:useLocalDpi xmlns:a14="http://schemas.microsoft.com/office/drawing/2010/main" val="0"/>
+              </a:ext>
+            </a:extLst>
+          </a:blip>
+          <a:stretch>
+            <a:fillRect/>
+          </a:stretch>
+        </p:blipFill>
+        <p:spPr>
+          <a:xfrm>
+            <a:off x="4711306" y="1145370"/>
+            <a:ext cx="325120" cy="345440"/>
+          </a:xfrm>
+          <a:prstGeom prst="rect">
+            <a:avLst/>
+          </a:prstGeom>
+        </p:spPr>
+      </p:pic>
+      <p:pic>
+        <p:nvPicPr>
+          <p:cNvPr id="9" name="Imagem 8">
+            <a:extLst>
+              <a:ext uri="{FF2B5EF4-FFF2-40B4-BE49-F238E27FC236}">
+                <a16:creationId xmlns:a16="http://schemas.microsoft.com/office/drawing/2014/main" id="{A1A51CDE-BE47-4270-B6B6-93065A794C61}"/>
+              </a:ext>
+            </a:extLst>
+          </p:cNvPr>
+          <p:cNvPicPr/>
+          <p:nvPr/>
+        </p:nvPicPr>
+        <p:blipFill>
+          <a:blip r:embed="rId6" cstate="print">
+            <a:extLst>
+              <a:ext uri="{28A0092B-C50C-407E-A947-70E740481C1C}">
+                <a14:useLocalDpi xmlns:a14="http://schemas.microsoft.com/office/drawing/2010/main" val="0"/>
+              </a:ext>
+            </a:extLst>
+          </a:blip>
+          <a:srcRect/>
+          <a:stretch>
+            <a:fillRect/>
+          </a:stretch>
+        </p:blipFill>
+        <p:spPr bwMode="auto">
+          <a:xfrm>
+            <a:off x="5439166" y="1159348"/>
+            <a:ext cx="447675" cy="447675"/>
+          </a:xfrm>
+          <a:prstGeom prst="rect">
+            <a:avLst/>
+          </a:prstGeom>
+          <a:noFill/>
+          <a:ln>
+            <a:noFill/>
+          </a:ln>
+        </p:spPr>
+      </p:pic>
+      <p:pic>
+        <p:nvPicPr>
+          <p:cNvPr id="10" name="Imagem 9">
+            <a:extLst>
+              <a:ext uri="{FF2B5EF4-FFF2-40B4-BE49-F238E27FC236}">
+                <a16:creationId xmlns:a16="http://schemas.microsoft.com/office/drawing/2014/main" id="{BEE35917-D903-4427-8FA7-A94E1216143D}"/>
+              </a:ext>
+            </a:extLst>
+          </p:cNvPr>
+          <p:cNvPicPr/>
+          <p:nvPr/>
+        </p:nvPicPr>
+        <p:blipFill>
+          <a:blip r:embed="rId7" cstate="print">
+            <a:extLst>
+              <a:ext uri="{28A0092B-C50C-407E-A947-70E740481C1C}">
+                <a14:useLocalDpi xmlns:a14="http://schemas.microsoft.com/office/drawing/2010/main" val="0"/>
+              </a:ext>
+            </a:extLst>
+          </a:blip>
+          <a:srcRect/>
+          <a:stretch>
+            <a:fillRect/>
+          </a:stretch>
+        </p:blipFill>
+        <p:spPr bwMode="auto">
+          <a:xfrm>
+            <a:off x="6460330" y="549319"/>
+            <a:ext cx="436245" cy="436245"/>
+          </a:xfrm>
+          <a:prstGeom prst="rect">
+            <a:avLst/>
+          </a:prstGeom>
+          <a:noFill/>
+          <a:ln>
+            <a:noFill/>
+          </a:ln>
+        </p:spPr>
+      </p:pic>
+      <p:pic>
+        <p:nvPicPr>
+          <p:cNvPr id="11" name="Gráfico 3">
+            <a:extLst>
+              <a:ext uri="{FF2B5EF4-FFF2-40B4-BE49-F238E27FC236}">
+                <a16:creationId xmlns:a16="http://schemas.microsoft.com/office/drawing/2014/main" id="{8ADFB6D0-FE23-4CAC-858B-58CEE23EBBD8}"/>
+              </a:ext>
+            </a:extLst>
+          </p:cNvPr>
+          <p:cNvPicPr/>
+          <p:nvPr/>
+        </p:nvPicPr>
+        <p:blipFill>
+          <a:blip r:embed="rId8" cstate="print">
+            <a:extLst>
+              <a:ext uri="{28A0092B-C50C-407E-A947-70E740481C1C}">
+                <a14:useLocalDpi xmlns:a14="http://schemas.microsoft.com/office/drawing/2010/main" val="0"/>
+              </a:ext>
+              <a:ext uri="{96DAC541-7B7A-43D3-8B79-37D633B846F1}">
+                <asvg:svgBlip xmlns:asvg="http://schemas.microsoft.com/office/drawing/2016/SVG/main" r:embed="rId9"/>
+              </a:ext>
+            </a:extLst>
+          </a:blip>
+          <a:stretch>
+            <a:fillRect/>
+          </a:stretch>
+        </p:blipFill>
+        <p:spPr>
+          <a:xfrm>
+            <a:off x="1072775" y="516704"/>
+            <a:ext cx="581660" cy="581660"/>
+          </a:xfrm>
+          <a:prstGeom prst="rect">
+            <a:avLst/>
+          </a:prstGeom>
+        </p:spPr>
+      </p:pic>
+      <p:sp>
+        <p:nvSpPr>
+          <p:cNvPr id="12" name="Retângulo: Cantos Arredondados 11">
+            <a:extLst>
+              <a:ext uri="{FF2B5EF4-FFF2-40B4-BE49-F238E27FC236}">
+                <a16:creationId xmlns:a16="http://schemas.microsoft.com/office/drawing/2014/main" id="{295966DB-5F45-4E1C-A708-21C0A9B1E4B7}"/>
+              </a:ext>
+            </a:extLst>
+          </p:cNvPr>
+          <p:cNvSpPr/>
+          <p:nvPr/>
+        </p:nvSpPr>
+        <p:spPr>
+          <a:xfrm>
+            <a:off x="120766" y="1555907"/>
+            <a:ext cx="2480335" cy="2337924"/>
+          </a:xfrm>
+          <a:prstGeom prst="roundRect">
+            <a:avLst/>
+          </a:prstGeom>
+          <a:noFill/>
+          <a:ln w="9525" cap="flat" cmpd="sng" algn="ctr">
+            <a:solidFill>
+              <a:schemeClr val="dk1"/>
+            </a:solidFill>
+            <a:prstDash val="solid"/>
+            <a:round/>
+            <a:headEnd type="none" w="med" len="med"/>
+            <a:tailEnd type="none" w="med" len="med"/>
+          </a:ln>
+        </p:spPr>
+        <p:style>
+          <a:lnRef idx="0">
+            <a:scrgbClr r="0" g="0" b="0"/>
+          </a:lnRef>
+          <a:fillRef idx="0">
+            <a:scrgbClr r="0" g="0" b="0"/>
+          </a:fillRef>
+          <a:effectRef idx="0">
+            <a:scrgbClr r="0" g="0" b="0"/>
+          </a:effectRef>
+          <a:fontRef idx="minor">
+            <a:schemeClr val="dk1"/>
+          </a:fontRef>
+        </p:style>
+        <p:txBody>
+          <a:bodyPr rot="0" spcFirstLastPara="0" vert="horz" wrap="square" lIns="91440" tIns="45720" rIns="91440" bIns="45720" numCol="1" spcCol="0" rtlCol="0" fromWordArt="0" anchor="ctr" anchorCtr="0" forceAA="0" compatLnSpc="1">
+            <a:prstTxWarp prst="textNoShape">
+              <a:avLst/>
+            </a:prstTxWarp>
+            <a:noAutofit/>
+          </a:bodyPr>
+          <a:lstStyle/>
+          <a:p>
+            <a:endParaRPr lang="pt-BR"/>
+          </a:p>
+        </p:txBody>
+      </p:sp>
+      <p:pic>
+        <p:nvPicPr>
+          <p:cNvPr id="13" name="Gráfico 8">
+            <a:extLst>
+              <a:ext uri="{FF2B5EF4-FFF2-40B4-BE49-F238E27FC236}">
+                <a16:creationId xmlns:a16="http://schemas.microsoft.com/office/drawing/2014/main" id="{7666CA5F-910B-4270-8F49-E00FF97EED5E}"/>
+              </a:ext>
+            </a:extLst>
+          </p:cNvPr>
+          <p:cNvPicPr/>
+          <p:nvPr/>
+        </p:nvPicPr>
+        <p:blipFill>
+          <a:blip r:embed="rId10" cstate="print">
+            <a:extLst>
+              <a:ext uri="{28A0092B-C50C-407E-A947-70E740481C1C}">
+                <a14:useLocalDpi xmlns:a14="http://schemas.microsoft.com/office/drawing/2010/main" val="0"/>
+              </a:ext>
+              <a:ext uri="{96DAC541-7B7A-43D3-8B79-37D633B846F1}">
+                <asvg:svgBlip xmlns:asvg="http://schemas.microsoft.com/office/drawing/2016/SVG/main" r:embed="rId11"/>
+              </a:ext>
+            </a:extLst>
+          </a:blip>
+          <a:stretch>
+            <a:fillRect/>
+          </a:stretch>
+        </p:blipFill>
+        <p:spPr>
+          <a:xfrm>
+            <a:off x="1622750" y="2803420"/>
+            <a:ext cx="434975" cy="434975"/>
+          </a:xfrm>
+          <a:prstGeom prst="rect">
+            <a:avLst/>
+          </a:prstGeom>
+        </p:spPr>
+      </p:pic>
+      <p:pic>
+        <p:nvPicPr>
+          <p:cNvPr id="14" name="Gráfico 1">
+            <a:extLst>
+              <a:ext uri="{FF2B5EF4-FFF2-40B4-BE49-F238E27FC236}">
+                <a16:creationId xmlns:a16="http://schemas.microsoft.com/office/drawing/2014/main" id="{BCC01DD5-D530-4C36-B791-E4481F17D8A3}"/>
+              </a:ext>
+            </a:extLst>
+          </p:cNvPr>
+          <p:cNvPicPr/>
+          <p:nvPr/>
+        </p:nvPicPr>
+        <p:blipFill>
+          <a:blip r:embed="rId12" cstate="print">
+            <a:extLst>
+              <a:ext uri="{28A0092B-C50C-407E-A947-70E740481C1C}">
+                <a14:useLocalDpi xmlns:a14="http://schemas.microsoft.com/office/drawing/2010/main" val="0"/>
+              </a:ext>
+              <a:ext uri="{96DAC541-7B7A-43D3-8B79-37D633B846F1}">
+                <asvg:svgBlip xmlns:asvg="http://schemas.microsoft.com/office/drawing/2016/SVG/main" r:embed="rId13"/>
+              </a:ext>
+            </a:extLst>
+          </a:blip>
+          <a:stretch>
+            <a:fillRect/>
+          </a:stretch>
+        </p:blipFill>
+        <p:spPr>
+          <a:xfrm>
+            <a:off x="434839" y="1598881"/>
+            <a:ext cx="479717" cy="484187"/>
+          </a:xfrm>
+          <a:prstGeom prst="rect">
+            <a:avLst/>
+          </a:prstGeom>
+        </p:spPr>
+      </p:pic>
+      <p:pic>
+        <p:nvPicPr>
+          <p:cNvPr id="15" name="Gráfico 6">
+            <a:extLst>
+              <a:ext uri="{FF2B5EF4-FFF2-40B4-BE49-F238E27FC236}">
+                <a16:creationId xmlns:a16="http://schemas.microsoft.com/office/drawing/2014/main" id="{BB4C7FED-7B9D-4FCD-A465-87C86C2583B5}"/>
+              </a:ext>
+            </a:extLst>
+          </p:cNvPr>
+          <p:cNvPicPr/>
+          <p:nvPr/>
+        </p:nvPicPr>
+        <p:blipFill>
+          <a:blip r:embed="rId14">
+            <a:extLst>
+              <a:ext uri="{28A0092B-C50C-407E-A947-70E740481C1C}">
+                <a14:useLocalDpi xmlns:a14="http://schemas.microsoft.com/office/drawing/2010/main" val="0"/>
+              </a:ext>
+              <a:ext uri="{96DAC541-7B7A-43D3-8B79-37D633B846F1}">
+                <asvg:svgBlip xmlns:asvg="http://schemas.microsoft.com/office/drawing/2016/SVG/main" r:embed="rId15"/>
+              </a:ext>
+            </a:extLst>
+          </a:blip>
+          <a:stretch>
+            <a:fillRect/>
+          </a:stretch>
+        </p:blipFill>
+        <p:spPr>
+          <a:xfrm>
+            <a:off x="1823282" y="1626889"/>
+            <a:ext cx="434975" cy="405274"/>
+          </a:xfrm>
+          <a:prstGeom prst="rect">
+            <a:avLst/>
+          </a:prstGeom>
+        </p:spPr>
+      </p:pic>
+      <p:pic>
+        <p:nvPicPr>
+          <p:cNvPr id="16" name="Gráfico 4">
+            <a:extLst>
+              <a:ext uri="{FF2B5EF4-FFF2-40B4-BE49-F238E27FC236}">
+                <a16:creationId xmlns:a16="http://schemas.microsoft.com/office/drawing/2014/main" id="{9249E2FF-1A82-41A2-B741-46D54B8422CE}"/>
+              </a:ext>
+            </a:extLst>
+          </p:cNvPr>
+          <p:cNvPicPr/>
+          <p:nvPr/>
+        </p:nvPicPr>
+        <p:blipFill>
+          <a:blip r:embed="rId16" cstate="print">
+            <a:extLst>
+              <a:ext uri="{28A0092B-C50C-407E-A947-70E740481C1C}">
+                <a14:useLocalDpi xmlns:a14="http://schemas.microsoft.com/office/drawing/2010/main" val="0"/>
+              </a:ext>
+              <a:ext uri="{96DAC541-7B7A-43D3-8B79-37D633B846F1}">
+                <asvg:svgBlip xmlns:asvg="http://schemas.microsoft.com/office/drawing/2016/SVG/main" r:embed="rId17"/>
+              </a:ext>
+            </a:extLst>
+          </a:blip>
+          <a:stretch>
+            <a:fillRect/>
+          </a:stretch>
+        </p:blipFill>
+        <p:spPr>
+          <a:xfrm rot="20026507">
+            <a:off x="1264144" y="1595910"/>
+            <a:ext cx="209550" cy="209550"/>
+          </a:xfrm>
+          <a:prstGeom prst="rect">
+            <a:avLst/>
+          </a:prstGeom>
+        </p:spPr>
+      </p:pic>
+      <p:sp>
+        <p:nvSpPr>
+          <p:cNvPr id="17" name="Caixa de Texto 2">
+            <a:extLst>
+              <a:ext uri="{FF2B5EF4-FFF2-40B4-BE49-F238E27FC236}">
+                <a16:creationId xmlns:a16="http://schemas.microsoft.com/office/drawing/2014/main" id="{834403AD-9612-4AE3-82E0-8F15F947919D}"/>
+              </a:ext>
+            </a:extLst>
+          </p:cNvPr>
+          <p:cNvSpPr txBox="1">
+            <a:spLocks noChangeArrowheads="1"/>
+          </p:cNvSpPr>
+          <p:nvPr/>
+        </p:nvSpPr>
+        <p:spPr bwMode="auto">
+          <a:xfrm>
+            <a:off x="1156532" y="3245960"/>
+            <a:ext cx="1333500" cy="495300"/>
+          </a:xfrm>
+          <a:prstGeom prst="rect">
+            <a:avLst/>
+          </a:prstGeom>
+          <a:noFill/>
+          <a:ln>
+            <a:noFill/>
+          </a:ln>
+        </p:spPr>
+        <p:style>
+          <a:lnRef idx="0">
+            <a:scrgbClr r="0" g="0" b="0"/>
+          </a:lnRef>
+          <a:fillRef idx="0">
+            <a:scrgbClr r="0" g="0" b="0"/>
+          </a:fillRef>
+          <a:effectRef idx="0">
+            <a:scrgbClr r="0" g="0" b="0"/>
+          </a:effectRef>
+          <a:fontRef idx="minor">
+            <a:schemeClr val="dk1"/>
+          </a:fontRef>
+        </p:style>
+        <p:txBody>
+          <a:bodyPr rot="0" vert="horz" wrap="square" lIns="91440" tIns="45720" rIns="91440" bIns="45720" anchor="t" anchorCtr="0">
+            <a:noAutofit/>
+          </a:bodyPr>
+          <a:lstStyle/>
+          <a:p>
+            <a:pPr algn="ctr">
+              <a:lnSpc>
+                <a:spcPct val="107000"/>
+              </a:lnSpc>
+              <a:spcAft>
+                <a:spcPts val="800"/>
+              </a:spcAft>
+            </a:pPr>
+            <a:r>
+              <a:rPr lang="pt-BR" sz="1100" dirty="0">
+                <a:effectLst/>
+                <a:ea typeface="Calibri" panose="020F0502020204030204" pitchFamily="34" charset="0"/>
+                <a:cs typeface="Times New Roman" panose="02020603050405020304" pitchFamily="18" charset="0"/>
+              </a:rPr>
+              <a:t>Usuário acessando a aplicação</a:t>
+            </a:r>
+          </a:p>
+        </p:txBody>
+      </p:sp>
+      <p:sp>
+        <p:nvSpPr>
+          <p:cNvPr id="18" name="Seta: da Esquerda para a Direita 17">
+            <a:extLst>
+              <a:ext uri="{FF2B5EF4-FFF2-40B4-BE49-F238E27FC236}">
+                <a16:creationId xmlns:a16="http://schemas.microsoft.com/office/drawing/2014/main" id="{475363A8-6230-49EB-A879-F8AF2DBA951F}"/>
+              </a:ext>
+            </a:extLst>
+          </p:cNvPr>
+          <p:cNvSpPr/>
+          <p:nvPr/>
+        </p:nvSpPr>
+        <p:spPr>
+          <a:xfrm>
+            <a:off x="1581192" y="696726"/>
+            <a:ext cx="2368384" cy="183515"/>
+          </a:xfrm>
+          <a:prstGeom prst="leftRightArrow">
+            <a:avLst/>
+          </a:prstGeom>
+          <a:noFill/>
+          <a:ln w="9525" cap="flat" cmpd="sng" algn="ctr">
+            <a:solidFill>
+              <a:schemeClr val="dk1"/>
+            </a:solidFill>
+            <a:prstDash val="solid"/>
+            <a:round/>
+            <a:headEnd type="none" w="med" len="med"/>
+            <a:tailEnd type="none" w="med" len="med"/>
+          </a:ln>
+        </p:spPr>
+        <p:style>
+          <a:lnRef idx="0">
+            <a:scrgbClr r="0" g="0" b="0"/>
+          </a:lnRef>
+          <a:fillRef idx="0">
+            <a:scrgbClr r="0" g="0" b="0"/>
+          </a:fillRef>
+          <a:effectRef idx="0">
+            <a:scrgbClr r="0" g="0" b="0"/>
+          </a:effectRef>
+          <a:fontRef idx="minor">
+            <a:schemeClr val="dk1"/>
+          </a:fontRef>
+        </p:style>
+        <p:txBody>
+          <a:bodyPr rot="0" spcFirstLastPara="0" vert="horz" wrap="square" lIns="91440" tIns="45720" rIns="91440" bIns="45720" numCol="1" spcCol="0" rtlCol="0" fromWordArt="0" anchor="ctr" anchorCtr="0" forceAA="0" compatLnSpc="1">
+            <a:prstTxWarp prst="textNoShape">
+              <a:avLst/>
+            </a:prstTxWarp>
+            <a:noAutofit/>
+          </a:bodyPr>
+          <a:lstStyle/>
+          <a:p>
+            <a:endParaRPr lang="pt-BR"/>
+          </a:p>
+        </p:txBody>
+      </p:sp>
+      <p:sp>
+        <p:nvSpPr>
+          <p:cNvPr id="19" name="Caixa de Texto 2">
+            <a:extLst>
+              <a:ext uri="{FF2B5EF4-FFF2-40B4-BE49-F238E27FC236}">
+                <a16:creationId xmlns:a16="http://schemas.microsoft.com/office/drawing/2014/main" id="{F5507976-4A08-41DC-AF9C-D29D38E84470}"/>
+              </a:ext>
+            </a:extLst>
+          </p:cNvPr>
+          <p:cNvSpPr txBox="1">
+            <a:spLocks noChangeArrowheads="1"/>
+          </p:cNvSpPr>
+          <p:nvPr/>
+        </p:nvSpPr>
+        <p:spPr bwMode="auto">
+          <a:xfrm>
+            <a:off x="0" y="2072167"/>
+            <a:ext cx="1333500" cy="1273747"/>
+          </a:xfrm>
+          <a:prstGeom prst="rect">
+            <a:avLst/>
+          </a:prstGeom>
+          <a:noFill/>
+          <a:ln>
+            <a:noFill/>
+          </a:ln>
+        </p:spPr>
+        <p:style>
+          <a:lnRef idx="0">
+            <a:scrgbClr r="0" g="0" b="0"/>
+          </a:lnRef>
+          <a:fillRef idx="0">
+            <a:scrgbClr r="0" g="0" b="0"/>
+          </a:fillRef>
+          <a:effectRef idx="0">
+            <a:scrgbClr r="0" g="0" b="0"/>
+          </a:effectRef>
+          <a:fontRef idx="minor">
+            <a:schemeClr val="dk1"/>
+          </a:fontRef>
+        </p:style>
+        <p:txBody>
+          <a:bodyPr rot="0" vert="horz" wrap="square" lIns="91440" tIns="45720" rIns="91440" bIns="45720" anchor="t" anchorCtr="0">
+            <a:spAutoFit/>
+          </a:bodyPr>
+          <a:lstStyle/>
+          <a:p>
+            <a:pPr algn="ctr">
+              <a:lnSpc>
+                <a:spcPct val="107000"/>
+              </a:lnSpc>
+              <a:spcAft>
+                <a:spcPts val="800"/>
+              </a:spcAft>
+            </a:pPr>
+            <a:r>
+              <a:rPr lang="pt-BR" sz="1100" dirty="0">
+                <a:ea typeface="Calibri" panose="020F0502020204030204" pitchFamily="34" charset="0"/>
+                <a:cs typeface="Times New Roman" panose="02020603050405020304" pitchFamily="18" charset="0"/>
+              </a:rPr>
+              <a:t>Especificações mínimas: processador </a:t>
+            </a:r>
+            <a:r>
+              <a:rPr lang="pt-BR" sz="1100" dirty="0">
+                <a:effectLst/>
+                <a:ea typeface="Calibri" panose="020F0502020204030204" pitchFamily="34" charset="0"/>
+                <a:cs typeface="Times New Roman" panose="02020603050405020304" pitchFamily="18" charset="0"/>
+              </a:rPr>
+              <a:t>Intel Celeron 4GB 128 GB SSD W10 15.6 </a:t>
+            </a:r>
+          </a:p>
+          <a:p>
+            <a:pPr>
+              <a:lnSpc>
+                <a:spcPct val="107000"/>
+              </a:lnSpc>
+              <a:spcAft>
+                <a:spcPts val="800"/>
+              </a:spcAft>
+            </a:pPr>
+            <a:r>
+              <a:rPr lang="pt-BR" sz="1100" dirty="0">
+                <a:effectLst/>
+                <a:ea typeface="Calibri" panose="020F0502020204030204" pitchFamily="34" charset="0"/>
+                <a:cs typeface="Times New Roman" panose="02020603050405020304" pitchFamily="18" charset="0"/>
+              </a:rPr>
+              <a:t> </a:t>
+            </a:r>
+          </a:p>
+        </p:txBody>
+      </p:sp>
+      <p:pic>
+        <p:nvPicPr>
+          <p:cNvPr id="20" name="Gráfico 7">
+            <a:extLst>
+              <a:ext uri="{FF2B5EF4-FFF2-40B4-BE49-F238E27FC236}">
+                <a16:creationId xmlns:a16="http://schemas.microsoft.com/office/drawing/2014/main" id="{7047810D-9D29-4B5B-9B73-ED60612AF750}"/>
+              </a:ext>
+            </a:extLst>
+          </p:cNvPr>
+          <p:cNvPicPr/>
+          <p:nvPr/>
+        </p:nvPicPr>
+        <p:blipFill>
+          <a:blip r:embed="rId18" cstate="print">
+            <a:extLst>
+              <a:ext uri="{28A0092B-C50C-407E-A947-70E740481C1C}">
+                <a14:useLocalDpi xmlns:a14="http://schemas.microsoft.com/office/drawing/2010/main" val="0"/>
+              </a:ext>
+              <a:ext uri="{96DAC541-7B7A-43D3-8B79-37D633B846F1}">
+                <asvg:svgBlip xmlns:asvg="http://schemas.microsoft.com/office/drawing/2016/SVG/main" r:embed="rId19"/>
+              </a:ext>
+            </a:extLst>
+          </a:blip>
+          <a:stretch>
+            <a:fillRect/>
+          </a:stretch>
+        </p:blipFill>
+        <p:spPr>
+          <a:xfrm>
+            <a:off x="501045" y="1206119"/>
+            <a:ext cx="380365" cy="380365"/>
+          </a:xfrm>
+          <a:prstGeom prst="rect">
+            <a:avLst/>
+          </a:prstGeom>
+        </p:spPr>
+      </p:pic>
+      <p:sp>
+        <p:nvSpPr>
+          <p:cNvPr id="21" name="Caixa de Texto 2">
+            <a:extLst>
+              <a:ext uri="{FF2B5EF4-FFF2-40B4-BE49-F238E27FC236}">
+                <a16:creationId xmlns:a16="http://schemas.microsoft.com/office/drawing/2014/main" id="{43439952-A82C-4B10-83BD-096A158F0E4F}"/>
+              </a:ext>
+            </a:extLst>
+          </p:cNvPr>
+          <p:cNvSpPr txBox="1">
+            <a:spLocks noChangeArrowheads="1"/>
+          </p:cNvSpPr>
+          <p:nvPr/>
+        </p:nvSpPr>
+        <p:spPr bwMode="auto">
+          <a:xfrm>
+            <a:off x="1348177" y="2031132"/>
+            <a:ext cx="1333500" cy="911468"/>
+          </a:xfrm>
+          <a:prstGeom prst="rect">
+            <a:avLst/>
+          </a:prstGeom>
+          <a:noFill/>
+          <a:ln>
+            <a:noFill/>
+          </a:ln>
+        </p:spPr>
+        <p:style>
+          <a:lnRef idx="0">
+            <a:scrgbClr r="0" g="0" b="0"/>
+          </a:lnRef>
+          <a:fillRef idx="0">
+            <a:scrgbClr r="0" g="0" b="0"/>
+          </a:fillRef>
+          <a:effectRef idx="0">
+            <a:scrgbClr r="0" g="0" b="0"/>
+          </a:effectRef>
+          <a:fontRef idx="minor">
+            <a:schemeClr val="dk1"/>
+          </a:fontRef>
+        </p:style>
+        <p:txBody>
+          <a:bodyPr rot="0" vert="horz" wrap="square" lIns="91440" tIns="45720" rIns="91440" bIns="45720" anchor="t" anchorCtr="0">
+            <a:spAutoFit/>
+          </a:bodyPr>
+          <a:lstStyle/>
+          <a:p>
+            <a:pPr algn="ctr">
+              <a:lnSpc>
+                <a:spcPct val="107000"/>
+              </a:lnSpc>
+              <a:spcAft>
+                <a:spcPts val="800"/>
+              </a:spcAft>
+            </a:pPr>
+            <a:r>
+              <a:rPr lang="pt-BR" sz="1100" dirty="0">
+                <a:ea typeface="Calibri" panose="020F0502020204030204" pitchFamily="34" charset="0"/>
+                <a:cs typeface="Times New Roman" panose="02020603050405020304" pitchFamily="18" charset="0"/>
+              </a:rPr>
+              <a:t>Especificações mínimas: 32GB / 2GB RAM </a:t>
+            </a:r>
+            <a:endParaRPr lang="pt-BR" sz="1100" dirty="0">
+              <a:effectLst/>
+              <a:ea typeface="Calibri" panose="020F0502020204030204" pitchFamily="34" charset="0"/>
+              <a:cs typeface="Times New Roman" panose="02020603050405020304" pitchFamily="18" charset="0"/>
+            </a:endParaRPr>
+          </a:p>
+          <a:p>
+            <a:pPr>
+              <a:lnSpc>
+                <a:spcPct val="107000"/>
+              </a:lnSpc>
+              <a:spcAft>
+                <a:spcPts val="800"/>
+              </a:spcAft>
+            </a:pPr>
+            <a:r>
+              <a:rPr lang="pt-BR" sz="1100" dirty="0">
+                <a:effectLst/>
+                <a:ea typeface="Calibri" panose="020F0502020204030204" pitchFamily="34" charset="0"/>
+                <a:cs typeface="Times New Roman" panose="02020603050405020304" pitchFamily="18" charset="0"/>
+              </a:rPr>
+              <a:t> </a:t>
+            </a:r>
+          </a:p>
+        </p:txBody>
+      </p:sp>
+      <p:sp>
+        <p:nvSpPr>
+          <p:cNvPr id="22" name="Seta: para a Esquerda e para Cima 21">
+            <a:extLst>
+              <a:ext uri="{FF2B5EF4-FFF2-40B4-BE49-F238E27FC236}">
+                <a16:creationId xmlns:a16="http://schemas.microsoft.com/office/drawing/2014/main" id="{C1728F3C-30DD-4186-8BB9-186D05129EAA}"/>
+              </a:ext>
+            </a:extLst>
+          </p:cNvPr>
+          <p:cNvSpPr/>
+          <p:nvPr/>
+        </p:nvSpPr>
+        <p:spPr>
+          <a:xfrm flipH="1" flipV="1">
+            <a:off x="611689" y="657128"/>
+            <a:ext cx="485562" cy="527504"/>
+          </a:xfrm>
+          <a:prstGeom prst="leftUpArrow">
+            <a:avLst>
+              <a:gd name="adj1" fmla="val 20163"/>
+              <a:gd name="adj2" fmla="val 15763"/>
+              <a:gd name="adj3" fmla="val 20163"/>
+            </a:avLst>
+          </a:prstGeom>
+          <a:noFill/>
+          <a:ln w="9525" cap="flat" cmpd="sng" algn="ctr">
+            <a:solidFill>
+              <a:schemeClr val="dk1"/>
+            </a:solidFill>
+            <a:prstDash val="solid"/>
+            <a:round/>
+            <a:headEnd type="none" w="med" len="med"/>
+            <a:tailEnd type="none" w="med" len="med"/>
+          </a:ln>
+        </p:spPr>
+        <p:style>
+          <a:lnRef idx="0">
+            <a:scrgbClr r="0" g="0" b="0"/>
+          </a:lnRef>
+          <a:fillRef idx="0">
+            <a:scrgbClr r="0" g="0" b="0"/>
+          </a:fillRef>
+          <a:effectRef idx="0">
+            <a:scrgbClr r="0" g="0" b="0"/>
+          </a:effectRef>
+          <a:fontRef idx="minor">
+            <a:schemeClr val="dk1"/>
+          </a:fontRef>
+        </p:style>
+        <p:txBody>
+          <a:bodyPr rot="0" spcFirstLastPara="0" vert="horz" wrap="square" lIns="91440" tIns="45720" rIns="91440" bIns="45720" numCol="1" spcCol="0" rtlCol="0" fromWordArt="0" anchor="ctr" anchorCtr="0" forceAA="0" compatLnSpc="1">
+            <a:prstTxWarp prst="textNoShape">
+              <a:avLst/>
+            </a:prstTxWarp>
+            <a:noAutofit/>
+          </a:bodyPr>
+          <a:lstStyle/>
+          <a:p>
+            <a:endParaRPr lang="pt-BR"/>
+          </a:p>
+        </p:txBody>
+      </p:sp>
+      <p:sp>
+        <p:nvSpPr>
+          <p:cNvPr id="24" name="Caixa de Texto 2">
+            <a:extLst>
+              <a:ext uri="{FF2B5EF4-FFF2-40B4-BE49-F238E27FC236}">
+                <a16:creationId xmlns:a16="http://schemas.microsoft.com/office/drawing/2014/main" id="{DFB669DD-8CFD-49A2-9767-A7BE999C8465}"/>
+              </a:ext>
+            </a:extLst>
+          </p:cNvPr>
+          <p:cNvSpPr txBox="1">
+            <a:spLocks noChangeArrowheads="1"/>
+          </p:cNvSpPr>
+          <p:nvPr/>
+        </p:nvSpPr>
+        <p:spPr bwMode="auto">
+          <a:xfrm>
+            <a:off x="813759" y="1233373"/>
+            <a:ext cx="2052955" cy="318770"/>
+          </a:xfrm>
+          <a:prstGeom prst="rect">
+            <a:avLst/>
+          </a:prstGeom>
+          <a:noFill/>
+          <a:ln>
+            <a:noFill/>
+          </a:ln>
+        </p:spPr>
+        <p:style>
+          <a:lnRef idx="0">
+            <a:scrgbClr r="0" g="0" b="0"/>
+          </a:lnRef>
+          <a:fillRef idx="0">
+            <a:scrgbClr r="0" g="0" b="0"/>
+          </a:fillRef>
+          <a:effectRef idx="0">
+            <a:scrgbClr r="0" g="0" b="0"/>
+          </a:effectRef>
+          <a:fontRef idx="minor">
+            <a:schemeClr val="dk1"/>
+          </a:fontRef>
+        </p:style>
+        <p:txBody>
+          <a:bodyPr rot="0" vert="horz" wrap="square" lIns="91440" tIns="45720" rIns="91440" bIns="45720" anchor="t" anchorCtr="0">
+            <a:noAutofit/>
+          </a:bodyPr>
+          <a:lstStyle/>
+          <a:p>
+            <a:pPr algn="ctr">
+              <a:lnSpc>
+                <a:spcPct val="107000"/>
+              </a:lnSpc>
+              <a:spcAft>
+                <a:spcPts val="800"/>
+              </a:spcAft>
+            </a:pPr>
+            <a:r>
+              <a:rPr lang="pt-BR" sz="1100" dirty="0">
+                <a:effectLst/>
+                <a:latin typeface="Adobe Devanagari" panose="02040503050201020203" pitchFamily="18" charset="0"/>
+                <a:ea typeface="Calibri" panose="020F0502020204030204" pitchFamily="34" charset="0"/>
+                <a:cs typeface="Times New Roman" panose="02020603050405020304" pitchFamily="18" charset="0"/>
+              </a:rPr>
+              <a:t>Internet </a:t>
+            </a:r>
+            <a:r>
+              <a:rPr lang="pt-BR" sz="1100" dirty="0" err="1">
+                <a:effectLst/>
+                <a:latin typeface="Adobe Devanagari" panose="02040503050201020203" pitchFamily="18" charset="0"/>
+                <a:ea typeface="Calibri" panose="020F0502020204030204" pitchFamily="34" charset="0"/>
+                <a:cs typeface="Times New Roman" panose="02020603050405020304" pitchFamily="18" charset="0"/>
+              </a:rPr>
+              <a:t>NobreakNet</a:t>
+            </a:r>
+            <a:r>
+              <a:rPr lang="pt-BR" sz="1100" dirty="0">
+                <a:effectLst/>
+                <a:latin typeface="Adobe Devanagari" panose="02040503050201020203" pitchFamily="18" charset="0"/>
+                <a:ea typeface="Calibri" panose="020F0502020204030204" pitchFamily="34" charset="0"/>
+                <a:cs typeface="Times New Roman" panose="02020603050405020304" pitchFamily="18" charset="0"/>
+              </a:rPr>
+              <a:t> de 200Mbps</a:t>
+            </a:r>
+            <a:endParaRPr lang="pt-BR" sz="1100" dirty="0">
+              <a:effectLst/>
+              <a:ea typeface="Calibri" panose="020F0502020204030204" pitchFamily="34" charset="0"/>
+              <a:cs typeface="Times New Roman" panose="02020603050405020304" pitchFamily="18" charset="0"/>
+            </a:endParaRPr>
+          </a:p>
+        </p:txBody>
+      </p:sp>
+      <p:sp>
+        <p:nvSpPr>
+          <p:cNvPr id="25" name="Seta: da Esquerda para a Direita 24">
+            <a:extLst>
+              <a:ext uri="{FF2B5EF4-FFF2-40B4-BE49-F238E27FC236}">
+                <a16:creationId xmlns:a16="http://schemas.microsoft.com/office/drawing/2014/main" id="{861CE262-9185-4D76-82A9-D9C8955FD4E8}"/>
+              </a:ext>
+            </a:extLst>
+          </p:cNvPr>
+          <p:cNvSpPr/>
+          <p:nvPr/>
+        </p:nvSpPr>
+        <p:spPr>
+          <a:xfrm rot="16200000">
+            <a:off x="452203" y="4114846"/>
+            <a:ext cx="539597" cy="183515"/>
+          </a:xfrm>
+          <a:prstGeom prst="leftRightArrow">
+            <a:avLst/>
+          </a:prstGeom>
+          <a:noFill/>
+          <a:ln w="9525" cap="flat" cmpd="sng" algn="ctr">
+            <a:solidFill>
+              <a:schemeClr val="dk1"/>
+            </a:solidFill>
+            <a:prstDash val="solid"/>
+            <a:round/>
+            <a:headEnd type="none" w="med" len="med"/>
+            <a:tailEnd type="none" w="med" len="med"/>
+          </a:ln>
+        </p:spPr>
+        <p:style>
+          <a:lnRef idx="0">
+            <a:scrgbClr r="0" g="0" b="0"/>
+          </a:lnRef>
+          <a:fillRef idx="0">
+            <a:scrgbClr r="0" g="0" b="0"/>
+          </a:fillRef>
+          <a:effectRef idx="0">
+            <a:scrgbClr r="0" g="0" b="0"/>
+          </a:effectRef>
+          <a:fontRef idx="minor">
+            <a:schemeClr val="dk1"/>
+          </a:fontRef>
+        </p:style>
+        <p:txBody>
+          <a:bodyPr rot="0" spcFirstLastPara="0" vert="horz" wrap="square" lIns="91440" tIns="45720" rIns="91440" bIns="45720" numCol="1" spcCol="0" rtlCol="0" fromWordArt="0" anchor="ctr" anchorCtr="0" forceAA="0" compatLnSpc="1">
+            <a:prstTxWarp prst="textNoShape">
+              <a:avLst/>
+            </a:prstTxWarp>
+            <a:noAutofit/>
+          </a:bodyPr>
+          <a:lstStyle/>
+          <a:p>
+            <a:endParaRPr lang="pt-BR"/>
+          </a:p>
+        </p:txBody>
+      </p:sp>
+      <p:pic>
+        <p:nvPicPr>
+          <p:cNvPr id="26" name="Gráfico 3">
+            <a:extLst>
+              <a:ext uri="{FF2B5EF4-FFF2-40B4-BE49-F238E27FC236}">
+                <a16:creationId xmlns:a16="http://schemas.microsoft.com/office/drawing/2014/main" id="{9A3AF597-9F6C-4A41-A3CF-95A72DBCB1B7}"/>
+              </a:ext>
+            </a:extLst>
+          </p:cNvPr>
+          <p:cNvPicPr/>
+          <p:nvPr/>
+        </p:nvPicPr>
+        <p:blipFill>
+          <a:blip r:embed="rId8" cstate="print">
+            <a:extLst>
+              <a:ext uri="{28A0092B-C50C-407E-A947-70E740481C1C}">
+                <a14:useLocalDpi xmlns:a14="http://schemas.microsoft.com/office/drawing/2010/main" val="0"/>
+              </a:ext>
+              <a:ext uri="{96DAC541-7B7A-43D3-8B79-37D633B846F1}">
+                <asvg:svgBlip xmlns:asvg="http://schemas.microsoft.com/office/drawing/2016/SVG/main" r:embed="rId9"/>
+              </a:ext>
+            </a:extLst>
+          </a:blip>
+          <a:stretch>
+            <a:fillRect/>
+          </a:stretch>
+        </p:blipFill>
+        <p:spPr>
+          <a:xfrm>
+            <a:off x="434839" y="4514908"/>
+            <a:ext cx="581660" cy="581660"/>
+          </a:xfrm>
+          <a:prstGeom prst="rect">
+            <a:avLst/>
+          </a:prstGeom>
+        </p:spPr>
+      </p:pic>
+      <p:sp>
+        <p:nvSpPr>
+          <p:cNvPr id="27" name="Caixa de Texto 2">
+            <a:extLst>
+              <a:ext uri="{FF2B5EF4-FFF2-40B4-BE49-F238E27FC236}">
+                <a16:creationId xmlns:a16="http://schemas.microsoft.com/office/drawing/2014/main" id="{32CACE5F-631F-42A9-BA4E-4912CF9B1567}"/>
+              </a:ext>
+            </a:extLst>
+          </p:cNvPr>
+          <p:cNvSpPr txBox="1">
+            <a:spLocks noChangeArrowheads="1"/>
+          </p:cNvSpPr>
+          <p:nvPr/>
+        </p:nvSpPr>
+        <p:spPr bwMode="auto">
+          <a:xfrm>
+            <a:off x="6731453" y="1336116"/>
+            <a:ext cx="2480335" cy="1079046"/>
+          </a:xfrm>
+          <a:prstGeom prst="rect">
+            <a:avLst/>
+          </a:prstGeom>
+          <a:noFill/>
+          <a:ln>
+            <a:noFill/>
+          </a:ln>
+        </p:spPr>
+        <p:style>
+          <a:lnRef idx="0">
+            <a:scrgbClr r="0" g="0" b="0"/>
+          </a:lnRef>
+          <a:fillRef idx="0">
+            <a:scrgbClr r="0" g="0" b="0"/>
+          </a:fillRef>
+          <a:effectRef idx="0">
+            <a:scrgbClr r="0" g="0" b="0"/>
+          </a:effectRef>
+          <a:fontRef idx="minor">
+            <a:schemeClr val="dk1"/>
+          </a:fontRef>
+        </p:style>
+        <p:txBody>
+          <a:bodyPr rot="0" vert="horz" wrap="square" lIns="91440" tIns="45720" rIns="91440" bIns="45720" anchor="t" anchorCtr="0">
+            <a:noAutofit/>
+          </a:bodyPr>
+          <a:lstStyle/>
+          <a:p>
+            <a:pPr marL="171450" lvl="0" indent="-171450">
+              <a:lnSpc>
+                <a:spcPct val="107000"/>
+              </a:lnSpc>
+              <a:buFont typeface="Arial" panose="020B0604020202020204" pitchFamily="34" charset="0"/>
+              <a:buChar char="•"/>
+            </a:pPr>
+            <a:r>
+              <a:rPr lang="pt-BR" sz="1100" dirty="0">
+                <a:effectLst/>
+                <a:ea typeface="Calibri" panose="020F0502020204030204" pitchFamily="34" charset="0"/>
+                <a:cs typeface="Times New Roman" panose="02020603050405020304" pitchFamily="18" charset="0"/>
+              </a:rPr>
+              <a:t>Infraestrutura: Azure.</a:t>
+            </a:r>
+          </a:p>
+          <a:p>
+            <a:pPr marL="171450" lvl="0" indent="-171450">
+              <a:lnSpc>
+                <a:spcPct val="107000"/>
+              </a:lnSpc>
+              <a:buFont typeface="Arial" panose="020B0604020202020204" pitchFamily="34" charset="0"/>
+              <a:buChar char="•"/>
+            </a:pPr>
+            <a:r>
+              <a:rPr lang="pt-BR" sz="1100" dirty="0">
+                <a:effectLst/>
+                <a:ea typeface="Calibri" panose="020F0502020204030204" pitchFamily="34" charset="0"/>
+                <a:cs typeface="Times New Roman" panose="02020603050405020304" pitchFamily="18" charset="0"/>
+              </a:rPr>
+              <a:t>Aplicação: HTML / JS.</a:t>
+            </a:r>
+          </a:p>
+          <a:p>
+            <a:pPr marL="171450" lvl="0" indent="-171450">
+              <a:lnSpc>
+                <a:spcPct val="107000"/>
+              </a:lnSpc>
+              <a:buFont typeface="Arial" panose="020B0604020202020204" pitchFamily="34" charset="0"/>
+              <a:buChar char="•"/>
+            </a:pPr>
+            <a:r>
+              <a:rPr lang="pt-BR" sz="1100" dirty="0">
+                <a:ea typeface="Calibri" panose="020F0502020204030204" pitchFamily="34" charset="0"/>
+                <a:cs typeface="Times New Roman" panose="02020603050405020304" pitchFamily="18" charset="0"/>
+              </a:rPr>
+              <a:t>Banco de dados: MySQL Workbench.</a:t>
+            </a:r>
+          </a:p>
+          <a:p>
+            <a:pPr marL="171450" lvl="0" indent="-171450">
+              <a:lnSpc>
+                <a:spcPct val="107000"/>
+              </a:lnSpc>
+              <a:buFont typeface="Arial" panose="020B0604020202020204" pitchFamily="34" charset="0"/>
+              <a:buChar char="•"/>
+            </a:pPr>
+            <a:r>
+              <a:rPr lang="pt-BR" sz="1100" dirty="0">
+                <a:effectLst/>
+                <a:ea typeface="Calibri" panose="020F0502020204030204" pitchFamily="34" charset="0"/>
+                <a:cs typeface="Times New Roman" panose="02020603050405020304" pitchFamily="18" charset="0"/>
+              </a:rPr>
+              <a:t>Backup peri</a:t>
+            </a:r>
+            <a:r>
+              <a:rPr lang="pt-BR" sz="1100" dirty="0">
+                <a:ea typeface="Calibri" panose="020F0502020204030204" pitchFamily="34" charset="0"/>
+                <a:cs typeface="Times New Roman" panose="02020603050405020304" pitchFamily="18" charset="0"/>
+              </a:rPr>
+              <a:t>ódico dos dados.</a:t>
+            </a:r>
+            <a:endParaRPr lang="pt-BR" sz="1100" dirty="0">
+              <a:effectLst/>
+              <a:ea typeface="Calibri" panose="020F0502020204030204" pitchFamily="34" charset="0"/>
+              <a:cs typeface="Times New Roman" panose="02020603050405020304" pitchFamily="18" charset="0"/>
+            </a:endParaRPr>
+          </a:p>
+        </p:txBody>
+      </p:sp>
+      <p:sp>
+        <p:nvSpPr>
+          <p:cNvPr id="29" name="Retângulo: Cantos Arredondados 28">
+            <a:extLst>
+              <a:ext uri="{FF2B5EF4-FFF2-40B4-BE49-F238E27FC236}">
+                <a16:creationId xmlns:a16="http://schemas.microsoft.com/office/drawing/2014/main" id="{9E74CF1D-EC69-4310-84D3-300CE57CE64A}"/>
+              </a:ext>
+            </a:extLst>
+          </p:cNvPr>
+          <p:cNvSpPr/>
+          <p:nvPr/>
+        </p:nvSpPr>
+        <p:spPr>
+          <a:xfrm>
+            <a:off x="3478603" y="4328306"/>
+            <a:ext cx="2184400" cy="1960712"/>
+          </a:xfrm>
+          <a:prstGeom prst="roundRect">
+            <a:avLst/>
+          </a:prstGeom>
+          <a:noFill/>
+          <a:ln w="9525" cap="flat" cmpd="sng" algn="ctr">
+            <a:solidFill>
+              <a:schemeClr val="dk1"/>
+            </a:solidFill>
+            <a:prstDash val="solid"/>
+            <a:round/>
+            <a:headEnd type="none" w="med" len="med"/>
+            <a:tailEnd type="none" w="med" len="med"/>
+          </a:ln>
+        </p:spPr>
+        <p:style>
+          <a:lnRef idx="0">
+            <a:scrgbClr r="0" g="0" b="0"/>
+          </a:lnRef>
+          <a:fillRef idx="0">
+            <a:scrgbClr r="0" g="0" b="0"/>
+          </a:fillRef>
+          <a:effectRef idx="0">
+            <a:scrgbClr r="0" g="0" b="0"/>
+          </a:effectRef>
+          <a:fontRef idx="minor">
+            <a:schemeClr val="dk1"/>
+          </a:fontRef>
+        </p:style>
+        <p:txBody>
+          <a:bodyPr rot="0" spcFirstLastPara="0" vert="horz" wrap="square" lIns="91440" tIns="45720" rIns="91440" bIns="45720" numCol="1" spcCol="0" rtlCol="0" fromWordArt="0" anchor="ctr" anchorCtr="0" forceAA="0" compatLnSpc="1">
+            <a:prstTxWarp prst="textNoShape">
+              <a:avLst/>
+            </a:prstTxWarp>
+            <a:noAutofit/>
+          </a:bodyPr>
+          <a:lstStyle/>
+          <a:p>
+            <a:endParaRPr lang="pt-BR"/>
+          </a:p>
+        </p:txBody>
+      </p:sp>
+      <p:pic>
+        <p:nvPicPr>
+          <p:cNvPr id="30" name="Imagem 29">
+            <a:extLst>
+              <a:ext uri="{FF2B5EF4-FFF2-40B4-BE49-F238E27FC236}">
+                <a16:creationId xmlns:a16="http://schemas.microsoft.com/office/drawing/2014/main" id="{273CBEE7-6AFA-4D00-BAC5-51F926742E19}"/>
+              </a:ext>
+            </a:extLst>
+          </p:cNvPr>
+          <p:cNvPicPr/>
+          <p:nvPr/>
+        </p:nvPicPr>
+        <p:blipFill>
+          <a:blip r:embed="rId20" cstate="print">
+            <a:extLst>
+              <a:ext uri="{28A0092B-C50C-407E-A947-70E740481C1C}">
+                <a14:useLocalDpi xmlns:a14="http://schemas.microsoft.com/office/drawing/2010/main" val="0"/>
+              </a:ext>
+            </a:extLst>
+          </a:blip>
+          <a:srcRect/>
+          <a:stretch>
+            <a:fillRect/>
+          </a:stretch>
+        </p:blipFill>
+        <p:spPr bwMode="auto">
+          <a:xfrm>
+            <a:off x="3995980" y="4397606"/>
+            <a:ext cx="514985" cy="514985"/>
+          </a:xfrm>
+          <a:prstGeom prst="rect">
+            <a:avLst/>
+          </a:prstGeom>
+          <a:noFill/>
+          <a:ln>
+            <a:noFill/>
+          </a:ln>
+        </p:spPr>
+      </p:pic>
+      <p:pic>
+        <p:nvPicPr>
+          <p:cNvPr id="31" name="Imagem 30" descr="Forma&#10;&#10;Descrição gerada automaticamente com confiança baixa">
+            <a:extLst>
+              <a:ext uri="{FF2B5EF4-FFF2-40B4-BE49-F238E27FC236}">
+                <a16:creationId xmlns:a16="http://schemas.microsoft.com/office/drawing/2014/main" id="{33B3D89D-D700-4DC9-B766-EDB29859E2C0}"/>
+              </a:ext>
+            </a:extLst>
+          </p:cNvPr>
+          <p:cNvPicPr/>
+          <p:nvPr/>
+        </p:nvPicPr>
+        <p:blipFill>
+          <a:blip r:embed="rId21" cstate="print">
+            <a:extLst>
+              <a:ext uri="{28A0092B-C50C-407E-A947-70E740481C1C}">
+                <a14:useLocalDpi xmlns:a14="http://schemas.microsoft.com/office/drawing/2010/main" val="0"/>
+              </a:ext>
+            </a:extLst>
+          </a:blip>
+          <a:stretch>
+            <a:fillRect/>
+          </a:stretch>
+        </p:blipFill>
+        <p:spPr>
+          <a:xfrm rot="20529588">
+            <a:off x="4778385" y="4395384"/>
+            <a:ext cx="519430" cy="519430"/>
+          </a:xfrm>
+          <a:prstGeom prst="rect">
+            <a:avLst/>
+          </a:prstGeom>
+        </p:spPr>
+      </p:pic>
+      <p:sp>
+        <p:nvSpPr>
+          <p:cNvPr id="32" name="Caixa de Texto 2">
+            <a:extLst>
+              <a:ext uri="{FF2B5EF4-FFF2-40B4-BE49-F238E27FC236}">
+                <a16:creationId xmlns:a16="http://schemas.microsoft.com/office/drawing/2014/main" id="{DE598F96-5A73-4D5D-ACDA-BF164DEC04FD}"/>
+              </a:ext>
+            </a:extLst>
+          </p:cNvPr>
+          <p:cNvSpPr txBox="1">
+            <a:spLocks noChangeArrowheads="1"/>
+          </p:cNvSpPr>
+          <p:nvPr/>
+        </p:nvSpPr>
+        <p:spPr bwMode="auto">
+          <a:xfrm>
+            <a:off x="3507326" y="4934414"/>
+            <a:ext cx="2126954" cy="495300"/>
+          </a:xfrm>
+          <a:prstGeom prst="rect">
+            <a:avLst/>
+          </a:prstGeom>
+          <a:noFill/>
+          <a:ln>
+            <a:noFill/>
+          </a:ln>
+        </p:spPr>
+        <p:style>
+          <a:lnRef idx="0">
+            <a:scrgbClr r="0" g="0" b="0"/>
+          </a:lnRef>
+          <a:fillRef idx="0">
+            <a:scrgbClr r="0" g="0" b="0"/>
+          </a:fillRef>
+          <a:effectRef idx="0">
+            <a:scrgbClr r="0" g="0" b="0"/>
+          </a:effectRef>
+          <a:fontRef idx="minor">
+            <a:schemeClr val="dk1"/>
+          </a:fontRef>
+        </p:style>
+        <p:txBody>
+          <a:bodyPr rot="0" vert="horz" wrap="square" lIns="91440" tIns="45720" rIns="91440" bIns="45720" anchor="t" anchorCtr="0">
+            <a:noAutofit/>
+          </a:bodyPr>
+          <a:lstStyle/>
+          <a:p>
+            <a:pPr algn="ctr">
+              <a:lnSpc>
+                <a:spcPct val="107000"/>
+              </a:lnSpc>
+              <a:spcAft>
+                <a:spcPts val="800"/>
+              </a:spcAft>
+            </a:pPr>
+            <a:r>
+              <a:rPr lang="pt-BR" sz="1100" dirty="0">
+                <a:ea typeface="Calibri" panose="020F0502020204030204" pitchFamily="34" charset="0"/>
+                <a:cs typeface="Times New Roman" panose="02020603050405020304" pitchFamily="18" charset="0"/>
+              </a:rPr>
+              <a:t>Equipe de modificação especializada em planejamento e  desenvolvimento de </a:t>
+            </a:r>
+            <a:r>
+              <a:rPr lang="pt-BR" sz="1100" dirty="0" err="1">
+                <a:ea typeface="Calibri" panose="020F0502020204030204" pitchFamily="34" charset="0"/>
+                <a:cs typeface="Times New Roman" panose="02020603050405020304" pitchFamily="18" charset="0"/>
+              </a:rPr>
+              <a:t>lowriders</a:t>
+            </a:r>
+            <a:r>
+              <a:rPr lang="pt-BR" sz="1100" dirty="0">
+                <a:ea typeface="Calibri" panose="020F0502020204030204" pitchFamily="34" charset="0"/>
+                <a:cs typeface="Times New Roman" panose="02020603050405020304" pitchFamily="18" charset="0"/>
+              </a:rPr>
+              <a:t> que realizaram a conexão da vontade do usuário com as oficinas e mecânicas.</a:t>
+            </a:r>
+            <a:endParaRPr lang="pt-BR" sz="1100" dirty="0">
+              <a:effectLst/>
+              <a:ea typeface="Calibri" panose="020F0502020204030204" pitchFamily="34" charset="0"/>
+              <a:cs typeface="Times New Roman" panose="02020603050405020304" pitchFamily="18" charset="0"/>
+            </a:endParaRPr>
+          </a:p>
+        </p:txBody>
+      </p:sp>
+      <p:sp>
+        <p:nvSpPr>
+          <p:cNvPr id="34" name="Retângulo: Cantos Arredondados 33">
+            <a:extLst>
+              <a:ext uri="{FF2B5EF4-FFF2-40B4-BE49-F238E27FC236}">
+                <a16:creationId xmlns:a16="http://schemas.microsoft.com/office/drawing/2014/main" id="{1552A492-9951-49F6-BF3E-9C680145D997}"/>
+              </a:ext>
+            </a:extLst>
+          </p:cNvPr>
+          <p:cNvSpPr/>
+          <p:nvPr/>
+        </p:nvSpPr>
+        <p:spPr>
+          <a:xfrm>
+            <a:off x="2875674" y="2413349"/>
+            <a:ext cx="3715222" cy="1621990"/>
+          </a:xfrm>
+          <a:prstGeom prst="roundRect">
+            <a:avLst/>
+          </a:prstGeom>
+          <a:noFill/>
+          <a:ln w="9525" cap="flat" cmpd="sng" algn="ctr">
+            <a:solidFill>
+              <a:schemeClr val="dk1"/>
+            </a:solidFill>
+            <a:prstDash val="solid"/>
+            <a:round/>
+            <a:headEnd type="none" w="med" len="med"/>
+            <a:tailEnd type="none" w="med" len="med"/>
+          </a:ln>
+        </p:spPr>
+        <p:style>
+          <a:lnRef idx="0">
+            <a:scrgbClr r="0" g="0" b="0"/>
+          </a:lnRef>
+          <a:fillRef idx="0">
+            <a:scrgbClr r="0" g="0" b="0"/>
+          </a:fillRef>
+          <a:effectRef idx="0">
+            <a:scrgbClr r="0" g="0" b="0"/>
+          </a:effectRef>
+          <a:fontRef idx="minor">
+            <a:schemeClr val="dk1"/>
+          </a:fontRef>
+        </p:style>
+        <p:txBody>
+          <a:bodyPr rot="0" spcFirstLastPara="0" vert="horz" wrap="square" lIns="91440" tIns="45720" rIns="91440" bIns="45720" numCol="1" spcCol="0" rtlCol="0" fromWordArt="0" anchor="ctr" anchorCtr="0" forceAA="0" compatLnSpc="1">
+            <a:prstTxWarp prst="textNoShape">
+              <a:avLst/>
+            </a:prstTxWarp>
+            <a:noAutofit/>
+          </a:bodyPr>
+          <a:lstStyle/>
+          <a:p>
+            <a:endParaRPr lang="pt-BR"/>
+          </a:p>
+        </p:txBody>
+      </p:sp>
+      <p:pic>
+        <p:nvPicPr>
+          <p:cNvPr id="36" name="Gráfico 7">
+            <a:extLst>
+              <a:ext uri="{FF2B5EF4-FFF2-40B4-BE49-F238E27FC236}">
+                <a16:creationId xmlns:a16="http://schemas.microsoft.com/office/drawing/2014/main" id="{6E496E5B-6030-4FC5-B18F-A4DCFB644E12}"/>
+              </a:ext>
+            </a:extLst>
+          </p:cNvPr>
+          <p:cNvPicPr/>
+          <p:nvPr/>
+        </p:nvPicPr>
+        <p:blipFill>
+          <a:blip r:embed="rId18" cstate="print">
+            <a:extLst>
+              <a:ext uri="{28A0092B-C50C-407E-A947-70E740481C1C}">
+                <a14:useLocalDpi xmlns:a14="http://schemas.microsoft.com/office/drawing/2010/main" val="0"/>
+              </a:ext>
+              <a:ext uri="{96DAC541-7B7A-43D3-8B79-37D633B846F1}">
+                <asvg:svgBlip xmlns:asvg="http://schemas.microsoft.com/office/drawing/2016/SVG/main" r:embed="rId19"/>
+              </a:ext>
+            </a:extLst>
+          </a:blip>
+          <a:stretch>
+            <a:fillRect/>
+          </a:stretch>
+        </p:blipFill>
+        <p:spPr>
+          <a:xfrm>
+            <a:off x="4544265" y="2072167"/>
+            <a:ext cx="380365" cy="380365"/>
+          </a:xfrm>
+          <a:prstGeom prst="rect">
+            <a:avLst/>
+          </a:prstGeom>
+        </p:spPr>
+      </p:pic>
+      <p:pic>
+        <p:nvPicPr>
+          <p:cNvPr id="37" name="Gráfico 3">
+            <a:extLst>
+              <a:ext uri="{FF2B5EF4-FFF2-40B4-BE49-F238E27FC236}">
+                <a16:creationId xmlns:a16="http://schemas.microsoft.com/office/drawing/2014/main" id="{F744C7D9-1732-459C-B01C-3EFE03802978}"/>
+              </a:ext>
+            </a:extLst>
+          </p:cNvPr>
+          <p:cNvPicPr/>
+          <p:nvPr/>
+        </p:nvPicPr>
+        <p:blipFill>
+          <a:blip r:embed="rId8" cstate="print">
+            <a:extLst>
+              <a:ext uri="{28A0092B-C50C-407E-A947-70E740481C1C}">
+                <a14:useLocalDpi xmlns:a14="http://schemas.microsoft.com/office/drawing/2010/main" val="0"/>
+              </a:ext>
+              <a:ext uri="{96DAC541-7B7A-43D3-8B79-37D633B846F1}">
+                <asvg:svgBlip xmlns:asvg="http://schemas.microsoft.com/office/drawing/2016/SVG/main" r:embed="rId9"/>
+              </a:ext>
+            </a:extLst>
+          </a:blip>
+          <a:stretch>
+            <a:fillRect/>
+          </a:stretch>
+        </p:blipFill>
+        <p:spPr>
+          <a:xfrm>
+            <a:off x="5332507" y="1801230"/>
+            <a:ext cx="581660" cy="581660"/>
+          </a:xfrm>
+          <a:prstGeom prst="rect">
+            <a:avLst/>
+          </a:prstGeom>
+        </p:spPr>
+      </p:pic>
+      <p:sp>
+        <p:nvSpPr>
+          <p:cNvPr id="38" name="Seta: da Esquerda para a Direita 37">
+            <a:extLst>
+              <a:ext uri="{FF2B5EF4-FFF2-40B4-BE49-F238E27FC236}">
+                <a16:creationId xmlns:a16="http://schemas.microsoft.com/office/drawing/2014/main" id="{20DC11D5-68BE-496C-A0DE-6A231EDB0031}"/>
+              </a:ext>
+            </a:extLst>
+          </p:cNvPr>
+          <p:cNvSpPr/>
+          <p:nvPr/>
+        </p:nvSpPr>
+        <p:spPr>
+          <a:xfrm>
+            <a:off x="4938932" y="2083068"/>
+            <a:ext cx="425961" cy="183515"/>
+          </a:xfrm>
+          <a:prstGeom prst="leftRightArrow">
+            <a:avLst/>
+          </a:prstGeom>
+          <a:noFill/>
+          <a:ln w="9525" cap="flat" cmpd="sng" algn="ctr">
+            <a:solidFill>
+              <a:schemeClr val="dk1"/>
+            </a:solidFill>
+            <a:prstDash val="solid"/>
+            <a:round/>
+            <a:headEnd type="none" w="med" len="med"/>
+            <a:tailEnd type="none" w="med" len="med"/>
+          </a:ln>
+        </p:spPr>
+        <p:style>
+          <a:lnRef idx="0">
+            <a:scrgbClr r="0" g="0" b="0"/>
+          </a:lnRef>
+          <a:fillRef idx="0">
+            <a:scrgbClr r="0" g="0" b="0"/>
+          </a:fillRef>
+          <a:effectRef idx="0">
+            <a:scrgbClr r="0" g="0" b="0"/>
+          </a:effectRef>
+          <a:fontRef idx="minor">
+            <a:schemeClr val="dk1"/>
+          </a:fontRef>
+        </p:style>
+        <p:txBody>
+          <a:bodyPr rot="0" spcFirstLastPara="0" vert="horz" wrap="square" lIns="91440" tIns="45720" rIns="91440" bIns="45720" numCol="1" spcCol="0" rtlCol="0" fromWordArt="0" anchor="ctr" anchorCtr="0" forceAA="0" compatLnSpc="1">
+            <a:prstTxWarp prst="textNoShape">
+              <a:avLst/>
+            </a:prstTxWarp>
+            <a:noAutofit/>
+          </a:bodyPr>
+          <a:lstStyle/>
+          <a:p>
+            <a:endParaRPr lang="pt-BR"/>
+          </a:p>
+        </p:txBody>
+      </p:sp>
+      <p:sp>
+        <p:nvSpPr>
+          <p:cNvPr id="39" name="Seta: para a Esquerda e para Cima 38">
+            <a:extLst>
+              <a:ext uri="{FF2B5EF4-FFF2-40B4-BE49-F238E27FC236}">
+                <a16:creationId xmlns:a16="http://schemas.microsoft.com/office/drawing/2014/main" id="{2C22550E-5228-42AB-99A9-AB855991E782}"/>
+              </a:ext>
+            </a:extLst>
+          </p:cNvPr>
+          <p:cNvSpPr/>
+          <p:nvPr/>
+        </p:nvSpPr>
+        <p:spPr>
+          <a:xfrm rot="10800000" flipH="1" flipV="1">
+            <a:off x="5837955" y="1607023"/>
+            <a:ext cx="485562" cy="613726"/>
+          </a:xfrm>
+          <a:prstGeom prst="leftUpArrow">
+            <a:avLst>
+              <a:gd name="adj1" fmla="val 20163"/>
+              <a:gd name="adj2" fmla="val 15763"/>
+              <a:gd name="adj3" fmla="val 20163"/>
+            </a:avLst>
+          </a:prstGeom>
+          <a:noFill/>
+          <a:ln w="9525" cap="flat" cmpd="sng" algn="ctr">
+            <a:solidFill>
+              <a:schemeClr val="dk1"/>
+            </a:solidFill>
+            <a:prstDash val="solid"/>
+            <a:round/>
+            <a:headEnd type="none" w="med" len="med"/>
+            <a:tailEnd type="none" w="med" len="med"/>
+          </a:ln>
+        </p:spPr>
+        <p:style>
+          <a:lnRef idx="0">
+            <a:scrgbClr r="0" g="0" b="0"/>
+          </a:lnRef>
+          <a:fillRef idx="0">
+            <a:scrgbClr r="0" g="0" b="0"/>
+          </a:fillRef>
+          <a:effectRef idx="0">
+            <a:scrgbClr r="0" g="0" b="0"/>
+          </a:effectRef>
+          <a:fontRef idx="minor">
+            <a:schemeClr val="dk1"/>
+          </a:fontRef>
+        </p:style>
+        <p:txBody>
+          <a:bodyPr rot="0" spcFirstLastPara="0" vert="horz" wrap="square" lIns="91440" tIns="45720" rIns="91440" bIns="45720" numCol="1" spcCol="0" rtlCol="0" fromWordArt="0" anchor="ctr" anchorCtr="0" forceAA="0" compatLnSpc="1">
+            <a:prstTxWarp prst="textNoShape">
+              <a:avLst/>
+            </a:prstTxWarp>
+            <a:noAutofit/>
+          </a:bodyPr>
+          <a:lstStyle/>
+          <a:p>
+            <a:endParaRPr lang="pt-BR"/>
+          </a:p>
+        </p:txBody>
+      </p:sp>
+      <p:pic>
+        <p:nvPicPr>
+          <p:cNvPr id="40" name="Gráfico 37">
+            <a:extLst>
+              <a:ext uri="{FF2B5EF4-FFF2-40B4-BE49-F238E27FC236}">
+                <a16:creationId xmlns:a16="http://schemas.microsoft.com/office/drawing/2014/main" id="{09856FA6-309B-4890-B32B-16D8CCF2E247}"/>
+              </a:ext>
+            </a:extLst>
+          </p:cNvPr>
+          <p:cNvPicPr/>
+          <p:nvPr/>
+        </p:nvPicPr>
+        <p:blipFill>
+          <a:blip r:embed="rId22" cstate="print">
+            <a:extLst>
+              <a:ext uri="{28A0092B-C50C-407E-A947-70E740481C1C}">
+                <a14:useLocalDpi xmlns:a14="http://schemas.microsoft.com/office/drawing/2010/main" val="0"/>
+              </a:ext>
+              <a:ext uri="{96DAC541-7B7A-43D3-8B79-37D633B846F1}">
+                <asvg:svgBlip xmlns:asvg="http://schemas.microsoft.com/office/drawing/2016/SVG/main" r:embed="rId23"/>
+              </a:ext>
+            </a:extLst>
+          </a:blip>
+          <a:stretch>
+            <a:fillRect/>
+          </a:stretch>
+        </p:blipFill>
+        <p:spPr>
+          <a:xfrm>
+            <a:off x="3200584" y="3327799"/>
+            <a:ext cx="529590" cy="529590"/>
+          </a:xfrm>
+          <a:prstGeom prst="rect">
+            <a:avLst/>
+          </a:prstGeom>
+        </p:spPr>
+      </p:pic>
+      <p:pic>
+        <p:nvPicPr>
+          <p:cNvPr id="41" name="Imagem 40" descr="Forma&#10;&#10;Descrição gerada automaticamente com confiança baixa">
+            <a:extLst>
+              <a:ext uri="{FF2B5EF4-FFF2-40B4-BE49-F238E27FC236}">
+                <a16:creationId xmlns:a16="http://schemas.microsoft.com/office/drawing/2014/main" id="{44141FA6-6EAA-4507-A773-60D6DE97B6D6}"/>
+              </a:ext>
+            </a:extLst>
+          </p:cNvPr>
+          <p:cNvPicPr/>
+          <p:nvPr/>
+        </p:nvPicPr>
+        <p:blipFill>
+          <a:blip r:embed="rId24" cstate="print">
+            <a:extLst>
+              <a:ext uri="{28A0092B-C50C-407E-A947-70E740481C1C}">
+                <a14:useLocalDpi xmlns:a14="http://schemas.microsoft.com/office/drawing/2010/main" val="0"/>
+              </a:ext>
+            </a:extLst>
+          </a:blip>
+          <a:stretch>
+            <a:fillRect/>
+          </a:stretch>
+        </p:blipFill>
+        <p:spPr>
+          <a:xfrm>
+            <a:off x="2998876" y="2534369"/>
+            <a:ext cx="381000" cy="381000"/>
+          </a:xfrm>
+          <a:prstGeom prst="rect">
+            <a:avLst/>
+          </a:prstGeom>
+        </p:spPr>
+      </p:pic>
+      <p:sp>
+        <p:nvSpPr>
+          <p:cNvPr id="43" name="Caixa de Texto 2">
+            <a:extLst>
+              <a:ext uri="{FF2B5EF4-FFF2-40B4-BE49-F238E27FC236}">
+                <a16:creationId xmlns:a16="http://schemas.microsoft.com/office/drawing/2014/main" id="{7615E8BF-7544-462A-94CC-B947AC00A821}"/>
+              </a:ext>
+            </a:extLst>
+          </p:cNvPr>
+          <p:cNvSpPr txBox="1">
+            <a:spLocks noChangeArrowheads="1"/>
+          </p:cNvSpPr>
+          <p:nvPr/>
+        </p:nvSpPr>
+        <p:spPr bwMode="auto">
+          <a:xfrm>
+            <a:off x="3762933" y="3457712"/>
+            <a:ext cx="2860722" cy="730328"/>
+          </a:xfrm>
+          <a:prstGeom prst="rect">
+            <a:avLst/>
+          </a:prstGeom>
+          <a:noFill/>
+          <a:ln>
+            <a:noFill/>
+          </a:ln>
+        </p:spPr>
+        <p:style>
+          <a:lnRef idx="0">
+            <a:scrgbClr r="0" g="0" b="0"/>
+          </a:lnRef>
+          <a:fillRef idx="0">
+            <a:scrgbClr r="0" g="0" b="0"/>
+          </a:fillRef>
+          <a:effectRef idx="0">
+            <a:scrgbClr r="0" g="0" b="0"/>
+          </a:effectRef>
+          <a:fontRef idx="minor">
+            <a:schemeClr val="dk1"/>
+          </a:fontRef>
+        </p:style>
+        <p:txBody>
+          <a:bodyPr rot="0" vert="horz" wrap="square" lIns="91440" tIns="45720" rIns="91440" bIns="45720" anchor="t" anchorCtr="0">
+            <a:spAutoFit/>
+          </a:bodyPr>
+          <a:lstStyle/>
+          <a:p>
+            <a:pPr algn="ctr">
+              <a:lnSpc>
+                <a:spcPct val="107000"/>
+              </a:lnSpc>
+              <a:spcAft>
+                <a:spcPts val="800"/>
+              </a:spcAft>
+            </a:pPr>
+            <a:r>
+              <a:rPr lang="pt-BR" sz="1100" dirty="0">
+                <a:ea typeface="Calibri" panose="020F0502020204030204" pitchFamily="34" charset="0"/>
+                <a:cs typeface="Times New Roman" panose="02020603050405020304" pitchFamily="18" charset="0"/>
+              </a:rPr>
+              <a:t>Especificações mínimas: processador </a:t>
+            </a:r>
+            <a:r>
+              <a:rPr lang="pt-BR" sz="1100" dirty="0">
+                <a:effectLst/>
+                <a:ea typeface="Calibri" panose="020F0502020204030204" pitchFamily="34" charset="0"/>
+                <a:cs typeface="Times New Roman" panose="02020603050405020304" pitchFamily="18" charset="0"/>
+              </a:rPr>
+              <a:t>Intel Pentium Gold, </a:t>
+            </a:r>
+            <a:r>
+              <a:rPr lang="pt-BR" sz="1100" dirty="0">
+                <a:ea typeface="Calibri" panose="020F0502020204030204" pitchFamily="34" charset="0"/>
+                <a:cs typeface="Times New Roman" panose="02020603050405020304" pitchFamily="18" charset="0"/>
+              </a:rPr>
+              <a:t>U</a:t>
+            </a:r>
+            <a:r>
+              <a:rPr lang="pt-BR" sz="1100" dirty="0">
+                <a:effectLst/>
+                <a:ea typeface="Calibri" panose="020F0502020204030204" pitchFamily="34" charset="0"/>
+                <a:cs typeface="Times New Roman" panose="02020603050405020304" pitchFamily="18" charset="0"/>
+              </a:rPr>
+              <a:t>buntu </a:t>
+            </a:r>
+            <a:r>
+              <a:rPr lang="pt-BR" sz="1100" dirty="0">
+                <a:ea typeface="Calibri" panose="020F0502020204030204" pitchFamily="34" charset="0"/>
+                <a:cs typeface="Times New Roman" panose="02020603050405020304" pitchFamily="18" charset="0"/>
+              </a:rPr>
+              <a:t>L</a:t>
+            </a:r>
+            <a:r>
+              <a:rPr lang="pt-BR" sz="1100" dirty="0">
+                <a:effectLst/>
+                <a:ea typeface="Calibri" panose="020F0502020204030204" pitchFamily="34" charset="0"/>
+                <a:cs typeface="Times New Roman" panose="02020603050405020304" pitchFamily="18" charset="0"/>
+              </a:rPr>
+              <a:t>inux 128GB SSD 4GB </a:t>
+            </a:r>
+          </a:p>
+          <a:p>
+            <a:pPr>
+              <a:lnSpc>
+                <a:spcPct val="107000"/>
+              </a:lnSpc>
+              <a:spcAft>
+                <a:spcPts val="800"/>
+              </a:spcAft>
+            </a:pPr>
+            <a:r>
+              <a:rPr lang="pt-BR" sz="1100" dirty="0">
+                <a:effectLst/>
+                <a:ea typeface="Calibri" panose="020F0502020204030204" pitchFamily="34" charset="0"/>
+                <a:cs typeface="Times New Roman" panose="02020603050405020304" pitchFamily="18" charset="0"/>
+              </a:rPr>
+              <a:t> </a:t>
+            </a:r>
+          </a:p>
+        </p:txBody>
+      </p:sp>
+      <p:sp>
+        <p:nvSpPr>
+          <p:cNvPr id="44" name="Caixa de Texto 2">
+            <a:extLst>
+              <a:ext uri="{FF2B5EF4-FFF2-40B4-BE49-F238E27FC236}">
+                <a16:creationId xmlns:a16="http://schemas.microsoft.com/office/drawing/2014/main" id="{5FA5075B-8097-419C-82E3-83819F2C21A6}"/>
+              </a:ext>
+            </a:extLst>
+          </p:cNvPr>
+          <p:cNvSpPr txBox="1">
+            <a:spLocks noChangeArrowheads="1"/>
+          </p:cNvSpPr>
+          <p:nvPr/>
+        </p:nvSpPr>
+        <p:spPr bwMode="auto">
+          <a:xfrm>
+            <a:off x="2786266" y="2834370"/>
+            <a:ext cx="3820310" cy="730328"/>
+          </a:xfrm>
+          <a:prstGeom prst="rect">
+            <a:avLst/>
+          </a:prstGeom>
+          <a:noFill/>
+          <a:ln>
+            <a:noFill/>
+          </a:ln>
+        </p:spPr>
+        <p:style>
+          <a:lnRef idx="0">
+            <a:scrgbClr r="0" g="0" b="0"/>
+          </a:lnRef>
+          <a:fillRef idx="0">
+            <a:scrgbClr r="0" g="0" b="0"/>
+          </a:fillRef>
+          <a:effectRef idx="0">
+            <a:scrgbClr r="0" g="0" b="0"/>
+          </a:effectRef>
+          <a:fontRef idx="minor">
+            <a:schemeClr val="dk1"/>
+          </a:fontRef>
+        </p:style>
+        <p:txBody>
+          <a:bodyPr rot="0" vert="horz" wrap="square" lIns="91440" tIns="45720" rIns="91440" bIns="45720" anchor="t" anchorCtr="0">
+            <a:spAutoFit/>
+          </a:bodyPr>
+          <a:lstStyle/>
+          <a:p>
+            <a:pPr algn="ctr">
+              <a:lnSpc>
+                <a:spcPct val="107000"/>
+              </a:lnSpc>
+              <a:spcAft>
+                <a:spcPts val="800"/>
+              </a:spcAft>
+            </a:pPr>
+            <a:r>
+              <a:rPr lang="pt-BR" sz="1100" dirty="0">
+                <a:effectLst/>
+                <a:ea typeface="Calibri" panose="020F0502020204030204" pitchFamily="34" charset="0"/>
+                <a:cs typeface="Times New Roman" panose="02020603050405020304" pitchFamily="18" charset="0"/>
+              </a:rPr>
+              <a:t>Equipe de funcionários responsáveis </a:t>
+            </a:r>
+            <a:r>
+              <a:rPr lang="pt-BR" sz="1100" dirty="0">
+                <a:ea typeface="Calibri" panose="020F0502020204030204" pitchFamily="34" charset="0"/>
+                <a:cs typeface="Times New Roman" panose="02020603050405020304" pitchFamily="18" charset="0"/>
+              </a:rPr>
+              <a:t>pela manutenção da solução web e backup periódico local para segurança dos dados</a:t>
+            </a:r>
+            <a:r>
+              <a:rPr lang="pt-BR" sz="1100" dirty="0">
+                <a:effectLst/>
+                <a:ea typeface="Calibri" panose="020F0502020204030204" pitchFamily="34" charset="0"/>
+                <a:cs typeface="Times New Roman" panose="02020603050405020304" pitchFamily="18" charset="0"/>
+              </a:rPr>
+              <a:t> </a:t>
+            </a:r>
+          </a:p>
+          <a:p>
+            <a:pPr>
+              <a:lnSpc>
+                <a:spcPct val="107000"/>
+              </a:lnSpc>
+              <a:spcAft>
+                <a:spcPts val="800"/>
+              </a:spcAft>
+            </a:pPr>
+            <a:r>
+              <a:rPr lang="pt-BR" sz="1100" dirty="0">
+                <a:effectLst/>
+                <a:ea typeface="Calibri" panose="020F0502020204030204" pitchFamily="34" charset="0"/>
+                <a:cs typeface="Times New Roman" panose="02020603050405020304" pitchFamily="18" charset="0"/>
+              </a:rPr>
+              <a:t> </a:t>
+            </a:r>
+          </a:p>
+        </p:txBody>
+      </p:sp>
+      <p:pic>
+        <p:nvPicPr>
+          <p:cNvPr id="48" name="Imagem 47" descr="Forma&#10;&#10;Descrição gerada automaticamente com confiança baixa">
+            <a:extLst>
+              <a:ext uri="{FF2B5EF4-FFF2-40B4-BE49-F238E27FC236}">
+                <a16:creationId xmlns:a16="http://schemas.microsoft.com/office/drawing/2014/main" id="{2268C85B-E56A-44B6-A488-11B5FEC55F3E}"/>
+              </a:ext>
+            </a:extLst>
+          </p:cNvPr>
+          <p:cNvPicPr>
+            <a:picLocks noChangeAspect="1"/>
+          </p:cNvPicPr>
+          <p:nvPr/>
+        </p:nvPicPr>
+        <p:blipFill>
+          <a:blip r:embed="rId25">
+            <a:extLst>
+              <a:ext uri="{28A0092B-C50C-407E-A947-70E740481C1C}">
+                <a14:useLocalDpi xmlns:a14="http://schemas.microsoft.com/office/drawing/2010/main" val="0"/>
+              </a:ext>
+            </a:extLst>
+          </a:blip>
+          <a:stretch>
+            <a:fillRect/>
+          </a:stretch>
+        </p:blipFill>
+        <p:spPr>
+          <a:xfrm>
+            <a:off x="4943549" y="766919"/>
+            <a:ext cx="340664" cy="340664"/>
+          </a:xfrm>
+          <a:prstGeom prst="rect">
+            <a:avLst/>
+          </a:prstGeom>
+        </p:spPr>
+      </p:pic>
+      <p:sp>
+        <p:nvSpPr>
+          <p:cNvPr id="49" name="Seta: para a Esquerda e para Cima 48">
+            <a:extLst>
+              <a:ext uri="{FF2B5EF4-FFF2-40B4-BE49-F238E27FC236}">
+                <a16:creationId xmlns:a16="http://schemas.microsoft.com/office/drawing/2014/main" id="{4B01AF33-C7C6-48A8-A62C-166373221828}"/>
+              </a:ext>
+            </a:extLst>
+          </p:cNvPr>
+          <p:cNvSpPr/>
+          <p:nvPr/>
+        </p:nvSpPr>
+        <p:spPr>
+          <a:xfrm rot="16200000" flipH="1" flipV="1">
+            <a:off x="1652720" y="4080491"/>
+            <a:ext cx="694453" cy="2847989"/>
+          </a:xfrm>
+          <a:prstGeom prst="leftUpArrow">
+            <a:avLst>
+              <a:gd name="adj1" fmla="val 17238"/>
+              <a:gd name="adj2" fmla="val 16284"/>
+              <a:gd name="adj3" fmla="val 19966"/>
+            </a:avLst>
+          </a:prstGeom>
+          <a:noFill/>
+          <a:ln w="9525" cap="flat" cmpd="sng" algn="ctr">
+            <a:solidFill>
+              <a:schemeClr val="dk1"/>
+            </a:solidFill>
+            <a:prstDash val="solid"/>
+            <a:round/>
+            <a:headEnd type="none" w="med" len="med"/>
+            <a:tailEnd type="none" w="med" len="med"/>
+          </a:ln>
+        </p:spPr>
+        <p:style>
+          <a:lnRef idx="0">
+            <a:scrgbClr r="0" g="0" b="0"/>
+          </a:lnRef>
+          <a:fillRef idx="0">
+            <a:scrgbClr r="0" g="0" b="0"/>
+          </a:fillRef>
+          <a:effectRef idx="0">
+            <a:scrgbClr r="0" g="0" b="0"/>
+          </a:effectRef>
+          <a:fontRef idx="minor">
+            <a:schemeClr val="dk1"/>
+          </a:fontRef>
+        </p:style>
+        <p:txBody>
+          <a:bodyPr rot="0" spcFirstLastPara="0" vert="horz" wrap="square" lIns="91440" tIns="45720" rIns="91440" bIns="45720" numCol="1" spcCol="0" rtlCol="0" fromWordArt="0" anchor="ctr" anchorCtr="0" forceAA="0" compatLnSpc="1">
+            <a:prstTxWarp prst="textNoShape">
+              <a:avLst/>
+            </a:prstTxWarp>
+            <a:noAutofit/>
+          </a:bodyPr>
+          <a:lstStyle/>
+          <a:p>
+            <a:endParaRPr lang="pt-BR"/>
+          </a:p>
+        </p:txBody>
+      </p:sp>
+      <p:sp>
+        <p:nvSpPr>
+          <p:cNvPr id="50" name="Seta: para a Esquerda e para Cima 49">
+            <a:extLst>
+              <a:ext uri="{FF2B5EF4-FFF2-40B4-BE49-F238E27FC236}">
+                <a16:creationId xmlns:a16="http://schemas.microsoft.com/office/drawing/2014/main" id="{4766E50E-5930-48B0-AF32-2AA05BA6EE52}"/>
+              </a:ext>
+            </a:extLst>
+          </p:cNvPr>
+          <p:cNvSpPr/>
+          <p:nvPr/>
+        </p:nvSpPr>
+        <p:spPr>
+          <a:xfrm flipH="1">
+            <a:off x="2998876" y="4065798"/>
+            <a:ext cx="448730" cy="689645"/>
+          </a:xfrm>
+          <a:prstGeom prst="leftUpArrow">
+            <a:avLst>
+              <a:gd name="adj1" fmla="val 20163"/>
+              <a:gd name="adj2" fmla="val 15763"/>
+              <a:gd name="adj3" fmla="val 20163"/>
+            </a:avLst>
+          </a:prstGeom>
+          <a:noFill/>
+          <a:ln w="9525" cap="flat" cmpd="sng" algn="ctr">
+            <a:solidFill>
+              <a:schemeClr val="dk1"/>
+            </a:solidFill>
+            <a:prstDash val="solid"/>
+            <a:round/>
+            <a:headEnd type="none" w="med" len="med"/>
+            <a:tailEnd type="none" w="med" len="med"/>
+          </a:ln>
+        </p:spPr>
+        <p:style>
+          <a:lnRef idx="0">
+            <a:scrgbClr r="0" g="0" b="0"/>
+          </a:lnRef>
+          <a:fillRef idx="0">
+            <a:scrgbClr r="0" g="0" b="0"/>
+          </a:fillRef>
+          <a:effectRef idx="0">
+            <a:scrgbClr r="0" g="0" b="0"/>
+          </a:effectRef>
+          <a:fontRef idx="minor">
+            <a:schemeClr val="dk1"/>
+          </a:fontRef>
+        </p:style>
+        <p:txBody>
+          <a:bodyPr rot="0" spcFirstLastPara="0" vert="horz" wrap="square" lIns="91440" tIns="45720" rIns="91440" bIns="45720" numCol="1" spcCol="0" rtlCol="0" fromWordArt="0" anchor="ctr" anchorCtr="0" forceAA="0" compatLnSpc="1">
+            <a:prstTxWarp prst="textNoShape">
+              <a:avLst/>
+            </a:prstTxWarp>
+            <a:noAutofit/>
+          </a:bodyPr>
+          <a:lstStyle/>
+          <a:p>
+            <a:endParaRPr lang="pt-BR"/>
+          </a:p>
+        </p:txBody>
+      </p:sp>
+      <p:sp>
+        <p:nvSpPr>
+          <p:cNvPr id="51" name="Caixa de Texto 2">
+            <a:extLst>
+              <a:ext uri="{FF2B5EF4-FFF2-40B4-BE49-F238E27FC236}">
+                <a16:creationId xmlns:a16="http://schemas.microsoft.com/office/drawing/2014/main" id="{9FED8758-6EE8-45FA-BDF7-E3DFAE481730}"/>
+              </a:ext>
+            </a:extLst>
+          </p:cNvPr>
+          <p:cNvSpPr txBox="1">
+            <a:spLocks noChangeArrowheads="1"/>
+          </p:cNvSpPr>
+          <p:nvPr/>
+        </p:nvSpPr>
+        <p:spPr bwMode="auto">
+          <a:xfrm>
+            <a:off x="2601101" y="2084883"/>
+            <a:ext cx="2052955" cy="318770"/>
+          </a:xfrm>
+          <a:prstGeom prst="rect">
+            <a:avLst/>
+          </a:prstGeom>
+          <a:noFill/>
+          <a:ln>
+            <a:noFill/>
+          </a:ln>
+        </p:spPr>
+        <p:style>
+          <a:lnRef idx="0">
+            <a:scrgbClr r="0" g="0" b="0"/>
+          </a:lnRef>
+          <a:fillRef idx="0">
+            <a:scrgbClr r="0" g="0" b="0"/>
+          </a:fillRef>
+          <a:effectRef idx="0">
+            <a:scrgbClr r="0" g="0" b="0"/>
+          </a:effectRef>
+          <a:fontRef idx="minor">
+            <a:schemeClr val="dk1"/>
+          </a:fontRef>
+        </p:style>
+        <p:txBody>
+          <a:bodyPr rot="0" vert="horz" wrap="square" lIns="91440" tIns="45720" rIns="91440" bIns="45720" anchor="t" anchorCtr="0">
+            <a:noAutofit/>
+          </a:bodyPr>
+          <a:lstStyle/>
+          <a:p>
+            <a:pPr algn="ctr">
+              <a:lnSpc>
+                <a:spcPct val="107000"/>
+              </a:lnSpc>
+              <a:spcAft>
+                <a:spcPts val="800"/>
+              </a:spcAft>
+            </a:pPr>
+            <a:r>
+              <a:rPr lang="pt-BR" sz="1100" dirty="0">
+                <a:effectLst/>
+                <a:latin typeface="Adobe Devanagari" panose="02040503050201020203" pitchFamily="18" charset="0"/>
+                <a:ea typeface="Calibri" panose="020F0502020204030204" pitchFamily="34" charset="0"/>
+                <a:cs typeface="Times New Roman" panose="02020603050405020304" pitchFamily="18" charset="0"/>
+              </a:rPr>
+              <a:t>Internet </a:t>
+            </a:r>
+            <a:r>
+              <a:rPr lang="pt-BR" sz="1100" dirty="0" err="1">
+                <a:effectLst/>
+                <a:latin typeface="Adobe Devanagari" panose="02040503050201020203" pitchFamily="18" charset="0"/>
+                <a:ea typeface="Calibri" panose="020F0502020204030204" pitchFamily="34" charset="0"/>
+                <a:cs typeface="Times New Roman" panose="02020603050405020304" pitchFamily="18" charset="0"/>
+              </a:rPr>
+              <a:t>NobreakNet</a:t>
+            </a:r>
+            <a:r>
+              <a:rPr lang="pt-BR" sz="1100" dirty="0">
+                <a:effectLst/>
+                <a:latin typeface="Adobe Devanagari" panose="02040503050201020203" pitchFamily="18" charset="0"/>
+                <a:ea typeface="Calibri" panose="020F0502020204030204" pitchFamily="34" charset="0"/>
+                <a:cs typeface="Times New Roman" panose="02020603050405020304" pitchFamily="18" charset="0"/>
+              </a:rPr>
+              <a:t> de 200Mbps</a:t>
+            </a:r>
+            <a:endParaRPr lang="pt-BR" sz="1100" dirty="0">
+              <a:effectLst/>
+              <a:ea typeface="Calibri" panose="020F0502020204030204" pitchFamily="34" charset="0"/>
+              <a:cs typeface="Times New Roman" panose="02020603050405020304" pitchFamily="18" charset="0"/>
+            </a:endParaRPr>
+          </a:p>
+        </p:txBody>
+      </p:sp>
+      <p:sp>
+        <p:nvSpPr>
+          <p:cNvPr id="52" name="Seta: da Esquerda para a Direita 51">
+            <a:extLst>
+              <a:ext uri="{FF2B5EF4-FFF2-40B4-BE49-F238E27FC236}">
+                <a16:creationId xmlns:a16="http://schemas.microsoft.com/office/drawing/2014/main" id="{CF0B45CF-4615-405E-B9A0-CAFCEB78B285}"/>
+              </a:ext>
+            </a:extLst>
+          </p:cNvPr>
+          <p:cNvSpPr/>
+          <p:nvPr/>
+        </p:nvSpPr>
+        <p:spPr>
+          <a:xfrm>
+            <a:off x="5684943" y="5337956"/>
+            <a:ext cx="1638578" cy="183515"/>
+          </a:xfrm>
+          <a:prstGeom prst="leftRightArrow">
+            <a:avLst/>
+          </a:prstGeom>
+          <a:noFill/>
+          <a:ln w="9525" cap="flat" cmpd="sng" algn="ctr">
+            <a:solidFill>
+              <a:schemeClr val="dk1"/>
+            </a:solidFill>
+            <a:prstDash val="solid"/>
+            <a:round/>
+            <a:headEnd type="none" w="med" len="med"/>
+            <a:tailEnd type="none" w="med" len="med"/>
+          </a:ln>
+        </p:spPr>
+        <p:style>
+          <a:lnRef idx="0">
+            <a:scrgbClr r="0" g="0" b="0"/>
+          </a:lnRef>
+          <a:fillRef idx="0">
+            <a:scrgbClr r="0" g="0" b="0"/>
+          </a:fillRef>
+          <a:effectRef idx="0">
+            <a:scrgbClr r="0" g="0" b="0"/>
+          </a:effectRef>
+          <a:fontRef idx="minor">
+            <a:schemeClr val="dk1"/>
+          </a:fontRef>
+        </p:style>
+        <p:txBody>
+          <a:bodyPr rot="0" spcFirstLastPara="0" vert="horz" wrap="square" lIns="91440" tIns="45720" rIns="91440" bIns="45720" numCol="1" spcCol="0" rtlCol="0" fromWordArt="0" anchor="ctr" anchorCtr="0" forceAA="0" compatLnSpc="1">
+            <a:prstTxWarp prst="textNoShape">
+              <a:avLst/>
+            </a:prstTxWarp>
+            <a:noAutofit/>
+          </a:bodyPr>
+          <a:lstStyle/>
+          <a:p>
+            <a:endParaRPr lang="pt-BR" dirty="0"/>
+          </a:p>
+        </p:txBody>
+      </p:sp>
+      <p:pic>
+        <p:nvPicPr>
+          <p:cNvPr id="53" name="Imagem 52">
+            <a:extLst>
+              <a:ext uri="{FF2B5EF4-FFF2-40B4-BE49-F238E27FC236}">
+                <a16:creationId xmlns:a16="http://schemas.microsoft.com/office/drawing/2014/main" id="{40EAA1B8-B13C-48F2-876C-8D4482C38014}"/>
+              </a:ext>
+            </a:extLst>
+          </p:cNvPr>
+          <p:cNvPicPr/>
+          <p:nvPr/>
+        </p:nvPicPr>
+        <p:blipFill>
+          <a:blip r:embed="rId26" cstate="print">
+            <a:extLst>
+              <a:ext uri="{28A0092B-C50C-407E-A947-70E740481C1C}">
+                <a14:useLocalDpi xmlns:a14="http://schemas.microsoft.com/office/drawing/2010/main" val="0"/>
+              </a:ext>
+            </a:extLst>
+          </a:blip>
+          <a:srcRect/>
+          <a:stretch>
+            <a:fillRect/>
+          </a:stretch>
+        </p:blipFill>
+        <p:spPr bwMode="auto">
+          <a:xfrm>
+            <a:off x="5886045" y="5325088"/>
+            <a:ext cx="701040" cy="701040"/>
+          </a:xfrm>
+          <a:prstGeom prst="rect">
+            <a:avLst/>
+          </a:prstGeom>
+          <a:noFill/>
+          <a:ln>
+            <a:noFill/>
+          </a:ln>
+        </p:spPr>
+      </p:pic>
+      <p:sp>
+        <p:nvSpPr>
+          <p:cNvPr id="54" name="Caixa de Texto 2">
+            <a:extLst>
+              <a:ext uri="{FF2B5EF4-FFF2-40B4-BE49-F238E27FC236}">
+                <a16:creationId xmlns:a16="http://schemas.microsoft.com/office/drawing/2014/main" id="{2E9C03F3-8E06-4074-A7C3-349F02589AF8}"/>
+              </a:ext>
+            </a:extLst>
+          </p:cNvPr>
+          <p:cNvSpPr txBox="1">
+            <a:spLocks noChangeArrowheads="1"/>
+          </p:cNvSpPr>
+          <p:nvPr/>
+        </p:nvSpPr>
+        <p:spPr bwMode="auto">
+          <a:xfrm>
+            <a:off x="5682828" y="5793654"/>
+            <a:ext cx="1749293" cy="911468"/>
+          </a:xfrm>
+          <a:prstGeom prst="rect">
+            <a:avLst/>
+          </a:prstGeom>
+          <a:noFill/>
+          <a:ln>
+            <a:noFill/>
+          </a:ln>
+        </p:spPr>
+        <p:style>
+          <a:lnRef idx="0">
+            <a:scrgbClr r="0" g="0" b="0"/>
+          </a:lnRef>
+          <a:fillRef idx="0">
+            <a:scrgbClr r="0" g="0" b="0"/>
+          </a:fillRef>
+          <a:effectRef idx="0">
+            <a:scrgbClr r="0" g="0" b="0"/>
+          </a:effectRef>
+          <a:fontRef idx="minor">
+            <a:schemeClr val="dk1"/>
+          </a:fontRef>
+        </p:style>
+        <p:txBody>
+          <a:bodyPr rot="0" vert="horz" wrap="square" lIns="91440" tIns="45720" rIns="91440" bIns="45720" anchor="t" anchorCtr="0">
+            <a:spAutoFit/>
+          </a:bodyPr>
+          <a:lstStyle/>
+          <a:p>
+            <a:pPr>
+              <a:lnSpc>
+                <a:spcPct val="107000"/>
+              </a:lnSpc>
+              <a:spcAft>
+                <a:spcPts val="800"/>
+              </a:spcAft>
+            </a:pPr>
+            <a:r>
+              <a:rPr lang="pt-BR" sz="1100" dirty="0">
+                <a:effectLst/>
+                <a:ea typeface="Calibri" panose="020F0502020204030204" pitchFamily="34" charset="0"/>
+                <a:cs typeface="Times New Roman" panose="02020603050405020304" pitchFamily="18" charset="0"/>
+              </a:rPr>
+              <a:t>Usuário levando o veiculo para reunião e decisão das mudanças a serem feitas</a:t>
+            </a:r>
+          </a:p>
+          <a:p>
+            <a:pPr>
+              <a:lnSpc>
+                <a:spcPct val="107000"/>
+              </a:lnSpc>
+              <a:spcAft>
+                <a:spcPts val="800"/>
+              </a:spcAft>
+            </a:pPr>
+            <a:r>
+              <a:rPr lang="pt-BR" sz="1100" dirty="0">
+                <a:effectLst/>
+                <a:ea typeface="Calibri" panose="020F0502020204030204" pitchFamily="34" charset="0"/>
+                <a:cs typeface="Times New Roman" panose="02020603050405020304" pitchFamily="18" charset="0"/>
+              </a:rPr>
+              <a:t> </a:t>
+            </a:r>
+          </a:p>
+        </p:txBody>
+      </p:sp>
+      <p:sp>
+        <p:nvSpPr>
+          <p:cNvPr id="55" name="Caixa de Texto 2">
+            <a:extLst>
+              <a:ext uri="{FF2B5EF4-FFF2-40B4-BE49-F238E27FC236}">
+                <a16:creationId xmlns:a16="http://schemas.microsoft.com/office/drawing/2014/main" id="{ECCE0A22-3F22-4E58-AA54-EE9F17E51A16}"/>
+              </a:ext>
+            </a:extLst>
+          </p:cNvPr>
+          <p:cNvSpPr txBox="1">
+            <a:spLocks noChangeArrowheads="1"/>
+          </p:cNvSpPr>
+          <p:nvPr/>
+        </p:nvSpPr>
+        <p:spPr bwMode="auto">
+          <a:xfrm>
+            <a:off x="874923" y="3955877"/>
+            <a:ext cx="2052955" cy="808876"/>
+          </a:xfrm>
+          <a:prstGeom prst="rect">
+            <a:avLst/>
+          </a:prstGeom>
+          <a:noFill/>
+          <a:ln>
+            <a:noFill/>
+          </a:ln>
+        </p:spPr>
+        <p:style>
+          <a:lnRef idx="0">
+            <a:scrgbClr r="0" g="0" b="0"/>
+          </a:lnRef>
+          <a:fillRef idx="0">
+            <a:scrgbClr r="0" g="0" b="0"/>
+          </a:fillRef>
+          <a:effectRef idx="0">
+            <a:scrgbClr r="0" g="0" b="0"/>
+          </a:effectRef>
+          <a:fontRef idx="minor">
+            <a:schemeClr val="dk1"/>
+          </a:fontRef>
+        </p:style>
+        <p:txBody>
+          <a:bodyPr rot="0" vert="horz" wrap="square" lIns="91440" tIns="45720" rIns="91440" bIns="45720" anchor="t" anchorCtr="0">
+            <a:spAutoFit/>
+          </a:bodyPr>
+          <a:lstStyle/>
+          <a:p>
+            <a:pPr>
+              <a:lnSpc>
+                <a:spcPct val="107000"/>
+              </a:lnSpc>
+              <a:spcAft>
+                <a:spcPts val="800"/>
+              </a:spcAft>
+            </a:pPr>
+            <a:r>
+              <a:rPr lang="pt-BR" sz="1100" dirty="0">
+                <a:effectLst/>
+                <a:ea typeface="Calibri" panose="020F0502020204030204" pitchFamily="34" charset="0"/>
+                <a:cs typeface="Times New Roman" panose="02020603050405020304" pitchFamily="18" charset="0"/>
+              </a:rPr>
+              <a:t>Usuário possui um veiculo e deseja realizar uma reunião com a equipe de modificação para mudanças em seu </a:t>
+            </a:r>
+            <a:r>
+              <a:rPr lang="pt-BR" sz="1100" dirty="0" err="1">
+                <a:effectLst/>
+                <a:ea typeface="Calibri" panose="020F0502020204030204" pitchFamily="34" charset="0"/>
+                <a:cs typeface="Times New Roman" panose="02020603050405020304" pitchFamily="18" charset="0"/>
+              </a:rPr>
+              <a:t>automovel</a:t>
+            </a:r>
+            <a:r>
+              <a:rPr lang="pt-BR" sz="1100" dirty="0">
+                <a:effectLst/>
+                <a:ea typeface="Calibri" panose="020F0502020204030204" pitchFamily="34" charset="0"/>
+                <a:cs typeface="Times New Roman" panose="02020603050405020304" pitchFamily="18" charset="0"/>
+              </a:rPr>
+              <a:t> </a:t>
+            </a:r>
+          </a:p>
+        </p:txBody>
+      </p:sp>
+      <p:sp>
+        <p:nvSpPr>
+          <p:cNvPr id="56" name="Retângulo: Cantos Arredondados 55">
+            <a:extLst>
+              <a:ext uri="{FF2B5EF4-FFF2-40B4-BE49-F238E27FC236}">
+                <a16:creationId xmlns:a16="http://schemas.microsoft.com/office/drawing/2014/main" id="{5A103AB2-F675-4534-8C53-9159D3CC808B}"/>
+              </a:ext>
+            </a:extLst>
+          </p:cNvPr>
+          <p:cNvSpPr/>
+          <p:nvPr/>
+        </p:nvSpPr>
+        <p:spPr>
+          <a:xfrm>
+            <a:off x="7386164" y="4656277"/>
+            <a:ext cx="4267322" cy="1960712"/>
+          </a:xfrm>
+          <a:prstGeom prst="roundRect">
+            <a:avLst/>
+          </a:prstGeom>
+          <a:noFill/>
+          <a:ln w="9525" cap="flat" cmpd="sng" algn="ctr">
+            <a:solidFill>
+              <a:schemeClr val="dk1"/>
+            </a:solidFill>
+            <a:prstDash val="solid"/>
+            <a:round/>
+            <a:headEnd type="none" w="med" len="med"/>
+            <a:tailEnd type="none" w="med" len="med"/>
+          </a:ln>
+        </p:spPr>
+        <p:style>
+          <a:lnRef idx="0">
+            <a:scrgbClr r="0" g="0" b="0"/>
+          </a:lnRef>
+          <a:fillRef idx="0">
+            <a:scrgbClr r="0" g="0" b="0"/>
+          </a:fillRef>
+          <a:effectRef idx="0">
+            <a:scrgbClr r="0" g="0" b="0"/>
+          </a:effectRef>
+          <a:fontRef idx="minor">
+            <a:schemeClr val="dk1"/>
+          </a:fontRef>
+        </p:style>
+        <p:txBody>
+          <a:bodyPr rot="0" spcFirstLastPara="0" vert="horz" wrap="square" lIns="91440" tIns="45720" rIns="91440" bIns="45720" numCol="1" spcCol="0" rtlCol="0" fromWordArt="0" anchor="ctr" anchorCtr="0" forceAA="0" compatLnSpc="1">
+            <a:prstTxWarp prst="textNoShape">
+              <a:avLst/>
+            </a:prstTxWarp>
+            <a:noAutofit/>
+          </a:bodyPr>
+          <a:lstStyle/>
+          <a:p>
+            <a:endParaRPr lang="pt-BR"/>
+          </a:p>
+        </p:txBody>
+      </p:sp>
+      <p:pic>
+        <p:nvPicPr>
+          <p:cNvPr id="57" name="Imagem 56">
+            <a:extLst>
+              <a:ext uri="{FF2B5EF4-FFF2-40B4-BE49-F238E27FC236}">
+                <a16:creationId xmlns:a16="http://schemas.microsoft.com/office/drawing/2014/main" id="{9301728F-B06E-46F2-A1ED-05DA50AF7A05}"/>
+              </a:ext>
+            </a:extLst>
+          </p:cNvPr>
+          <p:cNvPicPr/>
+          <p:nvPr/>
+        </p:nvPicPr>
+        <p:blipFill>
+          <a:blip r:embed="rId27" cstate="print">
+            <a:extLst>
+              <a:ext uri="{28A0092B-C50C-407E-A947-70E740481C1C}">
+                <a14:useLocalDpi xmlns:a14="http://schemas.microsoft.com/office/drawing/2010/main" val="0"/>
+              </a:ext>
+            </a:extLst>
+          </a:blip>
+          <a:srcRect/>
+          <a:stretch>
+            <a:fillRect/>
+          </a:stretch>
+        </p:blipFill>
+        <p:spPr bwMode="auto">
+          <a:xfrm>
+            <a:off x="7494747" y="4852834"/>
+            <a:ext cx="550545" cy="550546"/>
+          </a:xfrm>
+          <a:prstGeom prst="rect">
+            <a:avLst/>
+          </a:prstGeom>
+          <a:noFill/>
+          <a:ln>
+            <a:noFill/>
+          </a:ln>
+        </p:spPr>
+      </p:pic>
+      <p:pic>
+        <p:nvPicPr>
+          <p:cNvPr id="58" name="Imagem 57">
+            <a:extLst>
+              <a:ext uri="{FF2B5EF4-FFF2-40B4-BE49-F238E27FC236}">
+                <a16:creationId xmlns:a16="http://schemas.microsoft.com/office/drawing/2014/main" id="{75B5140B-5B49-4107-9F5C-E6E25393ABEC}"/>
+              </a:ext>
+            </a:extLst>
+          </p:cNvPr>
+          <p:cNvPicPr/>
+          <p:nvPr/>
+        </p:nvPicPr>
+        <p:blipFill>
+          <a:blip r:embed="rId28" cstate="print">
+            <a:extLst>
+              <a:ext uri="{28A0092B-C50C-407E-A947-70E740481C1C}">
+                <a14:useLocalDpi xmlns:a14="http://schemas.microsoft.com/office/drawing/2010/main" val="0"/>
+              </a:ext>
+            </a:extLst>
+          </a:blip>
+          <a:srcRect/>
+          <a:stretch>
+            <a:fillRect/>
+          </a:stretch>
+        </p:blipFill>
+        <p:spPr bwMode="auto">
+          <a:xfrm>
+            <a:off x="7493671" y="5676923"/>
+            <a:ext cx="550545" cy="608193"/>
+          </a:xfrm>
+          <a:prstGeom prst="rect">
+            <a:avLst/>
+          </a:prstGeom>
+          <a:noFill/>
+          <a:ln>
+            <a:noFill/>
+          </a:ln>
+        </p:spPr>
+      </p:pic>
+      <p:sp>
+        <p:nvSpPr>
+          <p:cNvPr id="59" name="Caixa de Texto 2">
+            <a:extLst>
+              <a:ext uri="{FF2B5EF4-FFF2-40B4-BE49-F238E27FC236}">
+                <a16:creationId xmlns:a16="http://schemas.microsoft.com/office/drawing/2014/main" id="{FE986946-E8B7-49EF-A3C1-DD82DE04E81C}"/>
+              </a:ext>
+            </a:extLst>
+          </p:cNvPr>
+          <p:cNvSpPr txBox="1">
+            <a:spLocks noChangeArrowheads="1"/>
+          </p:cNvSpPr>
+          <p:nvPr/>
+        </p:nvSpPr>
+        <p:spPr bwMode="auto">
+          <a:xfrm>
+            <a:off x="7808299" y="4719293"/>
+            <a:ext cx="3820310" cy="627736"/>
+          </a:xfrm>
+          <a:prstGeom prst="rect">
+            <a:avLst/>
+          </a:prstGeom>
+          <a:noFill/>
+          <a:ln>
+            <a:noFill/>
+          </a:ln>
+        </p:spPr>
+        <p:style>
+          <a:lnRef idx="0">
+            <a:scrgbClr r="0" g="0" b="0"/>
+          </a:lnRef>
+          <a:fillRef idx="0">
+            <a:scrgbClr r="0" g="0" b="0"/>
+          </a:fillRef>
+          <a:effectRef idx="0">
+            <a:scrgbClr r="0" g="0" b="0"/>
+          </a:effectRef>
+          <a:fontRef idx="minor">
+            <a:schemeClr val="dk1"/>
+          </a:fontRef>
+        </p:style>
+        <p:txBody>
+          <a:bodyPr rot="0" vert="horz" wrap="square" lIns="91440" tIns="45720" rIns="91440" bIns="45720" anchor="t" anchorCtr="0">
+            <a:spAutoFit/>
+          </a:bodyPr>
+          <a:lstStyle/>
+          <a:p>
+            <a:pPr algn="ctr">
+              <a:lnSpc>
+                <a:spcPct val="107000"/>
+              </a:lnSpc>
+              <a:spcAft>
+                <a:spcPts val="800"/>
+              </a:spcAft>
+            </a:pPr>
+            <a:r>
+              <a:rPr lang="pt-BR" sz="1100" dirty="0">
+                <a:effectLst/>
+                <a:ea typeface="Calibri" panose="020F0502020204030204" pitchFamily="34" charset="0"/>
+                <a:cs typeface="Times New Roman" panose="02020603050405020304" pitchFamily="18" charset="0"/>
+              </a:rPr>
+              <a:t>Reunião realizada entre os funcionários e o cliente para decisões do que precisa ser feito  no veiculo e o valor acordado do serviço</a:t>
+            </a:r>
+          </a:p>
+        </p:txBody>
+      </p:sp>
+      <p:sp>
+        <p:nvSpPr>
+          <p:cNvPr id="60" name="Caixa de Texto 2">
+            <a:extLst>
+              <a:ext uri="{FF2B5EF4-FFF2-40B4-BE49-F238E27FC236}">
+                <a16:creationId xmlns:a16="http://schemas.microsoft.com/office/drawing/2014/main" id="{892DF93E-7A2A-4C73-BDA2-86AD851C8279}"/>
+              </a:ext>
+            </a:extLst>
+          </p:cNvPr>
+          <p:cNvSpPr txBox="1">
+            <a:spLocks noChangeArrowheads="1"/>
+          </p:cNvSpPr>
+          <p:nvPr/>
+        </p:nvSpPr>
+        <p:spPr bwMode="auto">
+          <a:xfrm>
+            <a:off x="7227682" y="6299490"/>
+            <a:ext cx="3033934" cy="549189"/>
+          </a:xfrm>
+          <a:prstGeom prst="rect">
+            <a:avLst/>
+          </a:prstGeom>
+          <a:noFill/>
+          <a:ln>
+            <a:noFill/>
+          </a:ln>
+        </p:spPr>
+        <p:style>
+          <a:lnRef idx="0">
+            <a:scrgbClr r="0" g="0" b="0"/>
+          </a:lnRef>
+          <a:fillRef idx="0">
+            <a:scrgbClr r="0" g="0" b="0"/>
+          </a:fillRef>
+          <a:effectRef idx="0">
+            <a:scrgbClr r="0" g="0" b="0"/>
+          </a:effectRef>
+          <a:fontRef idx="minor">
+            <a:schemeClr val="dk1"/>
+          </a:fontRef>
+        </p:style>
+        <p:txBody>
+          <a:bodyPr rot="0" vert="horz" wrap="square" lIns="91440" tIns="45720" rIns="91440" bIns="45720" anchor="t" anchorCtr="0">
+            <a:spAutoFit/>
+          </a:bodyPr>
+          <a:lstStyle/>
+          <a:p>
+            <a:pPr algn="ctr">
+              <a:lnSpc>
+                <a:spcPct val="107000"/>
+              </a:lnSpc>
+              <a:spcAft>
+                <a:spcPts val="800"/>
+              </a:spcAft>
+            </a:pPr>
+            <a:r>
+              <a:rPr lang="pt-BR" sz="1100" dirty="0">
+                <a:effectLst/>
+                <a:ea typeface="Calibri" panose="020F0502020204030204" pitchFamily="34" charset="0"/>
+                <a:cs typeface="Times New Roman" panose="02020603050405020304" pitchFamily="18" charset="0"/>
+              </a:rPr>
+              <a:t>Ao fechar o contrato, inicio da solução</a:t>
+            </a:r>
+          </a:p>
+          <a:p>
+            <a:pPr>
+              <a:lnSpc>
+                <a:spcPct val="107000"/>
+              </a:lnSpc>
+              <a:spcAft>
+                <a:spcPts val="800"/>
+              </a:spcAft>
+            </a:pPr>
+            <a:r>
+              <a:rPr lang="pt-BR" sz="1100" dirty="0">
+                <a:effectLst/>
+                <a:ea typeface="Calibri" panose="020F0502020204030204" pitchFamily="34" charset="0"/>
+                <a:cs typeface="Times New Roman" panose="02020603050405020304" pitchFamily="18" charset="0"/>
+              </a:rPr>
+              <a:t> </a:t>
+            </a:r>
+          </a:p>
+        </p:txBody>
+      </p:sp>
+      <p:pic>
+        <p:nvPicPr>
+          <p:cNvPr id="61" name="Imagem 60" descr="Forma&#10;&#10;Descrição gerada automaticamente com confiança baixa">
+            <a:extLst>
+              <a:ext uri="{FF2B5EF4-FFF2-40B4-BE49-F238E27FC236}">
+                <a16:creationId xmlns:a16="http://schemas.microsoft.com/office/drawing/2014/main" id="{1C3DA128-332C-45DF-BD1A-664CE3715489}"/>
+              </a:ext>
+            </a:extLst>
+          </p:cNvPr>
+          <p:cNvPicPr>
+            <a:picLocks noChangeAspect="1"/>
+          </p:cNvPicPr>
+          <p:nvPr/>
+        </p:nvPicPr>
+        <p:blipFill>
+          <a:blip r:embed="rId25">
+            <a:extLst>
+              <a:ext uri="{28A0092B-C50C-407E-A947-70E740481C1C}">
+                <a14:useLocalDpi xmlns:a14="http://schemas.microsoft.com/office/drawing/2010/main" val="0"/>
+              </a:ext>
+            </a:extLst>
+          </a:blip>
+          <a:stretch>
+            <a:fillRect/>
+          </a:stretch>
+        </p:blipFill>
+        <p:spPr>
+          <a:xfrm>
+            <a:off x="10896643" y="5467041"/>
+            <a:ext cx="340664" cy="340664"/>
+          </a:xfrm>
+          <a:prstGeom prst="rect">
+            <a:avLst/>
+          </a:prstGeom>
+        </p:spPr>
+      </p:pic>
+      <p:sp>
+        <p:nvSpPr>
+          <p:cNvPr id="62" name="Caixa de Texto 2">
+            <a:extLst>
+              <a:ext uri="{FF2B5EF4-FFF2-40B4-BE49-F238E27FC236}">
+                <a16:creationId xmlns:a16="http://schemas.microsoft.com/office/drawing/2014/main" id="{A3F35302-1874-4693-A365-D099FEBD40D8}"/>
+              </a:ext>
+            </a:extLst>
+          </p:cNvPr>
+          <p:cNvSpPr txBox="1">
+            <a:spLocks noChangeArrowheads="1"/>
+          </p:cNvSpPr>
+          <p:nvPr/>
+        </p:nvSpPr>
+        <p:spPr bwMode="auto">
+          <a:xfrm>
+            <a:off x="9746729" y="5800150"/>
+            <a:ext cx="2052955" cy="627736"/>
+          </a:xfrm>
+          <a:prstGeom prst="rect">
+            <a:avLst/>
+          </a:prstGeom>
+          <a:noFill/>
+          <a:ln>
+            <a:noFill/>
+          </a:ln>
+        </p:spPr>
+        <p:style>
+          <a:lnRef idx="0">
+            <a:scrgbClr r="0" g="0" b="0"/>
+          </a:lnRef>
+          <a:fillRef idx="0">
+            <a:scrgbClr r="0" g="0" b="0"/>
+          </a:fillRef>
+          <a:effectRef idx="0">
+            <a:scrgbClr r="0" g="0" b="0"/>
+          </a:effectRef>
+          <a:fontRef idx="minor">
+            <a:schemeClr val="dk1"/>
+          </a:fontRef>
+        </p:style>
+        <p:txBody>
+          <a:bodyPr rot="0" vert="horz" wrap="square" lIns="91440" tIns="45720" rIns="91440" bIns="45720" anchor="t" anchorCtr="0">
+            <a:spAutoFit/>
+          </a:bodyPr>
+          <a:lstStyle/>
+          <a:p>
+            <a:pPr>
+              <a:lnSpc>
+                <a:spcPct val="107000"/>
+              </a:lnSpc>
+              <a:spcAft>
+                <a:spcPts val="800"/>
+              </a:spcAft>
+            </a:pPr>
+            <a:r>
+              <a:rPr lang="pt-BR" sz="1100" dirty="0">
+                <a:effectLst/>
+                <a:ea typeface="Calibri" panose="020F0502020204030204" pitchFamily="34" charset="0"/>
+                <a:cs typeface="Times New Roman" panose="02020603050405020304" pitchFamily="18" charset="0"/>
+              </a:rPr>
+              <a:t>Office para realização dos relatórios e planejamento do projeto</a:t>
+            </a:r>
+          </a:p>
+        </p:txBody>
+      </p:sp>
+      <p:sp>
+        <p:nvSpPr>
+          <p:cNvPr id="63" name="Seta: da Esquerda para a Direita 62">
+            <a:extLst>
+              <a:ext uri="{FF2B5EF4-FFF2-40B4-BE49-F238E27FC236}">
+                <a16:creationId xmlns:a16="http://schemas.microsoft.com/office/drawing/2014/main" id="{10C05E53-ABAF-45DD-ABE3-0EF273EE1B86}"/>
+              </a:ext>
+            </a:extLst>
+          </p:cNvPr>
+          <p:cNvSpPr/>
+          <p:nvPr/>
+        </p:nvSpPr>
+        <p:spPr>
+          <a:xfrm>
+            <a:off x="6623655" y="3016809"/>
+            <a:ext cx="3448590" cy="183515"/>
+          </a:xfrm>
+          <a:prstGeom prst="leftRightArrow">
+            <a:avLst/>
+          </a:prstGeom>
+          <a:noFill/>
+          <a:ln w="9525" cap="flat" cmpd="sng" algn="ctr">
+            <a:solidFill>
+              <a:schemeClr val="dk1"/>
+            </a:solidFill>
+            <a:prstDash val="solid"/>
+            <a:round/>
+            <a:headEnd type="none" w="med" len="med"/>
+            <a:tailEnd type="none" w="med" len="med"/>
+          </a:ln>
+        </p:spPr>
+        <p:style>
+          <a:lnRef idx="0">
+            <a:scrgbClr r="0" g="0" b="0"/>
+          </a:lnRef>
+          <a:fillRef idx="0">
+            <a:scrgbClr r="0" g="0" b="0"/>
+          </a:fillRef>
+          <a:effectRef idx="0">
+            <a:scrgbClr r="0" g="0" b="0"/>
+          </a:effectRef>
+          <a:fontRef idx="minor">
+            <a:schemeClr val="dk1"/>
+          </a:fontRef>
+        </p:style>
+        <p:txBody>
+          <a:bodyPr rot="0" spcFirstLastPara="0" vert="horz" wrap="square" lIns="91440" tIns="45720" rIns="91440" bIns="45720" numCol="1" spcCol="0" rtlCol="0" fromWordArt="0" anchor="ctr" anchorCtr="0" forceAA="0" compatLnSpc="1">
+            <a:prstTxWarp prst="textNoShape">
+              <a:avLst/>
+            </a:prstTxWarp>
+            <a:noAutofit/>
+          </a:bodyPr>
+          <a:lstStyle/>
+          <a:p>
+            <a:endParaRPr lang="pt-BR" dirty="0"/>
+          </a:p>
+        </p:txBody>
+      </p:sp>
+      <p:pic>
+        <p:nvPicPr>
+          <p:cNvPr id="64" name="Imagem 63">
+            <a:extLst>
+              <a:ext uri="{FF2B5EF4-FFF2-40B4-BE49-F238E27FC236}">
+                <a16:creationId xmlns:a16="http://schemas.microsoft.com/office/drawing/2014/main" id="{98BCA619-37C1-4B58-BBDF-6A1C0E0A5403}"/>
+              </a:ext>
+            </a:extLst>
+          </p:cNvPr>
+          <p:cNvPicPr/>
+          <p:nvPr/>
+        </p:nvPicPr>
+        <p:blipFill>
+          <a:blip r:embed="rId29" cstate="print">
+            <a:extLst>
+              <a:ext uri="{28A0092B-C50C-407E-A947-70E740481C1C}">
+                <a14:useLocalDpi xmlns:a14="http://schemas.microsoft.com/office/drawing/2010/main" val="0"/>
+              </a:ext>
+            </a:extLst>
+          </a:blip>
+          <a:srcRect/>
+          <a:stretch>
+            <a:fillRect/>
+          </a:stretch>
+        </p:blipFill>
+        <p:spPr bwMode="auto">
+          <a:xfrm>
+            <a:off x="8392778" y="3331470"/>
+            <a:ext cx="520065" cy="520065"/>
+          </a:xfrm>
+          <a:prstGeom prst="rect">
+            <a:avLst/>
+          </a:prstGeom>
+          <a:noFill/>
+          <a:ln>
+            <a:noFill/>
+          </a:ln>
+        </p:spPr>
+      </p:pic>
+      <p:sp>
+        <p:nvSpPr>
+          <p:cNvPr id="65" name="Caixa de Texto 2">
+            <a:extLst>
+              <a:ext uri="{FF2B5EF4-FFF2-40B4-BE49-F238E27FC236}">
+                <a16:creationId xmlns:a16="http://schemas.microsoft.com/office/drawing/2014/main" id="{D8B2D5FD-6615-4A95-87C5-4832106F93D3}"/>
+              </a:ext>
+            </a:extLst>
+          </p:cNvPr>
+          <p:cNvSpPr txBox="1">
+            <a:spLocks noChangeArrowheads="1"/>
+          </p:cNvSpPr>
+          <p:nvPr/>
+        </p:nvSpPr>
+        <p:spPr bwMode="auto">
+          <a:xfrm>
+            <a:off x="7546378" y="3822876"/>
+            <a:ext cx="2090537" cy="911468"/>
+          </a:xfrm>
+          <a:prstGeom prst="rect">
+            <a:avLst/>
+          </a:prstGeom>
+          <a:noFill/>
+          <a:ln>
+            <a:noFill/>
+          </a:ln>
+        </p:spPr>
+        <p:style>
+          <a:lnRef idx="0">
+            <a:scrgbClr r="0" g="0" b="0"/>
+          </a:lnRef>
+          <a:fillRef idx="0">
+            <a:scrgbClr r="0" g="0" b="0"/>
+          </a:fillRef>
+          <a:effectRef idx="0">
+            <a:scrgbClr r="0" g="0" b="0"/>
+          </a:effectRef>
+          <a:fontRef idx="minor">
+            <a:schemeClr val="dk1"/>
+          </a:fontRef>
+        </p:style>
+        <p:txBody>
+          <a:bodyPr rot="0" vert="horz" wrap="square" lIns="91440" tIns="45720" rIns="91440" bIns="45720" anchor="t" anchorCtr="0">
+            <a:spAutoFit/>
+          </a:bodyPr>
+          <a:lstStyle/>
+          <a:p>
+            <a:pPr algn="ctr">
+              <a:lnSpc>
+                <a:spcPct val="107000"/>
+              </a:lnSpc>
+              <a:spcAft>
+                <a:spcPts val="800"/>
+              </a:spcAft>
+            </a:pPr>
+            <a:r>
+              <a:rPr lang="pt-BR" sz="1100" dirty="0">
+                <a:ea typeface="Calibri" panose="020F0502020204030204" pitchFamily="34" charset="0"/>
+                <a:cs typeface="Times New Roman" panose="02020603050405020304" pitchFamily="18" charset="0"/>
+              </a:rPr>
+              <a:t>Contato com oficinas de pintura para realizar a melhor pintura possível para o projeto</a:t>
+            </a:r>
+            <a:endParaRPr lang="pt-BR" sz="1100" dirty="0">
+              <a:effectLst/>
+              <a:ea typeface="Calibri" panose="020F0502020204030204" pitchFamily="34" charset="0"/>
+              <a:cs typeface="Times New Roman" panose="02020603050405020304" pitchFamily="18" charset="0"/>
+            </a:endParaRPr>
+          </a:p>
+          <a:p>
+            <a:pPr>
+              <a:lnSpc>
+                <a:spcPct val="107000"/>
+              </a:lnSpc>
+              <a:spcAft>
+                <a:spcPts val="800"/>
+              </a:spcAft>
+            </a:pPr>
+            <a:r>
+              <a:rPr lang="pt-BR" sz="1100" dirty="0">
+                <a:effectLst/>
+                <a:ea typeface="Calibri" panose="020F0502020204030204" pitchFamily="34" charset="0"/>
+                <a:cs typeface="Times New Roman" panose="02020603050405020304" pitchFamily="18" charset="0"/>
+              </a:rPr>
+              <a:t> </a:t>
+            </a:r>
+          </a:p>
+        </p:txBody>
+      </p:sp>
+      <p:sp>
+        <p:nvSpPr>
+          <p:cNvPr id="66" name="Seta: para a Esquerda e para Cima 65">
+            <a:extLst>
+              <a:ext uri="{FF2B5EF4-FFF2-40B4-BE49-F238E27FC236}">
+                <a16:creationId xmlns:a16="http://schemas.microsoft.com/office/drawing/2014/main" id="{B6B6237C-D3EB-4F37-8B53-F9721FCD196C}"/>
+              </a:ext>
+            </a:extLst>
+          </p:cNvPr>
+          <p:cNvSpPr/>
+          <p:nvPr/>
+        </p:nvSpPr>
+        <p:spPr>
+          <a:xfrm rot="5400000" flipV="1">
+            <a:off x="7659843" y="464368"/>
+            <a:ext cx="1441613" cy="3298394"/>
+          </a:xfrm>
+          <a:prstGeom prst="leftUpArrow">
+            <a:avLst>
+              <a:gd name="adj1" fmla="val 9577"/>
+              <a:gd name="adj2" fmla="val 8930"/>
+              <a:gd name="adj3" fmla="val 9854"/>
+            </a:avLst>
+          </a:prstGeom>
+          <a:noFill/>
+          <a:ln w="9525" cap="flat" cmpd="sng" algn="ctr">
+            <a:solidFill>
+              <a:schemeClr val="dk1"/>
+            </a:solidFill>
+            <a:prstDash val="solid"/>
+            <a:round/>
+            <a:headEnd type="none" w="med" len="med"/>
+            <a:tailEnd type="none" w="med" len="med"/>
+          </a:ln>
+        </p:spPr>
+        <p:style>
+          <a:lnRef idx="0">
+            <a:scrgbClr r="0" g="0" b="0"/>
+          </a:lnRef>
+          <a:fillRef idx="0">
+            <a:scrgbClr r="0" g="0" b="0"/>
+          </a:fillRef>
+          <a:effectRef idx="0">
+            <a:scrgbClr r="0" g="0" b="0"/>
+          </a:effectRef>
+          <a:fontRef idx="minor">
+            <a:schemeClr val="dk1"/>
+          </a:fontRef>
+        </p:style>
+        <p:txBody>
+          <a:bodyPr rot="0" spcFirstLastPara="0" vert="horz" wrap="square" lIns="91440" tIns="45720" rIns="91440" bIns="45720" numCol="1" spcCol="0" rtlCol="0" fromWordArt="0" anchor="ctr" anchorCtr="0" forceAA="0" compatLnSpc="1">
+            <a:prstTxWarp prst="textNoShape">
+              <a:avLst/>
+            </a:prstTxWarp>
+            <a:noAutofit/>
+          </a:bodyPr>
+          <a:lstStyle/>
+          <a:p>
+            <a:endParaRPr lang="pt-BR"/>
+          </a:p>
+        </p:txBody>
+      </p:sp>
+      <p:sp>
+        <p:nvSpPr>
+          <p:cNvPr id="68" name="Seta: da Esquerda para a Direita 67">
+            <a:extLst>
+              <a:ext uri="{FF2B5EF4-FFF2-40B4-BE49-F238E27FC236}">
+                <a16:creationId xmlns:a16="http://schemas.microsoft.com/office/drawing/2014/main" id="{B0DC7BEB-F34F-4C21-8959-DA3E0D6180EE}"/>
+              </a:ext>
+            </a:extLst>
+          </p:cNvPr>
+          <p:cNvSpPr/>
+          <p:nvPr/>
+        </p:nvSpPr>
+        <p:spPr>
+          <a:xfrm>
+            <a:off x="6662160" y="3566750"/>
+            <a:ext cx="1146139" cy="183515"/>
+          </a:xfrm>
+          <a:prstGeom prst="leftRightArrow">
+            <a:avLst/>
+          </a:prstGeom>
+          <a:noFill/>
+          <a:ln w="9525" cap="flat" cmpd="sng" algn="ctr">
+            <a:solidFill>
+              <a:schemeClr val="dk1"/>
+            </a:solidFill>
+            <a:prstDash val="solid"/>
+            <a:round/>
+            <a:headEnd type="none" w="med" len="med"/>
+            <a:tailEnd type="none" w="med" len="med"/>
+          </a:ln>
+        </p:spPr>
+        <p:style>
+          <a:lnRef idx="0">
+            <a:scrgbClr r="0" g="0" b="0"/>
+          </a:lnRef>
+          <a:fillRef idx="0">
+            <a:scrgbClr r="0" g="0" b="0"/>
+          </a:fillRef>
+          <a:effectRef idx="0">
+            <a:scrgbClr r="0" g="0" b="0"/>
+          </a:effectRef>
+          <a:fontRef idx="minor">
+            <a:schemeClr val="dk1"/>
+          </a:fontRef>
+        </p:style>
+        <p:txBody>
+          <a:bodyPr rot="0" spcFirstLastPara="0" vert="horz" wrap="square" lIns="91440" tIns="45720" rIns="91440" bIns="45720" numCol="1" spcCol="0" rtlCol="0" fromWordArt="0" anchor="ctr" anchorCtr="0" forceAA="0" compatLnSpc="1">
+            <a:prstTxWarp prst="textNoShape">
+              <a:avLst/>
+            </a:prstTxWarp>
+            <a:noAutofit/>
+          </a:bodyPr>
+          <a:lstStyle/>
+          <a:p>
+            <a:endParaRPr lang="pt-BR" dirty="0"/>
+          </a:p>
+        </p:txBody>
+      </p:sp>
+      <p:sp>
+        <p:nvSpPr>
+          <p:cNvPr id="70" name="Caixa de Texto 2">
+            <a:extLst>
+              <a:ext uri="{FF2B5EF4-FFF2-40B4-BE49-F238E27FC236}">
+                <a16:creationId xmlns:a16="http://schemas.microsoft.com/office/drawing/2014/main" id="{3CC80F38-C302-45BA-96AC-B3E7914F14F5}"/>
+              </a:ext>
+            </a:extLst>
+          </p:cNvPr>
+          <p:cNvSpPr txBox="1">
+            <a:spLocks noChangeArrowheads="1"/>
+          </p:cNvSpPr>
+          <p:nvPr/>
+        </p:nvSpPr>
+        <p:spPr bwMode="auto">
+          <a:xfrm>
+            <a:off x="9919669" y="3354704"/>
+            <a:ext cx="2090537" cy="1092607"/>
+          </a:xfrm>
+          <a:prstGeom prst="rect">
+            <a:avLst/>
+          </a:prstGeom>
+          <a:noFill/>
+          <a:ln>
+            <a:noFill/>
+          </a:ln>
+        </p:spPr>
+        <p:style>
+          <a:lnRef idx="0">
+            <a:scrgbClr r="0" g="0" b="0"/>
+          </a:lnRef>
+          <a:fillRef idx="0">
+            <a:scrgbClr r="0" g="0" b="0"/>
+          </a:fillRef>
+          <a:effectRef idx="0">
+            <a:scrgbClr r="0" g="0" b="0"/>
+          </a:effectRef>
+          <a:fontRef idx="minor">
+            <a:schemeClr val="dk1"/>
+          </a:fontRef>
+        </p:style>
+        <p:txBody>
+          <a:bodyPr rot="0" vert="horz" wrap="square" lIns="91440" tIns="45720" rIns="91440" bIns="45720" anchor="t" anchorCtr="0">
+            <a:spAutoFit/>
+          </a:bodyPr>
+          <a:lstStyle/>
+          <a:p>
+            <a:pPr algn="ctr">
+              <a:lnSpc>
+                <a:spcPct val="107000"/>
+              </a:lnSpc>
+              <a:spcAft>
+                <a:spcPts val="800"/>
+              </a:spcAft>
+            </a:pPr>
+            <a:r>
+              <a:rPr lang="pt-BR" sz="1100" dirty="0">
+                <a:ea typeface="Calibri" panose="020F0502020204030204" pitchFamily="34" charset="0"/>
+                <a:cs typeface="Times New Roman" panose="02020603050405020304" pitchFamily="18" charset="0"/>
+              </a:rPr>
+              <a:t>Contato com mecânicas para aplicação do sistema de suspensão e modificação dos atributos do veiculo</a:t>
+            </a:r>
+            <a:endParaRPr lang="pt-BR" sz="1100" dirty="0">
+              <a:effectLst/>
+              <a:ea typeface="Calibri" panose="020F0502020204030204" pitchFamily="34" charset="0"/>
+              <a:cs typeface="Times New Roman" panose="02020603050405020304" pitchFamily="18" charset="0"/>
+            </a:endParaRPr>
+          </a:p>
+          <a:p>
+            <a:pPr>
+              <a:lnSpc>
+                <a:spcPct val="107000"/>
+              </a:lnSpc>
+              <a:spcAft>
+                <a:spcPts val="800"/>
+              </a:spcAft>
+            </a:pPr>
+            <a:r>
+              <a:rPr lang="pt-BR" sz="1100" dirty="0">
+                <a:effectLst/>
+                <a:ea typeface="Calibri" panose="020F0502020204030204" pitchFamily="34" charset="0"/>
+                <a:cs typeface="Times New Roman" panose="02020603050405020304" pitchFamily="18" charset="0"/>
+              </a:rPr>
+              <a:t> </a:t>
+            </a:r>
+          </a:p>
+        </p:txBody>
+      </p:sp>
+      <p:pic>
+        <p:nvPicPr>
+          <p:cNvPr id="71" name="Imagem 70">
+            <a:extLst>
+              <a:ext uri="{FF2B5EF4-FFF2-40B4-BE49-F238E27FC236}">
+                <a16:creationId xmlns:a16="http://schemas.microsoft.com/office/drawing/2014/main" id="{5ED51377-CA61-4945-A63E-2626E4BF9A80}"/>
+              </a:ext>
+            </a:extLst>
+          </p:cNvPr>
+          <p:cNvPicPr/>
+          <p:nvPr/>
+        </p:nvPicPr>
+        <p:blipFill>
+          <a:blip r:embed="rId30" cstate="print">
+            <a:extLst>
+              <a:ext uri="{28A0092B-C50C-407E-A947-70E740481C1C}">
+                <a14:useLocalDpi xmlns:a14="http://schemas.microsoft.com/office/drawing/2010/main" val="0"/>
+              </a:ext>
+            </a:extLst>
+          </a:blip>
+          <a:srcRect/>
+          <a:stretch>
+            <a:fillRect/>
+          </a:stretch>
+        </p:blipFill>
+        <p:spPr bwMode="auto">
+          <a:xfrm>
+            <a:off x="10645013" y="2703436"/>
+            <a:ext cx="626745" cy="626745"/>
+          </a:xfrm>
+          <a:prstGeom prst="rect">
+            <a:avLst/>
+          </a:prstGeom>
+          <a:noFill/>
+          <a:ln>
+            <a:noFill/>
+          </a:ln>
+        </p:spPr>
+      </p:pic>
+      <p:pic>
+        <p:nvPicPr>
+          <p:cNvPr id="72" name="Imagem 71">
+            <a:extLst>
+              <a:ext uri="{FF2B5EF4-FFF2-40B4-BE49-F238E27FC236}">
+                <a16:creationId xmlns:a16="http://schemas.microsoft.com/office/drawing/2014/main" id="{C6BF0D65-460A-4AF1-8418-923C64350219}"/>
+              </a:ext>
+            </a:extLst>
+          </p:cNvPr>
+          <p:cNvPicPr/>
+          <p:nvPr/>
+        </p:nvPicPr>
+        <p:blipFill>
+          <a:blip r:embed="rId31" cstate="print">
+            <a:extLst>
+              <a:ext uri="{28A0092B-C50C-407E-A947-70E740481C1C}">
+                <a14:useLocalDpi xmlns:a14="http://schemas.microsoft.com/office/drawing/2010/main" val="0"/>
+              </a:ext>
+            </a:extLst>
+          </a:blip>
+          <a:srcRect/>
+          <a:stretch>
+            <a:fillRect/>
+          </a:stretch>
+        </p:blipFill>
+        <p:spPr bwMode="auto">
+          <a:xfrm>
+            <a:off x="9573691" y="872693"/>
+            <a:ext cx="1199515" cy="520065"/>
+          </a:xfrm>
+          <a:prstGeom prst="rect">
+            <a:avLst/>
+          </a:prstGeom>
+          <a:noFill/>
+          <a:ln>
+            <a:noFill/>
+          </a:ln>
+        </p:spPr>
+      </p:pic>
+      <p:sp>
+        <p:nvSpPr>
+          <p:cNvPr id="73" name="Caixa de Texto 2">
+            <a:extLst>
+              <a:ext uri="{FF2B5EF4-FFF2-40B4-BE49-F238E27FC236}">
+                <a16:creationId xmlns:a16="http://schemas.microsoft.com/office/drawing/2014/main" id="{F4AB5FE0-BC87-47C3-A1AF-13D1B92259B1}"/>
+              </a:ext>
+            </a:extLst>
+          </p:cNvPr>
+          <p:cNvSpPr txBox="1">
+            <a:spLocks noChangeArrowheads="1"/>
+          </p:cNvSpPr>
+          <p:nvPr/>
+        </p:nvSpPr>
+        <p:spPr bwMode="auto">
+          <a:xfrm>
+            <a:off x="9919669" y="1442296"/>
+            <a:ext cx="2066006" cy="911468"/>
+          </a:xfrm>
+          <a:prstGeom prst="rect">
+            <a:avLst/>
+          </a:prstGeom>
+          <a:noFill/>
+          <a:ln>
+            <a:noFill/>
+          </a:ln>
+        </p:spPr>
+        <p:style>
+          <a:lnRef idx="0">
+            <a:scrgbClr r="0" g="0" b="0"/>
+          </a:lnRef>
+          <a:fillRef idx="0">
+            <a:scrgbClr r="0" g="0" b="0"/>
+          </a:fillRef>
+          <a:effectRef idx="0">
+            <a:scrgbClr r="0" g="0" b="0"/>
+          </a:effectRef>
+          <a:fontRef idx="minor">
+            <a:schemeClr val="dk1"/>
+          </a:fontRef>
+        </p:style>
+        <p:txBody>
+          <a:bodyPr rot="0" vert="horz" wrap="square" lIns="91440" tIns="45720" rIns="91440" bIns="45720" anchor="t" anchorCtr="0">
+            <a:spAutoFit/>
+          </a:bodyPr>
+          <a:lstStyle/>
+          <a:p>
+            <a:pPr algn="ctr">
+              <a:lnSpc>
+                <a:spcPct val="107000"/>
+              </a:lnSpc>
+              <a:spcAft>
+                <a:spcPts val="800"/>
+              </a:spcAft>
+            </a:pPr>
+            <a:r>
+              <a:rPr lang="pt-BR" sz="1100" dirty="0">
+                <a:ea typeface="Calibri" panose="020F0502020204030204" pitchFamily="34" charset="0"/>
+                <a:cs typeface="Times New Roman" panose="02020603050405020304" pitchFamily="18" charset="0"/>
+              </a:rPr>
+              <a:t>Veiculo entregue com as modificações exigidas pelo cliente de forma única e especial</a:t>
+            </a:r>
+            <a:endParaRPr lang="pt-BR" sz="1100" dirty="0">
+              <a:effectLst/>
+              <a:ea typeface="Calibri" panose="020F0502020204030204" pitchFamily="34" charset="0"/>
+              <a:cs typeface="Times New Roman" panose="02020603050405020304" pitchFamily="18" charset="0"/>
+            </a:endParaRPr>
+          </a:p>
+          <a:p>
+            <a:pPr>
+              <a:lnSpc>
+                <a:spcPct val="107000"/>
+              </a:lnSpc>
+              <a:spcAft>
+                <a:spcPts val="800"/>
+              </a:spcAft>
+            </a:pPr>
+            <a:r>
+              <a:rPr lang="pt-BR" sz="1100" dirty="0">
+                <a:effectLst/>
+                <a:ea typeface="Calibri" panose="020F0502020204030204" pitchFamily="34" charset="0"/>
+                <a:cs typeface="Times New Roman" panose="02020603050405020304" pitchFamily="18" charset="0"/>
+              </a:rPr>
+              <a:t> </a:t>
+            </a:r>
+          </a:p>
+        </p:txBody>
+      </p:sp>
     </p:spTree>
     <p:extLst>
       <p:ext uri="{BB962C8B-B14F-4D97-AF65-F5344CB8AC3E}">

</xml_diff>

<commit_message>
adicionando novas funcionalidades ao site e finalizando index
</commit_message>
<xml_diff>
--- a/documentacao/HLD_LLD.pptx
+++ b/documentacao/HLD_LLD.pptx
@@ -8,6 +8,7 @@
     <p:sldId id="256" r:id="rId2"/>
     <p:sldId id="257" r:id="rId3"/>
     <p:sldId id="258" r:id="rId4"/>
+    <p:sldId id="259" r:id="rId5"/>
   </p:sldIdLst>
   <p:sldSz cx="12192000" cy="6858000"/>
   <p:notesSz cx="6858000" cy="9144000"/>
@@ -261,7 +262,7 @@
           <a:p>
             <a:fld id="{9C051C65-7635-434F-9E39-2D893C4FB771}" type="datetimeFigureOut">
               <a:rPr lang="pt-BR" smtClean="0"/>
-              <a:t>13/05/2021</a:t>
+              <a:t>16/05/2021</a:t>
             </a:fld>
             <a:endParaRPr lang="pt-BR"/>
           </a:p>
@@ -459,7 +460,7 @@
           <a:p>
             <a:fld id="{9C051C65-7635-434F-9E39-2D893C4FB771}" type="datetimeFigureOut">
               <a:rPr lang="pt-BR" smtClean="0"/>
-              <a:t>13/05/2021</a:t>
+              <a:t>16/05/2021</a:t>
             </a:fld>
             <a:endParaRPr lang="pt-BR"/>
           </a:p>
@@ -667,7 +668,7 @@
           <a:p>
             <a:fld id="{9C051C65-7635-434F-9E39-2D893C4FB771}" type="datetimeFigureOut">
               <a:rPr lang="pt-BR" smtClean="0"/>
-              <a:t>13/05/2021</a:t>
+              <a:t>16/05/2021</a:t>
             </a:fld>
             <a:endParaRPr lang="pt-BR"/>
           </a:p>
@@ -865,7 +866,7 @@
           <a:p>
             <a:fld id="{9C051C65-7635-434F-9E39-2D893C4FB771}" type="datetimeFigureOut">
               <a:rPr lang="pt-BR" smtClean="0"/>
-              <a:t>13/05/2021</a:t>
+              <a:t>16/05/2021</a:t>
             </a:fld>
             <a:endParaRPr lang="pt-BR"/>
           </a:p>
@@ -1140,7 +1141,7 @@
           <a:p>
             <a:fld id="{9C051C65-7635-434F-9E39-2D893C4FB771}" type="datetimeFigureOut">
               <a:rPr lang="pt-BR" smtClean="0"/>
-              <a:t>13/05/2021</a:t>
+              <a:t>16/05/2021</a:t>
             </a:fld>
             <a:endParaRPr lang="pt-BR"/>
           </a:p>
@@ -1405,7 +1406,7 @@
           <a:p>
             <a:fld id="{9C051C65-7635-434F-9E39-2D893C4FB771}" type="datetimeFigureOut">
               <a:rPr lang="pt-BR" smtClean="0"/>
-              <a:t>13/05/2021</a:t>
+              <a:t>16/05/2021</a:t>
             </a:fld>
             <a:endParaRPr lang="pt-BR"/>
           </a:p>
@@ -1817,7 +1818,7 @@
           <a:p>
             <a:fld id="{9C051C65-7635-434F-9E39-2D893C4FB771}" type="datetimeFigureOut">
               <a:rPr lang="pt-BR" smtClean="0"/>
-              <a:t>13/05/2021</a:t>
+              <a:t>16/05/2021</a:t>
             </a:fld>
             <a:endParaRPr lang="pt-BR"/>
           </a:p>
@@ -1958,7 +1959,7 @@
           <a:p>
             <a:fld id="{9C051C65-7635-434F-9E39-2D893C4FB771}" type="datetimeFigureOut">
               <a:rPr lang="pt-BR" smtClean="0"/>
-              <a:t>13/05/2021</a:t>
+              <a:t>16/05/2021</a:t>
             </a:fld>
             <a:endParaRPr lang="pt-BR"/>
           </a:p>
@@ -2071,7 +2072,7 @@
           <a:p>
             <a:fld id="{9C051C65-7635-434F-9E39-2D893C4FB771}" type="datetimeFigureOut">
               <a:rPr lang="pt-BR" smtClean="0"/>
-              <a:t>13/05/2021</a:t>
+              <a:t>16/05/2021</a:t>
             </a:fld>
             <a:endParaRPr lang="pt-BR"/>
           </a:p>
@@ -2382,7 +2383,7 @@
           <a:p>
             <a:fld id="{9C051C65-7635-434F-9E39-2D893C4FB771}" type="datetimeFigureOut">
               <a:rPr lang="pt-BR" smtClean="0"/>
-              <a:t>13/05/2021</a:t>
+              <a:t>16/05/2021</a:t>
             </a:fld>
             <a:endParaRPr lang="pt-BR"/>
           </a:p>
@@ -2670,7 +2671,7 @@
           <a:p>
             <a:fld id="{9C051C65-7635-434F-9E39-2D893C4FB771}" type="datetimeFigureOut">
               <a:rPr lang="pt-BR" smtClean="0"/>
-              <a:t>13/05/2021</a:t>
+              <a:t>16/05/2021</a:t>
             </a:fld>
             <a:endParaRPr lang="pt-BR"/>
           </a:p>
@@ -2911,7 +2912,7 @@
           <a:p>
             <a:fld id="{9C051C65-7635-434F-9E39-2D893C4FB771}" type="datetimeFigureOut">
               <a:rPr lang="pt-BR" smtClean="0"/>
-              <a:t>13/05/2021</a:t>
+              <a:t>16/05/2021</a:t>
             </a:fld>
             <a:endParaRPr lang="pt-BR"/>
           </a:p>
@@ -3422,7 +3423,7 @@
         </p:nvSpPr>
         <p:spPr>
           <a:xfrm>
-            <a:off x="5019624" y="226370"/>
+            <a:off x="3309855" y="218306"/>
             <a:ext cx="3165475" cy="1661795"/>
           </a:xfrm>
           <a:prstGeom prst="cloud">
@@ -3482,7 +3483,7 @@
         </p:nvSpPr>
         <p:spPr bwMode="auto">
           <a:xfrm>
-            <a:off x="5970783" y="609664"/>
+            <a:off x="4261014" y="601600"/>
             <a:ext cx="1126108" cy="495300"/>
           </a:xfrm>
           <a:prstGeom prst="rect">
@@ -3564,7 +3565,7 @@
         </p:blipFill>
         <p:spPr bwMode="auto">
           <a:xfrm>
-            <a:off x="7194084" y="312624"/>
+            <a:off x="5484315" y="304560"/>
             <a:ext cx="617220" cy="617220"/>
           </a:xfrm>
           <a:prstGeom prst="rect">
@@ -3592,7 +3593,7 @@
         </p:nvSpPr>
         <p:spPr bwMode="auto">
           <a:xfrm>
-            <a:off x="7056985" y="870999"/>
+            <a:off x="5347216" y="862935"/>
             <a:ext cx="889195" cy="391844"/>
           </a:xfrm>
           <a:prstGeom prst="rect">
@@ -3669,7 +3670,7 @@
         </p:blipFill>
         <p:spPr bwMode="auto">
           <a:xfrm>
-            <a:off x="6527504" y="1282414"/>
+            <a:off x="4817735" y="1274350"/>
             <a:ext cx="436245" cy="436245"/>
           </a:xfrm>
           <a:prstGeom prst="rect">
@@ -3710,7 +3711,7 @@
         </p:blipFill>
         <p:spPr>
           <a:xfrm>
-            <a:off x="5478484" y="688404"/>
+            <a:off x="3768715" y="680340"/>
             <a:ext cx="337820" cy="337820"/>
           </a:xfrm>
           <a:prstGeom prst="rect">
@@ -3745,7 +3746,7 @@
         </p:blipFill>
         <p:spPr bwMode="auto">
           <a:xfrm>
-            <a:off x="5660707" y="1188304"/>
+            <a:off x="3950938" y="1180240"/>
             <a:ext cx="447675" cy="447675"/>
           </a:xfrm>
           <a:prstGeom prst="rect">
@@ -3786,7 +3787,7 @@
         </p:blipFill>
         <p:spPr>
           <a:xfrm>
-            <a:off x="1618781" y="1542359"/>
+            <a:off x="1568905" y="1642112"/>
             <a:ext cx="581660" cy="581660"/>
           </a:xfrm>
           <a:prstGeom prst="rect">
@@ -3808,11 +3809,15 @@
         </p:nvSpPr>
         <p:spPr>
           <a:xfrm rot="10800000">
-            <a:off x="1752066" y="1094799"/>
-            <a:ext cx="3267558" cy="391795"/>
+            <a:off x="1752990" y="858897"/>
+            <a:ext cx="1491451" cy="729577"/>
           </a:xfrm>
           <a:prstGeom prst="leftUpArrow">
-            <a:avLst/>
+            <a:avLst>
+              <a:gd name="adj1" fmla="val 10647"/>
+              <a:gd name="adj2" fmla="val 13765"/>
+              <a:gd name="adj3" fmla="val 17734"/>
+            </a:avLst>
           </a:prstGeom>
           <a:noFill/>
           <a:ln w="9525" cap="flat" cmpd="sng" algn="ctr">
@@ -3881,7 +3886,7 @@
         </p:blipFill>
         <p:spPr>
           <a:xfrm>
-            <a:off x="988083" y="2621179"/>
+            <a:off x="938207" y="2720932"/>
             <a:ext cx="380365" cy="380365"/>
           </a:xfrm>
           <a:prstGeom prst="rect">
@@ -3903,14 +3908,14 @@
         </p:nvSpPr>
         <p:spPr>
           <a:xfrm rot="10800000" flipH="1" flipV="1">
-            <a:off x="1368448" y="2179783"/>
+            <a:off x="1318572" y="2279536"/>
             <a:ext cx="581660" cy="635365"/>
           </a:xfrm>
           <a:prstGeom prst="leftUpArrow">
             <a:avLst>
-              <a:gd name="adj1" fmla="val 20163"/>
-              <a:gd name="adj2" fmla="val 15763"/>
-              <a:gd name="adj3" fmla="val 20163"/>
+              <a:gd name="adj1" fmla="val 16549"/>
+              <a:gd name="adj2" fmla="val 13053"/>
+              <a:gd name="adj3" fmla="val 14742"/>
             </a:avLst>
           </a:prstGeom>
           <a:noFill/>
@@ -3965,7 +3970,7 @@
         </p:nvSpPr>
         <p:spPr>
           <a:xfrm>
-            <a:off x="611208" y="2974918"/>
+            <a:off x="561332" y="3074671"/>
             <a:ext cx="1589233" cy="1285875"/>
           </a:xfrm>
           <a:prstGeom prst="roundRect">
@@ -4038,7 +4043,7 @@
         </p:blipFill>
         <p:spPr>
           <a:xfrm>
-            <a:off x="1188336" y="3363200"/>
+            <a:off x="1138460" y="3462953"/>
             <a:ext cx="434975" cy="434975"/>
           </a:xfrm>
           <a:prstGeom prst="rect">
@@ -4075,7 +4080,7 @@
         </p:blipFill>
         <p:spPr>
           <a:xfrm>
-            <a:off x="714617" y="3085438"/>
+            <a:off x="664741" y="3185191"/>
             <a:ext cx="390525" cy="390525"/>
           </a:xfrm>
           <a:prstGeom prst="rect">
@@ -4112,7 +4117,7 @@
         </p:blipFill>
         <p:spPr>
           <a:xfrm>
-            <a:off x="1671049" y="3112425"/>
+            <a:off x="1621173" y="3212178"/>
             <a:ext cx="360680" cy="336550"/>
           </a:xfrm>
           <a:prstGeom prst="rect">
@@ -4149,7 +4154,7 @@
         </p:blipFill>
         <p:spPr>
           <a:xfrm rot="20026507">
-            <a:off x="1338770" y="3063867"/>
+            <a:off x="1288894" y="3163620"/>
             <a:ext cx="209550" cy="209550"/>
           </a:xfrm>
           <a:prstGeom prst="rect">
@@ -4173,7 +4178,7 @@
         </p:nvSpPr>
         <p:spPr bwMode="auto">
           <a:xfrm>
-            <a:off x="714617" y="3811772"/>
+            <a:off x="664741" y="3911525"/>
             <a:ext cx="1333500" cy="495300"/>
           </a:xfrm>
           <a:prstGeom prst="rect">
@@ -4239,7 +4244,7 @@
         </p:nvSpPr>
         <p:spPr bwMode="auto">
           <a:xfrm>
-            <a:off x="7733723" y="1452189"/>
+            <a:off x="6023954" y="1444125"/>
             <a:ext cx="1586269" cy="762000"/>
           </a:xfrm>
           <a:prstGeom prst="rect">
@@ -4354,7 +4359,7 @@
         </p:blipFill>
         <p:spPr>
           <a:xfrm>
-            <a:off x="3951849" y="2234085"/>
+            <a:off x="3844225" y="2409200"/>
             <a:ext cx="581660" cy="581660"/>
           </a:xfrm>
           <a:prstGeom prst="rect">
@@ -4376,14 +4381,14 @@
         </p:nvSpPr>
         <p:spPr>
           <a:xfrm rot="10800000" flipH="1" flipV="1">
-            <a:off x="4533509" y="1834929"/>
-            <a:ext cx="1830314" cy="889611"/>
+            <a:off x="4447553" y="1894763"/>
+            <a:ext cx="807260" cy="889611"/>
           </a:xfrm>
           <a:prstGeom prst="leftUpArrow">
             <a:avLst>
-              <a:gd name="adj1" fmla="val 16062"/>
-              <a:gd name="adj2" fmla="val 13828"/>
-              <a:gd name="adj3" fmla="val 16062"/>
+              <a:gd name="adj1" fmla="val 11336"/>
+              <a:gd name="adj2" fmla="val 11465"/>
+              <a:gd name="adj3" fmla="val 12518"/>
             </a:avLst>
           </a:prstGeom>
           <a:noFill/>
@@ -4453,7 +4458,7 @@
         </p:blipFill>
         <p:spPr>
           <a:xfrm>
-            <a:off x="4923491" y="3048121"/>
+            <a:off x="4873615" y="3147874"/>
             <a:ext cx="380365" cy="380365"/>
           </a:xfrm>
           <a:prstGeom prst="rect">
@@ -4475,7 +4480,7 @@
         </p:nvSpPr>
         <p:spPr>
           <a:xfrm>
-            <a:off x="3862701" y="3396960"/>
+            <a:off x="3812825" y="3496713"/>
             <a:ext cx="2076716" cy="1324924"/>
           </a:xfrm>
           <a:prstGeom prst="roundRect">
@@ -4545,7 +4550,7 @@
         </p:blipFill>
         <p:spPr>
           <a:xfrm>
-            <a:off x="5287984" y="3580688"/>
+            <a:off x="5238108" y="3680441"/>
             <a:ext cx="381000" cy="381000"/>
           </a:xfrm>
           <a:prstGeom prst="rect">
@@ -4582,7 +4587,7 @@
         </p:blipFill>
         <p:spPr>
           <a:xfrm>
-            <a:off x="3951849" y="3459521"/>
+            <a:off x="3901973" y="3559274"/>
             <a:ext cx="529590" cy="529590"/>
           </a:xfrm>
           <a:prstGeom prst="rect">
@@ -4619,7 +4624,7 @@
         </p:blipFill>
         <p:spPr>
           <a:xfrm rot="2566580">
-            <a:off x="4784940" y="3572199"/>
+            <a:off x="4735064" y="3671952"/>
             <a:ext cx="209550" cy="209550"/>
           </a:xfrm>
           <a:prstGeom prst="rect">
@@ -4643,7 +4648,7 @@
         </p:nvSpPr>
         <p:spPr bwMode="auto">
           <a:xfrm>
-            <a:off x="3839668" y="4025810"/>
+            <a:off x="3789792" y="4125563"/>
             <a:ext cx="2209800" cy="495300"/>
           </a:xfrm>
           <a:prstGeom prst="rect">
@@ -4707,11 +4712,15 @@
         </p:nvSpPr>
         <p:spPr>
           <a:xfrm rot="10800000" flipV="1">
-            <a:off x="4116066" y="2889540"/>
-            <a:ext cx="733547" cy="391795"/>
+            <a:off x="4067100" y="3047449"/>
+            <a:ext cx="733547" cy="333639"/>
           </a:xfrm>
           <a:prstGeom prst="leftUpArrow">
-            <a:avLst/>
+            <a:avLst>
+              <a:gd name="adj1" fmla="val 19634"/>
+              <a:gd name="adj2" fmla="val 22317"/>
+              <a:gd name="adj3" fmla="val 25000"/>
+            </a:avLst>
           </a:prstGeom>
           <a:noFill/>
           <a:ln w="9525" cap="flat" cmpd="sng" algn="ctr">
@@ -4777,7 +4786,7 @@
         </p:blipFill>
         <p:spPr>
           <a:xfrm rot="20529588">
-            <a:off x="4314550" y="5266537"/>
+            <a:off x="7509554" y="4456170"/>
             <a:ext cx="519430" cy="519430"/>
           </a:xfrm>
           <a:prstGeom prst="rect">
@@ -4812,7 +4821,7 @@
         </p:blipFill>
         <p:spPr bwMode="auto">
           <a:xfrm>
-            <a:off x="3436864" y="5276271"/>
+            <a:off x="6749616" y="4483017"/>
             <a:ext cx="514985" cy="514985"/>
           </a:xfrm>
           <a:prstGeom prst="rect">
@@ -4840,7 +4849,7 @@
         </p:nvSpPr>
         <p:spPr bwMode="auto">
           <a:xfrm>
-            <a:off x="3036557" y="5740986"/>
+            <a:off x="6294727" y="4986702"/>
             <a:ext cx="2209800" cy="495300"/>
           </a:xfrm>
           <a:prstGeom prst="rect">
@@ -4904,11 +4913,15 @@
         </p:nvSpPr>
         <p:spPr>
           <a:xfrm rot="10800000" flipV="1">
-            <a:off x="1107272" y="4339161"/>
-            <a:ext cx="1044575" cy="391795"/>
+            <a:off x="1055263" y="4439156"/>
+            <a:ext cx="1044575" cy="713881"/>
           </a:xfrm>
           <a:prstGeom prst="leftUpArrow">
-            <a:avLst/>
+            <a:avLst>
+              <a:gd name="adj1" fmla="val 13504"/>
+              <a:gd name="adj2" fmla="val 12785"/>
+              <a:gd name="adj3" fmla="val 17815"/>
+            </a:avLst>
           </a:prstGeom>
           <a:noFill/>
           <a:ln w="9525" cap="flat" cmpd="sng" algn="ctr">
@@ -4977,7 +4990,7 @@
         </p:blipFill>
         <p:spPr>
           <a:xfrm>
-            <a:off x="2200441" y="4260793"/>
+            <a:off x="2150565" y="4789614"/>
             <a:ext cx="581660" cy="615059"/>
           </a:xfrm>
           <a:prstGeom prst="rect">
@@ -4998,12 +5011,16 @@
           <p:nvPr/>
         </p:nvSpPr>
         <p:spPr>
-          <a:xfrm rot="16200000" flipH="1" flipV="1">
-            <a:off x="2156707" y="5086895"/>
-            <a:ext cx="950642" cy="581660"/>
+          <a:xfrm flipV="1">
+            <a:off x="8273937" y="4632971"/>
+            <a:ext cx="2209799" cy="550543"/>
           </a:xfrm>
           <a:prstGeom prst="leftUpArrow">
-            <a:avLst/>
+            <a:avLst>
+              <a:gd name="adj1" fmla="val 14158"/>
+              <a:gd name="adj2" fmla="val 14158"/>
+              <a:gd name="adj3" fmla="val 14895"/>
+            </a:avLst>
           </a:prstGeom>
           <a:noFill/>
           <a:ln w="9525" cap="flat" cmpd="sng" algn="ctr">
@@ -5043,12 +5060,195 @@
           </a:p>
         </p:txBody>
       </p:sp>
-      <p:sp>
-        <p:nvSpPr>
-          <p:cNvPr id="40" name="Seta: da Esquerda para a Direita 39">
-            <a:extLst>
-              <a:ext uri="{FF2B5EF4-FFF2-40B4-BE49-F238E27FC236}">
-                <a16:creationId xmlns:a16="http://schemas.microsoft.com/office/drawing/2014/main" id="{3F8852BA-2FAE-4DBD-A8CD-842FB54C36A4}"/>
+      <p:pic>
+        <p:nvPicPr>
+          <p:cNvPr id="42" name="Imagem 41">
+            <a:extLst>
+              <a:ext uri="{FF2B5EF4-FFF2-40B4-BE49-F238E27FC236}">
+                <a16:creationId xmlns:a16="http://schemas.microsoft.com/office/drawing/2014/main" id="{2694F079-673D-4DD2-B88B-701F413495CC}"/>
+              </a:ext>
+            </a:extLst>
+          </p:cNvPr>
+          <p:cNvPicPr/>
+          <p:nvPr/>
+        </p:nvPicPr>
+        <p:blipFill>
+          <a:blip r:embed="rId24" cstate="print">
+            <a:extLst>
+              <a:ext uri="{28A0092B-C50C-407E-A947-70E740481C1C}">
+                <a14:useLocalDpi xmlns:a14="http://schemas.microsoft.com/office/drawing/2010/main" val="0"/>
+              </a:ext>
+            </a:extLst>
+          </a:blip>
+          <a:srcRect/>
+          <a:stretch>
+            <a:fillRect/>
+          </a:stretch>
+        </p:blipFill>
+        <p:spPr bwMode="auto">
+          <a:xfrm>
+            <a:off x="10589649" y="5192644"/>
+            <a:ext cx="550545" cy="550546"/>
+          </a:xfrm>
+          <a:prstGeom prst="rect">
+            <a:avLst/>
+          </a:prstGeom>
+          <a:noFill/>
+          <a:ln>
+            <a:noFill/>
+          </a:ln>
+        </p:spPr>
+      </p:pic>
+      <p:pic>
+        <p:nvPicPr>
+          <p:cNvPr id="43" name="Imagem 42">
+            <a:extLst>
+              <a:ext uri="{FF2B5EF4-FFF2-40B4-BE49-F238E27FC236}">
+                <a16:creationId xmlns:a16="http://schemas.microsoft.com/office/drawing/2014/main" id="{EA433D55-F576-4799-B237-66C620CDC551}"/>
+              </a:ext>
+            </a:extLst>
+          </p:cNvPr>
+          <p:cNvPicPr/>
+          <p:nvPr/>
+        </p:nvPicPr>
+        <p:blipFill>
+          <a:blip r:embed="rId25" cstate="print">
+            <a:extLst>
+              <a:ext uri="{28A0092B-C50C-407E-A947-70E740481C1C}">
+                <a14:useLocalDpi xmlns:a14="http://schemas.microsoft.com/office/drawing/2010/main" val="0"/>
+              </a:ext>
+            </a:extLst>
+          </a:blip>
+          <a:srcRect/>
+          <a:stretch>
+            <a:fillRect/>
+          </a:stretch>
+        </p:blipFill>
+        <p:spPr bwMode="auto">
+          <a:xfrm>
+            <a:off x="9721990" y="5206729"/>
+            <a:ext cx="550545" cy="550545"/>
+          </a:xfrm>
+          <a:prstGeom prst="rect">
+            <a:avLst/>
+          </a:prstGeom>
+          <a:noFill/>
+          <a:ln>
+            <a:noFill/>
+          </a:ln>
+        </p:spPr>
+      </p:pic>
+      <p:sp>
+        <p:nvSpPr>
+          <p:cNvPr id="44" name="Caixa de Texto 2">
+            <a:extLst>
+              <a:ext uri="{FF2B5EF4-FFF2-40B4-BE49-F238E27FC236}">
+                <a16:creationId xmlns:a16="http://schemas.microsoft.com/office/drawing/2014/main" id="{5D84FF84-1521-40BB-9439-EA49F642FDA8}"/>
+              </a:ext>
+            </a:extLst>
+          </p:cNvPr>
+          <p:cNvSpPr txBox="1">
+            <a:spLocks noChangeArrowheads="1"/>
+          </p:cNvSpPr>
+          <p:nvPr/>
+        </p:nvSpPr>
+        <p:spPr bwMode="auto">
+          <a:xfrm>
+            <a:off x="9378836" y="5799315"/>
+            <a:ext cx="2103120" cy="509905"/>
+          </a:xfrm>
+          <a:prstGeom prst="rect">
+            <a:avLst/>
+          </a:prstGeom>
+          <a:noFill/>
+          <a:ln>
+            <a:noFill/>
+          </a:ln>
+        </p:spPr>
+        <p:style>
+          <a:lnRef idx="0">
+            <a:scrgbClr r="0" g="0" b="0"/>
+          </a:lnRef>
+          <a:fillRef idx="0">
+            <a:scrgbClr r="0" g="0" b="0"/>
+          </a:fillRef>
+          <a:effectRef idx="0">
+            <a:scrgbClr r="0" g="0" b="0"/>
+          </a:effectRef>
+          <a:fontRef idx="minor">
+            <a:schemeClr val="dk1"/>
+          </a:fontRef>
+        </p:style>
+        <p:txBody>
+          <a:bodyPr rot="0" vert="horz" wrap="square" lIns="91440" tIns="45720" rIns="91440" bIns="45720" anchor="t" anchorCtr="0">
+            <a:noAutofit/>
+          </a:bodyPr>
+          <a:lstStyle/>
+          <a:p>
+            <a:pPr algn="ctr">
+              <a:lnSpc>
+                <a:spcPct val="107000"/>
+              </a:lnSpc>
+              <a:spcAft>
+                <a:spcPts val="800"/>
+              </a:spcAft>
+            </a:pPr>
+            <a:r>
+              <a:rPr lang="pt-BR" sz="1100" dirty="0">
+                <a:effectLst/>
+                <a:ea typeface="Calibri" panose="020F0502020204030204" pitchFamily="34" charset="0"/>
+                <a:cs typeface="Times New Roman" panose="02020603050405020304" pitchFamily="18" charset="0"/>
+              </a:rPr>
+              <a:t>Reunião para decidir como e o que o cliente deseja modificar</a:t>
+            </a:r>
+          </a:p>
+        </p:txBody>
+      </p:sp>
+      <p:pic>
+        <p:nvPicPr>
+          <p:cNvPr id="45" name="Imagem 44">
+            <a:extLst>
+              <a:ext uri="{FF2B5EF4-FFF2-40B4-BE49-F238E27FC236}">
+                <a16:creationId xmlns:a16="http://schemas.microsoft.com/office/drawing/2014/main" id="{A2C4E18C-61E3-4D26-93D8-42B61FB55518}"/>
+              </a:ext>
+            </a:extLst>
+          </p:cNvPr>
+          <p:cNvPicPr/>
+          <p:nvPr/>
+        </p:nvPicPr>
+        <p:blipFill>
+          <a:blip r:embed="rId26" cstate="print">
+            <a:extLst>
+              <a:ext uri="{28A0092B-C50C-407E-A947-70E740481C1C}">
+                <a14:useLocalDpi xmlns:a14="http://schemas.microsoft.com/office/drawing/2010/main" val="0"/>
+              </a:ext>
+            </a:extLst>
+          </a:blip>
+          <a:srcRect/>
+          <a:stretch>
+            <a:fillRect/>
+          </a:stretch>
+        </p:blipFill>
+        <p:spPr bwMode="auto">
+          <a:xfrm>
+            <a:off x="9020950" y="4082427"/>
+            <a:ext cx="701040" cy="701040"/>
+          </a:xfrm>
+          <a:prstGeom prst="rect">
+            <a:avLst/>
+          </a:prstGeom>
+          <a:noFill/>
+          <a:ln>
+            <a:noFill/>
+          </a:ln>
+        </p:spPr>
+      </p:pic>
+      <p:sp>
+        <p:nvSpPr>
+          <p:cNvPr id="47" name="Seta: da Esquerda para a Direita 46">
+            <a:extLst>
+              <a:ext uri="{FF2B5EF4-FFF2-40B4-BE49-F238E27FC236}">
+                <a16:creationId xmlns:a16="http://schemas.microsoft.com/office/drawing/2014/main" id="{B1703C86-63DD-4526-A5F5-0CD40DDC32C8}"/>
               </a:ext>
             </a:extLst>
           </p:cNvPr>
@@ -5056,9 +5256,9 @@
           <p:nvPr/>
         </p:nvSpPr>
         <p:spPr>
-          <a:xfrm rot="16200000">
-            <a:off x="4354899" y="4896463"/>
-            <a:ext cx="438731" cy="183515"/>
+          <a:xfrm>
+            <a:off x="2732225" y="4974904"/>
+            <a:ext cx="3659040" cy="183515"/>
           </a:xfrm>
           <a:prstGeom prst="leftRightArrow">
             <a:avLst/>
@@ -5103,10 +5303,10 @@
       </p:sp>
       <p:pic>
         <p:nvPicPr>
-          <p:cNvPr id="42" name="Imagem 41">
-            <a:extLst>
-              <a:ext uri="{FF2B5EF4-FFF2-40B4-BE49-F238E27FC236}">
-                <a16:creationId xmlns:a16="http://schemas.microsoft.com/office/drawing/2014/main" id="{2694F079-673D-4DD2-B88B-701F413495CC}"/>
+          <p:cNvPr id="48" name="Imagem 47">
+            <a:extLst>
+              <a:ext uri="{FF2B5EF4-FFF2-40B4-BE49-F238E27FC236}">
+                <a16:creationId xmlns:a16="http://schemas.microsoft.com/office/drawing/2014/main" id="{8148F385-5076-46DA-9B5F-A1C363797481}"/>
               </a:ext>
             </a:extLst>
           </p:cNvPr>
@@ -5114,7 +5314,7 @@
           <p:nvPr/>
         </p:nvPicPr>
         <p:blipFill>
-          <a:blip r:embed="rId24" cstate="print">
+          <a:blip r:embed="rId27" cstate="print">
             <a:extLst>
               <a:ext uri="{28A0092B-C50C-407E-A947-70E740481C1C}">
                 <a14:useLocalDpi xmlns:a14="http://schemas.microsoft.com/office/drawing/2010/main" val="0"/>
@@ -5128,8 +5328,8 @@
         </p:blipFill>
         <p:spPr bwMode="auto">
           <a:xfrm>
-            <a:off x="7473372" y="5199458"/>
-            <a:ext cx="550545" cy="550546"/>
+            <a:off x="8135223" y="2698907"/>
+            <a:ext cx="1199515" cy="520065"/>
           </a:xfrm>
           <a:prstGeom prst="rect">
             <a:avLst/>
@@ -5142,10 +5342,10 @@
       </p:pic>
       <p:pic>
         <p:nvPicPr>
-          <p:cNvPr id="43" name="Imagem 42">
-            <a:extLst>
-              <a:ext uri="{FF2B5EF4-FFF2-40B4-BE49-F238E27FC236}">
-                <a16:creationId xmlns:a16="http://schemas.microsoft.com/office/drawing/2014/main" id="{EA433D55-F576-4799-B237-66C620CDC551}"/>
+          <p:cNvPr id="50" name="Imagem 49">
+            <a:extLst>
+              <a:ext uri="{FF2B5EF4-FFF2-40B4-BE49-F238E27FC236}">
+                <a16:creationId xmlns:a16="http://schemas.microsoft.com/office/drawing/2014/main" id="{51523602-2DDD-49EC-A2C8-258A1322A2D5}"/>
               </a:ext>
             </a:extLst>
           </p:cNvPr>
@@ -5153,7 +5353,7 @@
           <p:nvPr/>
         </p:nvPicPr>
         <p:blipFill>
-          <a:blip r:embed="rId25" cstate="print">
+          <a:blip r:embed="rId28" cstate="print">
             <a:extLst>
               <a:ext uri="{28A0092B-C50C-407E-A947-70E740481C1C}">
                 <a14:useLocalDpi xmlns:a14="http://schemas.microsoft.com/office/drawing/2010/main" val="0"/>
@@ -5167,8 +5367,8 @@
         </p:blipFill>
         <p:spPr bwMode="auto">
           <a:xfrm>
-            <a:off x="8465104" y="5190441"/>
-            <a:ext cx="550545" cy="550545"/>
+            <a:off x="6410947" y="5743190"/>
+            <a:ext cx="626745" cy="626745"/>
           </a:xfrm>
           <a:prstGeom prst="rect">
             <a:avLst/>
@@ -5181,10 +5381,10 @@
       </p:pic>
       <p:sp>
         <p:nvSpPr>
-          <p:cNvPr id="44" name="Caixa de Texto 2">
-            <a:extLst>
-              <a:ext uri="{FF2B5EF4-FFF2-40B4-BE49-F238E27FC236}">
-                <a16:creationId xmlns:a16="http://schemas.microsoft.com/office/drawing/2014/main" id="{5D84FF84-1521-40BB-9439-EA49F642FDA8}"/>
+          <p:cNvPr id="51" name="Caixa de Texto 2">
+            <a:extLst>
+              <a:ext uri="{FF2B5EF4-FFF2-40B4-BE49-F238E27FC236}">
+                <a16:creationId xmlns:a16="http://schemas.microsoft.com/office/drawing/2014/main" id="{D350F5E3-A9CB-4858-95CC-B400E65FAE75}"/>
               </a:ext>
             </a:extLst>
           </p:cNvPr>
@@ -5195,8 +5395,8 @@
         </p:nvSpPr>
         <p:spPr bwMode="auto">
           <a:xfrm>
-            <a:off x="7146418" y="5853046"/>
-            <a:ext cx="2103120" cy="509905"/>
+            <a:off x="6193661" y="6323367"/>
+            <a:ext cx="1125902" cy="382270"/>
           </a:xfrm>
           <a:prstGeom prst="rect">
             <a:avLst/>
@@ -5240,17 +5440,17 @@
                 <a:ea typeface="Calibri" panose="020F0502020204030204" pitchFamily="34" charset="0"/>
                 <a:cs typeface="Times New Roman" panose="02020603050405020304" pitchFamily="18" charset="0"/>
               </a:rPr>
-              <a:t>Reunião para decidir como e o que o cliente deseja modificar</a:t>
+              <a:t>Mecânica</a:t>
             </a:r>
           </a:p>
         </p:txBody>
       </p:sp>
       <p:pic>
         <p:nvPicPr>
-          <p:cNvPr id="45" name="Imagem 44">
-            <a:extLst>
-              <a:ext uri="{FF2B5EF4-FFF2-40B4-BE49-F238E27FC236}">
-                <a16:creationId xmlns:a16="http://schemas.microsoft.com/office/drawing/2014/main" id="{A2C4E18C-61E3-4D26-93D8-42B61FB55518}"/>
+          <p:cNvPr id="56" name="Imagem 55">
+            <a:extLst>
+              <a:ext uri="{FF2B5EF4-FFF2-40B4-BE49-F238E27FC236}">
+                <a16:creationId xmlns:a16="http://schemas.microsoft.com/office/drawing/2014/main" id="{C7C4B593-0DDA-4F8C-9381-B08EC987864F}"/>
               </a:ext>
             </a:extLst>
           </p:cNvPr>
@@ -5258,7 +5458,7 @@
           <p:nvPr/>
         </p:nvPicPr>
         <p:blipFill>
-          <a:blip r:embed="rId26" cstate="print">
+          <a:blip r:embed="rId29" cstate="print">
             <a:extLst>
               <a:ext uri="{28A0092B-C50C-407E-A947-70E740481C1C}">
                 <a14:useLocalDpi xmlns:a14="http://schemas.microsoft.com/office/drawing/2010/main" val="0"/>
@@ -5272,8 +5472,8 @@
         </p:blipFill>
         <p:spPr bwMode="auto">
           <a:xfrm>
-            <a:off x="5821768" y="5672633"/>
-            <a:ext cx="701040" cy="701040"/>
+            <a:off x="7913708" y="5821074"/>
+            <a:ext cx="520065" cy="520065"/>
           </a:xfrm>
           <a:prstGeom prst="rect">
             <a:avLst/>
@@ -5286,10 +5486,176 @@
       </p:pic>
       <p:sp>
         <p:nvSpPr>
-          <p:cNvPr id="47" name="Seta: da Esquerda para a Direita 46">
-            <a:extLst>
-              <a:ext uri="{FF2B5EF4-FFF2-40B4-BE49-F238E27FC236}">
-                <a16:creationId xmlns:a16="http://schemas.microsoft.com/office/drawing/2014/main" id="{B1703C86-63DD-4526-A5F5-0CD40DDC32C8}"/>
+          <p:cNvPr id="57" name="Caixa de Texto 2">
+            <a:extLst>
+              <a:ext uri="{FF2B5EF4-FFF2-40B4-BE49-F238E27FC236}">
+                <a16:creationId xmlns:a16="http://schemas.microsoft.com/office/drawing/2014/main" id="{9920C27E-6D88-413C-A431-7593E507BBCC}"/>
+              </a:ext>
+            </a:extLst>
+          </p:cNvPr>
+          <p:cNvSpPr txBox="1">
+            <a:spLocks noChangeArrowheads="1"/>
+          </p:cNvSpPr>
+          <p:nvPr/>
+        </p:nvSpPr>
+        <p:spPr bwMode="auto">
+          <a:xfrm>
+            <a:off x="7259011" y="6334162"/>
+            <a:ext cx="1674103" cy="371475"/>
+          </a:xfrm>
+          <a:prstGeom prst="rect">
+            <a:avLst/>
+          </a:prstGeom>
+          <a:noFill/>
+          <a:ln>
+            <a:noFill/>
+          </a:ln>
+        </p:spPr>
+        <p:style>
+          <a:lnRef idx="0">
+            <a:scrgbClr r="0" g="0" b="0"/>
+          </a:lnRef>
+          <a:fillRef idx="0">
+            <a:scrgbClr r="0" g="0" b="0"/>
+          </a:fillRef>
+          <a:effectRef idx="0">
+            <a:scrgbClr r="0" g="0" b="0"/>
+          </a:effectRef>
+          <a:fontRef idx="minor">
+            <a:schemeClr val="dk1"/>
+          </a:fontRef>
+        </p:style>
+        <p:txBody>
+          <a:bodyPr rot="0" vert="horz" wrap="square" lIns="91440" tIns="45720" rIns="91440" bIns="45720" anchor="t" anchorCtr="0">
+            <a:noAutofit/>
+          </a:bodyPr>
+          <a:lstStyle/>
+          <a:p>
+            <a:pPr algn="ctr">
+              <a:lnSpc>
+                <a:spcPct val="107000"/>
+              </a:lnSpc>
+              <a:spcAft>
+                <a:spcPts val="800"/>
+              </a:spcAft>
+            </a:pPr>
+            <a:r>
+              <a:rPr lang="pt-BR" sz="1100" dirty="0">
+                <a:effectLst/>
+                <a:ea typeface="Calibri" panose="020F0502020204030204" pitchFamily="34" charset="0"/>
+                <a:cs typeface="Times New Roman" panose="02020603050405020304" pitchFamily="18" charset="0"/>
+              </a:rPr>
+              <a:t>Oficina de pintura</a:t>
+            </a:r>
+          </a:p>
+        </p:txBody>
+      </p:sp>
+      <p:pic>
+        <p:nvPicPr>
+          <p:cNvPr id="63" name="Imagem 62" descr="Forma&#10;&#10;Descrição gerada automaticamente com confiança baixa">
+            <a:extLst>
+              <a:ext uri="{FF2B5EF4-FFF2-40B4-BE49-F238E27FC236}">
+                <a16:creationId xmlns:a16="http://schemas.microsoft.com/office/drawing/2014/main" id="{004C6537-F452-4B3D-9EB1-28D872B4A0D0}"/>
+              </a:ext>
+            </a:extLst>
+          </p:cNvPr>
+          <p:cNvPicPr/>
+          <p:nvPr/>
+        </p:nvPicPr>
+        <p:blipFill>
+          <a:blip r:embed="rId30" cstate="print">
+            <a:extLst>
+              <a:ext uri="{28A0092B-C50C-407E-A947-70E740481C1C}">
+                <a14:useLocalDpi xmlns:a14="http://schemas.microsoft.com/office/drawing/2010/main" val="0"/>
+              </a:ext>
+            </a:extLst>
+          </a:blip>
+          <a:stretch>
+            <a:fillRect/>
+          </a:stretch>
+        </p:blipFill>
+        <p:spPr>
+          <a:xfrm>
+            <a:off x="10108038" y="2666399"/>
+            <a:ext cx="508635" cy="508635"/>
+          </a:xfrm>
+          <a:prstGeom prst="rect">
+            <a:avLst/>
+          </a:prstGeom>
+        </p:spPr>
+      </p:pic>
+      <p:sp>
+        <p:nvSpPr>
+          <p:cNvPr id="64" name="Caixa de Texto 2">
+            <a:extLst>
+              <a:ext uri="{FF2B5EF4-FFF2-40B4-BE49-F238E27FC236}">
+                <a16:creationId xmlns:a16="http://schemas.microsoft.com/office/drawing/2014/main" id="{05AF41CD-90DD-4208-8A18-239281707FDB}"/>
+              </a:ext>
+            </a:extLst>
+          </p:cNvPr>
+          <p:cNvSpPr txBox="1">
+            <a:spLocks noChangeArrowheads="1"/>
+          </p:cNvSpPr>
+          <p:nvPr/>
+        </p:nvSpPr>
+        <p:spPr bwMode="auto">
+          <a:xfrm>
+            <a:off x="9257456" y="3190430"/>
+            <a:ext cx="2209800" cy="382270"/>
+          </a:xfrm>
+          <a:prstGeom prst="rect">
+            <a:avLst/>
+          </a:prstGeom>
+          <a:noFill/>
+          <a:ln>
+            <a:noFill/>
+          </a:ln>
+        </p:spPr>
+        <p:style>
+          <a:lnRef idx="0">
+            <a:scrgbClr r="0" g="0" b="0"/>
+          </a:lnRef>
+          <a:fillRef idx="0">
+            <a:scrgbClr r="0" g="0" b="0"/>
+          </a:fillRef>
+          <a:effectRef idx="0">
+            <a:scrgbClr r="0" g="0" b="0"/>
+          </a:effectRef>
+          <a:fontRef idx="minor">
+            <a:schemeClr val="dk1"/>
+          </a:fontRef>
+        </p:style>
+        <p:txBody>
+          <a:bodyPr rot="0" vert="horz" wrap="square" lIns="91440" tIns="45720" rIns="91440" bIns="45720" anchor="t" anchorCtr="0">
+            <a:noAutofit/>
+          </a:bodyPr>
+          <a:lstStyle/>
+          <a:p>
+            <a:pPr algn="ctr">
+              <a:lnSpc>
+                <a:spcPct val="107000"/>
+              </a:lnSpc>
+              <a:spcAft>
+                <a:spcPts val="800"/>
+              </a:spcAft>
+            </a:pPr>
+            <a:r>
+              <a:rPr lang="pt-BR" sz="1100" dirty="0">
+                <a:effectLst/>
+                <a:ea typeface="Calibri" panose="020F0502020204030204" pitchFamily="34" charset="0"/>
+                <a:cs typeface="Times New Roman" panose="02020603050405020304" pitchFamily="18" charset="0"/>
+              </a:rPr>
+              <a:t>Cliente satisfeito</a:t>
+            </a:r>
+          </a:p>
+        </p:txBody>
+      </p:sp>
+      <p:sp>
+        <p:nvSpPr>
+          <p:cNvPr id="53" name="Seta: para a Esquerda e para Cima 52">
+            <a:extLst>
+              <a:ext uri="{FF2B5EF4-FFF2-40B4-BE49-F238E27FC236}">
+                <a16:creationId xmlns:a16="http://schemas.microsoft.com/office/drawing/2014/main" id="{19361BCE-4905-4A83-B10F-355170D0BD2E}"/>
               </a:ext>
             </a:extLst>
           </p:cNvPr>
@@ -5297,11 +5663,11 @@
           <p:nvPr/>
         </p:nvSpPr>
         <p:spPr>
-          <a:xfrm>
-            <a:off x="5174867" y="5699498"/>
-            <a:ext cx="1939290" cy="183515"/>
-          </a:xfrm>
-          <a:prstGeom prst="leftRightArrow">
+          <a:xfrm rot="16200000">
+            <a:off x="6336593" y="3534085"/>
+            <a:ext cx="391934" cy="1223302"/>
+          </a:xfrm>
+          <a:prstGeom prst="leftUpArrow">
             <a:avLst/>
           </a:prstGeom>
           <a:noFill/>
@@ -5342,261 +5708,12 @@
           </a:p>
         </p:txBody>
       </p:sp>
-      <p:pic>
-        <p:nvPicPr>
-          <p:cNvPr id="48" name="Imagem 47">
-            <a:extLst>
-              <a:ext uri="{FF2B5EF4-FFF2-40B4-BE49-F238E27FC236}">
-                <a16:creationId xmlns:a16="http://schemas.microsoft.com/office/drawing/2014/main" id="{8148F385-5076-46DA-9B5F-A1C363797481}"/>
-              </a:ext>
-            </a:extLst>
-          </p:cNvPr>
-          <p:cNvPicPr/>
-          <p:nvPr/>
-        </p:nvPicPr>
-        <p:blipFill>
-          <a:blip r:embed="rId27" cstate="print">
-            <a:extLst>
-              <a:ext uri="{28A0092B-C50C-407E-A947-70E740481C1C}">
-                <a14:useLocalDpi xmlns:a14="http://schemas.microsoft.com/office/drawing/2010/main" val="0"/>
-              </a:ext>
-            </a:extLst>
-          </a:blip>
-          <a:srcRect/>
-          <a:stretch>
-            <a:fillRect/>
-          </a:stretch>
-        </p:blipFill>
-        <p:spPr bwMode="auto">
-          <a:xfrm>
-            <a:off x="8465104" y="2648577"/>
-            <a:ext cx="1199515" cy="520065"/>
-          </a:xfrm>
-          <a:prstGeom prst="rect">
-            <a:avLst/>
-          </a:prstGeom>
-          <a:noFill/>
-          <a:ln>
-            <a:noFill/>
-          </a:ln>
-        </p:spPr>
-      </p:pic>
-      <p:pic>
-        <p:nvPicPr>
-          <p:cNvPr id="50" name="Imagem 49">
-            <a:extLst>
-              <a:ext uri="{FF2B5EF4-FFF2-40B4-BE49-F238E27FC236}">
-                <a16:creationId xmlns:a16="http://schemas.microsoft.com/office/drawing/2014/main" id="{51523602-2DDD-49EC-A2C8-258A1322A2D5}"/>
-              </a:ext>
-            </a:extLst>
-          </p:cNvPr>
-          <p:cNvPicPr/>
-          <p:nvPr/>
-        </p:nvPicPr>
-        <p:blipFill>
-          <a:blip r:embed="rId28" cstate="print">
-            <a:extLst>
-              <a:ext uri="{28A0092B-C50C-407E-A947-70E740481C1C}">
-                <a14:useLocalDpi xmlns:a14="http://schemas.microsoft.com/office/drawing/2010/main" val="0"/>
-              </a:ext>
-            </a:extLst>
-          </a:blip>
-          <a:srcRect/>
-          <a:stretch>
-            <a:fillRect/>
-          </a:stretch>
-        </p:blipFill>
-        <p:spPr bwMode="auto">
-          <a:xfrm>
-            <a:off x="6635826" y="3492316"/>
-            <a:ext cx="626745" cy="626745"/>
-          </a:xfrm>
-          <a:prstGeom prst="rect">
-            <a:avLst/>
-          </a:prstGeom>
-          <a:noFill/>
-          <a:ln>
-            <a:noFill/>
-          </a:ln>
-        </p:spPr>
-      </p:pic>
-      <p:sp>
-        <p:nvSpPr>
-          <p:cNvPr id="51" name="Caixa de Texto 2">
-            <a:extLst>
-              <a:ext uri="{FF2B5EF4-FFF2-40B4-BE49-F238E27FC236}">
-                <a16:creationId xmlns:a16="http://schemas.microsoft.com/office/drawing/2014/main" id="{D350F5E3-A9CB-4858-95CC-B400E65FAE75}"/>
-              </a:ext>
-            </a:extLst>
-          </p:cNvPr>
-          <p:cNvSpPr txBox="1">
-            <a:spLocks noChangeArrowheads="1"/>
-          </p:cNvSpPr>
-          <p:nvPr/>
-        </p:nvSpPr>
-        <p:spPr bwMode="auto">
-          <a:xfrm>
-            <a:off x="6396306" y="4059422"/>
-            <a:ext cx="1125902" cy="382270"/>
-          </a:xfrm>
-          <a:prstGeom prst="rect">
-            <a:avLst/>
-          </a:prstGeom>
-          <a:noFill/>
-          <a:ln>
-            <a:noFill/>
-          </a:ln>
-        </p:spPr>
-        <p:style>
-          <a:lnRef idx="0">
-            <a:scrgbClr r="0" g="0" b="0"/>
-          </a:lnRef>
-          <a:fillRef idx="0">
-            <a:scrgbClr r="0" g="0" b="0"/>
-          </a:fillRef>
-          <a:effectRef idx="0">
-            <a:scrgbClr r="0" g="0" b="0"/>
-          </a:effectRef>
-          <a:fontRef idx="minor">
-            <a:schemeClr val="dk1"/>
-          </a:fontRef>
-        </p:style>
-        <p:txBody>
-          <a:bodyPr rot="0" vert="horz" wrap="square" lIns="91440" tIns="45720" rIns="91440" bIns="45720" anchor="t" anchorCtr="0">
-            <a:noAutofit/>
-          </a:bodyPr>
-          <a:lstStyle/>
-          <a:p>
-            <a:pPr algn="ctr">
-              <a:lnSpc>
-                <a:spcPct val="107000"/>
-              </a:lnSpc>
-              <a:spcAft>
-                <a:spcPts val="800"/>
-              </a:spcAft>
-            </a:pPr>
-            <a:r>
-              <a:rPr lang="pt-BR" sz="1100" dirty="0">
-                <a:effectLst/>
-                <a:ea typeface="Calibri" panose="020F0502020204030204" pitchFamily="34" charset="0"/>
-                <a:cs typeface="Times New Roman" panose="02020603050405020304" pitchFamily="18" charset="0"/>
-              </a:rPr>
-              <a:t>Mecânica</a:t>
-            </a:r>
-          </a:p>
-        </p:txBody>
-      </p:sp>
-      <p:pic>
-        <p:nvPicPr>
-          <p:cNvPr id="56" name="Imagem 55">
-            <a:extLst>
-              <a:ext uri="{FF2B5EF4-FFF2-40B4-BE49-F238E27FC236}">
-                <a16:creationId xmlns:a16="http://schemas.microsoft.com/office/drawing/2014/main" id="{C7C4B593-0DDA-4F8C-9381-B08EC987864F}"/>
-              </a:ext>
-            </a:extLst>
-          </p:cNvPr>
-          <p:cNvPicPr/>
-          <p:nvPr/>
-        </p:nvPicPr>
-        <p:blipFill>
-          <a:blip r:embed="rId29" cstate="print">
-            <a:extLst>
-              <a:ext uri="{28A0092B-C50C-407E-A947-70E740481C1C}">
-                <a14:useLocalDpi xmlns:a14="http://schemas.microsoft.com/office/drawing/2010/main" val="0"/>
-              </a:ext>
-            </a:extLst>
-          </a:blip>
-          <a:srcRect/>
-          <a:stretch>
-            <a:fillRect/>
-          </a:stretch>
-        </p:blipFill>
-        <p:spPr bwMode="auto">
-          <a:xfrm>
-            <a:off x="7787472" y="4201819"/>
-            <a:ext cx="520065" cy="520065"/>
-          </a:xfrm>
-          <a:prstGeom prst="rect">
-            <a:avLst/>
-          </a:prstGeom>
-          <a:noFill/>
-          <a:ln>
-            <a:noFill/>
-          </a:ln>
-        </p:spPr>
-      </p:pic>
-      <p:sp>
-        <p:nvSpPr>
-          <p:cNvPr id="57" name="Caixa de Texto 2">
-            <a:extLst>
-              <a:ext uri="{FF2B5EF4-FFF2-40B4-BE49-F238E27FC236}">
-                <a16:creationId xmlns:a16="http://schemas.microsoft.com/office/drawing/2014/main" id="{9920C27E-6D88-413C-A431-7593E507BBCC}"/>
-              </a:ext>
-            </a:extLst>
-          </p:cNvPr>
-          <p:cNvSpPr txBox="1">
-            <a:spLocks noChangeArrowheads="1"/>
-          </p:cNvSpPr>
-          <p:nvPr/>
-        </p:nvSpPr>
-        <p:spPr bwMode="auto">
-          <a:xfrm>
-            <a:off x="7120592" y="4709286"/>
-            <a:ext cx="1674103" cy="371475"/>
-          </a:xfrm>
-          <a:prstGeom prst="rect">
-            <a:avLst/>
-          </a:prstGeom>
-          <a:noFill/>
-          <a:ln>
-            <a:noFill/>
-          </a:ln>
-        </p:spPr>
-        <p:style>
-          <a:lnRef idx="0">
-            <a:scrgbClr r="0" g="0" b="0"/>
-          </a:lnRef>
-          <a:fillRef idx="0">
-            <a:scrgbClr r="0" g="0" b="0"/>
-          </a:fillRef>
-          <a:effectRef idx="0">
-            <a:scrgbClr r="0" g="0" b="0"/>
-          </a:effectRef>
-          <a:fontRef idx="minor">
-            <a:schemeClr val="dk1"/>
-          </a:fontRef>
-        </p:style>
-        <p:txBody>
-          <a:bodyPr rot="0" vert="horz" wrap="square" lIns="91440" tIns="45720" rIns="91440" bIns="45720" anchor="t" anchorCtr="0">
-            <a:noAutofit/>
-          </a:bodyPr>
-          <a:lstStyle/>
-          <a:p>
-            <a:pPr algn="ctr">
-              <a:lnSpc>
-                <a:spcPct val="107000"/>
-              </a:lnSpc>
-              <a:spcAft>
-                <a:spcPts val="800"/>
-              </a:spcAft>
-            </a:pPr>
-            <a:r>
-              <a:rPr lang="pt-BR" sz="1100" dirty="0">
-                <a:effectLst/>
-                <a:ea typeface="Calibri" panose="020F0502020204030204" pitchFamily="34" charset="0"/>
-                <a:cs typeface="Times New Roman" panose="02020603050405020304" pitchFamily="18" charset="0"/>
-              </a:rPr>
-              <a:t>Oficina de pintura</a:t>
-            </a:r>
-          </a:p>
-        </p:txBody>
-      </p:sp>
-      <p:sp>
-        <p:nvSpPr>
-          <p:cNvPr id="61" name="Seta: para a Esquerda e para Cima 60">
-            <a:extLst>
-              <a:ext uri="{FF2B5EF4-FFF2-40B4-BE49-F238E27FC236}">
-                <a16:creationId xmlns:a16="http://schemas.microsoft.com/office/drawing/2014/main" id="{D6C5FA2E-5049-43AC-9548-16FAE9B9EAF0}"/>
+      <p:sp>
+        <p:nvSpPr>
+          <p:cNvPr id="58" name="Seta: da Esquerda para a Direita 57">
+            <a:extLst>
+              <a:ext uri="{FF2B5EF4-FFF2-40B4-BE49-F238E27FC236}">
+                <a16:creationId xmlns:a16="http://schemas.microsoft.com/office/drawing/2014/main" id="{2A933F51-507C-4868-B992-B5444D296D2C}"/>
               </a:ext>
             </a:extLst>
           </p:cNvPr>
@@ -5604,16 +5721,12 @@
           <p:nvPr/>
         </p:nvSpPr>
         <p:spPr>
-          <a:xfrm rot="16200000" flipV="1">
-            <a:off x="6745421" y="1666388"/>
-            <a:ext cx="452746" cy="2986622"/>
-          </a:xfrm>
-          <a:prstGeom prst="leftUpArrow">
-            <a:avLst>
-              <a:gd name="adj1" fmla="val 17238"/>
-              <a:gd name="adj2" fmla="val 16284"/>
-              <a:gd name="adj3" fmla="val 19966"/>
-            </a:avLst>
+          <a:xfrm rot="5400000">
+            <a:off x="6564646" y="5495948"/>
+            <a:ext cx="319155" cy="183515"/>
+          </a:xfrm>
+          <a:prstGeom prst="leftRightArrow">
+            <a:avLst/>
           </a:prstGeom>
           <a:noFill/>
           <a:ln w="9525" cap="flat" cmpd="sng" algn="ctr">
@@ -5655,10 +5768,10 @@
       </p:sp>
       <p:sp>
         <p:nvSpPr>
-          <p:cNvPr id="62" name="Seta: para a Esquerda e para Cima 61">
-            <a:extLst>
-              <a:ext uri="{FF2B5EF4-FFF2-40B4-BE49-F238E27FC236}">
-                <a16:creationId xmlns:a16="http://schemas.microsoft.com/office/drawing/2014/main" id="{F5D67D2D-2BAF-4A51-B5E7-EA78FB05049A}"/>
+          <p:cNvPr id="60" name="Seta: da Esquerda para a Direita 59">
+            <a:extLst>
+              <a:ext uri="{FF2B5EF4-FFF2-40B4-BE49-F238E27FC236}">
+                <a16:creationId xmlns:a16="http://schemas.microsoft.com/office/drawing/2014/main" id="{AF0D8BC1-87A2-4D01-ACA5-8B27C1590819}"/>
               </a:ext>
             </a:extLst>
           </p:cNvPr>
@@ -5666,11 +5779,11 @@
           <p:nvPr/>
         </p:nvSpPr>
         <p:spPr>
-          <a:xfrm flipH="1">
-            <a:off x="8844671" y="3219487"/>
-            <a:ext cx="950642" cy="509905"/>
-          </a:xfrm>
-          <a:prstGeom prst="leftUpArrow">
+          <a:xfrm rot="5400000">
+            <a:off x="7929288" y="5495947"/>
+            <a:ext cx="319155" cy="183515"/>
+          </a:xfrm>
+          <a:prstGeom prst="leftRightArrow">
             <a:avLst/>
           </a:prstGeom>
           <a:noFill/>
@@ -5711,122 +5824,22 @@
           </a:p>
         </p:txBody>
       </p:sp>
-      <p:pic>
-        <p:nvPicPr>
-          <p:cNvPr id="63" name="Imagem 62" descr="Forma&#10;&#10;Descrição gerada automaticamente com confiança baixa">
-            <a:extLst>
-              <a:ext uri="{FF2B5EF4-FFF2-40B4-BE49-F238E27FC236}">
-                <a16:creationId xmlns:a16="http://schemas.microsoft.com/office/drawing/2014/main" id="{004C6537-F452-4B3D-9EB1-28D872B4A0D0}"/>
-              </a:ext>
-            </a:extLst>
-          </p:cNvPr>
-          <p:cNvPicPr/>
-          <p:nvPr/>
-        </p:nvPicPr>
-        <p:blipFill>
-          <a:blip r:embed="rId30" cstate="print">
-            <a:extLst>
-              <a:ext uri="{28A0092B-C50C-407E-A947-70E740481C1C}">
-                <a14:useLocalDpi xmlns:a14="http://schemas.microsoft.com/office/drawing/2010/main" val="0"/>
-              </a:ext>
-            </a:extLst>
-          </a:blip>
-          <a:stretch>
-            <a:fillRect/>
-          </a:stretch>
-        </p:blipFill>
+      <p:sp>
+        <p:nvSpPr>
+          <p:cNvPr id="66" name="Seta: da Esquerda para a Direita 65">
+            <a:extLst>
+              <a:ext uri="{FF2B5EF4-FFF2-40B4-BE49-F238E27FC236}">
+                <a16:creationId xmlns:a16="http://schemas.microsoft.com/office/drawing/2014/main" id="{DA2308ED-6825-41E8-B40E-64E43FE5E803}"/>
+              </a:ext>
+            </a:extLst>
+          </p:cNvPr>
+          <p:cNvSpPr/>
+          <p:nvPr/>
+        </p:nvSpPr>
         <p:spPr>
-          <a:xfrm>
-            <a:off x="10053929" y="3363537"/>
-            <a:ext cx="508635" cy="508635"/>
-          </a:xfrm>
-          <a:prstGeom prst="rect">
-            <a:avLst/>
-          </a:prstGeom>
-        </p:spPr>
-      </p:pic>
-      <p:sp>
-        <p:nvSpPr>
-          <p:cNvPr id="64" name="Caixa de Texto 2">
-            <a:extLst>
-              <a:ext uri="{FF2B5EF4-FFF2-40B4-BE49-F238E27FC236}">
-                <a16:creationId xmlns:a16="http://schemas.microsoft.com/office/drawing/2014/main" id="{05AF41CD-90DD-4208-8A18-239281707FDB}"/>
-              </a:ext>
-            </a:extLst>
-          </p:cNvPr>
-          <p:cNvSpPr txBox="1">
-            <a:spLocks noChangeArrowheads="1"/>
-          </p:cNvSpPr>
-          <p:nvPr/>
-        </p:nvSpPr>
-        <p:spPr bwMode="auto">
-          <a:xfrm>
-            <a:off x="9203346" y="3910977"/>
-            <a:ext cx="2209800" cy="382270"/>
-          </a:xfrm>
-          <a:prstGeom prst="rect">
-            <a:avLst/>
-          </a:prstGeom>
-          <a:noFill/>
-          <a:ln>
-            <a:noFill/>
-          </a:ln>
-        </p:spPr>
-        <p:style>
-          <a:lnRef idx="0">
-            <a:scrgbClr r="0" g="0" b="0"/>
-          </a:lnRef>
-          <a:fillRef idx="0">
-            <a:scrgbClr r="0" g="0" b="0"/>
-          </a:fillRef>
-          <a:effectRef idx="0">
-            <a:scrgbClr r="0" g="0" b="0"/>
-          </a:effectRef>
-          <a:fontRef idx="minor">
-            <a:schemeClr val="dk1"/>
-          </a:fontRef>
-        </p:style>
-        <p:txBody>
-          <a:bodyPr rot="0" vert="horz" wrap="square" lIns="91440" tIns="45720" rIns="91440" bIns="45720" anchor="t" anchorCtr="0">
-            <a:noAutofit/>
-          </a:bodyPr>
-          <a:lstStyle/>
-          <a:p>
-            <a:pPr algn="ctr">
-              <a:lnSpc>
-                <a:spcPct val="107000"/>
-              </a:lnSpc>
-              <a:spcAft>
-                <a:spcPts val="800"/>
-              </a:spcAft>
-            </a:pPr>
-            <a:r>
-              <a:rPr lang="pt-BR" sz="1100" dirty="0">
-                <a:effectLst/>
-                <a:ea typeface="Calibri" panose="020F0502020204030204" pitchFamily="34" charset="0"/>
-                <a:cs typeface="Times New Roman" panose="02020603050405020304" pitchFamily="18" charset="0"/>
-              </a:rPr>
-              <a:t>Cliente satisfeito</a:t>
-            </a:r>
-          </a:p>
-        </p:txBody>
-      </p:sp>
-      <p:sp>
-        <p:nvSpPr>
-          <p:cNvPr id="54" name="Seta: da Esquerda para a Direita 53">
-            <a:extLst>
-              <a:ext uri="{FF2B5EF4-FFF2-40B4-BE49-F238E27FC236}">
-                <a16:creationId xmlns:a16="http://schemas.microsoft.com/office/drawing/2014/main" id="{E1225EAE-CFA3-4211-BBAD-8F0CE6BEA6BF}"/>
-              </a:ext>
-            </a:extLst>
-          </p:cNvPr>
-          <p:cNvSpPr/>
-          <p:nvPr/>
-        </p:nvSpPr>
-        <p:spPr>
-          <a:xfrm>
-            <a:off x="5970783" y="4416091"/>
-            <a:ext cx="1573627" cy="183515"/>
+          <a:xfrm rot="10800000">
+            <a:off x="7319564" y="5964804"/>
+            <a:ext cx="319155" cy="183515"/>
           </a:xfrm>
           <a:prstGeom prst="leftRightArrow">
             <a:avLst/>
@@ -5865,16 +5878,16 @@
           </a:bodyPr>
           <a:lstStyle/>
           <a:p>
-            <a:endParaRPr lang="pt-BR" dirty="0"/>
-          </a:p>
-        </p:txBody>
-      </p:sp>
-      <p:sp>
-        <p:nvSpPr>
-          <p:cNvPr id="59" name="Seta: da Esquerda para a Direita 58">
-            <a:extLst>
-              <a:ext uri="{FF2B5EF4-FFF2-40B4-BE49-F238E27FC236}">
-                <a16:creationId xmlns:a16="http://schemas.microsoft.com/office/drawing/2014/main" id="{EA89C4BF-FAF1-4878-908C-B3E38D5C5AC9}"/>
+            <a:endParaRPr lang="pt-BR"/>
+          </a:p>
+        </p:txBody>
+      </p:sp>
+      <p:sp>
+        <p:nvSpPr>
+          <p:cNvPr id="2" name="Seta: para a Direita 1">
+            <a:extLst>
+              <a:ext uri="{FF2B5EF4-FFF2-40B4-BE49-F238E27FC236}">
+                <a16:creationId xmlns:a16="http://schemas.microsoft.com/office/drawing/2014/main" id="{AEF29182-498B-4D76-8EBE-B46DE39E7A1D}"/>
               </a:ext>
             </a:extLst>
           </p:cNvPr>
@@ -5883,10 +5896,10 @@
         </p:nvSpPr>
         <p:spPr>
           <a:xfrm>
-            <a:off x="5975615" y="3757201"/>
-            <a:ext cx="626746" cy="183515"/>
-          </a:xfrm>
-          <a:prstGeom prst="leftRightArrow">
+            <a:off x="9382406" y="2906675"/>
+            <a:ext cx="508635" cy="125387"/>
+          </a:xfrm>
+          <a:prstGeom prst="rightArrow">
             <a:avLst/>
           </a:prstGeom>
           <a:noFill/>
@@ -5915,24 +5928,20 @@
           </a:fontRef>
         </p:style>
         <p:txBody>
-          <a:bodyPr rot="0" spcFirstLastPara="0" vert="horz" wrap="square" lIns="91440" tIns="45720" rIns="91440" bIns="45720" numCol="1" spcCol="0" rtlCol="0" fromWordArt="0" anchor="ctr" anchorCtr="0" forceAA="0" compatLnSpc="1">
-            <a:prstTxWarp prst="textNoShape">
-              <a:avLst/>
-            </a:prstTxWarp>
-            <a:noAutofit/>
-          </a:bodyPr>
-          <a:lstStyle/>
-          <a:p>
-            <a:endParaRPr lang="pt-BR" dirty="0"/>
-          </a:p>
-        </p:txBody>
-      </p:sp>
-      <p:sp>
-        <p:nvSpPr>
-          <p:cNvPr id="65" name="Seta: para a Esquerda e para Cima 64">
-            <a:extLst>
-              <a:ext uri="{FF2B5EF4-FFF2-40B4-BE49-F238E27FC236}">
-                <a16:creationId xmlns:a16="http://schemas.microsoft.com/office/drawing/2014/main" id="{5ECA784C-F4B3-4939-9BC1-E1862EC7E2AB}"/>
+          <a:bodyPr rtlCol="0" anchor="ctr"/>
+          <a:lstStyle/>
+          <a:p>
+            <a:pPr algn="ctr"/>
+            <a:endParaRPr lang="pt-BR"/>
+          </a:p>
+        </p:txBody>
+      </p:sp>
+      <p:sp>
+        <p:nvSpPr>
+          <p:cNvPr id="3" name="Seta: Dobrada para Cima 2">
+            <a:extLst>
+              <a:ext uri="{FF2B5EF4-FFF2-40B4-BE49-F238E27FC236}">
+                <a16:creationId xmlns:a16="http://schemas.microsoft.com/office/drawing/2014/main" id="{2A4129D8-08DA-445D-9325-84C0C455719B}"/>
               </a:ext>
             </a:extLst>
           </p:cNvPr>
@@ -5940,16 +5949,12 @@
           <p:nvPr/>
         </p:nvSpPr>
         <p:spPr>
-          <a:xfrm rot="5400000" flipH="1" flipV="1">
-            <a:off x="7497559" y="3607214"/>
-            <a:ext cx="382271" cy="635365"/>
-          </a:xfrm>
-          <a:prstGeom prst="leftUpArrow">
-            <a:avLst>
-              <a:gd name="adj1" fmla="val 20163"/>
-              <a:gd name="adj2" fmla="val 15763"/>
-              <a:gd name="adj3" fmla="val 20163"/>
-            </a:avLst>
+          <a:xfrm rot="5400000" flipH="1">
+            <a:off x="7248976" y="3520578"/>
+            <a:ext cx="1482352" cy="290142"/>
+          </a:xfrm>
+          <a:prstGeom prst="bentUpArrow">
+            <a:avLst/>
           </a:prstGeom>
           <a:noFill/>
           <a:ln w="9525" cap="flat" cmpd="sng" algn="ctr">
@@ -5977,14 +5982,10 @@
           </a:fontRef>
         </p:style>
         <p:txBody>
-          <a:bodyPr rot="0" spcFirstLastPara="0" vert="horz" wrap="square" lIns="91440" tIns="45720" rIns="91440" bIns="45720" numCol="1" spcCol="0" rtlCol="0" fromWordArt="0" anchor="ctr" anchorCtr="0" forceAA="0" compatLnSpc="1">
-            <a:prstTxWarp prst="textNoShape">
-              <a:avLst/>
-            </a:prstTxWarp>
-            <a:noAutofit/>
-          </a:bodyPr>
-          <a:lstStyle/>
-          <a:p>
+          <a:bodyPr rtlCol="0" anchor="ctr"/>
+          <a:lstStyle/>
+          <a:p>
+            <a:pPr algn="ctr"/>
             <a:endParaRPr lang="pt-BR"/>
           </a:p>
         </p:txBody>
@@ -6033,7 +6034,7 @@
         </p:nvSpPr>
         <p:spPr>
           <a:xfrm>
-            <a:off x="3995980" y="57444"/>
+            <a:off x="3995980" y="44192"/>
             <a:ext cx="3165475" cy="1661795"/>
           </a:xfrm>
           <a:prstGeom prst="cloud">
@@ -7142,7 +7143,7 @@
         </p:nvSpPr>
         <p:spPr bwMode="auto">
           <a:xfrm>
-            <a:off x="6731453" y="1336116"/>
+            <a:off x="6731452" y="1336116"/>
             <a:ext cx="2480335" cy="1079046"/>
           </a:xfrm>
           <a:prstGeom prst="rect">
@@ -9371,7 +9372,7 @@
         </p:blipFill>
         <p:spPr bwMode="auto">
           <a:xfrm>
-            <a:off x="9573691" y="872693"/>
+            <a:off x="9636915" y="872693"/>
             <a:ext cx="1199515" cy="520065"/>
           </a:xfrm>
           <a:prstGeom prst="rect">
@@ -9475,6 +9476,768 @@
     <p:extLst>
       <p:ext uri="{BB962C8B-B14F-4D97-AF65-F5344CB8AC3E}">
         <p14:creationId xmlns:p14="http://schemas.microsoft.com/office/powerpoint/2010/main" val="3030577506"/>
+      </p:ext>
+    </p:extLst>
+  </p:cSld>
+  <p:clrMapOvr>
+    <a:masterClrMapping/>
+  </p:clrMapOvr>
+</p:sld>
+</file>
+
+<file path=ppt/slides/slide4.xml><?xml version="1.0" encoding="utf-8"?>
+<p:sld xmlns:a="http://schemas.openxmlformats.org/drawingml/2006/main" xmlns:r="http://schemas.openxmlformats.org/officeDocument/2006/relationships" xmlns:p="http://schemas.openxmlformats.org/presentationml/2006/main">
+  <p:cSld>
+    <p:spTree>
+      <p:nvGrpSpPr>
+        <p:cNvPr id="1" name=""/>
+        <p:cNvGrpSpPr/>
+        <p:nvPr/>
+      </p:nvGrpSpPr>
+      <p:grpSpPr>
+        <a:xfrm>
+          <a:off x="0" y="0"/>
+          <a:ext cx="0" cy="0"/>
+          <a:chOff x="0" y="0"/>
+          <a:chExt cx="0" cy="0"/>
+        </a:xfrm>
+      </p:grpSpPr>
+      <p:sp>
+        <p:nvSpPr>
+          <p:cNvPr id="4" name="Retângulo: Cantos Arredondados 3">
+            <a:extLst>
+              <a:ext uri="{FF2B5EF4-FFF2-40B4-BE49-F238E27FC236}">
+                <a16:creationId xmlns:a16="http://schemas.microsoft.com/office/drawing/2014/main" id="{E49CB7CA-422E-4821-BDA3-61C81E784D1F}"/>
+              </a:ext>
+            </a:extLst>
+          </p:cNvPr>
+          <p:cNvSpPr/>
+          <p:nvPr/>
+        </p:nvSpPr>
+        <p:spPr>
+          <a:xfrm>
+            <a:off x="119269" y="2014332"/>
+            <a:ext cx="4452731" cy="4777408"/>
+          </a:xfrm>
+          <a:prstGeom prst="roundRect">
+            <a:avLst/>
+          </a:prstGeom>
+          <a:noFill/>
+          <a:ln w="9525" cap="flat" cmpd="sng" algn="ctr">
+            <a:solidFill>
+              <a:schemeClr val="dk1"/>
+            </a:solidFill>
+            <a:prstDash val="solid"/>
+            <a:round/>
+            <a:headEnd type="none" w="med" len="med"/>
+            <a:tailEnd type="none" w="med" len="med"/>
+          </a:ln>
+        </p:spPr>
+        <p:style>
+          <a:lnRef idx="0">
+            <a:scrgbClr r="0" g="0" b="0"/>
+          </a:lnRef>
+          <a:fillRef idx="0">
+            <a:scrgbClr r="0" g="0" b="0"/>
+          </a:fillRef>
+          <a:effectRef idx="0">
+            <a:scrgbClr r="0" g="0" b="0"/>
+          </a:effectRef>
+          <a:fontRef idx="minor">
+            <a:schemeClr val="dk1"/>
+          </a:fontRef>
+        </p:style>
+        <p:txBody>
+          <a:bodyPr rtlCol="0" anchor="ctr"/>
+          <a:lstStyle/>
+          <a:p>
+            <a:pPr algn="ctr"/>
+            <a:endParaRPr lang="pt-BR"/>
+          </a:p>
+        </p:txBody>
+      </p:sp>
+      <p:sp>
+        <p:nvSpPr>
+          <p:cNvPr id="5" name="Retângulo: Cantos Arredondados 4">
+            <a:extLst>
+              <a:ext uri="{FF2B5EF4-FFF2-40B4-BE49-F238E27FC236}">
+                <a16:creationId xmlns:a16="http://schemas.microsoft.com/office/drawing/2014/main" id="{811838D3-8756-43CE-8878-FD5B1F15517A}"/>
+              </a:ext>
+            </a:extLst>
+          </p:cNvPr>
+          <p:cNvSpPr/>
+          <p:nvPr/>
+        </p:nvSpPr>
+        <p:spPr>
+          <a:xfrm>
+            <a:off x="4737651" y="4823790"/>
+            <a:ext cx="4234071" cy="1967949"/>
+          </a:xfrm>
+          <a:prstGeom prst="roundRect">
+            <a:avLst/>
+          </a:prstGeom>
+          <a:noFill/>
+          <a:ln w="9525" cap="flat" cmpd="sng" algn="ctr">
+            <a:solidFill>
+              <a:schemeClr val="dk1"/>
+            </a:solidFill>
+            <a:prstDash val="solid"/>
+            <a:round/>
+            <a:headEnd type="none" w="med" len="med"/>
+            <a:tailEnd type="none" w="med" len="med"/>
+          </a:ln>
+        </p:spPr>
+        <p:style>
+          <a:lnRef idx="0">
+            <a:scrgbClr r="0" g="0" b="0"/>
+          </a:lnRef>
+          <a:fillRef idx="0">
+            <a:scrgbClr r="0" g="0" b="0"/>
+          </a:fillRef>
+          <a:effectRef idx="0">
+            <a:scrgbClr r="0" g="0" b="0"/>
+          </a:effectRef>
+          <a:fontRef idx="minor">
+            <a:schemeClr val="dk1"/>
+          </a:fontRef>
+        </p:style>
+        <p:txBody>
+          <a:bodyPr rtlCol="0" anchor="ctr"/>
+          <a:lstStyle/>
+          <a:p>
+            <a:pPr algn="ctr"/>
+            <a:endParaRPr lang="pt-BR"/>
+          </a:p>
+        </p:txBody>
+      </p:sp>
+      <p:sp>
+        <p:nvSpPr>
+          <p:cNvPr id="6" name="Retângulo: Cantos Arredondados 5">
+            <a:extLst>
+              <a:ext uri="{FF2B5EF4-FFF2-40B4-BE49-F238E27FC236}">
+                <a16:creationId xmlns:a16="http://schemas.microsoft.com/office/drawing/2014/main" id="{CEBF9686-2E7E-4F27-88C2-28501F84CBE0}"/>
+              </a:ext>
+            </a:extLst>
+          </p:cNvPr>
+          <p:cNvSpPr/>
+          <p:nvPr/>
+        </p:nvSpPr>
+        <p:spPr>
+          <a:xfrm>
+            <a:off x="4737651" y="2434816"/>
+            <a:ext cx="4234071" cy="1967949"/>
+          </a:xfrm>
+          <a:prstGeom prst="roundRect">
+            <a:avLst/>
+          </a:prstGeom>
+          <a:noFill/>
+          <a:ln w="9525" cap="flat" cmpd="sng" algn="ctr">
+            <a:solidFill>
+              <a:schemeClr val="dk1"/>
+            </a:solidFill>
+            <a:prstDash val="solid"/>
+            <a:round/>
+            <a:headEnd type="none" w="med" len="med"/>
+            <a:tailEnd type="none" w="med" len="med"/>
+          </a:ln>
+        </p:spPr>
+        <p:style>
+          <a:lnRef idx="0">
+            <a:scrgbClr r="0" g="0" b="0"/>
+          </a:lnRef>
+          <a:fillRef idx="0">
+            <a:scrgbClr r="0" g="0" b="0"/>
+          </a:fillRef>
+          <a:effectRef idx="0">
+            <a:scrgbClr r="0" g="0" b="0"/>
+          </a:effectRef>
+          <a:fontRef idx="minor">
+            <a:schemeClr val="dk1"/>
+          </a:fontRef>
+        </p:style>
+        <p:txBody>
+          <a:bodyPr rtlCol="0" anchor="ctr"/>
+          <a:lstStyle/>
+          <a:p>
+            <a:pPr algn="ctr"/>
+            <a:endParaRPr lang="pt-BR"/>
+          </a:p>
+        </p:txBody>
+      </p:sp>
+      <p:sp>
+        <p:nvSpPr>
+          <p:cNvPr id="7" name="Nuvem 6">
+            <a:extLst>
+              <a:ext uri="{FF2B5EF4-FFF2-40B4-BE49-F238E27FC236}">
+                <a16:creationId xmlns:a16="http://schemas.microsoft.com/office/drawing/2014/main" id="{FF3C51CB-60CC-4699-BDEA-34FB50A17C80}"/>
+              </a:ext>
+            </a:extLst>
+          </p:cNvPr>
+          <p:cNvSpPr/>
+          <p:nvPr/>
+        </p:nvSpPr>
+        <p:spPr>
+          <a:xfrm>
+            <a:off x="521175" y="102433"/>
+            <a:ext cx="3165475" cy="1607974"/>
+          </a:xfrm>
+          <a:prstGeom prst="cloud">
+            <a:avLst/>
+          </a:prstGeom>
+          <a:noFill/>
+          <a:ln w="9525" cap="flat" cmpd="sng" algn="ctr">
+            <a:solidFill>
+              <a:schemeClr val="dk1"/>
+            </a:solidFill>
+            <a:prstDash val="solid"/>
+            <a:round/>
+            <a:headEnd type="none" w="med" len="med"/>
+            <a:tailEnd type="none" w="med" len="med"/>
+          </a:ln>
+        </p:spPr>
+        <p:style>
+          <a:lnRef idx="0">
+            <a:scrgbClr r="0" g="0" b="0"/>
+          </a:lnRef>
+          <a:fillRef idx="0">
+            <a:scrgbClr r="0" g="0" b="0"/>
+          </a:fillRef>
+          <a:effectRef idx="0">
+            <a:scrgbClr r="0" g="0" b="0"/>
+          </a:effectRef>
+          <a:fontRef idx="minor">
+            <a:schemeClr val="dk1"/>
+          </a:fontRef>
+        </p:style>
+        <p:txBody>
+          <a:bodyPr rot="0" spcFirstLastPara="0" vert="horz" wrap="square" lIns="91440" tIns="45720" rIns="91440" bIns="45720" numCol="1" spcCol="0" rtlCol="0" fromWordArt="0" anchor="ctr" anchorCtr="0" forceAA="0" compatLnSpc="1">
+            <a:prstTxWarp prst="textNoShape">
+              <a:avLst/>
+            </a:prstTxWarp>
+            <a:noAutofit/>
+          </a:bodyPr>
+          <a:lstStyle/>
+          <a:p>
+            <a:endParaRPr lang="pt-BR"/>
+          </a:p>
+        </p:txBody>
+      </p:sp>
+      <p:pic>
+        <p:nvPicPr>
+          <p:cNvPr id="8" name="Imagem 7">
+            <a:extLst>
+              <a:ext uri="{FF2B5EF4-FFF2-40B4-BE49-F238E27FC236}">
+                <a16:creationId xmlns:a16="http://schemas.microsoft.com/office/drawing/2014/main" id="{ED734FD5-E77F-402B-87F9-178EFD6CEB7A}"/>
+              </a:ext>
+            </a:extLst>
+          </p:cNvPr>
+          <p:cNvPicPr/>
+          <p:nvPr/>
+        </p:nvPicPr>
+        <p:blipFill>
+          <a:blip r:embed="rId2" cstate="print">
+            <a:extLst>
+              <a:ext uri="{28A0092B-C50C-407E-A947-70E740481C1C}">
+                <a14:useLocalDpi xmlns:a14="http://schemas.microsoft.com/office/drawing/2010/main" val="0"/>
+              </a:ext>
+            </a:extLst>
+          </a:blip>
+          <a:srcRect/>
+          <a:stretch>
+            <a:fillRect/>
+          </a:stretch>
+        </p:blipFill>
+        <p:spPr bwMode="auto">
+          <a:xfrm>
+            <a:off x="1857702" y="272892"/>
+            <a:ext cx="617220" cy="597230"/>
+          </a:xfrm>
+          <a:prstGeom prst="rect">
+            <a:avLst/>
+          </a:prstGeom>
+          <a:noFill/>
+          <a:ln>
+            <a:noFill/>
+          </a:ln>
+        </p:spPr>
+      </p:pic>
+      <p:pic>
+        <p:nvPicPr>
+          <p:cNvPr id="9" name="Imagem 8" descr="Forma&#10;&#10;Descrição gerada automaticamente com confiança baixa">
+            <a:extLst>
+              <a:ext uri="{FF2B5EF4-FFF2-40B4-BE49-F238E27FC236}">
+                <a16:creationId xmlns:a16="http://schemas.microsoft.com/office/drawing/2014/main" id="{18531BC2-E4C9-4CF0-BF6D-8E61A55941D1}"/>
+              </a:ext>
+            </a:extLst>
+          </p:cNvPr>
+          <p:cNvPicPr/>
+          <p:nvPr/>
+        </p:nvPicPr>
+        <p:blipFill>
+          <a:blip r:embed="rId3" cstate="print">
+            <a:extLst>
+              <a:ext uri="{28A0092B-C50C-407E-A947-70E740481C1C}">
+                <a14:useLocalDpi xmlns:a14="http://schemas.microsoft.com/office/drawing/2010/main" val="0"/>
+              </a:ext>
+            </a:extLst>
+          </a:blip>
+          <a:stretch>
+            <a:fillRect/>
+          </a:stretch>
+        </p:blipFill>
+        <p:spPr>
+          <a:xfrm>
+            <a:off x="911382" y="738436"/>
+            <a:ext cx="325120" cy="352224"/>
+          </a:xfrm>
+          <a:prstGeom prst="rect">
+            <a:avLst/>
+          </a:prstGeom>
+        </p:spPr>
+      </p:pic>
+      <p:pic>
+        <p:nvPicPr>
+          <p:cNvPr id="10" name="Imagem 9" descr="Forma&#10;&#10;Descrição gerada automaticamente com confiança baixa">
+            <a:extLst>
+              <a:ext uri="{FF2B5EF4-FFF2-40B4-BE49-F238E27FC236}">
+                <a16:creationId xmlns:a16="http://schemas.microsoft.com/office/drawing/2014/main" id="{5CE7D00D-6B93-4A97-8A87-7F432DED91AB}"/>
+              </a:ext>
+            </a:extLst>
+          </p:cNvPr>
+          <p:cNvPicPr/>
+          <p:nvPr/>
+        </p:nvPicPr>
+        <p:blipFill>
+          <a:blip r:embed="rId4" cstate="print">
+            <a:extLst>
+              <a:ext uri="{28A0092B-C50C-407E-A947-70E740481C1C}">
+                <a14:useLocalDpi xmlns:a14="http://schemas.microsoft.com/office/drawing/2010/main" val="0"/>
+              </a:ext>
+            </a:extLst>
+          </a:blip>
+          <a:stretch>
+            <a:fillRect/>
+          </a:stretch>
+        </p:blipFill>
+        <p:spPr>
+          <a:xfrm>
+            <a:off x="2643678" y="1040819"/>
+            <a:ext cx="381328" cy="342087"/>
+          </a:xfrm>
+          <a:prstGeom prst="rect">
+            <a:avLst/>
+          </a:prstGeom>
+        </p:spPr>
+      </p:pic>
+      <p:pic>
+        <p:nvPicPr>
+          <p:cNvPr id="11" name="Imagem 10" descr="Forma&#10;&#10;Descrição gerada automaticamente com confiança baixa">
+            <a:extLst>
+              <a:ext uri="{FF2B5EF4-FFF2-40B4-BE49-F238E27FC236}">
+                <a16:creationId xmlns:a16="http://schemas.microsoft.com/office/drawing/2014/main" id="{897DD533-126A-4558-8CF6-AB96B0C7D6A9}"/>
+              </a:ext>
+            </a:extLst>
+          </p:cNvPr>
+          <p:cNvPicPr/>
+          <p:nvPr/>
+        </p:nvPicPr>
+        <p:blipFill>
+          <a:blip r:embed="rId5" cstate="print">
+            <a:extLst>
+              <a:ext uri="{28A0092B-C50C-407E-A947-70E740481C1C}">
+                <a14:useLocalDpi xmlns:a14="http://schemas.microsoft.com/office/drawing/2010/main" val="0"/>
+              </a:ext>
+            </a:extLst>
+          </a:blip>
+          <a:stretch>
+            <a:fillRect/>
+          </a:stretch>
+        </p:blipFill>
+        <p:spPr>
+          <a:xfrm>
+            <a:off x="1236501" y="1203610"/>
+            <a:ext cx="325120" cy="334252"/>
+          </a:xfrm>
+          <a:prstGeom prst="rect">
+            <a:avLst/>
+          </a:prstGeom>
+        </p:spPr>
+      </p:pic>
+      <p:pic>
+        <p:nvPicPr>
+          <p:cNvPr id="12" name="Imagem 11">
+            <a:extLst>
+              <a:ext uri="{FF2B5EF4-FFF2-40B4-BE49-F238E27FC236}">
+                <a16:creationId xmlns:a16="http://schemas.microsoft.com/office/drawing/2014/main" id="{5686E5F4-80DE-41C8-BBED-6910565CA9B1}"/>
+              </a:ext>
+            </a:extLst>
+          </p:cNvPr>
+          <p:cNvPicPr/>
+          <p:nvPr/>
+        </p:nvPicPr>
+        <p:blipFill>
+          <a:blip r:embed="rId6" cstate="print">
+            <a:extLst>
+              <a:ext uri="{28A0092B-C50C-407E-A947-70E740481C1C}">
+                <a14:useLocalDpi xmlns:a14="http://schemas.microsoft.com/office/drawing/2010/main" val="0"/>
+              </a:ext>
+            </a:extLst>
+          </a:blip>
+          <a:srcRect/>
+          <a:stretch>
+            <a:fillRect/>
+          </a:stretch>
+        </p:blipFill>
+        <p:spPr bwMode="auto">
+          <a:xfrm>
+            <a:off x="1964361" y="1217589"/>
+            <a:ext cx="447675" cy="433176"/>
+          </a:xfrm>
+          <a:prstGeom prst="rect">
+            <a:avLst/>
+          </a:prstGeom>
+          <a:noFill/>
+          <a:ln>
+            <a:noFill/>
+          </a:ln>
+        </p:spPr>
+      </p:pic>
+      <p:pic>
+        <p:nvPicPr>
+          <p:cNvPr id="13" name="Imagem 12">
+            <a:extLst>
+              <a:ext uri="{FF2B5EF4-FFF2-40B4-BE49-F238E27FC236}">
+                <a16:creationId xmlns:a16="http://schemas.microsoft.com/office/drawing/2014/main" id="{E2B117C0-BAC4-44F4-A3DE-607AA3A89D82}"/>
+              </a:ext>
+            </a:extLst>
+          </p:cNvPr>
+          <p:cNvPicPr/>
+          <p:nvPr/>
+        </p:nvPicPr>
+        <p:blipFill>
+          <a:blip r:embed="rId7" cstate="print">
+            <a:extLst>
+              <a:ext uri="{28A0092B-C50C-407E-A947-70E740481C1C}">
+                <a14:useLocalDpi xmlns:a14="http://schemas.microsoft.com/office/drawing/2010/main" val="0"/>
+              </a:ext>
+            </a:extLst>
+          </a:blip>
+          <a:srcRect/>
+          <a:stretch>
+            <a:fillRect/>
+          </a:stretch>
+        </p:blipFill>
+        <p:spPr bwMode="auto">
+          <a:xfrm>
+            <a:off x="2985525" y="607560"/>
+            <a:ext cx="436245" cy="422116"/>
+          </a:xfrm>
+          <a:prstGeom prst="rect">
+            <a:avLst/>
+          </a:prstGeom>
+          <a:noFill/>
+          <a:ln>
+            <a:noFill/>
+          </a:ln>
+        </p:spPr>
+      </p:pic>
+      <p:pic>
+        <p:nvPicPr>
+          <p:cNvPr id="15" name="Imagem 14" descr="Forma&#10;&#10;Descrição gerada automaticamente com confiança baixa">
+            <a:extLst>
+              <a:ext uri="{FF2B5EF4-FFF2-40B4-BE49-F238E27FC236}">
+                <a16:creationId xmlns:a16="http://schemas.microsoft.com/office/drawing/2014/main" id="{8EC16D4C-C9C2-41AE-9995-3EFD9C9CBDA6}"/>
+              </a:ext>
+            </a:extLst>
+          </p:cNvPr>
+          <p:cNvPicPr>
+            <a:picLocks noChangeAspect="1"/>
+          </p:cNvPicPr>
+          <p:nvPr/>
+        </p:nvPicPr>
+        <p:blipFill>
+          <a:blip r:embed="rId8">
+            <a:extLst>
+              <a:ext uri="{28A0092B-C50C-407E-A947-70E740481C1C}">
+                <a14:useLocalDpi xmlns:a14="http://schemas.microsoft.com/office/drawing/2010/main" val="0"/>
+              </a:ext>
+            </a:extLst>
+          </a:blip>
+          <a:stretch>
+            <a:fillRect/>
+          </a:stretch>
+        </p:blipFill>
+        <p:spPr>
+          <a:xfrm>
+            <a:off x="1468744" y="825159"/>
+            <a:ext cx="340664" cy="329631"/>
+          </a:xfrm>
+          <a:prstGeom prst="rect">
+            <a:avLst/>
+          </a:prstGeom>
+        </p:spPr>
+      </p:pic>
+      <p:sp>
+        <p:nvSpPr>
+          <p:cNvPr id="16" name="Caixa de Texto 2">
+            <a:extLst>
+              <a:ext uri="{FF2B5EF4-FFF2-40B4-BE49-F238E27FC236}">
+                <a16:creationId xmlns:a16="http://schemas.microsoft.com/office/drawing/2014/main" id="{357B9040-D01E-4B8E-A77C-94CD38853067}"/>
+              </a:ext>
+            </a:extLst>
+          </p:cNvPr>
+          <p:cNvSpPr txBox="1">
+            <a:spLocks noChangeArrowheads="1"/>
+          </p:cNvSpPr>
+          <p:nvPr/>
+        </p:nvSpPr>
+        <p:spPr bwMode="auto">
+          <a:xfrm>
+            <a:off x="3421770" y="1111242"/>
+            <a:ext cx="2480335" cy="1079046"/>
+          </a:xfrm>
+          <a:prstGeom prst="rect">
+            <a:avLst/>
+          </a:prstGeom>
+          <a:noFill/>
+          <a:ln>
+            <a:noFill/>
+          </a:ln>
+        </p:spPr>
+        <p:style>
+          <a:lnRef idx="0">
+            <a:scrgbClr r="0" g="0" b="0"/>
+          </a:lnRef>
+          <a:fillRef idx="0">
+            <a:scrgbClr r="0" g="0" b="0"/>
+          </a:fillRef>
+          <a:effectRef idx="0">
+            <a:scrgbClr r="0" g="0" b="0"/>
+          </a:effectRef>
+          <a:fontRef idx="minor">
+            <a:schemeClr val="dk1"/>
+          </a:fontRef>
+        </p:style>
+        <p:txBody>
+          <a:bodyPr rot="0" vert="horz" wrap="square" lIns="91440" tIns="45720" rIns="91440" bIns="45720" anchor="t" anchorCtr="0">
+            <a:noAutofit/>
+          </a:bodyPr>
+          <a:lstStyle/>
+          <a:p>
+            <a:pPr marL="171450" lvl="0" indent="-171450">
+              <a:lnSpc>
+                <a:spcPct val="107000"/>
+              </a:lnSpc>
+              <a:buFont typeface="Arial" panose="020B0604020202020204" pitchFamily="34" charset="0"/>
+              <a:buChar char="•"/>
+            </a:pPr>
+            <a:r>
+              <a:rPr lang="pt-BR" sz="1100" dirty="0">
+                <a:effectLst/>
+                <a:ea typeface="Calibri" panose="020F0502020204030204" pitchFamily="34" charset="0"/>
+                <a:cs typeface="Times New Roman" panose="02020603050405020304" pitchFamily="18" charset="0"/>
+              </a:rPr>
+              <a:t>Infraestrutura: Azure.</a:t>
+            </a:r>
+          </a:p>
+          <a:p>
+            <a:pPr marL="171450" lvl="0" indent="-171450">
+              <a:lnSpc>
+                <a:spcPct val="107000"/>
+              </a:lnSpc>
+              <a:buFont typeface="Arial" panose="020B0604020202020204" pitchFamily="34" charset="0"/>
+              <a:buChar char="•"/>
+            </a:pPr>
+            <a:r>
+              <a:rPr lang="pt-BR" sz="1100" dirty="0">
+                <a:effectLst/>
+                <a:ea typeface="Calibri" panose="020F0502020204030204" pitchFamily="34" charset="0"/>
+                <a:cs typeface="Times New Roman" panose="02020603050405020304" pitchFamily="18" charset="0"/>
+              </a:rPr>
+              <a:t>Aplicação: HTML / JS.</a:t>
+            </a:r>
+          </a:p>
+          <a:p>
+            <a:pPr marL="171450" lvl="0" indent="-171450">
+              <a:lnSpc>
+                <a:spcPct val="107000"/>
+              </a:lnSpc>
+              <a:buFont typeface="Arial" panose="020B0604020202020204" pitchFamily="34" charset="0"/>
+              <a:buChar char="•"/>
+            </a:pPr>
+            <a:r>
+              <a:rPr lang="pt-BR" sz="1100" dirty="0">
+                <a:ea typeface="Calibri" panose="020F0502020204030204" pitchFamily="34" charset="0"/>
+                <a:cs typeface="Times New Roman" panose="02020603050405020304" pitchFamily="18" charset="0"/>
+              </a:rPr>
+              <a:t>Banco de dados: MySQL Workbench.</a:t>
+            </a:r>
+          </a:p>
+          <a:p>
+            <a:pPr marL="171450" lvl="0" indent="-171450">
+              <a:lnSpc>
+                <a:spcPct val="107000"/>
+              </a:lnSpc>
+              <a:buFont typeface="Arial" panose="020B0604020202020204" pitchFamily="34" charset="0"/>
+              <a:buChar char="•"/>
+            </a:pPr>
+            <a:r>
+              <a:rPr lang="pt-BR" sz="1100" dirty="0">
+                <a:effectLst/>
+                <a:ea typeface="Calibri" panose="020F0502020204030204" pitchFamily="34" charset="0"/>
+                <a:cs typeface="Times New Roman" panose="02020603050405020304" pitchFamily="18" charset="0"/>
+              </a:rPr>
+              <a:t>Backup peri</a:t>
+            </a:r>
+            <a:r>
+              <a:rPr lang="pt-BR" sz="1100" dirty="0">
+                <a:ea typeface="Calibri" panose="020F0502020204030204" pitchFamily="34" charset="0"/>
+                <a:cs typeface="Times New Roman" panose="02020603050405020304" pitchFamily="18" charset="0"/>
+              </a:rPr>
+              <a:t>ódico dos dados.</a:t>
+            </a:r>
+            <a:endParaRPr lang="pt-BR" sz="1100" dirty="0">
+              <a:effectLst/>
+              <a:ea typeface="Calibri" panose="020F0502020204030204" pitchFamily="34" charset="0"/>
+              <a:cs typeface="Times New Roman" panose="02020603050405020304" pitchFamily="18" charset="0"/>
+            </a:endParaRPr>
+          </a:p>
+        </p:txBody>
+      </p:sp>
+      <p:sp>
+        <p:nvSpPr>
+          <p:cNvPr id="17" name="Retângulo: Cantos Arredondados 16">
+            <a:extLst>
+              <a:ext uri="{FF2B5EF4-FFF2-40B4-BE49-F238E27FC236}">
+                <a16:creationId xmlns:a16="http://schemas.microsoft.com/office/drawing/2014/main" id="{77BDB398-3F75-480F-A4B7-7DD59B402C89}"/>
+              </a:ext>
+            </a:extLst>
+          </p:cNvPr>
+          <p:cNvSpPr/>
+          <p:nvPr/>
+        </p:nvSpPr>
+        <p:spPr>
+          <a:xfrm rot="5400000">
+            <a:off x="8747551" y="3603475"/>
+            <a:ext cx="3509594" cy="2849218"/>
+          </a:xfrm>
+          <a:prstGeom prst="roundRect">
+            <a:avLst/>
+          </a:prstGeom>
+          <a:noFill/>
+          <a:ln w="9525" cap="flat" cmpd="sng" algn="ctr">
+            <a:solidFill>
+              <a:schemeClr val="dk1"/>
+            </a:solidFill>
+            <a:prstDash val="solid"/>
+            <a:round/>
+            <a:headEnd type="none" w="med" len="med"/>
+            <a:tailEnd type="none" w="med" len="med"/>
+          </a:ln>
+        </p:spPr>
+        <p:style>
+          <a:lnRef idx="0">
+            <a:scrgbClr r="0" g="0" b="0"/>
+          </a:lnRef>
+          <a:fillRef idx="0">
+            <a:scrgbClr r="0" g="0" b="0"/>
+          </a:fillRef>
+          <a:effectRef idx="0">
+            <a:scrgbClr r="0" g="0" b="0"/>
+          </a:effectRef>
+          <a:fontRef idx="minor">
+            <a:schemeClr val="dk1"/>
+          </a:fontRef>
+        </p:style>
+        <p:txBody>
+          <a:bodyPr rtlCol="0" anchor="ctr"/>
+          <a:lstStyle/>
+          <a:p>
+            <a:pPr algn="ctr"/>
+            <a:endParaRPr lang="pt-BR"/>
+          </a:p>
+        </p:txBody>
+      </p:sp>
+      <p:pic>
+        <p:nvPicPr>
+          <p:cNvPr id="18" name="Imagem 17">
+            <a:extLst>
+              <a:ext uri="{FF2B5EF4-FFF2-40B4-BE49-F238E27FC236}">
+                <a16:creationId xmlns:a16="http://schemas.microsoft.com/office/drawing/2014/main" id="{5E6FED90-1A52-4007-B52F-5C6B20214155}"/>
+              </a:ext>
+            </a:extLst>
+          </p:cNvPr>
+          <p:cNvPicPr/>
+          <p:nvPr/>
+        </p:nvPicPr>
+        <p:blipFill>
+          <a:blip r:embed="rId9" cstate="print">
+            <a:extLst>
+              <a:ext uri="{28A0092B-C50C-407E-A947-70E740481C1C}">
+                <a14:useLocalDpi xmlns:a14="http://schemas.microsoft.com/office/drawing/2010/main" val="0"/>
+              </a:ext>
+            </a:extLst>
+          </a:blip>
+          <a:srcRect/>
+          <a:stretch>
+            <a:fillRect/>
+          </a:stretch>
+        </p:blipFill>
+        <p:spPr bwMode="auto">
+          <a:xfrm>
+            <a:off x="9636915" y="872693"/>
+            <a:ext cx="1199515" cy="520065"/>
+          </a:xfrm>
+          <a:prstGeom prst="rect">
+            <a:avLst/>
+          </a:prstGeom>
+          <a:noFill/>
+          <a:ln>
+            <a:noFill/>
+          </a:ln>
+        </p:spPr>
+      </p:pic>
+      <p:pic>
+        <p:nvPicPr>
+          <p:cNvPr id="19" name="Gráfico 1">
+            <a:extLst>
+              <a:ext uri="{FF2B5EF4-FFF2-40B4-BE49-F238E27FC236}">
+                <a16:creationId xmlns:a16="http://schemas.microsoft.com/office/drawing/2014/main" id="{8F6E0979-90BD-4AFE-B0C0-93F6E5DB0F02}"/>
+              </a:ext>
+            </a:extLst>
+          </p:cNvPr>
+          <p:cNvPicPr/>
+          <p:nvPr/>
+        </p:nvPicPr>
+        <p:blipFill>
+          <a:blip r:embed="rId10" cstate="print">
+            <a:extLst>
+              <a:ext uri="{28A0092B-C50C-407E-A947-70E740481C1C}">
+                <a14:useLocalDpi xmlns:a14="http://schemas.microsoft.com/office/drawing/2010/main" val="0"/>
+              </a:ext>
+              <a:ext uri="{96DAC541-7B7A-43D3-8B79-37D633B846F1}">
+                <asvg:svgBlip xmlns:asvg="http://schemas.microsoft.com/office/drawing/2016/SVG/main" r:embed="rId11"/>
+              </a:ext>
+            </a:extLst>
+          </a:blip>
+          <a:stretch>
+            <a:fillRect/>
+          </a:stretch>
+        </p:blipFill>
+        <p:spPr>
+          <a:xfrm>
+            <a:off x="265043" y="3366658"/>
+            <a:ext cx="479717" cy="484187"/>
+          </a:xfrm>
+          <a:prstGeom prst="rect">
+            <a:avLst/>
+          </a:prstGeom>
+        </p:spPr>
+      </p:pic>
+    </p:spTree>
+    <p:extLst>
+      <p:ext uri="{BB962C8B-B14F-4D97-AF65-F5344CB8AC3E}">
+        <p14:creationId xmlns:p14="http://schemas.microsoft.com/office/powerpoint/2010/main" val="3925219901"/>
       </p:ext>
     </p:extLst>
   </p:cSld>

</xml_diff>

<commit_message>
adicionando novas funcionalidades ao site
</commit_message>
<xml_diff>
--- a/documentacao/HLD_LLD.pptx
+++ b/documentacao/HLD_LLD.pptx
@@ -3787,7 +3787,7 @@
         </p:blipFill>
         <p:spPr>
           <a:xfrm>
-            <a:off x="1568905" y="1642112"/>
+            <a:off x="841085" y="1481711"/>
             <a:ext cx="581660" cy="581660"/>
           </a:xfrm>
           <a:prstGeom prst="rect">
@@ -3809,14 +3809,14 @@
         </p:nvSpPr>
         <p:spPr>
           <a:xfrm rot="10800000">
-            <a:off x="1752990" y="858897"/>
-            <a:ext cx="1491451" cy="729577"/>
+            <a:off x="1067799" y="1018159"/>
+            <a:ext cx="2144861" cy="435167"/>
           </a:xfrm>
           <a:prstGeom prst="leftUpArrow">
             <a:avLst>
               <a:gd name="adj1" fmla="val 10647"/>
               <a:gd name="adj2" fmla="val 13765"/>
-              <a:gd name="adj3" fmla="val 17734"/>
+              <a:gd name="adj3" fmla="val 12811"/>
             </a:avLst>
           </a:prstGeom>
           <a:noFill/>
@@ -3886,7 +3886,7 @@
         </p:blipFill>
         <p:spPr>
           <a:xfrm>
-            <a:off x="938207" y="2720932"/>
+            <a:off x="951126" y="2716492"/>
             <a:ext cx="380365" cy="380365"/>
           </a:xfrm>
           <a:prstGeom prst="rect">
@@ -3896,10 +3896,10 @@
       </p:pic>
       <p:sp>
         <p:nvSpPr>
-          <p:cNvPr id="14" name="Seta: para a Esquerda e para Cima 13">
-            <a:extLst>
-              <a:ext uri="{FF2B5EF4-FFF2-40B4-BE49-F238E27FC236}">
-                <a16:creationId xmlns:a16="http://schemas.microsoft.com/office/drawing/2014/main" id="{51BB28E3-5C8F-44E9-B9A2-5E81BBDBB95A}"/>
+          <p:cNvPr id="15" name="Retângulo: Cantos Arredondados 14">
+            <a:extLst>
+              <a:ext uri="{FF2B5EF4-FFF2-40B4-BE49-F238E27FC236}">
+                <a16:creationId xmlns:a16="http://schemas.microsoft.com/office/drawing/2014/main" id="{3345E1AE-73DE-4872-891B-FE861FA891FA}"/>
               </a:ext>
             </a:extLst>
           </p:cNvPr>
@@ -3907,16 +3907,12 @@
           <p:nvPr/>
         </p:nvSpPr>
         <p:spPr>
-          <a:xfrm rot="10800000" flipH="1" flipV="1">
-            <a:off x="1318572" y="2279536"/>
-            <a:ext cx="581660" cy="635365"/>
-          </a:xfrm>
-          <a:prstGeom prst="leftUpArrow">
-            <a:avLst>
-              <a:gd name="adj1" fmla="val 16549"/>
-              <a:gd name="adj2" fmla="val 13053"/>
-              <a:gd name="adj3" fmla="val 14742"/>
-            </a:avLst>
+          <a:xfrm>
+            <a:off x="561332" y="3074671"/>
+            <a:ext cx="1589233" cy="1285875"/>
+          </a:xfrm>
+          <a:prstGeom prst="roundRect">
+            <a:avLst/>
           </a:prstGeom>
           <a:noFill/>
           <a:ln w="9525" cap="flat" cmpd="sng" algn="ctr">
@@ -3956,12 +3952,365 @@
           </a:p>
         </p:txBody>
       </p:sp>
-      <p:sp>
-        <p:nvSpPr>
-          <p:cNvPr id="15" name="Retângulo: Cantos Arredondados 14">
-            <a:extLst>
-              <a:ext uri="{FF2B5EF4-FFF2-40B4-BE49-F238E27FC236}">
-                <a16:creationId xmlns:a16="http://schemas.microsoft.com/office/drawing/2014/main" id="{3345E1AE-73DE-4872-891B-FE861FA891FA}"/>
+      <p:pic>
+        <p:nvPicPr>
+          <p:cNvPr id="16" name="Gráfico 8">
+            <a:extLst>
+              <a:ext uri="{FF2B5EF4-FFF2-40B4-BE49-F238E27FC236}">
+                <a16:creationId xmlns:a16="http://schemas.microsoft.com/office/drawing/2014/main" id="{2E912DC5-187C-42C4-8336-C4B01335B430}"/>
+              </a:ext>
+            </a:extLst>
+          </p:cNvPr>
+          <p:cNvPicPr/>
+          <p:nvPr/>
+        </p:nvPicPr>
+        <p:blipFill>
+          <a:blip r:embed="rId11" cstate="print">
+            <a:extLst>
+              <a:ext uri="{28A0092B-C50C-407E-A947-70E740481C1C}">
+                <a14:useLocalDpi xmlns:a14="http://schemas.microsoft.com/office/drawing/2010/main" val="0"/>
+              </a:ext>
+              <a:ext uri="{96DAC541-7B7A-43D3-8B79-37D633B846F1}">
+                <asvg:svgBlip xmlns:asvg="http://schemas.microsoft.com/office/drawing/2016/SVG/main" r:embed="rId12"/>
+              </a:ext>
+            </a:extLst>
+          </a:blip>
+          <a:stretch>
+            <a:fillRect/>
+          </a:stretch>
+        </p:blipFill>
+        <p:spPr>
+          <a:xfrm>
+            <a:off x="1138460" y="3462953"/>
+            <a:ext cx="434975" cy="434975"/>
+          </a:xfrm>
+          <a:prstGeom prst="rect">
+            <a:avLst/>
+          </a:prstGeom>
+        </p:spPr>
+      </p:pic>
+      <p:pic>
+        <p:nvPicPr>
+          <p:cNvPr id="17" name="Gráfico 1">
+            <a:extLst>
+              <a:ext uri="{FF2B5EF4-FFF2-40B4-BE49-F238E27FC236}">
+                <a16:creationId xmlns:a16="http://schemas.microsoft.com/office/drawing/2014/main" id="{BF71FA2E-4BE1-4A86-9521-AF74BE072DD8}"/>
+              </a:ext>
+            </a:extLst>
+          </p:cNvPr>
+          <p:cNvPicPr/>
+          <p:nvPr/>
+        </p:nvPicPr>
+        <p:blipFill>
+          <a:blip r:embed="rId13" cstate="print">
+            <a:extLst>
+              <a:ext uri="{28A0092B-C50C-407E-A947-70E740481C1C}">
+                <a14:useLocalDpi xmlns:a14="http://schemas.microsoft.com/office/drawing/2010/main" val="0"/>
+              </a:ext>
+              <a:ext uri="{96DAC541-7B7A-43D3-8B79-37D633B846F1}">
+                <asvg:svgBlip xmlns:asvg="http://schemas.microsoft.com/office/drawing/2016/SVG/main" r:embed="rId14"/>
+              </a:ext>
+            </a:extLst>
+          </a:blip>
+          <a:stretch>
+            <a:fillRect/>
+          </a:stretch>
+        </p:blipFill>
+        <p:spPr>
+          <a:xfrm>
+            <a:off x="664741" y="3185191"/>
+            <a:ext cx="390525" cy="390525"/>
+          </a:xfrm>
+          <a:prstGeom prst="rect">
+            <a:avLst/>
+          </a:prstGeom>
+        </p:spPr>
+      </p:pic>
+      <p:pic>
+        <p:nvPicPr>
+          <p:cNvPr id="18" name="Gráfico 6">
+            <a:extLst>
+              <a:ext uri="{FF2B5EF4-FFF2-40B4-BE49-F238E27FC236}">
+                <a16:creationId xmlns:a16="http://schemas.microsoft.com/office/drawing/2014/main" id="{20DA31CC-3E90-49F1-B6BC-C578F793FBB0}"/>
+              </a:ext>
+            </a:extLst>
+          </p:cNvPr>
+          <p:cNvPicPr/>
+          <p:nvPr/>
+        </p:nvPicPr>
+        <p:blipFill>
+          <a:blip r:embed="rId15">
+            <a:extLst>
+              <a:ext uri="{28A0092B-C50C-407E-A947-70E740481C1C}">
+                <a14:useLocalDpi xmlns:a14="http://schemas.microsoft.com/office/drawing/2010/main" val="0"/>
+              </a:ext>
+              <a:ext uri="{96DAC541-7B7A-43D3-8B79-37D633B846F1}">
+                <asvg:svgBlip xmlns:asvg="http://schemas.microsoft.com/office/drawing/2016/SVG/main" r:embed="rId16"/>
+              </a:ext>
+            </a:extLst>
+          </a:blip>
+          <a:stretch>
+            <a:fillRect/>
+          </a:stretch>
+        </p:blipFill>
+        <p:spPr>
+          <a:xfrm>
+            <a:off x="1621173" y="3212178"/>
+            <a:ext cx="360680" cy="336550"/>
+          </a:xfrm>
+          <a:prstGeom prst="rect">
+            <a:avLst/>
+          </a:prstGeom>
+        </p:spPr>
+      </p:pic>
+      <p:pic>
+        <p:nvPicPr>
+          <p:cNvPr id="19" name="Gráfico 4">
+            <a:extLst>
+              <a:ext uri="{FF2B5EF4-FFF2-40B4-BE49-F238E27FC236}">
+                <a16:creationId xmlns:a16="http://schemas.microsoft.com/office/drawing/2014/main" id="{DB5F871E-0861-4F7F-945B-1D3DD9E49D69}"/>
+              </a:ext>
+            </a:extLst>
+          </p:cNvPr>
+          <p:cNvPicPr/>
+          <p:nvPr/>
+        </p:nvPicPr>
+        <p:blipFill>
+          <a:blip r:embed="rId17" cstate="print">
+            <a:extLst>
+              <a:ext uri="{28A0092B-C50C-407E-A947-70E740481C1C}">
+                <a14:useLocalDpi xmlns:a14="http://schemas.microsoft.com/office/drawing/2010/main" val="0"/>
+              </a:ext>
+              <a:ext uri="{96DAC541-7B7A-43D3-8B79-37D633B846F1}">
+                <asvg:svgBlip xmlns:asvg="http://schemas.microsoft.com/office/drawing/2016/SVG/main" r:embed="rId18"/>
+              </a:ext>
+            </a:extLst>
+          </a:blip>
+          <a:stretch>
+            <a:fillRect/>
+          </a:stretch>
+        </p:blipFill>
+        <p:spPr>
+          <a:xfrm rot="20026507">
+            <a:off x="1288894" y="3163620"/>
+            <a:ext cx="209550" cy="209550"/>
+          </a:xfrm>
+          <a:prstGeom prst="rect">
+            <a:avLst/>
+          </a:prstGeom>
+        </p:spPr>
+      </p:pic>
+      <p:sp>
+        <p:nvSpPr>
+          <p:cNvPr id="20" name="Caixa de Texto 2">
+            <a:extLst>
+              <a:ext uri="{FF2B5EF4-FFF2-40B4-BE49-F238E27FC236}">
+                <a16:creationId xmlns:a16="http://schemas.microsoft.com/office/drawing/2014/main" id="{8F877C01-BA23-4964-9E7A-45FA20A40796}"/>
+              </a:ext>
+            </a:extLst>
+          </p:cNvPr>
+          <p:cNvSpPr txBox="1">
+            <a:spLocks noChangeArrowheads="1"/>
+          </p:cNvSpPr>
+          <p:nvPr/>
+        </p:nvSpPr>
+        <p:spPr bwMode="auto">
+          <a:xfrm>
+            <a:off x="664741" y="3911525"/>
+            <a:ext cx="1333500" cy="495300"/>
+          </a:xfrm>
+          <a:prstGeom prst="rect">
+            <a:avLst/>
+          </a:prstGeom>
+          <a:noFill/>
+          <a:ln>
+            <a:noFill/>
+          </a:ln>
+        </p:spPr>
+        <p:style>
+          <a:lnRef idx="0">
+            <a:scrgbClr r="0" g="0" b="0"/>
+          </a:lnRef>
+          <a:fillRef idx="0">
+            <a:scrgbClr r="0" g="0" b="0"/>
+          </a:fillRef>
+          <a:effectRef idx="0">
+            <a:scrgbClr r="0" g="0" b="0"/>
+          </a:effectRef>
+          <a:fontRef idx="minor">
+            <a:schemeClr val="dk1"/>
+          </a:fontRef>
+        </p:style>
+        <p:txBody>
+          <a:bodyPr rot="0" vert="horz" wrap="square" lIns="91440" tIns="45720" rIns="91440" bIns="45720" anchor="t" anchorCtr="0">
+            <a:noAutofit/>
+          </a:bodyPr>
+          <a:lstStyle/>
+          <a:p>
+            <a:pPr algn="ctr">
+              <a:lnSpc>
+                <a:spcPct val="107000"/>
+              </a:lnSpc>
+              <a:spcAft>
+                <a:spcPts val="800"/>
+              </a:spcAft>
+            </a:pPr>
+            <a:r>
+              <a:rPr lang="pt-BR" sz="1100" dirty="0">
+                <a:effectLst/>
+                <a:ea typeface="Calibri" panose="020F0502020204030204" pitchFamily="34" charset="0"/>
+                <a:cs typeface="Times New Roman" panose="02020603050405020304" pitchFamily="18" charset="0"/>
+              </a:rPr>
+              <a:t>Usuário acessando a aplicação</a:t>
+            </a:r>
+          </a:p>
+        </p:txBody>
+      </p:sp>
+      <p:sp>
+        <p:nvSpPr>
+          <p:cNvPr id="21" name="Caixa de Texto 2">
+            <a:extLst>
+              <a:ext uri="{FF2B5EF4-FFF2-40B4-BE49-F238E27FC236}">
+                <a16:creationId xmlns:a16="http://schemas.microsoft.com/office/drawing/2014/main" id="{832EE2B5-FB43-4C9D-9D09-746F6B5DCE93}"/>
+              </a:ext>
+            </a:extLst>
+          </p:cNvPr>
+          <p:cNvSpPr txBox="1">
+            <a:spLocks noChangeArrowheads="1"/>
+          </p:cNvSpPr>
+          <p:nvPr/>
+        </p:nvSpPr>
+        <p:spPr bwMode="auto">
+          <a:xfrm>
+            <a:off x="6023954" y="1444125"/>
+            <a:ext cx="1586269" cy="762000"/>
+          </a:xfrm>
+          <a:prstGeom prst="rect">
+            <a:avLst/>
+          </a:prstGeom>
+          <a:noFill/>
+          <a:ln>
+            <a:noFill/>
+          </a:ln>
+        </p:spPr>
+        <p:style>
+          <a:lnRef idx="0">
+            <a:scrgbClr r="0" g="0" b="0"/>
+          </a:lnRef>
+          <a:fillRef idx="0">
+            <a:scrgbClr r="0" g="0" b="0"/>
+          </a:fillRef>
+          <a:effectRef idx="0">
+            <a:scrgbClr r="0" g="0" b="0"/>
+          </a:effectRef>
+          <a:fontRef idx="minor">
+            <a:schemeClr val="dk1"/>
+          </a:fontRef>
+        </p:style>
+        <p:txBody>
+          <a:bodyPr rot="0" vert="horz" wrap="square" lIns="91440" tIns="45720" rIns="91440" bIns="45720" anchor="t" anchorCtr="0">
+            <a:noAutofit/>
+          </a:bodyPr>
+          <a:lstStyle/>
+          <a:p>
+            <a:pPr marL="342900" lvl="0" indent="-342900">
+              <a:lnSpc>
+                <a:spcPct val="107000"/>
+              </a:lnSpc>
+              <a:buFont typeface="Symbol" panose="05050102010706020507" pitchFamily="18" charset="2"/>
+              <a:buChar char=""/>
+            </a:pPr>
+            <a:r>
+              <a:rPr lang="pt-BR" sz="1100" dirty="0">
+                <a:effectLst/>
+                <a:ea typeface="Calibri" panose="020F0502020204030204" pitchFamily="34" charset="0"/>
+                <a:cs typeface="Times New Roman" panose="02020603050405020304" pitchFamily="18" charset="0"/>
+              </a:rPr>
+              <a:t>Banco de dados;</a:t>
+            </a:r>
+          </a:p>
+          <a:p>
+            <a:pPr marL="342900" lvl="0" indent="-342900">
+              <a:lnSpc>
+                <a:spcPct val="107000"/>
+              </a:lnSpc>
+              <a:buFont typeface="Symbol" panose="05050102010706020507" pitchFamily="18" charset="2"/>
+              <a:buChar char=""/>
+            </a:pPr>
+            <a:r>
+              <a:rPr lang="pt-BR" sz="1100" dirty="0">
+                <a:effectLst/>
+                <a:ea typeface="Calibri" panose="020F0502020204030204" pitchFamily="34" charset="0"/>
+                <a:cs typeface="Times New Roman" panose="02020603050405020304" pitchFamily="18" charset="0"/>
+              </a:rPr>
+              <a:t>Site;</a:t>
+            </a:r>
+          </a:p>
+          <a:p>
+            <a:pPr marL="342900" lvl="0" indent="-342900">
+              <a:lnSpc>
+                <a:spcPct val="107000"/>
+              </a:lnSpc>
+              <a:spcAft>
+                <a:spcPts val="800"/>
+              </a:spcAft>
+              <a:buFont typeface="Symbol" panose="05050102010706020507" pitchFamily="18" charset="2"/>
+              <a:buChar char=""/>
+            </a:pPr>
+            <a:r>
+              <a:rPr lang="pt-BR" sz="1100" dirty="0">
+                <a:effectLst/>
+                <a:ea typeface="Calibri" panose="020F0502020204030204" pitchFamily="34" charset="0"/>
+                <a:cs typeface="Times New Roman" panose="02020603050405020304" pitchFamily="18" charset="0"/>
+              </a:rPr>
+              <a:t>Comunidade.</a:t>
+            </a:r>
+          </a:p>
+        </p:txBody>
+      </p:sp>
+      <p:pic>
+        <p:nvPicPr>
+          <p:cNvPr id="22" name="Gráfico 46">
+            <a:extLst>
+              <a:ext uri="{FF2B5EF4-FFF2-40B4-BE49-F238E27FC236}">
+                <a16:creationId xmlns:a16="http://schemas.microsoft.com/office/drawing/2014/main" id="{7064C349-6ABA-472F-A085-12A80E1D9A4A}"/>
+              </a:ext>
+            </a:extLst>
+          </p:cNvPr>
+          <p:cNvPicPr/>
+          <p:nvPr/>
+        </p:nvPicPr>
+        <p:blipFill>
+          <a:blip r:embed="rId7" cstate="print">
+            <a:extLst>
+              <a:ext uri="{28A0092B-C50C-407E-A947-70E740481C1C}">
+                <a14:useLocalDpi xmlns:a14="http://schemas.microsoft.com/office/drawing/2010/main" val="0"/>
+              </a:ext>
+              <a:ext uri="{96DAC541-7B7A-43D3-8B79-37D633B846F1}">
+                <asvg:svgBlip xmlns:asvg="http://schemas.microsoft.com/office/drawing/2016/SVG/main" r:embed="rId8"/>
+              </a:ext>
+            </a:extLst>
+          </a:blip>
+          <a:stretch>
+            <a:fillRect/>
+          </a:stretch>
+        </p:blipFill>
+        <p:spPr>
+          <a:xfrm>
+            <a:off x="3844225" y="2409200"/>
+            <a:ext cx="581660" cy="581660"/>
+          </a:xfrm>
+          <a:prstGeom prst="rect">
+            <a:avLst/>
+          </a:prstGeom>
+        </p:spPr>
+      </p:pic>
+      <p:sp>
+        <p:nvSpPr>
+          <p:cNvPr id="24" name="Seta: para a Esquerda e para Cima 23">
+            <a:extLst>
+              <a:ext uri="{FF2B5EF4-FFF2-40B4-BE49-F238E27FC236}">
+                <a16:creationId xmlns:a16="http://schemas.microsoft.com/office/drawing/2014/main" id="{0B3260EA-20F3-407F-9B6F-A32E48DAA9F8}"/>
               </a:ext>
             </a:extLst>
           </p:cNvPr>
@@ -3969,12 +4318,16 @@
           <p:nvPr/>
         </p:nvSpPr>
         <p:spPr>
-          <a:xfrm>
-            <a:off x="561332" y="3074671"/>
-            <a:ext cx="1589233" cy="1285875"/>
-          </a:xfrm>
-          <a:prstGeom prst="roundRect">
-            <a:avLst/>
+          <a:xfrm rot="10800000" flipH="1" flipV="1">
+            <a:off x="4447553" y="1894763"/>
+            <a:ext cx="807260" cy="889611"/>
+          </a:xfrm>
+          <a:prstGeom prst="leftUpArrow">
+            <a:avLst>
+              <a:gd name="adj1" fmla="val 11336"/>
+              <a:gd name="adj2" fmla="val 11465"/>
+              <a:gd name="adj3" fmla="val 12518"/>
+            </a:avLst>
           </a:prstGeom>
           <a:noFill/>
           <a:ln w="9525" cap="flat" cmpd="sng" algn="ctr">
@@ -4016,10 +4369,10 @@
       </p:sp>
       <p:pic>
         <p:nvPicPr>
-          <p:cNvPr id="16" name="Gráfico 8">
-            <a:extLst>
-              <a:ext uri="{FF2B5EF4-FFF2-40B4-BE49-F238E27FC236}">
-                <a16:creationId xmlns:a16="http://schemas.microsoft.com/office/drawing/2014/main" id="{2E912DC5-187C-42C4-8336-C4B01335B430}"/>
+          <p:cNvPr id="25" name="Gráfico 7">
+            <a:extLst>
+              <a:ext uri="{FF2B5EF4-FFF2-40B4-BE49-F238E27FC236}">
+                <a16:creationId xmlns:a16="http://schemas.microsoft.com/office/drawing/2014/main" id="{FA5B2B38-0CD9-49CE-84E0-8222CCB181F0}"/>
               </a:ext>
             </a:extLst>
           </p:cNvPr>
@@ -4027,13 +4380,13 @@
           <p:nvPr/>
         </p:nvPicPr>
         <p:blipFill>
-          <a:blip r:embed="rId11" cstate="print">
+          <a:blip r:embed="rId9" cstate="print">
             <a:extLst>
               <a:ext uri="{28A0092B-C50C-407E-A947-70E740481C1C}">
                 <a14:useLocalDpi xmlns:a14="http://schemas.microsoft.com/office/drawing/2010/main" val="0"/>
               </a:ext>
               <a:ext uri="{96DAC541-7B7A-43D3-8B79-37D633B846F1}">
-                <asvg:svgBlip xmlns:asvg="http://schemas.microsoft.com/office/drawing/2016/SVG/main" r:embed="rId12"/>
+                <asvg:svgBlip xmlns:asvg="http://schemas.microsoft.com/office/drawing/2016/SVG/main" r:embed="rId10"/>
               </a:ext>
             </a:extLst>
           </a:blip>
@@ -4043,353 +4396,33 @@
         </p:blipFill>
         <p:spPr>
           <a:xfrm>
-            <a:off x="1138460" y="3462953"/>
-            <a:ext cx="434975" cy="434975"/>
+            <a:off x="4873615" y="3147874"/>
+            <a:ext cx="380365" cy="380365"/>
           </a:xfrm>
           <a:prstGeom prst="rect">
             <a:avLst/>
           </a:prstGeom>
         </p:spPr>
       </p:pic>
-      <p:pic>
-        <p:nvPicPr>
-          <p:cNvPr id="17" name="Gráfico 1">
-            <a:extLst>
-              <a:ext uri="{FF2B5EF4-FFF2-40B4-BE49-F238E27FC236}">
-                <a16:creationId xmlns:a16="http://schemas.microsoft.com/office/drawing/2014/main" id="{BF71FA2E-4BE1-4A86-9521-AF74BE072DD8}"/>
-              </a:ext>
-            </a:extLst>
-          </p:cNvPr>
-          <p:cNvPicPr/>
-          <p:nvPr/>
-        </p:nvPicPr>
-        <p:blipFill>
-          <a:blip r:embed="rId13" cstate="print">
-            <a:extLst>
-              <a:ext uri="{28A0092B-C50C-407E-A947-70E740481C1C}">
-                <a14:useLocalDpi xmlns:a14="http://schemas.microsoft.com/office/drawing/2010/main" val="0"/>
-              </a:ext>
-              <a:ext uri="{96DAC541-7B7A-43D3-8B79-37D633B846F1}">
-                <asvg:svgBlip xmlns:asvg="http://schemas.microsoft.com/office/drawing/2016/SVG/main" r:embed="rId14"/>
-              </a:ext>
-            </a:extLst>
-          </a:blip>
-          <a:stretch>
-            <a:fillRect/>
-          </a:stretch>
-        </p:blipFill>
+      <p:sp>
+        <p:nvSpPr>
+          <p:cNvPr id="26" name="Retângulo: Cantos Arredondados 25">
+            <a:extLst>
+              <a:ext uri="{FF2B5EF4-FFF2-40B4-BE49-F238E27FC236}">
+                <a16:creationId xmlns:a16="http://schemas.microsoft.com/office/drawing/2014/main" id="{26509C0C-F813-42ED-B78D-8E9BD409F8AC}"/>
+              </a:ext>
+            </a:extLst>
+          </p:cNvPr>
+          <p:cNvSpPr/>
+          <p:nvPr/>
+        </p:nvSpPr>
         <p:spPr>
           <a:xfrm>
-            <a:off x="664741" y="3185191"/>
-            <a:ext cx="390525" cy="390525"/>
-          </a:xfrm>
-          <a:prstGeom prst="rect">
-            <a:avLst/>
-          </a:prstGeom>
-        </p:spPr>
-      </p:pic>
-      <p:pic>
-        <p:nvPicPr>
-          <p:cNvPr id="18" name="Gráfico 6">
-            <a:extLst>
-              <a:ext uri="{FF2B5EF4-FFF2-40B4-BE49-F238E27FC236}">
-                <a16:creationId xmlns:a16="http://schemas.microsoft.com/office/drawing/2014/main" id="{20DA31CC-3E90-49F1-B6BC-C578F793FBB0}"/>
-              </a:ext>
-            </a:extLst>
-          </p:cNvPr>
-          <p:cNvPicPr/>
-          <p:nvPr/>
-        </p:nvPicPr>
-        <p:blipFill>
-          <a:blip r:embed="rId15">
-            <a:extLst>
-              <a:ext uri="{28A0092B-C50C-407E-A947-70E740481C1C}">
-                <a14:useLocalDpi xmlns:a14="http://schemas.microsoft.com/office/drawing/2010/main" val="0"/>
-              </a:ext>
-              <a:ext uri="{96DAC541-7B7A-43D3-8B79-37D633B846F1}">
-                <asvg:svgBlip xmlns:asvg="http://schemas.microsoft.com/office/drawing/2016/SVG/main" r:embed="rId16"/>
-              </a:ext>
-            </a:extLst>
-          </a:blip>
-          <a:stretch>
-            <a:fillRect/>
-          </a:stretch>
-        </p:blipFill>
-        <p:spPr>
-          <a:xfrm>
-            <a:off x="1621173" y="3212178"/>
-            <a:ext cx="360680" cy="336550"/>
-          </a:xfrm>
-          <a:prstGeom prst="rect">
-            <a:avLst/>
-          </a:prstGeom>
-        </p:spPr>
-      </p:pic>
-      <p:pic>
-        <p:nvPicPr>
-          <p:cNvPr id="19" name="Gráfico 4">
-            <a:extLst>
-              <a:ext uri="{FF2B5EF4-FFF2-40B4-BE49-F238E27FC236}">
-                <a16:creationId xmlns:a16="http://schemas.microsoft.com/office/drawing/2014/main" id="{DB5F871E-0861-4F7F-945B-1D3DD9E49D69}"/>
-              </a:ext>
-            </a:extLst>
-          </p:cNvPr>
-          <p:cNvPicPr/>
-          <p:nvPr/>
-        </p:nvPicPr>
-        <p:blipFill>
-          <a:blip r:embed="rId17" cstate="print">
-            <a:extLst>
-              <a:ext uri="{28A0092B-C50C-407E-A947-70E740481C1C}">
-                <a14:useLocalDpi xmlns:a14="http://schemas.microsoft.com/office/drawing/2010/main" val="0"/>
-              </a:ext>
-              <a:ext uri="{96DAC541-7B7A-43D3-8B79-37D633B846F1}">
-                <asvg:svgBlip xmlns:asvg="http://schemas.microsoft.com/office/drawing/2016/SVG/main" r:embed="rId18"/>
-              </a:ext>
-            </a:extLst>
-          </a:blip>
-          <a:stretch>
-            <a:fillRect/>
-          </a:stretch>
-        </p:blipFill>
-        <p:spPr>
-          <a:xfrm rot="20026507">
-            <a:off x="1288894" y="3163620"/>
-            <a:ext cx="209550" cy="209550"/>
-          </a:xfrm>
-          <a:prstGeom prst="rect">
-            <a:avLst/>
-          </a:prstGeom>
-        </p:spPr>
-      </p:pic>
-      <p:sp>
-        <p:nvSpPr>
-          <p:cNvPr id="20" name="Caixa de Texto 2">
-            <a:extLst>
-              <a:ext uri="{FF2B5EF4-FFF2-40B4-BE49-F238E27FC236}">
-                <a16:creationId xmlns:a16="http://schemas.microsoft.com/office/drawing/2014/main" id="{8F877C01-BA23-4964-9E7A-45FA20A40796}"/>
-              </a:ext>
-            </a:extLst>
-          </p:cNvPr>
-          <p:cNvSpPr txBox="1">
-            <a:spLocks noChangeArrowheads="1"/>
-          </p:cNvSpPr>
-          <p:nvPr/>
-        </p:nvSpPr>
-        <p:spPr bwMode="auto">
-          <a:xfrm>
-            <a:off x="664741" y="3911525"/>
-            <a:ext cx="1333500" cy="495300"/>
-          </a:xfrm>
-          <a:prstGeom prst="rect">
-            <a:avLst/>
-          </a:prstGeom>
-          <a:noFill/>
-          <a:ln>
-            <a:noFill/>
-          </a:ln>
-        </p:spPr>
-        <p:style>
-          <a:lnRef idx="0">
-            <a:scrgbClr r="0" g="0" b="0"/>
-          </a:lnRef>
-          <a:fillRef idx="0">
-            <a:scrgbClr r="0" g="0" b="0"/>
-          </a:fillRef>
-          <a:effectRef idx="0">
-            <a:scrgbClr r="0" g="0" b="0"/>
-          </a:effectRef>
-          <a:fontRef idx="minor">
-            <a:schemeClr val="dk1"/>
-          </a:fontRef>
-        </p:style>
-        <p:txBody>
-          <a:bodyPr rot="0" vert="horz" wrap="square" lIns="91440" tIns="45720" rIns="91440" bIns="45720" anchor="t" anchorCtr="0">
-            <a:noAutofit/>
-          </a:bodyPr>
-          <a:lstStyle/>
-          <a:p>
-            <a:pPr algn="ctr">
-              <a:lnSpc>
-                <a:spcPct val="107000"/>
-              </a:lnSpc>
-              <a:spcAft>
-                <a:spcPts val="800"/>
-              </a:spcAft>
-            </a:pPr>
-            <a:r>
-              <a:rPr lang="pt-BR" sz="1100" dirty="0">
-                <a:effectLst/>
-                <a:ea typeface="Calibri" panose="020F0502020204030204" pitchFamily="34" charset="0"/>
-                <a:cs typeface="Times New Roman" panose="02020603050405020304" pitchFamily="18" charset="0"/>
-              </a:rPr>
-              <a:t>Usuário acessando a aplicação</a:t>
-            </a:r>
-          </a:p>
-        </p:txBody>
-      </p:sp>
-      <p:sp>
-        <p:nvSpPr>
-          <p:cNvPr id="21" name="Caixa de Texto 2">
-            <a:extLst>
-              <a:ext uri="{FF2B5EF4-FFF2-40B4-BE49-F238E27FC236}">
-                <a16:creationId xmlns:a16="http://schemas.microsoft.com/office/drawing/2014/main" id="{832EE2B5-FB43-4C9D-9D09-746F6B5DCE93}"/>
-              </a:ext>
-            </a:extLst>
-          </p:cNvPr>
-          <p:cNvSpPr txBox="1">
-            <a:spLocks noChangeArrowheads="1"/>
-          </p:cNvSpPr>
-          <p:nvPr/>
-        </p:nvSpPr>
-        <p:spPr bwMode="auto">
-          <a:xfrm>
-            <a:off x="6023954" y="1444125"/>
-            <a:ext cx="1586269" cy="762000"/>
-          </a:xfrm>
-          <a:prstGeom prst="rect">
-            <a:avLst/>
-          </a:prstGeom>
-          <a:noFill/>
-          <a:ln>
-            <a:noFill/>
-          </a:ln>
-        </p:spPr>
-        <p:style>
-          <a:lnRef idx="0">
-            <a:scrgbClr r="0" g="0" b="0"/>
-          </a:lnRef>
-          <a:fillRef idx="0">
-            <a:scrgbClr r="0" g="0" b="0"/>
-          </a:fillRef>
-          <a:effectRef idx="0">
-            <a:scrgbClr r="0" g="0" b="0"/>
-          </a:effectRef>
-          <a:fontRef idx="minor">
-            <a:schemeClr val="dk1"/>
-          </a:fontRef>
-        </p:style>
-        <p:txBody>
-          <a:bodyPr rot="0" vert="horz" wrap="square" lIns="91440" tIns="45720" rIns="91440" bIns="45720" anchor="t" anchorCtr="0">
-            <a:noAutofit/>
-          </a:bodyPr>
-          <a:lstStyle/>
-          <a:p>
-            <a:pPr marL="342900" lvl="0" indent="-342900">
-              <a:lnSpc>
-                <a:spcPct val="107000"/>
-              </a:lnSpc>
-              <a:buFont typeface="Symbol" panose="05050102010706020507" pitchFamily="18" charset="2"/>
-              <a:buChar char=""/>
-            </a:pPr>
-            <a:r>
-              <a:rPr lang="pt-BR" sz="1100" dirty="0">
-                <a:effectLst/>
-                <a:ea typeface="Calibri" panose="020F0502020204030204" pitchFamily="34" charset="0"/>
-                <a:cs typeface="Times New Roman" panose="02020603050405020304" pitchFamily="18" charset="0"/>
-              </a:rPr>
-              <a:t>Banco de dados;</a:t>
-            </a:r>
-          </a:p>
-          <a:p>
-            <a:pPr marL="342900" lvl="0" indent="-342900">
-              <a:lnSpc>
-                <a:spcPct val="107000"/>
-              </a:lnSpc>
-              <a:buFont typeface="Symbol" panose="05050102010706020507" pitchFamily="18" charset="2"/>
-              <a:buChar char=""/>
-            </a:pPr>
-            <a:r>
-              <a:rPr lang="pt-BR" sz="1100" dirty="0">
-                <a:effectLst/>
-                <a:ea typeface="Calibri" panose="020F0502020204030204" pitchFamily="34" charset="0"/>
-                <a:cs typeface="Times New Roman" panose="02020603050405020304" pitchFamily="18" charset="0"/>
-              </a:rPr>
-              <a:t>Site;</a:t>
-            </a:r>
-          </a:p>
-          <a:p>
-            <a:pPr marL="342900" lvl="0" indent="-342900">
-              <a:lnSpc>
-                <a:spcPct val="107000"/>
-              </a:lnSpc>
-              <a:spcAft>
-                <a:spcPts val="800"/>
-              </a:spcAft>
-              <a:buFont typeface="Symbol" panose="05050102010706020507" pitchFamily="18" charset="2"/>
-              <a:buChar char=""/>
-            </a:pPr>
-            <a:r>
-              <a:rPr lang="pt-BR" sz="1100" dirty="0">
-                <a:effectLst/>
-                <a:ea typeface="Calibri" panose="020F0502020204030204" pitchFamily="34" charset="0"/>
-                <a:cs typeface="Times New Roman" panose="02020603050405020304" pitchFamily="18" charset="0"/>
-              </a:rPr>
-              <a:t>Comunidade.</a:t>
-            </a:r>
-          </a:p>
-        </p:txBody>
-      </p:sp>
-      <p:pic>
-        <p:nvPicPr>
-          <p:cNvPr id="22" name="Gráfico 46">
-            <a:extLst>
-              <a:ext uri="{FF2B5EF4-FFF2-40B4-BE49-F238E27FC236}">
-                <a16:creationId xmlns:a16="http://schemas.microsoft.com/office/drawing/2014/main" id="{7064C349-6ABA-472F-A085-12A80E1D9A4A}"/>
-              </a:ext>
-            </a:extLst>
-          </p:cNvPr>
-          <p:cNvPicPr/>
-          <p:nvPr/>
-        </p:nvPicPr>
-        <p:blipFill>
-          <a:blip r:embed="rId7" cstate="print">
-            <a:extLst>
-              <a:ext uri="{28A0092B-C50C-407E-A947-70E740481C1C}">
-                <a14:useLocalDpi xmlns:a14="http://schemas.microsoft.com/office/drawing/2010/main" val="0"/>
-              </a:ext>
-              <a:ext uri="{96DAC541-7B7A-43D3-8B79-37D633B846F1}">
-                <asvg:svgBlip xmlns:asvg="http://schemas.microsoft.com/office/drawing/2016/SVG/main" r:embed="rId8"/>
-              </a:ext>
-            </a:extLst>
-          </a:blip>
-          <a:stretch>
-            <a:fillRect/>
-          </a:stretch>
-        </p:blipFill>
-        <p:spPr>
-          <a:xfrm>
-            <a:off x="3844225" y="2409200"/>
-            <a:ext cx="581660" cy="581660"/>
-          </a:xfrm>
-          <a:prstGeom prst="rect">
-            <a:avLst/>
-          </a:prstGeom>
-        </p:spPr>
-      </p:pic>
-      <p:sp>
-        <p:nvSpPr>
-          <p:cNvPr id="24" name="Seta: para a Esquerda e para Cima 23">
-            <a:extLst>
-              <a:ext uri="{FF2B5EF4-FFF2-40B4-BE49-F238E27FC236}">
-                <a16:creationId xmlns:a16="http://schemas.microsoft.com/office/drawing/2014/main" id="{0B3260EA-20F3-407F-9B6F-A32E48DAA9F8}"/>
-              </a:ext>
-            </a:extLst>
-          </p:cNvPr>
-          <p:cNvSpPr/>
-          <p:nvPr/>
-        </p:nvSpPr>
-        <p:spPr>
-          <a:xfrm rot="10800000" flipH="1" flipV="1">
-            <a:off x="4447553" y="1894763"/>
-            <a:ext cx="807260" cy="889611"/>
-          </a:xfrm>
-          <a:prstGeom prst="leftUpArrow">
-            <a:avLst>
-              <a:gd name="adj1" fmla="val 11336"/>
-              <a:gd name="adj2" fmla="val 11465"/>
-              <a:gd name="adj3" fmla="val 12518"/>
-            </a:avLst>
+            <a:off x="3812825" y="3496713"/>
+            <a:ext cx="2076716" cy="1324924"/>
+          </a:xfrm>
+          <a:prstGeom prst="roundRect">
+            <a:avLst/>
           </a:prstGeom>
           <a:noFill/>
           <a:ln w="9525" cap="flat" cmpd="sng" algn="ctr">
@@ -4431,10 +4464,10 @@
       </p:sp>
       <p:pic>
         <p:nvPicPr>
-          <p:cNvPr id="25" name="Gráfico 7">
-            <a:extLst>
-              <a:ext uri="{FF2B5EF4-FFF2-40B4-BE49-F238E27FC236}">
-                <a16:creationId xmlns:a16="http://schemas.microsoft.com/office/drawing/2014/main" id="{FA5B2B38-0CD9-49CE-84E0-8222CCB181F0}"/>
+          <p:cNvPr id="27" name="Imagem 26" descr="Forma&#10;&#10;Descrição gerada automaticamente com confiança baixa">
+            <a:extLst>
+              <a:ext uri="{FF2B5EF4-FFF2-40B4-BE49-F238E27FC236}">
+                <a16:creationId xmlns:a16="http://schemas.microsoft.com/office/drawing/2014/main" id="{BFA5B051-79A7-4DB3-9302-4AFC370AB37F}"/>
               </a:ext>
             </a:extLst>
           </p:cNvPr>
@@ -4442,13 +4475,10 @@
           <p:nvPr/>
         </p:nvPicPr>
         <p:blipFill>
-          <a:blip r:embed="rId9" cstate="print">
+          <a:blip r:embed="rId19" cstate="print">
             <a:extLst>
               <a:ext uri="{28A0092B-C50C-407E-A947-70E740481C1C}">
                 <a14:useLocalDpi xmlns:a14="http://schemas.microsoft.com/office/drawing/2010/main" val="0"/>
-              </a:ext>
-              <a:ext uri="{96DAC541-7B7A-43D3-8B79-37D633B846F1}">
-                <asvg:svgBlip xmlns:asvg="http://schemas.microsoft.com/office/drawing/2016/SVG/main" r:embed="rId10"/>
               </a:ext>
             </a:extLst>
           </a:blip>
@@ -4458,20 +4488,160 @@
         </p:blipFill>
         <p:spPr>
           <a:xfrm>
-            <a:off x="4873615" y="3147874"/>
-            <a:ext cx="380365" cy="380365"/>
+            <a:off x="5238108" y="3680441"/>
+            <a:ext cx="381000" cy="381000"/>
           </a:xfrm>
           <a:prstGeom prst="rect">
             <a:avLst/>
           </a:prstGeom>
         </p:spPr>
       </p:pic>
-      <p:sp>
-        <p:nvSpPr>
-          <p:cNvPr id="26" name="Retângulo: Cantos Arredondados 25">
-            <a:extLst>
-              <a:ext uri="{FF2B5EF4-FFF2-40B4-BE49-F238E27FC236}">
-                <a16:creationId xmlns:a16="http://schemas.microsoft.com/office/drawing/2014/main" id="{26509C0C-F813-42ED-B78D-8E9BD409F8AC}"/>
+      <p:pic>
+        <p:nvPicPr>
+          <p:cNvPr id="28" name="Gráfico 37">
+            <a:extLst>
+              <a:ext uri="{FF2B5EF4-FFF2-40B4-BE49-F238E27FC236}">
+                <a16:creationId xmlns:a16="http://schemas.microsoft.com/office/drawing/2014/main" id="{2136C48C-0928-4B8C-AF47-76AF8957BAAC}"/>
+              </a:ext>
+            </a:extLst>
+          </p:cNvPr>
+          <p:cNvPicPr/>
+          <p:nvPr/>
+        </p:nvPicPr>
+        <p:blipFill>
+          <a:blip r:embed="rId20" cstate="print">
+            <a:extLst>
+              <a:ext uri="{28A0092B-C50C-407E-A947-70E740481C1C}">
+                <a14:useLocalDpi xmlns:a14="http://schemas.microsoft.com/office/drawing/2010/main" val="0"/>
+              </a:ext>
+              <a:ext uri="{96DAC541-7B7A-43D3-8B79-37D633B846F1}">
+                <asvg:svgBlip xmlns:asvg="http://schemas.microsoft.com/office/drawing/2016/SVG/main" r:embed="rId21"/>
+              </a:ext>
+            </a:extLst>
+          </a:blip>
+          <a:stretch>
+            <a:fillRect/>
+          </a:stretch>
+        </p:blipFill>
+        <p:spPr>
+          <a:xfrm>
+            <a:off x="3901973" y="3559274"/>
+            <a:ext cx="529590" cy="529590"/>
+          </a:xfrm>
+          <a:prstGeom prst="rect">
+            <a:avLst/>
+          </a:prstGeom>
+        </p:spPr>
+      </p:pic>
+      <p:pic>
+        <p:nvPicPr>
+          <p:cNvPr id="29" name="Gráfico 47">
+            <a:extLst>
+              <a:ext uri="{FF2B5EF4-FFF2-40B4-BE49-F238E27FC236}">
+                <a16:creationId xmlns:a16="http://schemas.microsoft.com/office/drawing/2014/main" id="{008590B2-6EF8-49F3-8182-6045AE304616}"/>
+              </a:ext>
+            </a:extLst>
+          </p:cNvPr>
+          <p:cNvPicPr/>
+          <p:nvPr/>
+        </p:nvPicPr>
+        <p:blipFill>
+          <a:blip r:embed="rId17" cstate="print">
+            <a:extLst>
+              <a:ext uri="{28A0092B-C50C-407E-A947-70E740481C1C}">
+                <a14:useLocalDpi xmlns:a14="http://schemas.microsoft.com/office/drawing/2010/main" val="0"/>
+              </a:ext>
+              <a:ext uri="{96DAC541-7B7A-43D3-8B79-37D633B846F1}">
+                <asvg:svgBlip xmlns:asvg="http://schemas.microsoft.com/office/drawing/2016/SVG/main" r:embed="rId18"/>
+              </a:ext>
+            </a:extLst>
+          </a:blip>
+          <a:stretch>
+            <a:fillRect/>
+          </a:stretch>
+        </p:blipFill>
+        <p:spPr>
+          <a:xfrm rot="2566580">
+            <a:off x="4735064" y="3671952"/>
+            <a:ext cx="209550" cy="209550"/>
+          </a:xfrm>
+          <a:prstGeom prst="rect">
+            <a:avLst/>
+          </a:prstGeom>
+        </p:spPr>
+      </p:pic>
+      <p:sp>
+        <p:nvSpPr>
+          <p:cNvPr id="30" name="Caixa de Texto 2">
+            <a:extLst>
+              <a:ext uri="{FF2B5EF4-FFF2-40B4-BE49-F238E27FC236}">
+                <a16:creationId xmlns:a16="http://schemas.microsoft.com/office/drawing/2014/main" id="{F319D67E-56C7-4085-9F31-0A49FF8D9287}"/>
+              </a:ext>
+            </a:extLst>
+          </p:cNvPr>
+          <p:cNvSpPr txBox="1">
+            <a:spLocks noChangeArrowheads="1"/>
+          </p:cNvSpPr>
+          <p:nvPr/>
+        </p:nvSpPr>
+        <p:spPr bwMode="auto">
+          <a:xfrm>
+            <a:off x="3789792" y="4125563"/>
+            <a:ext cx="2209800" cy="495300"/>
+          </a:xfrm>
+          <a:prstGeom prst="rect">
+            <a:avLst/>
+          </a:prstGeom>
+          <a:noFill/>
+          <a:ln>
+            <a:noFill/>
+          </a:ln>
+        </p:spPr>
+        <p:style>
+          <a:lnRef idx="0">
+            <a:scrgbClr r="0" g="0" b="0"/>
+          </a:lnRef>
+          <a:fillRef idx="0">
+            <a:scrgbClr r="0" g="0" b="0"/>
+          </a:fillRef>
+          <a:effectRef idx="0">
+            <a:scrgbClr r="0" g="0" b="0"/>
+          </a:effectRef>
+          <a:fontRef idx="minor">
+            <a:schemeClr val="dk1"/>
+          </a:fontRef>
+        </p:style>
+        <p:txBody>
+          <a:bodyPr rot="0" vert="horz" wrap="square" lIns="91440" tIns="45720" rIns="91440" bIns="45720" anchor="t" anchorCtr="0">
+            <a:noAutofit/>
+          </a:bodyPr>
+          <a:lstStyle/>
+          <a:p>
+            <a:pPr algn="ctr">
+              <a:lnSpc>
+                <a:spcPct val="107000"/>
+              </a:lnSpc>
+              <a:spcAft>
+                <a:spcPts val="800"/>
+              </a:spcAft>
+            </a:pPr>
+            <a:r>
+              <a:rPr lang="pt-BR" sz="1100" dirty="0">
+                <a:effectLst/>
+                <a:ea typeface="Calibri" panose="020F0502020204030204" pitchFamily="34" charset="0"/>
+                <a:cs typeface="Times New Roman" panose="02020603050405020304" pitchFamily="18" charset="0"/>
+              </a:rPr>
+              <a:t>Funcionários responsáveis pela manutenção do site</a:t>
+            </a:r>
+          </a:p>
+        </p:txBody>
+      </p:sp>
+      <p:sp>
+        <p:nvSpPr>
+          <p:cNvPr id="32" name="Seta: para a Esquerda e para Cima 31">
+            <a:extLst>
+              <a:ext uri="{FF2B5EF4-FFF2-40B4-BE49-F238E27FC236}">
+                <a16:creationId xmlns:a16="http://schemas.microsoft.com/office/drawing/2014/main" id="{5496BD22-2B19-46CB-B3D7-8289805B0B93}"/>
               </a:ext>
             </a:extLst>
           </p:cNvPr>
@@ -4479,12 +4649,16 @@
           <p:nvPr/>
         </p:nvSpPr>
         <p:spPr>
-          <a:xfrm>
-            <a:off x="3812825" y="3496713"/>
-            <a:ext cx="2076716" cy="1324924"/>
-          </a:xfrm>
-          <a:prstGeom prst="roundRect">
-            <a:avLst/>
+          <a:xfrm rot="10800000" flipV="1">
+            <a:off x="4067100" y="3047449"/>
+            <a:ext cx="733547" cy="333639"/>
+          </a:xfrm>
+          <a:prstGeom prst="leftUpArrow">
+            <a:avLst>
+              <a:gd name="adj1" fmla="val 19634"/>
+              <a:gd name="adj2" fmla="val 22317"/>
+              <a:gd name="adj3" fmla="val 25000"/>
+            </a:avLst>
           </a:prstGeom>
           <a:noFill/>
           <a:ln w="9525" cap="flat" cmpd="sng" algn="ctr">
@@ -4526,10 +4700,10 @@
       </p:sp>
       <p:pic>
         <p:nvPicPr>
-          <p:cNvPr id="27" name="Imagem 26" descr="Forma&#10;&#10;Descrição gerada automaticamente com confiança baixa">
-            <a:extLst>
-              <a:ext uri="{FF2B5EF4-FFF2-40B4-BE49-F238E27FC236}">
-                <a16:creationId xmlns:a16="http://schemas.microsoft.com/office/drawing/2014/main" id="{BFA5B051-79A7-4DB3-9302-4AFC370AB37F}"/>
+          <p:cNvPr id="34" name="Imagem 33" descr="Forma&#10;&#10;Descrição gerada automaticamente com confiança baixa">
+            <a:extLst>
+              <a:ext uri="{FF2B5EF4-FFF2-40B4-BE49-F238E27FC236}">
+                <a16:creationId xmlns:a16="http://schemas.microsoft.com/office/drawing/2014/main" id="{88524CEA-6175-4B76-97DF-9410EE8F7470}"/>
               </a:ext>
             </a:extLst>
           </p:cNvPr>
@@ -4537,7 +4711,7 @@
           <p:nvPr/>
         </p:nvPicPr>
         <p:blipFill>
-          <a:blip r:embed="rId19" cstate="print">
+          <a:blip r:embed="rId22" cstate="print">
             <a:extLst>
               <a:ext uri="{28A0092B-C50C-407E-A947-70E740481C1C}">
                 <a14:useLocalDpi xmlns:a14="http://schemas.microsoft.com/office/drawing/2010/main" val="0"/>
@@ -4549,9 +4723,9 @@
           </a:stretch>
         </p:blipFill>
         <p:spPr>
-          <a:xfrm>
-            <a:off x="5238108" y="3680441"/>
-            <a:ext cx="381000" cy="381000"/>
+          <a:xfrm rot="20529588">
+            <a:off x="7509554" y="4456170"/>
+            <a:ext cx="519430" cy="519430"/>
           </a:xfrm>
           <a:prstGeom prst="rect">
             <a:avLst/>
@@ -4560,10 +4734,10 @@
       </p:pic>
       <p:pic>
         <p:nvPicPr>
-          <p:cNvPr id="28" name="Gráfico 37">
-            <a:extLst>
-              <a:ext uri="{FF2B5EF4-FFF2-40B4-BE49-F238E27FC236}">
-                <a16:creationId xmlns:a16="http://schemas.microsoft.com/office/drawing/2014/main" id="{2136C48C-0928-4B8C-AF47-76AF8957BAAC}"/>
+          <p:cNvPr id="35" name="Imagem 34">
+            <a:extLst>
+              <a:ext uri="{FF2B5EF4-FFF2-40B4-BE49-F238E27FC236}">
+                <a16:creationId xmlns:a16="http://schemas.microsoft.com/office/drawing/2014/main" id="{082C0DB5-A7DF-4197-A76B-6BB799A05499}"/>
               </a:ext>
             </a:extLst>
           </p:cNvPr>
@@ -4571,73 +4745,38 @@
           <p:nvPr/>
         </p:nvPicPr>
         <p:blipFill>
-          <a:blip r:embed="rId20" cstate="print">
+          <a:blip r:embed="rId23" cstate="print">
             <a:extLst>
               <a:ext uri="{28A0092B-C50C-407E-A947-70E740481C1C}">
                 <a14:useLocalDpi xmlns:a14="http://schemas.microsoft.com/office/drawing/2010/main" val="0"/>
               </a:ext>
-              <a:ext uri="{96DAC541-7B7A-43D3-8B79-37D633B846F1}">
-                <asvg:svgBlip xmlns:asvg="http://schemas.microsoft.com/office/drawing/2016/SVG/main" r:embed="rId21"/>
-              </a:ext>
             </a:extLst>
           </a:blip>
+          <a:srcRect/>
           <a:stretch>
             <a:fillRect/>
           </a:stretch>
         </p:blipFill>
-        <p:spPr>
-          <a:xfrm>
-            <a:off x="3901973" y="3559274"/>
-            <a:ext cx="529590" cy="529590"/>
+        <p:spPr bwMode="auto">
+          <a:xfrm>
+            <a:off x="6749616" y="4483017"/>
+            <a:ext cx="514985" cy="514985"/>
           </a:xfrm>
           <a:prstGeom prst="rect">
             <a:avLst/>
           </a:prstGeom>
+          <a:noFill/>
+          <a:ln>
+            <a:noFill/>
+          </a:ln>
         </p:spPr>
       </p:pic>
-      <p:pic>
-        <p:nvPicPr>
-          <p:cNvPr id="29" name="Gráfico 47">
-            <a:extLst>
-              <a:ext uri="{FF2B5EF4-FFF2-40B4-BE49-F238E27FC236}">
-                <a16:creationId xmlns:a16="http://schemas.microsoft.com/office/drawing/2014/main" id="{008590B2-6EF8-49F3-8182-6045AE304616}"/>
-              </a:ext>
-            </a:extLst>
-          </p:cNvPr>
-          <p:cNvPicPr/>
-          <p:nvPr/>
-        </p:nvPicPr>
-        <p:blipFill>
-          <a:blip r:embed="rId17" cstate="print">
-            <a:extLst>
-              <a:ext uri="{28A0092B-C50C-407E-A947-70E740481C1C}">
-                <a14:useLocalDpi xmlns:a14="http://schemas.microsoft.com/office/drawing/2010/main" val="0"/>
-              </a:ext>
-              <a:ext uri="{96DAC541-7B7A-43D3-8B79-37D633B846F1}">
-                <asvg:svgBlip xmlns:asvg="http://schemas.microsoft.com/office/drawing/2016/SVG/main" r:embed="rId18"/>
-              </a:ext>
-            </a:extLst>
-          </a:blip>
-          <a:stretch>
-            <a:fillRect/>
-          </a:stretch>
-        </p:blipFill>
-        <p:spPr>
-          <a:xfrm rot="2566580">
-            <a:off x="4735064" y="3671952"/>
-            <a:ext cx="209550" cy="209550"/>
-          </a:xfrm>
-          <a:prstGeom prst="rect">
-            <a:avLst/>
-          </a:prstGeom>
-        </p:spPr>
-      </p:pic>
-      <p:sp>
-        <p:nvSpPr>
-          <p:cNvPr id="30" name="Caixa de Texto 2">
-            <a:extLst>
-              <a:ext uri="{FF2B5EF4-FFF2-40B4-BE49-F238E27FC236}">
-                <a16:creationId xmlns:a16="http://schemas.microsoft.com/office/drawing/2014/main" id="{F319D67E-56C7-4085-9F31-0A49FF8D9287}"/>
+      <p:sp>
+        <p:nvSpPr>
+          <p:cNvPr id="36" name="Caixa de Texto 2">
+            <a:extLst>
+              <a:ext uri="{FF2B5EF4-FFF2-40B4-BE49-F238E27FC236}">
+                <a16:creationId xmlns:a16="http://schemas.microsoft.com/office/drawing/2014/main" id="{774367AE-5669-406F-8CA4-1568A3B38FDB}"/>
               </a:ext>
             </a:extLst>
           </p:cNvPr>
@@ -4648,7 +4787,7 @@
         </p:nvSpPr>
         <p:spPr bwMode="auto">
           <a:xfrm>
-            <a:off x="3789792" y="4125563"/>
+            <a:off x="6294727" y="4986702"/>
             <a:ext cx="2209800" cy="495300"/>
           </a:xfrm>
           <a:prstGeom prst="rect">
@@ -4693,17 +4832,17 @@
                 <a:ea typeface="Calibri" panose="020F0502020204030204" pitchFamily="34" charset="0"/>
                 <a:cs typeface="Times New Roman" panose="02020603050405020304" pitchFamily="18" charset="0"/>
               </a:rPr>
-              <a:t>Funcionários responsáveis pela manutenção do site</a:t>
-            </a:r>
-          </a:p>
-        </p:txBody>
-      </p:sp>
-      <p:sp>
-        <p:nvSpPr>
-          <p:cNvPr id="32" name="Seta: para a Esquerda e para Cima 31">
-            <a:extLst>
-              <a:ext uri="{FF2B5EF4-FFF2-40B4-BE49-F238E27FC236}">
-                <a16:creationId xmlns:a16="http://schemas.microsoft.com/office/drawing/2014/main" id="{5496BD22-2B19-46CB-B3D7-8289805B0B93}"/>
+              <a:t>Usuário entra em contato com equipe de modificação</a:t>
+            </a:r>
+          </a:p>
+        </p:txBody>
+      </p:sp>
+      <p:sp>
+        <p:nvSpPr>
+          <p:cNvPr id="37" name="Seta: para a Esquerda e para Cima 36">
+            <a:extLst>
+              <a:ext uri="{FF2B5EF4-FFF2-40B4-BE49-F238E27FC236}">
+                <a16:creationId xmlns:a16="http://schemas.microsoft.com/office/drawing/2014/main" id="{655B7F3F-C2DD-43FA-B0F1-E745E3FF16EE}"/>
               </a:ext>
             </a:extLst>
           </p:cNvPr>
@@ -4712,14 +4851,14 @@
         </p:nvSpPr>
         <p:spPr>
           <a:xfrm rot="10800000" flipV="1">
-            <a:off x="4067100" y="3047449"/>
-            <a:ext cx="733547" cy="333639"/>
+            <a:off x="1055263" y="4439156"/>
+            <a:ext cx="1044575" cy="713881"/>
           </a:xfrm>
           <a:prstGeom prst="leftUpArrow">
             <a:avLst>
-              <a:gd name="adj1" fmla="val 19634"/>
-              <a:gd name="adj2" fmla="val 22317"/>
-              <a:gd name="adj3" fmla="val 25000"/>
+              <a:gd name="adj1" fmla="val 13504"/>
+              <a:gd name="adj2" fmla="val 12785"/>
+              <a:gd name="adj3" fmla="val 17815"/>
             </a:avLst>
           </a:prstGeom>
           <a:noFill/>
@@ -4762,10 +4901,10 @@
       </p:sp>
       <p:pic>
         <p:nvPicPr>
-          <p:cNvPr id="34" name="Imagem 33" descr="Forma&#10;&#10;Descrição gerada automaticamente com confiança baixa">
-            <a:extLst>
-              <a:ext uri="{FF2B5EF4-FFF2-40B4-BE49-F238E27FC236}">
-                <a16:creationId xmlns:a16="http://schemas.microsoft.com/office/drawing/2014/main" id="{88524CEA-6175-4B76-97DF-9410EE8F7470}"/>
+          <p:cNvPr id="38" name="Gráfico 46">
+            <a:extLst>
+              <a:ext uri="{FF2B5EF4-FFF2-40B4-BE49-F238E27FC236}">
+                <a16:creationId xmlns:a16="http://schemas.microsoft.com/office/drawing/2014/main" id="{6D90F829-ED32-44E2-A1B5-E5C2E257F4E4}"/>
               </a:ext>
             </a:extLst>
           </p:cNvPr>
@@ -4773,10 +4912,13 @@
           <p:nvPr/>
         </p:nvPicPr>
         <p:blipFill>
-          <a:blip r:embed="rId22" cstate="print">
+          <a:blip r:embed="rId7" cstate="print">
             <a:extLst>
               <a:ext uri="{28A0092B-C50C-407E-A947-70E740481C1C}">
                 <a14:useLocalDpi xmlns:a14="http://schemas.microsoft.com/office/drawing/2010/main" val="0"/>
+              </a:ext>
+              <a:ext uri="{96DAC541-7B7A-43D3-8B79-37D633B846F1}">
+                <asvg:svgBlip xmlns:asvg="http://schemas.microsoft.com/office/drawing/2016/SVG/main" r:embed="rId8"/>
               </a:ext>
             </a:extLst>
           </a:blip>
@@ -4785,126 +4927,21 @@
           </a:stretch>
         </p:blipFill>
         <p:spPr>
-          <a:xfrm rot="20529588">
-            <a:off x="7509554" y="4456170"/>
-            <a:ext cx="519430" cy="519430"/>
+          <a:xfrm>
+            <a:off x="2150565" y="4789614"/>
+            <a:ext cx="581660" cy="615059"/>
           </a:xfrm>
           <a:prstGeom prst="rect">
             <a:avLst/>
           </a:prstGeom>
         </p:spPr>
       </p:pic>
-      <p:pic>
-        <p:nvPicPr>
-          <p:cNvPr id="35" name="Imagem 34">
-            <a:extLst>
-              <a:ext uri="{FF2B5EF4-FFF2-40B4-BE49-F238E27FC236}">
-                <a16:creationId xmlns:a16="http://schemas.microsoft.com/office/drawing/2014/main" id="{082C0DB5-A7DF-4197-A76B-6BB799A05499}"/>
-              </a:ext>
-            </a:extLst>
-          </p:cNvPr>
-          <p:cNvPicPr/>
-          <p:nvPr/>
-        </p:nvPicPr>
-        <p:blipFill>
-          <a:blip r:embed="rId23" cstate="print">
-            <a:extLst>
-              <a:ext uri="{28A0092B-C50C-407E-A947-70E740481C1C}">
-                <a14:useLocalDpi xmlns:a14="http://schemas.microsoft.com/office/drawing/2010/main" val="0"/>
-              </a:ext>
-            </a:extLst>
-          </a:blip>
-          <a:srcRect/>
-          <a:stretch>
-            <a:fillRect/>
-          </a:stretch>
-        </p:blipFill>
-        <p:spPr bwMode="auto">
-          <a:xfrm>
-            <a:off x="6749616" y="4483017"/>
-            <a:ext cx="514985" cy="514985"/>
-          </a:xfrm>
-          <a:prstGeom prst="rect">
-            <a:avLst/>
-          </a:prstGeom>
-          <a:noFill/>
-          <a:ln>
-            <a:noFill/>
-          </a:ln>
-        </p:spPr>
-      </p:pic>
-      <p:sp>
-        <p:nvSpPr>
-          <p:cNvPr id="36" name="Caixa de Texto 2">
-            <a:extLst>
-              <a:ext uri="{FF2B5EF4-FFF2-40B4-BE49-F238E27FC236}">
-                <a16:creationId xmlns:a16="http://schemas.microsoft.com/office/drawing/2014/main" id="{774367AE-5669-406F-8CA4-1568A3B38FDB}"/>
-              </a:ext>
-            </a:extLst>
-          </p:cNvPr>
-          <p:cNvSpPr txBox="1">
-            <a:spLocks noChangeArrowheads="1"/>
-          </p:cNvSpPr>
-          <p:nvPr/>
-        </p:nvSpPr>
-        <p:spPr bwMode="auto">
-          <a:xfrm>
-            <a:off x="6294727" y="4986702"/>
-            <a:ext cx="2209800" cy="495300"/>
-          </a:xfrm>
-          <a:prstGeom prst="rect">
-            <a:avLst/>
-          </a:prstGeom>
-          <a:noFill/>
-          <a:ln>
-            <a:noFill/>
-          </a:ln>
-        </p:spPr>
-        <p:style>
-          <a:lnRef idx="0">
-            <a:scrgbClr r="0" g="0" b="0"/>
-          </a:lnRef>
-          <a:fillRef idx="0">
-            <a:scrgbClr r="0" g="0" b="0"/>
-          </a:fillRef>
-          <a:effectRef idx="0">
-            <a:scrgbClr r="0" g="0" b="0"/>
-          </a:effectRef>
-          <a:fontRef idx="minor">
-            <a:schemeClr val="dk1"/>
-          </a:fontRef>
-        </p:style>
-        <p:txBody>
-          <a:bodyPr rot="0" vert="horz" wrap="square" lIns="91440" tIns="45720" rIns="91440" bIns="45720" anchor="t" anchorCtr="0">
-            <a:noAutofit/>
-          </a:bodyPr>
-          <a:lstStyle/>
-          <a:p>
-            <a:pPr algn="ctr">
-              <a:lnSpc>
-                <a:spcPct val="107000"/>
-              </a:lnSpc>
-              <a:spcAft>
-                <a:spcPts val="800"/>
-              </a:spcAft>
-            </a:pPr>
-            <a:r>
-              <a:rPr lang="pt-BR" sz="1100" dirty="0">
-                <a:effectLst/>
-                <a:ea typeface="Calibri" panose="020F0502020204030204" pitchFamily="34" charset="0"/>
-                <a:cs typeface="Times New Roman" panose="02020603050405020304" pitchFamily="18" charset="0"/>
-              </a:rPr>
-              <a:t>Usuário entra em contato com equipe de modificação</a:t>
-            </a:r>
-          </a:p>
-        </p:txBody>
-      </p:sp>
-      <p:sp>
-        <p:nvSpPr>
-          <p:cNvPr id="37" name="Seta: para a Esquerda e para Cima 36">
-            <a:extLst>
-              <a:ext uri="{FF2B5EF4-FFF2-40B4-BE49-F238E27FC236}">
-                <a16:creationId xmlns:a16="http://schemas.microsoft.com/office/drawing/2014/main" id="{655B7F3F-C2DD-43FA-B0F1-E745E3FF16EE}"/>
+      <p:sp>
+        <p:nvSpPr>
+          <p:cNvPr id="39" name="Seta: para a Esquerda e para Cima 38">
+            <a:extLst>
+              <a:ext uri="{FF2B5EF4-FFF2-40B4-BE49-F238E27FC236}">
+                <a16:creationId xmlns:a16="http://schemas.microsoft.com/office/drawing/2014/main" id="{D130859D-B541-43FC-94EB-E56B6379F44B}"/>
               </a:ext>
             </a:extLst>
           </p:cNvPr>
@@ -4912,15 +4949,15 @@
           <p:nvPr/>
         </p:nvSpPr>
         <p:spPr>
-          <a:xfrm rot="10800000" flipV="1">
-            <a:off x="1055263" y="4439156"/>
-            <a:ext cx="1044575" cy="713881"/>
+          <a:xfrm flipV="1">
+            <a:off x="8273937" y="4632971"/>
+            <a:ext cx="2209799" cy="550543"/>
           </a:xfrm>
           <a:prstGeom prst="leftUpArrow">
             <a:avLst>
-              <a:gd name="adj1" fmla="val 13504"/>
-              <a:gd name="adj2" fmla="val 12785"/>
-              <a:gd name="adj3" fmla="val 17815"/>
+              <a:gd name="adj1" fmla="val 14158"/>
+              <a:gd name="adj2" fmla="val 14158"/>
+              <a:gd name="adj3" fmla="val 14895"/>
             </a:avLst>
           </a:prstGeom>
           <a:noFill/>
@@ -4963,10 +5000,10 @@
       </p:sp>
       <p:pic>
         <p:nvPicPr>
-          <p:cNvPr id="38" name="Gráfico 46">
-            <a:extLst>
-              <a:ext uri="{FF2B5EF4-FFF2-40B4-BE49-F238E27FC236}">
-                <a16:creationId xmlns:a16="http://schemas.microsoft.com/office/drawing/2014/main" id="{6D90F829-ED32-44E2-A1B5-E5C2E257F4E4}"/>
+          <p:cNvPr id="42" name="Imagem 41">
+            <a:extLst>
+              <a:ext uri="{FF2B5EF4-FFF2-40B4-BE49-F238E27FC236}">
+                <a16:creationId xmlns:a16="http://schemas.microsoft.com/office/drawing/2014/main" id="{2694F079-673D-4DD2-B88B-701F413495CC}"/>
               </a:ext>
             </a:extLst>
           </p:cNvPr>
@@ -4974,53 +5011,195 @@
           <p:nvPr/>
         </p:nvPicPr>
         <p:blipFill>
-          <a:blip r:embed="rId7" cstate="print">
+          <a:blip r:embed="rId24" cstate="print">
             <a:extLst>
               <a:ext uri="{28A0092B-C50C-407E-A947-70E740481C1C}">
                 <a14:useLocalDpi xmlns:a14="http://schemas.microsoft.com/office/drawing/2010/main" val="0"/>
               </a:ext>
-              <a:ext uri="{96DAC541-7B7A-43D3-8B79-37D633B846F1}">
-                <asvg:svgBlip xmlns:asvg="http://schemas.microsoft.com/office/drawing/2016/SVG/main" r:embed="rId8"/>
-              </a:ext>
             </a:extLst>
           </a:blip>
+          <a:srcRect/>
           <a:stretch>
             <a:fillRect/>
           </a:stretch>
         </p:blipFill>
+        <p:spPr bwMode="auto">
+          <a:xfrm>
+            <a:off x="10589649" y="5192644"/>
+            <a:ext cx="550545" cy="550546"/>
+          </a:xfrm>
+          <a:prstGeom prst="rect">
+            <a:avLst/>
+          </a:prstGeom>
+          <a:noFill/>
+          <a:ln>
+            <a:noFill/>
+          </a:ln>
+        </p:spPr>
+      </p:pic>
+      <p:pic>
+        <p:nvPicPr>
+          <p:cNvPr id="43" name="Imagem 42">
+            <a:extLst>
+              <a:ext uri="{FF2B5EF4-FFF2-40B4-BE49-F238E27FC236}">
+                <a16:creationId xmlns:a16="http://schemas.microsoft.com/office/drawing/2014/main" id="{EA433D55-F576-4799-B237-66C620CDC551}"/>
+              </a:ext>
+            </a:extLst>
+          </p:cNvPr>
+          <p:cNvPicPr/>
+          <p:nvPr/>
+        </p:nvPicPr>
+        <p:blipFill>
+          <a:blip r:embed="rId25" cstate="print">
+            <a:extLst>
+              <a:ext uri="{28A0092B-C50C-407E-A947-70E740481C1C}">
+                <a14:useLocalDpi xmlns:a14="http://schemas.microsoft.com/office/drawing/2010/main" val="0"/>
+              </a:ext>
+            </a:extLst>
+          </a:blip>
+          <a:srcRect/>
+          <a:stretch>
+            <a:fillRect/>
+          </a:stretch>
+        </p:blipFill>
+        <p:spPr bwMode="auto">
+          <a:xfrm>
+            <a:off x="9721990" y="5206729"/>
+            <a:ext cx="550545" cy="550545"/>
+          </a:xfrm>
+          <a:prstGeom prst="rect">
+            <a:avLst/>
+          </a:prstGeom>
+          <a:noFill/>
+          <a:ln>
+            <a:noFill/>
+          </a:ln>
+        </p:spPr>
+      </p:pic>
+      <p:sp>
+        <p:nvSpPr>
+          <p:cNvPr id="44" name="Caixa de Texto 2">
+            <a:extLst>
+              <a:ext uri="{FF2B5EF4-FFF2-40B4-BE49-F238E27FC236}">
+                <a16:creationId xmlns:a16="http://schemas.microsoft.com/office/drawing/2014/main" id="{5D84FF84-1521-40BB-9439-EA49F642FDA8}"/>
+              </a:ext>
+            </a:extLst>
+          </p:cNvPr>
+          <p:cNvSpPr txBox="1">
+            <a:spLocks noChangeArrowheads="1"/>
+          </p:cNvSpPr>
+          <p:nvPr/>
+        </p:nvSpPr>
+        <p:spPr bwMode="auto">
+          <a:xfrm>
+            <a:off x="9378836" y="5799315"/>
+            <a:ext cx="2103120" cy="509905"/>
+          </a:xfrm>
+          <a:prstGeom prst="rect">
+            <a:avLst/>
+          </a:prstGeom>
+          <a:noFill/>
+          <a:ln>
+            <a:noFill/>
+          </a:ln>
+        </p:spPr>
+        <p:style>
+          <a:lnRef idx="0">
+            <a:scrgbClr r="0" g="0" b="0"/>
+          </a:lnRef>
+          <a:fillRef idx="0">
+            <a:scrgbClr r="0" g="0" b="0"/>
+          </a:fillRef>
+          <a:effectRef idx="0">
+            <a:scrgbClr r="0" g="0" b="0"/>
+          </a:effectRef>
+          <a:fontRef idx="minor">
+            <a:schemeClr val="dk1"/>
+          </a:fontRef>
+        </p:style>
+        <p:txBody>
+          <a:bodyPr rot="0" vert="horz" wrap="square" lIns="91440" tIns="45720" rIns="91440" bIns="45720" anchor="t" anchorCtr="0">
+            <a:noAutofit/>
+          </a:bodyPr>
+          <a:lstStyle/>
+          <a:p>
+            <a:pPr algn="ctr">
+              <a:lnSpc>
+                <a:spcPct val="107000"/>
+              </a:lnSpc>
+              <a:spcAft>
+                <a:spcPts val="800"/>
+              </a:spcAft>
+            </a:pPr>
+            <a:r>
+              <a:rPr lang="pt-BR" sz="1100" dirty="0">
+                <a:effectLst/>
+                <a:ea typeface="Calibri" panose="020F0502020204030204" pitchFamily="34" charset="0"/>
+                <a:cs typeface="Times New Roman" panose="02020603050405020304" pitchFamily="18" charset="0"/>
+              </a:rPr>
+              <a:t>Reunião para decidir como e o que o cliente deseja modificar</a:t>
+            </a:r>
+          </a:p>
+        </p:txBody>
+      </p:sp>
+      <p:pic>
+        <p:nvPicPr>
+          <p:cNvPr id="45" name="Imagem 44">
+            <a:extLst>
+              <a:ext uri="{FF2B5EF4-FFF2-40B4-BE49-F238E27FC236}">
+                <a16:creationId xmlns:a16="http://schemas.microsoft.com/office/drawing/2014/main" id="{A2C4E18C-61E3-4D26-93D8-42B61FB55518}"/>
+              </a:ext>
+            </a:extLst>
+          </p:cNvPr>
+          <p:cNvPicPr/>
+          <p:nvPr/>
+        </p:nvPicPr>
+        <p:blipFill>
+          <a:blip r:embed="rId26" cstate="print">
+            <a:extLst>
+              <a:ext uri="{28A0092B-C50C-407E-A947-70E740481C1C}">
+                <a14:useLocalDpi xmlns:a14="http://schemas.microsoft.com/office/drawing/2010/main" val="0"/>
+              </a:ext>
+            </a:extLst>
+          </a:blip>
+          <a:srcRect/>
+          <a:stretch>
+            <a:fillRect/>
+          </a:stretch>
+        </p:blipFill>
+        <p:spPr bwMode="auto">
+          <a:xfrm>
+            <a:off x="9020950" y="4082427"/>
+            <a:ext cx="701040" cy="701040"/>
+          </a:xfrm>
+          <a:prstGeom prst="rect">
+            <a:avLst/>
+          </a:prstGeom>
+          <a:noFill/>
+          <a:ln>
+            <a:noFill/>
+          </a:ln>
+        </p:spPr>
+      </p:pic>
+      <p:sp>
+        <p:nvSpPr>
+          <p:cNvPr id="47" name="Seta: da Esquerda para a Direita 46">
+            <a:extLst>
+              <a:ext uri="{FF2B5EF4-FFF2-40B4-BE49-F238E27FC236}">
+                <a16:creationId xmlns:a16="http://schemas.microsoft.com/office/drawing/2014/main" id="{B1703C86-63DD-4526-A5F5-0CD40DDC32C8}"/>
+              </a:ext>
+            </a:extLst>
+          </p:cNvPr>
+          <p:cNvSpPr/>
+          <p:nvPr/>
+        </p:nvSpPr>
         <p:spPr>
           <a:xfrm>
-            <a:off x="2150565" y="4789614"/>
-            <a:ext cx="581660" cy="615059"/>
-          </a:xfrm>
-          <a:prstGeom prst="rect">
-            <a:avLst/>
-          </a:prstGeom>
-        </p:spPr>
-      </p:pic>
-      <p:sp>
-        <p:nvSpPr>
-          <p:cNvPr id="39" name="Seta: para a Esquerda e para Cima 38">
-            <a:extLst>
-              <a:ext uri="{FF2B5EF4-FFF2-40B4-BE49-F238E27FC236}">
-                <a16:creationId xmlns:a16="http://schemas.microsoft.com/office/drawing/2014/main" id="{D130859D-B541-43FC-94EB-E56B6379F44B}"/>
-              </a:ext>
-            </a:extLst>
-          </p:cNvPr>
-          <p:cNvSpPr/>
-          <p:nvPr/>
-        </p:nvSpPr>
-        <p:spPr>
-          <a:xfrm flipV="1">
-            <a:off x="8273937" y="4632971"/>
-            <a:ext cx="2209799" cy="550543"/>
-          </a:xfrm>
-          <a:prstGeom prst="leftUpArrow">
-            <a:avLst>
-              <a:gd name="adj1" fmla="val 14158"/>
-              <a:gd name="adj2" fmla="val 14158"/>
-              <a:gd name="adj3" fmla="val 14895"/>
-            </a:avLst>
+            <a:off x="2732225" y="4974904"/>
+            <a:ext cx="3659040" cy="183515"/>
+          </a:xfrm>
+          <a:prstGeom prst="leftRightArrow">
+            <a:avLst/>
           </a:prstGeom>
           <a:noFill/>
           <a:ln w="9525" cap="flat" cmpd="sng" algn="ctr">
@@ -5062,10 +5241,10 @@
       </p:sp>
       <p:pic>
         <p:nvPicPr>
-          <p:cNvPr id="42" name="Imagem 41">
-            <a:extLst>
-              <a:ext uri="{FF2B5EF4-FFF2-40B4-BE49-F238E27FC236}">
-                <a16:creationId xmlns:a16="http://schemas.microsoft.com/office/drawing/2014/main" id="{2694F079-673D-4DD2-B88B-701F413495CC}"/>
+          <p:cNvPr id="48" name="Imagem 47">
+            <a:extLst>
+              <a:ext uri="{FF2B5EF4-FFF2-40B4-BE49-F238E27FC236}">
+                <a16:creationId xmlns:a16="http://schemas.microsoft.com/office/drawing/2014/main" id="{8148F385-5076-46DA-9B5F-A1C363797481}"/>
               </a:ext>
             </a:extLst>
           </p:cNvPr>
@@ -5073,7 +5252,7 @@
           <p:nvPr/>
         </p:nvPicPr>
         <p:blipFill>
-          <a:blip r:embed="rId24" cstate="print">
+          <a:blip r:embed="rId27" cstate="print">
             <a:extLst>
               <a:ext uri="{28A0092B-C50C-407E-A947-70E740481C1C}">
                 <a14:useLocalDpi xmlns:a14="http://schemas.microsoft.com/office/drawing/2010/main" val="0"/>
@@ -5087,8 +5266,8 @@
         </p:blipFill>
         <p:spPr bwMode="auto">
           <a:xfrm>
-            <a:off x="10589649" y="5192644"/>
-            <a:ext cx="550545" cy="550546"/>
+            <a:off x="8135223" y="2698907"/>
+            <a:ext cx="1199515" cy="520065"/>
           </a:xfrm>
           <a:prstGeom prst="rect">
             <a:avLst/>
@@ -5101,10 +5280,10 @@
       </p:pic>
       <p:pic>
         <p:nvPicPr>
-          <p:cNvPr id="43" name="Imagem 42">
-            <a:extLst>
-              <a:ext uri="{FF2B5EF4-FFF2-40B4-BE49-F238E27FC236}">
-                <a16:creationId xmlns:a16="http://schemas.microsoft.com/office/drawing/2014/main" id="{EA433D55-F576-4799-B237-66C620CDC551}"/>
+          <p:cNvPr id="50" name="Imagem 49">
+            <a:extLst>
+              <a:ext uri="{FF2B5EF4-FFF2-40B4-BE49-F238E27FC236}">
+                <a16:creationId xmlns:a16="http://schemas.microsoft.com/office/drawing/2014/main" id="{51523602-2DDD-49EC-A2C8-258A1322A2D5}"/>
               </a:ext>
             </a:extLst>
           </p:cNvPr>
@@ -5112,7 +5291,7 @@
           <p:nvPr/>
         </p:nvPicPr>
         <p:blipFill>
-          <a:blip r:embed="rId25" cstate="print">
+          <a:blip r:embed="rId28" cstate="print">
             <a:extLst>
               <a:ext uri="{28A0092B-C50C-407E-A947-70E740481C1C}">
                 <a14:useLocalDpi xmlns:a14="http://schemas.microsoft.com/office/drawing/2010/main" val="0"/>
@@ -5126,8 +5305,8 @@
         </p:blipFill>
         <p:spPr bwMode="auto">
           <a:xfrm>
-            <a:off x="9721990" y="5206729"/>
-            <a:ext cx="550545" cy="550545"/>
+            <a:off x="6410947" y="5743190"/>
+            <a:ext cx="626745" cy="626745"/>
           </a:xfrm>
           <a:prstGeom prst="rect">
             <a:avLst/>
@@ -5140,10 +5319,10 @@
       </p:pic>
       <p:sp>
         <p:nvSpPr>
-          <p:cNvPr id="44" name="Caixa de Texto 2">
-            <a:extLst>
-              <a:ext uri="{FF2B5EF4-FFF2-40B4-BE49-F238E27FC236}">
-                <a16:creationId xmlns:a16="http://schemas.microsoft.com/office/drawing/2014/main" id="{5D84FF84-1521-40BB-9439-EA49F642FDA8}"/>
+          <p:cNvPr id="51" name="Caixa de Texto 2">
+            <a:extLst>
+              <a:ext uri="{FF2B5EF4-FFF2-40B4-BE49-F238E27FC236}">
+                <a16:creationId xmlns:a16="http://schemas.microsoft.com/office/drawing/2014/main" id="{D350F5E3-A9CB-4858-95CC-B400E65FAE75}"/>
               </a:ext>
             </a:extLst>
           </p:cNvPr>
@@ -5154,8 +5333,8 @@
         </p:nvSpPr>
         <p:spPr bwMode="auto">
           <a:xfrm>
-            <a:off x="9378836" y="5799315"/>
-            <a:ext cx="2103120" cy="509905"/>
+            <a:off x="6193661" y="6323367"/>
+            <a:ext cx="1125902" cy="382270"/>
           </a:xfrm>
           <a:prstGeom prst="rect">
             <a:avLst/>
@@ -5199,17 +5378,17 @@
                 <a:ea typeface="Calibri" panose="020F0502020204030204" pitchFamily="34" charset="0"/>
                 <a:cs typeface="Times New Roman" panose="02020603050405020304" pitchFamily="18" charset="0"/>
               </a:rPr>
-              <a:t>Reunião para decidir como e o que o cliente deseja modificar</a:t>
+              <a:t>Mecânica</a:t>
             </a:r>
           </a:p>
         </p:txBody>
       </p:sp>
       <p:pic>
         <p:nvPicPr>
-          <p:cNvPr id="45" name="Imagem 44">
-            <a:extLst>
-              <a:ext uri="{FF2B5EF4-FFF2-40B4-BE49-F238E27FC236}">
-                <a16:creationId xmlns:a16="http://schemas.microsoft.com/office/drawing/2014/main" id="{A2C4E18C-61E3-4D26-93D8-42B61FB55518}"/>
+          <p:cNvPr id="56" name="Imagem 55">
+            <a:extLst>
+              <a:ext uri="{FF2B5EF4-FFF2-40B4-BE49-F238E27FC236}">
+                <a16:creationId xmlns:a16="http://schemas.microsoft.com/office/drawing/2014/main" id="{C7C4B593-0DDA-4F8C-9381-B08EC987864F}"/>
               </a:ext>
             </a:extLst>
           </p:cNvPr>
@@ -5217,7 +5396,7 @@
           <p:nvPr/>
         </p:nvPicPr>
         <p:blipFill>
-          <a:blip r:embed="rId26" cstate="print">
+          <a:blip r:embed="rId29" cstate="print">
             <a:extLst>
               <a:ext uri="{28A0092B-C50C-407E-A947-70E740481C1C}">
                 <a14:useLocalDpi xmlns:a14="http://schemas.microsoft.com/office/drawing/2010/main" val="0"/>
@@ -5231,8 +5410,8 @@
         </p:blipFill>
         <p:spPr bwMode="auto">
           <a:xfrm>
-            <a:off x="9020950" y="4082427"/>
-            <a:ext cx="701040" cy="701040"/>
+            <a:off x="7913708" y="5821074"/>
+            <a:ext cx="520065" cy="520065"/>
           </a:xfrm>
           <a:prstGeom prst="rect">
             <a:avLst/>
@@ -5245,10 +5424,176 @@
       </p:pic>
       <p:sp>
         <p:nvSpPr>
-          <p:cNvPr id="47" name="Seta: da Esquerda para a Direita 46">
-            <a:extLst>
-              <a:ext uri="{FF2B5EF4-FFF2-40B4-BE49-F238E27FC236}">
-                <a16:creationId xmlns:a16="http://schemas.microsoft.com/office/drawing/2014/main" id="{B1703C86-63DD-4526-A5F5-0CD40DDC32C8}"/>
+          <p:cNvPr id="57" name="Caixa de Texto 2">
+            <a:extLst>
+              <a:ext uri="{FF2B5EF4-FFF2-40B4-BE49-F238E27FC236}">
+                <a16:creationId xmlns:a16="http://schemas.microsoft.com/office/drawing/2014/main" id="{9920C27E-6D88-413C-A431-7593E507BBCC}"/>
+              </a:ext>
+            </a:extLst>
+          </p:cNvPr>
+          <p:cNvSpPr txBox="1">
+            <a:spLocks noChangeArrowheads="1"/>
+          </p:cNvSpPr>
+          <p:nvPr/>
+        </p:nvSpPr>
+        <p:spPr bwMode="auto">
+          <a:xfrm>
+            <a:off x="7259011" y="6334162"/>
+            <a:ext cx="1674103" cy="371475"/>
+          </a:xfrm>
+          <a:prstGeom prst="rect">
+            <a:avLst/>
+          </a:prstGeom>
+          <a:noFill/>
+          <a:ln>
+            <a:noFill/>
+          </a:ln>
+        </p:spPr>
+        <p:style>
+          <a:lnRef idx="0">
+            <a:scrgbClr r="0" g="0" b="0"/>
+          </a:lnRef>
+          <a:fillRef idx="0">
+            <a:scrgbClr r="0" g="0" b="0"/>
+          </a:fillRef>
+          <a:effectRef idx="0">
+            <a:scrgbClr r="0" g="0" b="0"/>
+          </a:effectRef>
+          <a:fontRef idx="minor">
+            <a:schemeClr val="dk1"/>
+          </a:fontRef>
+        </p:style>
+        <p:txBody>
+          <a:bodyPr rot="0" vert="horz" wrap="square" lIns="91440" tIns="45720" rIns="91440" bIns="45720" anchor="t" anchorCtr="0">
+            <a:noAutofit/>
+          </a:bodyPr>
+          <a:lstStyle/>
+          <a:p>
+            <a:pPr algn="ctr">
+              <a:lnSpc>
+                <a:spcPct val="107000"/>
+              </a:lnSpc>
+              <a:spcAft>
+                <a:spcPts val="800"/>
+              </a:spcAft>
+            </a:pPr>
+            <a:r>
+              <a:rPr lang="pt-BR" sz="1100" dirty="0">
+                <a:effectLst/>
+                <a:ea typeface="Calibri" panose="020F0502020204030204" pitchFamily="34" charset="0"/>
+                <a:cs typeface="Times New Roman" panose="02020603050405020304" pitchFamily="18" charset="0"/>
+              </a:rPr>
+              <a:t>Oficina de pintura</a:t>
+            </a:r>
+          </a:p>
+        </p:txBody>
+      </p:sp>
+      <p:pic>
+        <p:nvPicPr>
+          <p:cNvPr id="63" name="Imagem 62" descr="Forma&#10;&#10;Descrição gerada automaticamente com confiança baixa">
+            <a:extLst>
+              <a:ext uri="{FF2B5EF4-FFF2-40B4-BE49-F238E27FC236}">
+                <a16:creationId xmlns:a16="http://schemas.microsoft.com/office/drawing/2014/main" id="{004C6537-F452-4B3D-9EB1-28D872B4A0D0}"/>
+              </a:ext>
+            </a:extLst>
+          </p:cNvPr>
+          <p:cNvPicPr/>
+          <p:nvPr/>
+        </p:nvPicPr>
+        <p:blipFill>
+          <a:blip r:embed="rId30" cstate="print">
+            <a:extLst>
+              <a:ext uri="{28A0092B-C50C-407E-A947-70E740481C1C}">
+                <a14:useLocalDpi xmlns:a14="http://schemas.microsoft.com/office/drawing/2010/main" val="0"/>
+              </a:ext>
+            </a:extLst>
+          </a:blip>
+          <a:stretch>
+            <a:fillRect/>
+          </a:stretch>
+        </p:blipFill>
+        <p:spPr>
+          <a:xfrm>
+            <a:off x="10108038" y="2666399"/>
+            <a:ext cx="508635" cy="508635"/>
+          </a:xfrm>
+          <a:prstGeom prst="rect">
+            <a:avLst/>
+          </a:prstGeom>
+        </p:spPr>
+      </p:pic>
+      <p:sp>
+        <p:nvSpPr>
+          <p:cNvPr id="64" name="Caixa de Texto 2">
+            <a:extLst>
+              <a:ext uri="{FF2B5EF4-FFF2-40B4-BE49-F238E27FC236}">
+                <a16:creationId xmlns:a16="http://schemas.microsoft.com/office/drawing/2014/main" id="{05AF41CD-90DD-4208-8A18-239281707FDB}"/>
+              </a:ext>
+            </a:extLst>
+          </p:cNvPr>
+          <p:cNvSpPr txBox="1">
+            <a:spLocks noChangeArrowheads="1"/>
+          </p:cNvSpPr>
+          <p:nvPr/>
+        </p:nvSpPr>
+        <p:spPr bwMode="auto">
+          <a:xfrm>
+            <a:off x="9257456" y="3190430"/>
+            <a:ext cx="2209800" cy="382270"/>
+          </a:xfrm>
+          <a:prstGeom prst="rect">
+            <a:avLst/>
+          </a:prstGeom>
+          <a:noFill/>
+          <a:ln>
+            <a:noFill/>
+          </a:ln>
+        </p:spPr>
+        <p:style>
+          <a:lnRef idx="0">
+            <a:scrgbClr r="0" g="0" b="0"/>
+          </a:lnRef>
+          <a:fillRef idx="0">
+            <a:scrgbClr r="0" g="0" b="0"/>
+          </a:fillRef>
+          <a:effectRef idx="0">
+            <a:scrgbClr r="0" g="0" b="0"/>
+          </a:effectRef>
+          <a:fontRef idx="minor">
+            <a:schemeClr val="dk1"/>
+          </a:fontRef>
+        </p:style>
+        <p:txBody>
+          <a:bodyPr rot="0" vert="horz" wrap="square" lIns="91440" tIns="45720" rIns="91440" bIns="45720" anchor="t" anchorCtr="0">
+            <a:noAutofit/>
+          </a:bodyPr>
+          <a:lstStyle/>
+          <a:p>
+            <a:pPr algn="ctr">
+              <a:lnSpc>
+                <a:spcPct val="107000"/>
+              </a:lnSpc>
+              <a:spcAft>
+                <a:spcPts val="800"/>
+              </a:spcAft>
+            </a:pPr>
+            <a:r>
+              <a:rPr lang="pt-BR" sz="1100" dirty="0">
+                <a:effectLst/>
+                <a:ea typeface="Calibri" panose="020F0502020204030204" pitchFamily="34" charset="0"/>
+                <a:cs typeface="Times New Roman" panose="02020603050405020304" pitchFamily="18" charset="0"/>
+              </a:rPr>
+              <a:t>Cliente satisfeito</a:t>
+            </a:r>
+          </a:p>
+        </p:txBody>
+      </p:sp>
+      <p:sp>
+        <p:nvSpPr>
+          <p:cNvPr id="53" name="Seta: para a Esquerda e para Cima 52">
+            <a:extLst>
+              <a:ext uri="{FF2B5EF4-FFF2-40B4-BE49-F238E27FC236}">
+                <a16:creationId xmlns:a16="http://schemas.microsoft.com/office/drawing/2014/main" id="{19361BCE-4905-4A83-B10F-355170D0BD2E}"/>
               </a:ext>
             </a:extLst>
           </p:cNvPr>
@@ -5256,11 +5601,11 @@
           <p:nvPr/>
         </p:nvSpPr>
         <p:spPr>
-          <a:xfrm>
-            <a:off x="2732225" y="4974904"/>
-            <a:ext cx="3659040" cy="183515"/>
-          </a:xfrm>
-          <a:prstGeom prst="leftRightArrow">
+          <a:xfrm rot="16200000">
+            <a:off x="6336593" y="3534085"/>
+            <a:ext cx="391934" cy="1223302"/>
+          </a:xfrm>
+          <a:prstGeom prst="leftUpArrow">
             <a:avLst/>
           </a:prstGeom>
           <a:noFill/>
@@ -5301,373 +5646,24 @@
           </a:p>
         </p:txBody>
       </p:sp>
-      <p:pic>
-        <p:nvPicPr>
-          <p:cNvPr id="48" name="Imagem 47">
-            <a:extLst>
-              <a:ext uri="{FF2B5EF4-FFF2-40B4-BE49-F238E27FC236}">
-                <a16:creationId xmlns:a16="http://schemas.microsoft.com/office/drawing/2014/main" id="{8148F385-5076-46DA-9B5F-A1C363797481}"/>
-              </a:ext>
-            </a:extLst>
-          </p:cNvPr>
-          <p:cNvPicPr/>
-          <p:nvPr/>
-        </p:nvPicPr>
-        <p:blipFill>
-          <a:blip r:embed="rId27" cstate="print">
-            <a:extLst>
-              <a:ext uri="{28A0092B-C50C-407E-A947-70E740481C1C}">
-                <a14:useLocalDpi xmlns:a14="http://schemas.microsoft.com/office/drawing/2010/main" val="0"/>
-              </a:ext>
-            </a:extLst>
-          </a:blip>
-          <a:srcRect/>
-          <a:stretch>
-            <a:fillRect/>
-          </a:stretch>
-        </p:blipFill>
-        <p:spPr bwMode="auto">
-          <a:xfrm>
-            <a:off x="8135223" y="2698907"/>
-            <a:ext cx="1199515" cy="520065"/>
-          </a:xfrm>
-          <a:prstGeom prst="rect">
-            <a:avLst/>
-          </a:prstGeom>
-          <a:noFill/>
-          <a:ln>
-            <a:noFill/>
-          </a:ln>
-        </p:spPr>
-      </p:pic>
-      <p:pic>
-        <p:nvPicPr>
-          <p:cNvPr id="50" name="Imagem 49">
-            <a:extLst>
-              <a:ext uri="{FF2B5EF4-FFF2-40B4-BE49-F238E27FC236}">
-                <a16:creationId xmlns:a16="http://schemas.microsoft.com/office/drawing/2014/main" id="{51523602-2DDD-49EC-A2C8-258A1322A2D5}"/>
-              </a:ext>
-            </a:extLst>
-          </p:cNvPr>
-          <p:cNvPicPr/>
-          <p:nvPr/>
-        </p:nvPicPr>
-        <p:blipFill>
-          <a:blip r:embed="rId28" cstate="print">
-            <a:extLst>
-              <a:ext uri="{28A0092B-C50C-407E-A947-70E740481C1C}">
-                <a14:useLocalDpi xmlns:a14="http://schemas.microsoft.com/office/drawing/2010/main" val="0"/>
-              </a:ext>
-            </a:extLst>
-          </a:blip>
-          <a:srcRect/>
-          <a:stretch>
-            <a:fillRect/>
-          </a:stretch>
-        </p:blipFill>
-        <p:spPr bwMode="auto">
-          <a:xfrm>
-            <a:off x="6410947" y="5743190"/>
-            <a:ext cx="626745" cy="626745"/>
-          </a:xfrm>
-          <a:prstGeom prst="rect">
-            <a:avLst/>
-          </a:prstGeom>
-          <a:noFill/>
-          <a:ln>
-            <a:noFill/>
-          </a:ln>
-        </p:spPr>
-      </p:pic>
-      <p:sp>
-        <p:nvSpPr>
-          <p:cNvPr id="51" name="Caixa de Texto 2">
-            <a:extLst>
-              <a:ext uri="{FF2B5EF4-FFF2-40B4-BE49-F238E27FC236}">
-                <a16:creationId xmlns:a16="http://schemas.microsoft.com/office/drawing/2014/main" id="{D350F5E3-A9CB-4858-95CC-B400E65FAE75}"/>
-              </a:ext>
-            </a:extLst>
-          </p:cNvPr>
-          <p:cNvSpPr txBox="1">
-            <a:spLocks noChangeArrowheads="1"/>
-          </p:cNvSpPr>
-          <p:nvPr/>
-        </p:nvSpPr>
-        <p:spPr bwMode="auto">
-          <a:xfrm>
-            <a:off x="6193661" y="6323367"/>
-            <a:ext cx="1125902" cy="382270"/>
-          </a:xfrm>
-          <a:prstGeom prst="rect">
-            <a:avLst/>
-          </a:prstGeom>
-          <a:noFill/>
-          <a:ln>
-            <a:noFill/>
-          </a:ln>
-        </p:spPr>
-        <p:style>
-          <a:lnRef idx="0">
-            <a:scrgbClr r="0" g="0" b="0"/>
-          </a:lnRef>
-          <a:fillRef idx="0">
-            <a:scrgbClr r="0" g="0" b="0"/>
-          </a:fillRef>
-          <a:effectRef idx="0">
-            <a:scrgbClr r="0" g="0" b="0"/>
-          </a:effectRef>
-          <a:fontRef idx="minor">
-            <a:schemeClr val="dk1"/>
-          </a:fontRef>
-        </p:style>
-        <p:txBody>
-          <a:bodyPr rot="0" vert="horz" wrap="square" lIns="91440" tIns="45720" rIns="91440" bIns="45720" anchor="t" anchorCtr="0">
-            <a:noAutofit/>
-          </a:bodyPr>
-          <a:lstStyle/>
-          <a:p>
-            <a:pPr algn="ctr">
-              <a:lnSpc>
-                <a:spcPct val="107000"/>
-              </a:lnSpc>
-              <a:spcAft>
-                <a:spcPts val="800"/>
-              </a:spcAft>
-            </a:pPr>
-            <a:r>
-              <a:rPr lang="pt-BR" sz="1100" dirty="0">
-                <a:effectLst/>
-                <a:ea typeface="Calibri" panose="020F0502020204030204" pitchFamily="34" charset="0"/>
-                <a:cs typeface="Times New Roman" panose="02020603050405020304" pitchFamily="18" charset="0"/>
-              </a:rPr>
-              <a:t>Mecânica</a:t>
-            </a:r>
-          </a:p>
-        </p:txBody>
-      </p:sp>
-      <p:pic>
-        <p:nvPicPr>
-          <p:cNvPr id="56" name="Imagem 55">
-            <a:extLst>
-              <a:ext uri="{FF2B5EF4-FFF2-40B4-BE49-F238E27FC236}">
-                <a16:creationId xmlns:a16="http://schemas.microsoft.com/office/drawing/2014/main" id="{C7C4B593-0DDA-4F8C-9381-B08EC987864F}"/>
-              </a:ext>
-            </a:extLst>
-          </p:cNvPr>
-          <p:cNvPicPr/>
-          <p:nvPr/>
-        </p:nvPicPr>
-        <p:blipFill>
-          <a:blip r:embed="rId29" cstate="print">
-            <a:extLst>
-              <a:ext uri="{28A0092B-C50C-407E-A947-70E740481C1C}">
-                <a14:useLocalDpi xmlns:a14="http://schemas.microsoft.com/office/drawing/2010/main" val="0"/>
-              </a:ext>
-            </a:extLst>
-          </a:blip>
-          <a:srcRect/>
-          <a:stretch>
-            <a:fillRect/>
-          </a:stretch>
-        </p:blipFill>
-        <p:spPr bwMode="auto">
-          <a:xfrm>
-            <a:off x="7913708" y="5821074"/>
-            <a:ext cx="520065" cy="520065"/>
-          </a:xfrm>
-          <a:prstGeom prst="rect">
-            <a:avLst/>
-          </a:prstGeom>
-          <a:noFill/>
-          <a:ln>
-            <a:noFill/>
-          </a:ln>
-        </p:spPr>
-      </p:pic>
-      <p:sp>
-        <p:nvSpPr>
-          <p:cNvPr id="57" name="Caixa de Texto 2">
-            <a:extLst>
-              <a:ext uri="{FF2B5EF4-FFF2-40B4-BE49-F238E27FC236}">
-                <a16:creationId xmlns:a16="http://schemas.microsoft.com/office/drawing/2014/main" id="{9920C27E-6D88-413C-A431-7593E507BBCC}"/>
-              </a:ext>
-            </a:extLst>
-          </p:cNvPr>
-          <p:cNvSpPr txBox="1">
-            <a:spLocks noChangeArrowheads="1"/>
-          </p:cNvSpPr>
-          <p:nvPr/>
-        </p:nvSpPr>
-        <p:spPr bwMode="auto">
-          <a:xfrm>
-            <a:off x="7259011" y="6334162"/>
-            <a:ext cx="1674103" cy="371475"/>
-          </a:xfrm>
-          <a:prstGeom prst="rect">
-            <a:avLst/>
-          </a:prstGeom>
-          <a:noFill/>
-          <a:ln>
-            <a:noFill/>
-          </a:ln>
-        </p:spPr>
-        <p:style>
-          <a:lnRef idx="0">
-            <a:scrgbClr r="0" g="0" b="0"/>
-          </a:lnRef>
-          <a:fillRef idx="0">
-            <a:scrgbClr r="0" g="0" b="0"/>
-          </a:fillRef>
-          <a:effectRef idx="0">
-            <a:scrgbClr r="0" g="0" b="0"/>
-          </a:effectRef>
-          <a:fontRef idx="minor">
-            <a:schemeClr val="dk1"/>
-          </a:fontRef>
-        </p:style>
-        <p:txBody>
-          <a:bodyPr rot="0" vert="horz" wrap="square" lIns="91440" tIns="45720" rIns="91440" bIns="45720" anchor="t" anchorCtr="0">
-            <a:noAutofit/>
-          </a:bodyPr>
-          <a:lstStyle/>
-          <a:p>
-            <a:pPr algn="ctr">
-              <a:lnSpc>
-                <a:spcPct val="107000"/>
-              </a:lnSpc>
-              <a:spcAft>
-                <a:spcPts val="800"/>
-              </a:spcAft>
-            </a:pPr>
-            <a:r>
-              <a:rPr lang="pt-BR" sz="1100" dirty="0">
-                <a:effectLst/>
-                <a:ea typeface="Calibri" panose="020F0502020204030204" pitchFamily="34" charset="0"/>
-                <a:cs typeface="Times New Roman" panose="02020603050405020304" pitchFamily="18" charset="0"/>
-              </a:rPr>
-              <a:t>Oficina de pintura</a:t>
-            </a:r>
-          </a:p>
-        </p:txBody>
-      </p:sp>
-      <p:pic>
-        <p:nvPicPr>
-          <p:cNvPr id="63" name="Imagem 62" descr="Forma&#10;&#10;Descrição gerada automaticamente com confiança baixa">
-            <a:extLst>
-              <a:ext uri="{FF2B5EF4-FFF2-40B4-BE49-F238E27FC236}">
-                <a16:creationId xmlns:a16="http://schemas.microsoft.com/office/drawing/2014/main" id="{004C6537-F452-4B3D-9EB1-28D872B4A0D0}"/>
-              </a:ext>
-            </a:extLst>
-          </p:cNvPr>
-          <p:cNvPicPr/>
-          <p:nvPr/>
-        </p:nvPicPr>
-        <p:blipFill>
-          <a:blip r:embed="rId30" cstate="print">
-            <a:extLst>
-              <a:ext uri="{28A0092B-C50C-407E-A947-70E740481C1C}">
-                <a14:useLocalDpi xmlns:a14="http://schemas.microsoft.com/office/drawing/2010/main" val="0"/>
-              </a:ext>
-            </a:extLst>
-          </a:blip>
-          <a:stretch>
-            <a:fillRect/>
-          </a:stretch>
-        </p:blipFill>
+      <p:sp>
+        <p:nvSpPr>
+          <p:cNvPr id="58" name="Seta: da Esquerda para a Direita 57">
+            <a:extLst>
+              <a:ext uri="{FF2B5EF4-FFF2-40B4-BE49-F238E27FC236}">
+                <a16:creationId xmlns:a16="http://schemas.microsoft.com/office/drawing/2014/main" id="{2A933F51-507C-4868-B992-B5444D296D2C}"/>
+              </a:ext>
+            </a:extLst>
+          </p:cNvPr>
+          <p:cNvSpPr/>
+          <p:nvPr/>
+        </p:nvSpPr>
         <p:spPr>
-          <a:xfrm>
-            <a:off x="10108038" y="2666399"/>
-            <a:ext cx="508635" cy="508635"/>
-          </a:xfrm>
-          <a:prstGeom prst="rect">
-            <a:avLst/>
-          </a:prstGeom>
-        </p:spPr>
-      </p:pic>
-      <p:sp>
-        <p:nvSpPr>
-          <p:cNvPr id="64" name="Caixa de Texto 2">
-            <a:extLst>
-              <a:ext uri="{FF2B5EF4-FFF2-40B4-BE49-F238E27FC236}">
-                <a16:creationId xmlns:a16="http://schemas.microsoft.com/office/drawing/2014/main" id="{05AF41CD-90DD-4208-8A18-239281707FDB}"/>
-              </a:ext>
-            </a:extLst>
-          </p:cNvPr>
-          <p:cNvSpPr txBox="1">
-            <a:spLocks noChangeArrowheads="1"/>
-          </p:cNvSpPr>
-          <p:nvPr/>
-        </p:nvSpPr>
-        <p:spPr bwMode="auto">
-          <a:xfrm>
-            <a:off x="9257456" y="3190430"/>
-            <a:ext cx="2209800" cy="382270"/>
-          </a:xfrm>
-          <a:prstGeom prst="rect">
-            <a:avLst/>
-          </a:prstGeom>
-          <a:noFill/>
-          <a:ln>
-            <a:noFill/>
-          </a:ln>
-        </p:spPr>
-        <p:style>
-          <a:lnRef idx="0">
-            <a:scrgbClr r="0" g="0" b="0"/>
-          </a:lnRef>
-          <a:fillRef idx="0">
-            <a:scrgbClr r="0" g="0" b="0"/>
-          </a:fillRef>
-          <a:effectRef idx="0">
-            <a:scrgbClr r="0" g="0" b="0"/>
-          </a:effectRef>
-          <a:fontRef idx="minor">
-            <a:schemeClr val="dk1"/>
-          </a:fontRef>
-        </p:style>
-        <p:txBody>
-          <a:bodyPr rot="0" vert="horz" wrap="square" lIns="91440" tIns="45720" rIns="91440" bIns="45720" anchor="t" anchorCtr="0">
-            <a:noAutofit/>
-          </a:bodyPr>
-          <a:lstStyle/>
-          <a:p>
-            <a:pPr algn="ctr">
-              <a:lnSpc>
-                <a:spcPct val="107000"/>
-              </a:lnSpc>
-              <a:spcAft>
-                <a:spcPts val="800"/>
-              </a:spcAft>
-            </a:pPr>
-            <a:r>
-              <a:rPr lang="pt-BR" sz="1100" dirty="0">
-                <a:effectLst/>
-                <a:ea typeface="Calibri" panose="020F0502020204030204" pitchFamily="34" charset="0"/>
-                <a:cs typeface="Times New Roman" panose="02020603050405020304" pitchFamily="18" charset="0"/>
-              </a:rPr>
-              <a:t>Cliente satisfeito</a:t>
-            </a:r>
-          </a:p>
-        </p:txBody>
-      </p:sp>
-      <p:sp>
-        <p:nvSpPr>
-          <p:cNvPr id="53" name="Seta: para a Esquerda e para Cima 52">
-            <a:extLst>
-              <a:ext uri="{FF2B5EF4-FFF2-40B4-BE49-F238E27FC236}">
-                <a16:creationId xmlns:a16="http://schemas.microsoft.com/office/drawing/2014/main" id="{19361BCE-4905-4A83-B10F-355170D0BD2E}"/>
-              </a:ext>
-            </a:extLst>
-          </p:cNvPr>
-          <p:cNvSpPr/>
-          <p:nvPr/>
-        </p:nvSpPr>
-        <p:spPr>
-          <a:xfrm rot="16200000">
-            <a:off x="6336593" y="3534085"/>
-            <a:ext cx="391934" cy="1223302"/>
-          </a:xfrm>
-          <a:prstGeom prst="leftUpArrow">
+          <a:xfrm rot="5400000">
+            <a:off x="6564646" y="5495948"/>
+            <a:ext cx="319155" cy="183515"/>
+          </a:xfrm>
+          <a:prstGeom prst="leftRightArrow">
             <a:avLst/>
           </a:prstGeom>
           <a:noFill/>
@@ -5710,10 +5706,10 @@
       </p:sp>
       <p:sp>
         <p:nvSpPr>
-          <p:cNvPr id="58" name="Seta: da Esquerda para a Direita 57">
-            <a:extLst>
-              <a:ext uri="{FF2B5EF4-FFF2-40B4-BE49-F238E27FC236}">
-                <a16:creationId xmlns:a16="http://schemas.microsoft.com/office/drawing/2014/main" id="{2A933F51-507C-4868-B992-B5444D296D2C}"/>
+          <p:cNvPr id="60" name="Seta: da Esquerda para a Direita 59">
+            <a:extLst>
+              <a:ext uri="{FF2B5EF4-FFF2-40B4-BE49-F238E27FC236}">
+                <a16:creationId xmlns:a16="http://schemas.microsoft.com/office/drawing/2014/main" id="{AF0D8BC1-87A2-4D01-ACA5-8B27C1590819}"/>
               </a:ext>
             </a:extLst>
           </p:cNvPr>
@@ -5722,7 +5718,7 @@
         </p:nvSpPr>
         <p:spPr>
           <a:xfrm rot="5400000">
-            <a:off x="6564646" y="5495948"/>
+            <a:off x="7929288" y="5495947"/>
             <a:ext cx="319155" cy="183515"/>
           </a:xfrm>
           <a:prstGeom prst="leftRightArrow">
@@ -5768,10 +5764,10 @@
       </p:sp>
       <p:sp>
         <p:nvSpPr>
-          <p:cNvPr id="60" name="Seta: da Esquerda para a Direita 59">
-            <a:extLst>
-              <a:ext uri="{FF2B5EF4-FFF2-40B4-BE49-F238E27FC236}">
-                <a16:creationId xmlns:a16="http://schemas.microsoft.com/office/drawing/2014/main" id="{AF0D8BC1-87A2-4D01-ACA5-8B27C1590819}"/>
+          <p:cNvPr id="66" name="Seta: da Esquerda para a Direita 65">
+            <a:extLst>
+              <a:ext uri="{FF2B5EF4-FFF2-40B4-BE49-F238E27FC236}">
+                <a16:creationId xmlns:a16="http://schemas.microsoft.com/office/drawing/2014/main" id="{DA2308ED-6825-41E8-B40E-64E43FE5E803}"/>
               </a:ext>
             </a:extLst>
           </p:cNvPr>
@@ -5779,8 +5775,8 @@
           <p:nvPr/>
         </p:nvSpPr>
         <p:spPr>
-          <a:xfrm rot="5400000">
-            <a:off x="7929288" y="5495947"/>
+          <a:xfrm rot="10800000">
+            <a:off x="7318563" y="5962509"/>
             <a:ext cx="319155" cy="183515"/>
           </a:xfrm>
           <a:prstGeom prst="leftRightArrow">
@@ -5826,10 +5822,10 @@
       </p:sp>
       <p:sp>
         <p:nvSpPr>
-          <p:cNvPr id="66" name="Seta: da Esquerda para a Direita 65">
-            <a:extLst>
-              <a:ext uri="{FF2B5EF4-FFF2-40B4-BE49-F238E27FC236}">
-                <a16:creationId xmlns:a16="http://schemas.microsoft.com/office/drawing/2014/main" id="{DA2308ED-6825-41E8-B40E-64E43FE5E803}"/>
+          <p:cNvPr id="2" name="Seta: para a Direita 1">
+            <a:extLst>
+              <a:ext uri="{FF2B5EF4-FFF2-40B4-BE49-F238E27FC236}">
+                <a16:creationId xmlns:a16="http://schemas.microsoft.com/office/drawing/2014/main" id="{AEF29182-498B-4D76-8EBE-B46DE39E7A1D}"/>
               </a:ext>
             </a:extLst>
           </p:cNvPr>
@@ -5837,11 +5833,11 @@
           <p:nvPr/>
         </p:nvSpPr>
         <p:spPr>
-          <a:xfrm rot="10800000">
-            <a:off x="7319564" y="5964804"/>
-            <a:ext cx="319155" cy="183515"/>
-          </a:xfrm>
-          <a:prstGeom prst="leftRightArrow">
+          <a:xfrm>
+            <a:off x="9382406" y="2906675"/>
+            <a:ext cx="508635" cy="125387"/>
+          </a:xfrm>
+          <a:prstGeom prst="rightArrow">
             <a:avLst/>
           </a:prstGeom>
           <a:noFill/>
@@ -5870,24 +5866,20 @@
           </a:fontRef>
         </p:style>
         <p:txBody>
-          <a:bodyPr rot="0" spcFirstLastPara="0" vert="horz" wrap="square" lIns="91440" tIns="45720" rIns="91440" bIns="45720" numCol="1" spcCol="0" rtlCol="0" fromWordArt="0" anchor="ctr" anchorCtr="0" forceAA="0" compatLnSpc="1">
-            <a:prstTxWarp prst="textNoShape">
-              <a:avLst/>
-            </a:prstTxWarp>
-            <a:noAutofit/>
-          </a:bodyPr>
-          <a:lstStyle/>
-          <a:p>
+          <a:bodyPr rtlCol="0" anchor="ctr"/>
+          <a:lstStyle/>
+          <a:p>
+            <a:pPr algn="ctr"/>
             <a:endParaRPr lang="pt-BR"/>
           </a:p>
         </p:txBody>
       </p:sp>
       <p:sp>
         <p:nvSpPr>
-          <p:cNvPr id="2" name="Seta: para a Direita 1">
-            <a:extLst>
-              <a:ext uri="{FF2B5EF4-FFF2-40B4-BE49-F238E27FC236}">
-                <a16:creationId xmlns:a16="http://schemas.microsoft.com/office/drawing/2014/main" id="{AEF29182-498B-4D76-8EBE-B46DE39E7A1D}"/>
+          <p:cNvPr id="3" name="Seta: Dobrada para Cima 2">
+            <a:extLst>
+              <a:ext uri="{FF2B5EF4-FFF2-40B4-BE49-F238E27FC236}">
+                <a16:creationId xmlns:a16="http://schemas.microsoft.com/office/drawing/2014/main" id="{2A4129D8-08DA-445D-9325-84C0C455719B}"/>
               </a:ext>
             </a:extLst>
           </p:cNvPr>
@@ -5895,11 +5887,11 @@
           <p:nvPr/>
         </p:nvSpPr>
         <p:spPr>
-          <a:xfrm>
-            <a:off x="9382406" y="2906675"/>
-            <a:ext cx="508635" cy="125387"/>
-          </a:xfrm>
-          <a:prstGeom prst="rightArrow">
+          <a:xfrm rot="5400000" flipH="1">
+            <a:off x="7248976" y="3520578"/>
+            <a:ext cx="1482352" cy="290142"/>
+          </a:xfrm>
+          <a:prstGeom prst="bentUpArrow">
             <a:avLst/>
           </a:prstGeom>
           <a:noFill/>
@@ -5938,10 +5930,10 @@
       </p:sp>
       <p:sp>
         <p:nvSpPr>
-          <p:cNvPr id="3" name="Seta: Dobrada para Cima 2">
-            <a:extLst>
-              <a:ext uri="{FF2B5EF4-FFF2-40B4-BE49-F238E27FC236}">
-                <a16:creationId xmlns:a16="http://schemas.microsoft.com/office/drawing/2014/main" id="{2A4129D8-08DA-445D-9325-84C0C455719B}"/>
+          <p:cNvPr id="54" name="Seta: da Esquerda para a Direita 53">
+            <a:extLst>
+              <a:ext uri="{FF2B5EF4-FFF2-40B4-BE49-F238E27FC236}">
+                <a16:creationId xmlns:a16="http://schemas.microsoft.com/office/drawing/2014/main" id="{C826E196-2720-4428-9F74-C5E9FC4CC57E}"/>
               </a:ext>
             </a:extLst>
           </p:cNvPr>
@@ -5949,11 +5941,11 @@
           <p:nvPr/>
         </p:nvSpPr>
         <p:spPr>
-          <a:xfrm rot="5400000" flipH="1">
-            <a:off x="7248976" y="3520578"/>
-            <a:ext cx="1482352" cy="290142"/>
-          </a:xfrm>
-          <a:prstGeom prst="bentUpArrow">
+          <a:xfrm rot="16200000">
+            <a:off x="864577" y="2356829"/>
+            <a:ext cx="547767" cy="101828"/>
+          </a:xfrm>
+          <a:prstGeom prst="leftRightArrow">
             <a:avLst/>
           </a:prstGeom>
           <a:noFill/>
@@ -5982,10 +5974,14 @@
           </a:fontRef>
         </p:style>
         <p:txBody>
-          <a:bodyPr rtlCol="0" anchor="ctr"/>
-          <a:lstStyle/>
-          <a:p>
-            <a:pPr algn="ctr"/>
+          <a:bodyPr rot="0" spcFirstLastPara="0" vert="horz" wrap="square" lIns="91440" tIns="45720" rIns="91440" bIns="45720" numCol="1" spcCol="0" rtlCol="0" fromWordArt="0" anchor="ctr" anchorCtr="0" forceAA="0" compatLnSpc="1">
+            <a:prstTxWarp prst="textNoShape">
+              <a:avLst/>
+            </a:prstTxWarp>
+            <a:noAutofit/>
+          </a:bodyPr>
+          <a:lstStyle/>
+          <a:p>
             <a:endParaRPr lang="pt-BR"/>
           </a:p>
         </p:txBody>
@@ -8610,7 +8606,7 @@
         </p:blipFill>
         <p:spPr bwMode="auto">
           <a:xfrm>
-            <a:off x="7494747" y="4852834"/>
+            <a:off x="7493671" y="4879168"/>
             <a:ext cx="550545" cy="550546"/>
           </a:xfrm>
           <a:prstGeom prst="rect">
@@ -9174,7 +9170,7 @@
         </p:nvSpPr>
         <p:spPr>
           <a:xfrm>
-            <a:off x="6662160" y="3566750"/>
+            <a:off x="6662160" y="3565919"/>
             <a:ext cx="1146139" cy="183515"/>
           </a:xfrm>
           <a:prstGeom prst="leftRightArrow">
@@ -9570,8 +9566,8 @@
         </p:nvSpPr>
         <p:spPr>
           <a:xfrm>
-            <a:off x="4737651" y="4823790"/>
-            <a:ext cx="4234071" cy="1967949"/>
+            <a:off x="5141843" y="4823790"/>
+            <a:ext cx="3591340" cy="1967949"/>
           </a:xfrm>
           <a:prstGeom prst="roundRect">
             <a:avLst/>
@@ -9624,8 +9620,8 @@
         </p:nvSpPr>
         <p:spPr>
           <a:xfrm>
-            <a:off x="4737651" y="2434816"/>
-            <a:ext cx="4234071" cy="1967949"/>
+            <a:off x="5141843" y="2367634"/>
+            <a:ext cx="3591340" cy="1967949"/>
           </a:xfrm>
           <a:prstGeom prst="roundRect">
             <a:avLst/>
@@ -10118,8 +10114,8 @@
         </p:nvSpPr>
         <p:spPr>
           <a:xfrm rot="5400000">
-            <a:off x="8747551" y="3603475"/>
-            <a:ext cx="3509594" cy="2849218"/>
+            <a:off x="9710338" y="2647121"/>
+            <a:ext cx="1808922" cy="2849218"/>
           </a:xfrm>
           <a:prstGeom prst="roundRect">
             <a:avLst/>
@@ -10226,8 +10222,424 @@
         </p:blipFill>
         <p:spPr>
           <a:xfrm>
-            <a:off x="265043" y="3366658"/>
+            <a:off x="431665" y="4339603"/>
             <a:ext cx="479717" cy="484187"/>
+          </a:xfrm>
+          <a:prstGeom prst="rect">
+            <a:avLst/>
+          </a:prstGeom>
+        </p:spPr>
+      </p:pic>
+      <p:sp>
+        <p:nvSpPr>
+          <p:cNvPr id="20" name="Seta: da Esquerda para a Direita 19">
+            <a:extLst>
+              <a:ext uri="{FF2B5EF4-FFF2-40B4-BE49-F238E27FC236}">
+                <a16:creationId xmlns:a16="http://schemas.microsoft.com/office/drawing/2014/main" id="{4D7D02EF-BFCF-4B0C-BA5A-C9A7C3A6997B}"/>
+              </a:ext>
+            </a:extLst>
+          </p:cNvPr>
+          <p:cNvSpPr/>
+          <p:nvPr/>
+        </p:nvSpPr>
+        <p:spPr>
+          <a:xfrm>
+            <a:off x="4651513" y="5716006"/>
+            <a:ext cx="425961" cy="183515"/>
+          </a:xfrm>
+          <a:prstGeom prst="leftRightArrow">
+            <a:avLst/>
+          </a:prstGeom>
+          <a:noFill/>
+          <a:ln w="9525" cap="flat" cmpd="sng" algn="ctr">
+            <a:solidFill>
+              <a:schemeClr val="dk1"/>
+            </a:solidFill>
+            <a:prstDash val="solid"/>
+            <a:round/>
+            <a:headEnd type="none" w="med" len="med"/>
+            <a:tailEnd type="none" w="med" len="med"/>
+          </a:ln>
+        </p:spPr>
+        <p:style>
+          <a:lnRef idx="0">
+            <a:scrgbClr r="0" g="0" b="0"/>
+          </a:lnRef>
+          <a:fillRef idx="0">
+            <a:scrgbClr r="0" g="0" b="0"/>
+          </a:fillRef>
+          <a:effectRef idx="0">
+            <a:scrgbClr r="0" g="0" b="0"/>
+          </a:effectRef>
+          <a:fontRef idx="minor">
+            <a:schemeClr val="dk1"/>
+          </a:fontRef>
+        </p:style>
+        <p:txBody>
+          <a:bodyPr rot="0" spcFirstLastPara="0" vert="horz" wrap="square" lIns="91440" tIns="45720" rIns="91440" bIns="45720" numCol="1" spcCol="0" rtlCol="0" fromWordArt="0" anchor="ctr" anchorCtr="0" forceAA="0" compatLnSpc="1">
+            <a:prstTxWarp prst="textNoShape">
+              <a:avLst/>
+            </a:prstTxWarp>
+            <a:noAutofit/>
+          </a:bodyPr>
+          <a:lstStyle/>
+          <a:p>
+            <a:endParaRPr lang="pt-BR"/>
+          </a:p>
+        </p:txBody>
+      </p:sp>
+      <p:sp>
+        <p:nvSpPr>
+          <p:cNvPr id="21" name="Seta: para a Esquerda e para Cima 20">
+            <a:extLst>
+              <a:ext uri="{FF2B5EF4-FFF2-40B4-BE49-F238E27FC236}">
+                <a16:creationId xmlns:a16="http://schemas.microsoft.com/office/drawing/2014/main" id="{82A1CE11-1362-4DDF-AC4D-74641235B01A}"/>
+              </a:ext>
+            </a:extLst>
+          </p:cNvPr>
+          <p:cNvSpPr/>
+          <p:nvPr/>
+        </p:nvSpPr>
+        <p:spPr>
+          <a:xfrm rot="5400000" flipH="1" flipV="1">
+            <a:off x="5600849" y="872396"/>
+            <a:ext cx="1300104" cy="1556738"/>
+          </a:xfrm>
+          <a:prstGeom prst="leftUpArrow">
+            <a:avLst>
+              <a:gd name="adj1" fmla="val 10995"/>
+              <a:gd name="adj2" fmla="val 10041"/>
+              <a:gd name="adj3" fmla="val 11642"/>
+            </a:avLst>
+          </a:prstGeom>
+          <a:noFill/>
+          <a:ln w="9525" cap="flat" cmpd="sng" algn="ctr">
+            <a:solidFill>
+              <a:schemeClr val="dk1"/>
+            </a:solidFill>
+            <a:prstDash val="solid"/>
+            <a:round/>
+            <a:headEnd type="none" w="med" len="med"/>
+            <a:tailEnd type="none" w="med" len="med"/>
+          </a:ln>
+        </p:spPr>
+        <p:style>
+          <a:lnRef idx="0">
+            <a:scrgbClr r="0" g="0" b="0"/>
+          </a:lnRef>
+          <a:fillRef idx="0">
+            <a:scrgbClr r="0" g="0" b="0"/>
+          </a:fillRef>
+          <a:effectRef idx="0">
+            <a:scrgbClr r="0" g="0" b="0"/>
+          </a:effectRef>
+          <a:fontRef idx="minor">
+            <a:schemeClr val="dk1"/>
+          </a:fontRef>
+        </p:style>
+        <p:txBody>
+          <a:bodyPr rot="0" spcFirstLastPara="0" vert="horz" wrap="square" lIns="91440" tIns="45720" rIns="91440" bIns="45720" numCol="1" spcCol="0" rtlCol="0" fromWordArt="0" anchor="ctr" anchorCtr="0" forceAA="0" compatLnSpc="1">
+            <a:prstTxWarp prst="textNoShape">
+              <a:avLst/>
+            </a:prstTxWarp>
+            <a:noAutofit/>
+          </a:bodyPr>
+          <a:lstStyle/>
+          <a:p>
+            <a:endParaRPr lang="pt-BR"/>
+          </a:p>
+        </p:txBody>
+      </p:sp>
+      <p:sp>
+        <p:nvSpPr>
+          <p:cNvPr id="22" name="Seta: da Esquerda para a Direita 21">
+            <a:extLst>
+              <a:ext uri="{FF2B5EF4-FFF2-40B4-BE49-F238E27FC236}">
+                <a16:creationId xmlns:a16="http://schemas.microsoft.com/office/drawing/2014/main" id="{E7B4861D-C1B8-4F00-882D-2C67EC16572A}"/>
+              </a:ext>
+            </a:extLst>
+          </p:cNvPr>
+          <p:cNvSpPr/>
+          <p:nvPr/>
+        </p:nvSpPr>
+        <p:spPr>
+          <a:xfrm rot="5400000">
+            <a:off x="6724532" y="4489938"/>
+            <a:ext cx="425961" cy="183515"/>
+          </a:xfrm>
+          <a:prstGeom prst="leftRightArrow">
+            <a:avLst/>
+          </a:prstGeom>
+          <a:noFill/>
+          <a:ln w="9525" cap="flat" cmpd="sng" algn="ctr">
+            <a:solidFill>
+              <a:schemeClr val="dk1"/>
+            </a:solidFill>
+            <a:prstDash val="solid"/>
+            <a:round/>
+            <a:headEnd type="none" w="med" len="med"/>
+            <a:tailEnd type="none" w="med" len="med"/>
+          </a:ln>
+        </p:spPr>
+        <p:style>
+          <a:lnRef idx="0">
+            <a:scrgbClr r="0" g="0" b="0"/>
+          </a:lnRef>
+          <a:fillRef idx="0">
+            <a:scrgbClr r="0" g="0" b="0"/>
+          </a:fillRef>
+          <a:effectRef idx="0">
+            <a:scrgbClr r="0" g="0" b="0"/>
+          </a:effectRef>
+          <a:fontRef idx="minor">
+            <a:schemeClr val="dk1"/>
+          </a:fontRef>
+        </p:style>
+        <p:txBody>
+          <a:bodyPr rot="0" spcFirstLastPara="0" vert="horz" wrap="square" lIns="91440" tIns="45720" rIns="91440" bIns="45720" numCol="1" spcCol="0" rtlCol="0" fromWordArt="0" anchor="ctr" anchorCtr="0" forceAA="0" compatLnSpc="1">
+            <a:prstTxWarp prst="textNoShape">
+              <a:avLst/>
+            </a:prstTxWarp>
+            <a:noAutofit/>
+          </a:bodyPr>
+          <a:lstStyle/>
+          <a:p>
+            <a:endParaRPr lang="pt-BR"/>
+          </a:p>
+        </p:txBody>
+      </p:sp>
+      <p:sp>
+        <p:nvSpPr>
+          <p:cNvPr id="23" name="Seta: da Esquerda para a Direita 22">
+            <a:extLst>
+              <a:ext uri="{FF2B5EF4-FFF2-40B4-BE49-F238E27FC236}">
+                <a16:creationId xmlns:a16="http://schemas.microsoft.com/office/drawing/2014/main" id="{4382B314-E635-496A-8B8C-EC2B0D223AF9}"/>
+              </a:ext>
+            </a:extLst>
+          </p:cNvPr>
+          <p:cNvSpPr/>
+          <p:nvPr/>
+        </p:nvSpPr>
+        <p:spPr>
+          <a:xfrm>
+            <a:off x="8780545" y="5894353"/>
+            <a:ext cx="819289" cy="183515"/>
+          </a:xfrm>
+          <a:prstGeom prst="leftRightArrow">
+            <a:avLst/>
+          </a:prstGeom>
+          <a:noFill/>
+          <a:ln w="9525" cap="flat" cmpd="sng" algn="ctr">
+            <a:solidFill>
+              <a:schemeClr val="dk1"/>
+            </a:solidFill>
+            <a:prstDash val="solid"/>
+            <a:round/>
+            <a:headEnd type="none" w="med" len="med"/>
+            <a:tailEnd type="none" w="med" len="med"/>
+          </a:ln>
+        </p:spPr>
+        <p:style>
+          <a:lnRef idx="0">
+            <a:scrgbClr r="0" g="0" b="0"/>
+          </a:lnRef>
+          <a:fillRef idx="0">
+            <a:scrgbClr r="0" g="0" b="0"/>
+          </a:fillRef>
+          <a:effectRef idx="0">
+            <a:scrgbClr r="0" g="0" b="0"/>
+          </a:effectRef>
+          <a:fontRef idx="minor">
+            <a:schemeClr val="dk1"/>
+          </a:fontRef>
+        </p:style>
+        <p:txBody>
+          <a:bodyPr rot="0" spcFirstLastPara="0" vert="horz" wrap="square" lIns="91440" tIns="45720" rIns="91440" bIns="45720" numCol="1" spcCol="0" rtlCol="0" fromWordArt="0" anchor="ctr" anchorCtr="0" forceAA="0" compatLnSpc="1">
+            <a:prstTxWarp prst="textNoShape">
+              <a:avLst/>
+            </a:prstTxWarp>
+            <a:noAutofit/>
+          </a:bodyPr>
+          <a:lstStyle/>
+          <a:p>
+            <a:endParaRPr lang="pt-BR" dirty="0"/>
+          </a:p>
+        </p:txBody>
+      </p:sp>
+      <p:pic>
+        <p:nvPicPr>
+          <p:cNvPr id="25" name="Imagem 24">
+            <a:extLst>
+              <a:ext uri="{FF2B5EF4-FFF2-40B4-BE49-F238E27FC236}">
+                <a16:creationId xmlns:a16="http://schemas.microsoft.com/office/drawing/2014/main" id="{D55AF0FD-F08A-47A3-B403-97AA1A00D3CE}"/>
+              </a:ext>
+            </a:extLst>
+          </p:cNvPr>
+          <p:cNvPicPr/>
+          <p:nvPr/>
+        </p:nvPicPr>
+        <p:blipFill>
+          <a:blip r:embed="rId12" cstate="print">
+            <a:extLst>
+              <a:ext uri="{28A0092B-C50C-407E-A947-70E740481C1C}">
+                <a14:useLocalDpi xmlns:a14="http://schemas.microsoft.com/office/drawing/2010/main" val="0"/>
+              </a:ext>
+            </a:extLst>
+          </a:blip>
+          <a:srcRect/>
+          <a:stretch>
+            <a:fillRect/>
+          </a:stretch>
+        </p:blipFill>
+        <p:spPr bwMode="auto">
+          <a:xfrm>
+            <a:off x="9849478" y="5455466"/>
+            <a:ext cx="550545" cy="550546"/>
+          </a:xfrm>
+          <a:prstGeom prst="rect">
+            <a:avLst/>
+          </a:prstGeom>
+          <a:noFill/>
+          <a:ln>
+            <a:noFill/>
+          </a:ln>
+        </p:spPr>
+      </p:pic>
+      <p:pic>
+        <p:nvPicPr>
+          <p:cNvPr id="26" name="Imagem 25">
+            <a:extLst>
+              <a:ext uri="{FF2B5EF4-FFF2-40B4-BE49-F238E27FC236}">
+                <a16:creationId xmlns:a16="http://schemas.microsoft.com/office/drawing/2014/main" id="{D5FAA85D-B44B-4F5C-80CB-91F86AC28D2B}"/>
+              </a:ext>
+            </a:extLst>
+          </p:cNvPr>
+          <p:cNvPicPr/>
+          <p:nvPr/>
+        </p:nvPicPr>
+        <p:blipFill>
+          <a:blip r:embed="rId13" cstate="print">
+            <a:extLst>
+              <a:ext uri="{28A0092B-C50C-407E-A947-70E740481C1C}">
+                <a14:useLocalDpi xmlns:a14="http://schemas.microsoft.com/office/drawing/2010/main" val="0"/>
+              </a:ext>
+            </a:extLst>
+          </a:blip>
+          <a:srcRect/>
+          <a:stretch>
+            <a:fillRect/>
+          </a:stretch>
+        </p:blipFill>
+        <p:spPr bwMode="auto">
+          <a:xfrm>
+            <a:off x="10649667" y="5281324"/>
+            <a:ext cx="550545" cy="608193"/>
+          </a:xfrm>
+          <a:prstGeom prst="rect">
+            <a:avLst/>
+          </a:prstGeom>
+          <a:noFill/>
+          <a:ln>
+            <a:noFill/>
+          </a:ln>
+        </p:spPr>
+      </p:pic>
+      <p:sp>
+        <p:nvSpPr>
+          <p:cNvPr id="27" name="Caixa de Texto 2">
+            <a:extLst>
+              <a:ext uri="{FF2B5EF4-FFF2-40B4-BE49-F238E27FC236}">
+                <a16:creationId xmlns:a16="http://schemas.microsoft.com/office/drawing/2014/main" id="{A785FFBC-4D34-431D-A439-83991FC768D6}"/>
+              </a:ext>
+            </a:extLst>
+          </p:cNvPr>
+          <p:cNvSpPr txBox="1">
+            <a:spLocks noChangeArrowheads="1"/>
+          </p:cNvSpPr>
+          <p:nvPr/>
+        </p:nvSpPr>
+        <p:spPr bwMode="auto">
+          <a:xfrm>
+            <a:off x="9374535" y="6113685"/>
+            <a:ext cx="2888974" cy="627736"/>
+          </a:xfrm>
+          <a:prstGeom prst="rect">
+            <a:avLst/>
+          </a:prstGeom>
+          <a:noFill/>
+          <a:ln>
+            <a:noFill/>
+          </a:ln>
+        </p:spPr>
+        <p:style>
+          <a:lnRef idx="0">
+            <a:scrgbClr r="0" g="0" b="0"/>
+          </a:lnRef>
+          <a:fillRef idx="0">
+            <a:scrgbClr r="0" g="0" b="0"/>
+          </a:fillRef>
+          <a:effectRef idx="0">
+            <a:scrgbClr r="0" g="0" b="0"/>
+          </a:effectRef>
+          <a:fontRef idx="minor">
+            <a:schemeClr val="dk1"/>
+          </a:fontRef>
+        </p:style>
+        <p:txBody>
+          <a:bodyPr rot="0" vert="horz" wrap="square" lIns="91440" tIns="45720" rIns="91440" bIns="45720" anchor="t" anchorCtr="0">
+            <a:spAutoFit/>
+          </a:bodyPr>
+          <a:lstStyle/>
+          <a:p>
+            <a:pPr algn="ctr">
+              <a:lnSpc>
+                <a:spcPct val="107000"/>
+              </a:lnSpc>
+              <a:spcAft>
+                <a:spcPts val="800"/>
+              </a:spcAft>
+            </a:pPr>
+            <a:r>
+              <a:rPr lang="pt-BR" sz="1100" dirty="0">
+                <a:effectLst/>
+                <a:ea typeface="Calibri" panose="020F0502020204030204" pitchFamily="34" charset="0"/>
+                <a:cs typeface="Times New Roman" panose="02020603050405020304" pitchFamily="18" charset="0"/>
+              </a:rPr>
+              <a:t>Reunião realizada entre os funcionários e o cliente para decisões do que precisa ser feito  no veiculo e o valor acordado do serviço</a:t>
+            </a:r>
+          </a:p>
+        </p:txBody>
+      </p:sp>
+      <p:pic>
+        <p:nvPicPr>
+          <p:cNvPr id="29" name="Imagem 28" descr="Forma&#10;&#10;Descrição gerada automaticamente com confiança baixa">
+            <a:extLst>
+              <a:ext uri="{FF2B5EF4-FFF2-40B4-BE49-F238E27FC236}">
+                <a16:creationId xmlns:a16="http://schemas.microsoft.com/office/drawing/2014/main" id="{8258BD33-ABD2-4F35-8437-615F56ABCC04}"/>
+              </a:ext>
+            </a:extLst>
+          </p:cNvPr>
+          <p:cNvPicPr>
+            <a:picLocks noChangeAspect="1"/>
+          </p:cNvPicPr>
+          <p:nvPr/>
+        </p:nvPicPr>
+        <p:blipFill>
+          <a:blip r:embed="rId8">
+            <a:extLst>
+              <a:ext uri="{28A0092B-C50C-407E-A947-70E740481C1C}">
+                <a14:useLocalDpi xmlns:a14="http://schemas.microsoft.com/office/drawing/2010/main" val="0"/>
+              </a:ext>
+            </a:extLst>
+          </a:blip>
+          <a:stretch>
+            <a:fillRect/>
+          </a:stretch>
+        </p:blipFill>
+        <p:spPr>
+          <a:xfrm>
+            <a:off x="11516318" y="5719185"/>
+            <a:ext cx="340664" cy="340664"/>
           </a:xfrm>
           <a:prstGeom prst="rect">
             <a:avLst/>

</xml_diff>

<commit_message>
adicionando versão estilizada HLD / LLD e documentação
</commit_message>
<xml_diff>
--- a/documentacao/HLD_LLD.pptx
+++ b/documentacao/HLD_LLD.pptx
@@ -262,7 +262,7 @@
           <a:p>
             <a:fld id="{9C051C65-7635-434F-9E39-2D893C4FB771}" type="datetimeFigureOut">
               <a:rPr lang="pt-BR" smtClean="0"/>
-              <a:t>18/05/2021</a:t>
+              <a:t>28/05/2021</a:t>
             </a:fld>
             <a:endParaRPr lang="pt-BR"/>
           </a:p>
@@ -460,7 +460,7 @@
           <a:p>
             <a:fld id="{9C051C65-7635-434F-9E39-2D893C4FB771}" type="datetimeFigureOut">
               <a:rPr lang="pt-BR" smtClean="0"/>
-              <a:t>18/05/2021</a:t>
+              <a:t>28/05/2021</a:t>
             </a:fld>
             <a:endParaRPr lang="pt-BR"/>
           </a:p>
@@ -668,7 +668,7 @@
           <a:p>
             <a:fld id="{9C051C65-7635-434F-9E39-2D893C4FB771}" type="datetimeFigureOut">
               <a:rPr lang="pt-BR" smtClean="0"/>
-              <a:t>18/05/2021</a:t>
+              <a:t>28/05/2021</a:t>
             </a:fld>
             <a:endParaRPr lang="pt-BR"/>
           </a:p>
@@ -866,7 +866,7 @@
           <a:p>
             <a:fld id="{9C051C65-7635-434F-9E39-2D893C4FB771}" type="datetimeFigureOut">
               <a:rPr lang="pt-BR" smtClean="0"/>
-              <a:t>18/05/2021</a:t>
+              <a:t>28/05/2021</a:t>
             </a:fld>
             <a:endParaRPr lang="pt-BR"/>
           </a:p>
@@ -1141,7 +1141,7 @@
           <a:p>
             <a:fld id="{9C051C65-7635-434F-9E39-2D893C4FB771}" type="datetimeFigureOut">
               <a:rPr lang="pt-BR" smtClean="0"/>
-              <a:t>18/05/2021</a:t>
+              <a:t>28/05/2021</a:t>
             </a:fld>
             <a:endParaRPr lang="pt-BR"/>
           </a:p>
@@ -1406,7 +1406,7 @@
           <a:p>
             <a:fld id="{9C051C65-7635-434F-9E39-2D893C4FB771}" type="datetimeFigureOut">
               <a:rPr lang="pt-BR" smtClean="0"/>
-              <a:t>18/05/2021</a:t>
+              <a:t>28/05/2021</a:t>
             </a:fld>
             <a:endParaRPr lang="pt-BR"/>
           </a:p>
@@ -1818,7 +1818,7 @@
           <a:p>
             <a:fld id="{9C051C65-7635-434F-9E39-2D893C4FB771}" type="datetimeFigureOut">
               <a:rPr lang="pt-BR" smtClean="0"/>
-              <a:t>18/05/2021</a:t>
+              <a:t>28/05/2021</a:t>
             </a:fld>
             <a:endParaRPr lang="pt-BR"/>
           </a:p>
@@ -1959,7 +1959,7 @@
           <a:p>
             <a:fld id="{9C051C65-7635-434F-9E39-2D893C4FB771}" type="datetimeFigureOut">
               <a:rPr lang="pt-BR" smtClean="0"/>
-              <a:t>18/05/2021</a:t>
+              <a:t>28/05/2021</a:t>
             </a:fld>
             <a:endParaRPr lang="pt-BR"/>
           </a:p>
@@ -2072,7 +2072,7 @@
           <a:p>
             <a:fld id="{9C051C65-7635-434F-9E39-2D893C4FB771}" type="datetimeFigureOut">
               <a:rPr lang="pt-BR" smtClean="0"/>
-              <a:t>18/05/2021</a:t>
+              <a:t>28/05/2021</a:t>
             </a:fld>
             <a:endParaRPr lang="pt-BR"/>
           </a:p>
@@ -2383,7 +2383,7 @@
           <a:p>
             <a:fld id="{9C051C65-7635-434F-9E39-2D893C4FB771}" type="datetimeFigureOut">
               <a:rPr lang="pt-BR" smtClean="0"/>
-              <a:t>18/05/2021</a:t>
+              <a:t>28/05/2021</a:t>
             </a:fld>
             <a:endParaRPr lang="pt-BR"/>
           </a:p>
@@ -2671,7 +2671,7 @@
           <a:p>
             <a:fld id="{9C051C65-7635-434F-9E39-2D893C4FB771}" type="datetimeFigureOut">
               <a:rPr lang="pt-BR" smtClean="0"/>
-              <a:t>18/05/2021</a:t>
+              <a:t>28/05/2021</a:t>
             </a:fld>
             <a:endParaRPr lang="pt-BR"/>
           </a:p>
@@ -2912,7 +2912,7 @@
           <a:p>
             <a:fld id="{9C051C65-7635-434F-9E39-2D893C4FB771}" type="datetimeFigureOut">
               <a:rPr lang="pt-BR" smtClean="0"/>
-              <a:t>18/05/2021</a:t>
+              <a:t>28/05/2021</a:t>
             </a:fld>
             <a:endParaRPr lang="pt-BR"/>
           </a:p>
@@ -3331,50 +3331,46 @@
       </p:grpSpPr>
       <p:sp>
         <p:nvSpPr>
-          <p:cNvPr id="2" name="Título 1">
-            <a:extLst>
-              <a:ext uri="{FF2B5EF4-FFF2-40B4-BE49-F238E27FC236}">
-                <a16:creationId xmlns:a16="http://schemas.microsoft.com/office/drawing/2014/main" id="{FA3A55ED-F94C-418B-8EBA-AF76F75D4FE8}"/>
-              </a:ext>
-            </a:extLst>
-          </p:cNvPr>
-          <p:cNvSpPr>
-            <a:spLocks noGrp="1"/>
-          </p:cNvSpPr>
-          <p:nvPr>
-            <p:ph type="ctrTitle"/>
-          </p:nvPr>
-        </p:nvSpPr>
-        <p:spPr/>
-        <p:txBody>
-          <a:bodyPr/>
-          <a:lstStyle/>
-          <a:p>
-            <a:endParaRPr lang="pt-BR"/>
-          </a:p>
-        </p:txBody>
-      </p:sp>
-      <p:sp>
-        <p:nvSpPr>
-          <p:cNvPr id="3" name="Subtítulo 2">
-            <a:extLst>
-              <a:ext uri="{FF2B5EF4-FFF2-40B4-BE49-F238E27FC236}">
-                <a16:creationId xmlns:a16="http://schemas.microsoft.com/office/drawing/2014/main" id="{7E9AE388-F9F3-4957-BC1C-D007F13E7F7F}"/>
-              </a:ext>
-            </a:extLst>
-          </p:cNvPr>
-          <p:cNvSpPr>
-            <a:spLocks noGrp="1"/>
-          </p:cNvSpPr>
-          <p:nvPr>
-            <p:ph type="subTitle" idx="1"/>
-          </p:nvPr>
-        </p:nvSpPr>
-        <p:spPr/>
-        <p:txBody>
-          <a:bodyPr/>
-          <a:lstStyle/>
-          <a:p>
+          <p:cNvPr id="4" name="Retângulo: Cantos Arredondados 3">
+            <a:extLst>
+              <a:ext uri="{FF2B5EF4-FFF2-40B4-BE49-F238E27FC236}">
+                <a16:creationId xmlns:a16="http://schemas.microsoft.com/office/drawing/2014/main" id="{EA581AAC-985E-4B22-B3CE-659C26894066}"/>
+              </a:ext>
+            </a:extLst>
+          </p:cNvPr>
+          <p:cNvSpPr/>
+          <p:nvPr/>
+        </p:nvSpPr>
+        <p:spPr>
+          <a:xfrm>
+            <a:off x="119270" y="92765"/>
+            <a:ext cx="3763617" cy="6665844"/>
+          </a:xfrm>
+          <a:prstGeom prst="roundRect">
+            <a:avLst/>
+          </a:prstGeom>
+        </p:spPr>
+        <p:style>
+          <a:lnRef idx="2">
+            <a:schemeClr val="accent1">
+              <a:shade val="50000"/>
+            </a:schemeClr>
+          </a:lnRef>
+          <a:fillRef idx="1">
+            <a:schemeClr val="accent1"/>
+          </a:fillRef>
+          <a:effectRef idx="0">
+            <a:schemeClr val="accent1"/>
+          </a:effectRef>
+          <a:fontRef idx="minor">
+            <a:schemeClr val="lt1"/>
+          </a:fontRef>
+        </p:style>
+        <p:txBody>
+          <a:bodyPr rtlCol="0" anchor="ctr"/>
+          <a:lstStyle/>
+          <a:p>
+            <a:pPr algn="ctr"/>
             <a:endParaRPr lang="pt-BR"/>
           </a:p>
         </p:txBody>
@@ -3395,6 +3391,17 @@
 <file path=ppt/slides/slide2.xml><?xml version="1.0" encoding="utf-8"?>
 <p:sld xmlns:a="http://schemas.openxmlformats.org/drawingml/2006/main" xmlns:r="http://schemas.openxmlformats.org/officeDocument/2006/relationships" xmlns:p="http://schemas.openxmlformats.org/presentationml/2006/main">
   <p:cSld>
+    <p:bg>
+      <p:bgPr>
+        <a:solidFill>
+          <a:schemeClr val="accent3">
+            <a:lumMod val="20000"/>
+            <a:lumOff val="80000"/>
+          </a:schemeClr>
+        </a:solidFill>
+        <a:effectLst/>
+      </p:bgPr>
+    </p:bg>
     <p:spTree>
       <p:nvGrpSpPr>
         <p:cNvPr id="1" name=""/>
@@ -3423,32 +3430,29 @@
         </p:nvSpPr>
         <p:spPr>
           <a:xfrm>
-            <a:off x="3290877" y="207310"/>
-            <a:ext cx="3165475" cy="1661795"/>
+            <a:off x="3263040" y="80934"/>
+            <a:ext cx="3494237" cy="1855555"/>
           </a:xfrm>
           <a:prstGeom prst="cloud">
             <a:avLst/>
           </a:prstGeom>
-          <a:noFill/>
-          <a:ln w="28575" cap="flat" cmpd="sng" algn="ctr">
+          <a:ln>
             <a:solidFill>
-              <a:schemeClr val="dk1"/>
+              <a:schemeClr val="bg1"/>
             </a:solidFill>
-            <a:prstDash val="solid"/>
-            <a:round/>
             <a:headEnd type="none" w="med" len="med"/>
             <a:tailEnd type="none" w="med" len="med"/>
           </a:ln>
         </p:spPr>
         <p:style>
-          <a:lnRef idx="0">
-            <a:scrgbClr r="0" g="0" b="0"/>
+          <a:lnRef idx="1">
+            <a:schemeClr val="accent5"/>
           </a:lnRef>
-          <a:fillRef idx="0">
-            <a:scrgbClr r="0" g="0" b="0"/>
+          <a:fillRef idx="2">
+            <a:schemeClr val="accent5"/>
           </a:fillRef>
-          <a:effectRef idx="0">
-            <a:scrgbClr r="0" g="0" b="0"/>
+          <a:effectRef idx="1">
+            <a:schemeClr val="accent5"/>
           </a:effectRef>
           <a:fontRef idx="minor">
             <a:schemeClr val="dk1"/>
@@ -3565,7 +3569,7 @@
         </p:blipFill>
         <p:spPr bwMode="auto">
           <a:xfrm>
-            <a:off x="5484315" y="304560"/>
+            <a:off x="5641105" y="171923"/>
             <a:ext cx="617220" cy="617220"/>
           </a:xfrm>
           <a:prstGeom prst="rect">
@@ -3593,7 +3597,7 @@
         </p:nvSpPr>
         <p:spPr bwMode="auto">
           <a:xfrm>
-            <a:off x="5347216" y="862935"/>
+            <a:off x="5520177" y="782747"/>
             <a:ext cx="889195" cy="391844"/>
           </a:xfrm>
           <a:prstGeom prst="rect">
@@ -3633,7 +3637,7 @@
               </a:spcAft>
             </a:pPr>
             <a:r>
-              <a:rPr lang="pt-BR" sz="1200">
+              <a:rPr lang="pt-BR" sz="1200" dirty="0">
                 <a:effectLst/>
                 <a:ea typeface="Calibri" panose="020F0502020204030204" pitchFamily="34" charset="0"/>
                 <a:cs typeface="Times New Roman" panose="02020603050405020304" pitchFamily="18" charset="0"/>
@@ -3787,8 +3791,8 @@
         </p:blipFill>
         <p:spPr>
           <a:xfrm>
-            <a:off x="841085" y="1481711"/>
-            <a:ext cx="581660" cy="581660"/>
+            <a:off x="1454673" y="514277"/>
+            <a:ext cx="380365" cy="380366"/>
           </a:xfrm>
           <a:prstGeom prst="rect">
             <a:avLst/>
@@ -3808,40 +3812,34 @@
           <p:nvPr/>
         </p:nvSpPr>
         <p:spPr>
-          <a:xfrm rot="10800000">
-            <a:off x="1067799" y="1018159"/>
-            <a:ext cx="2144861" cy="435167"/>
+          <a:xfrm rot="16200000" flipV="1">
+            <a:off x="1500437" y="890237"/>
+            <a:ext cx="1661794" cy="1724875"/>
           </a:xfrm>
           <a:prstGeom prst="leftUpArrow">
             <a:avLst>
-              <a:gd name="adj1" fmla="val 10647"/>
-              <a:gd name="adj2" fmla="val 13765"/>
-              <a:gd name="adj3" fmla="val 12811"/>
+              <a:gd name="adj1" fmla="val 6037"/>
+              <a:gd name="adj2" fmla="val 6466"/>
+              <a:gd name="adj3" fmla="val 6665"/>
             </a:avLst>
           </a:prstGeom>
-          <a:noFill/>
-          <a:ln w="9525" cap="flat" cmpd="sng" algn="ctr">
-            <a:solidFill>
-              <a:schemeClr val="dk1"/>
-            </a:solidFill>
-            <a:prstDash val="solid"/>
-            <a:round/>
+          <a:ln>
             <a:headEnd type="none" w="med" len="med"/>
             <a:tailEnd type="none" w="med" len="med"/>
           </a:ln>
         </p:spPr>
         <p:style>
-          <a:lnRef idx="0">
-            <a:scrgbClr r="0" g="0" b="0"/>
+          <a:lnRef idx="3">
+            <a:schemeClr val="lt1"/>
           </a:lnRef>
-          <a:fillRef idx="0">
-            <a:scrgbClr r="0" g="0" b="0"/>
+          <a:fillRef idx="1">
+            <a:schemeClr val="accent5"/>
           </a:fillRef>
-          <a:effectRef idx="0">
-            <a:scrgbClr r="0" g="0" b="0"/>
+          <a:effectRef idx="1">
+            <a:schemeClr val="accent5"/>
           </a:effectRef>
           <a:fontRef idx="minor">
-            <a:schemeClr val="dk1"/>
+            <a:schemeClr val="lt1"/>
           </a:fontRef>
         </p:style>
         <p:txBody>
@@ -3886,7 +3884,7 @@
         </p:blipFill>
         <p:spPr>
           <a:xfrm>
-            <a:off x="951126" y="2716492"/>
+            <a:off x="1393669" y="2729198"/>
             <a:ext cx="380365" cy="380365"/>
           </a:xfrm>
           <a:prstGeom prst="rect">
@@ -3915,14 +3913,8 @@
             <a:avLst/>
           </a:prstGeom>
           <a:noFill/>
-          <a:ln w="9525" cap="flat" cmpd="sng" algn="ctr">
-            <a:solidFill>
-              <a:schemeClr val="dk1"/>
-            </a:solidFill>
-            <a:prstDash val="solid"/>
-            <a:round/>
-            <a:headEnd type="none" w="med" len="med"/>
-            <a:tailEnd type="none" w="med" len="med"/>
+          <a:ln>
+            <a:noFill/>
           </a:ln>
         </p:spPr>
         <p:style>
@@ -4018,7 +4010,7 @@
         </p:blipFill>
         <p:spPr>
           <a:xfrm>
-            <a:off x="664741" y="3185191"/>
+            <a:off x="664741" y="3185190"/>
             <a:ext cx="390525" cy="390525"/>
           </a:xfrm>
           <a:prstGeom prst="rect">
@@ -4182,7 +4174,7 @@
         </p:nvSpPr>
         <p:spPr bwMode="auto">
           <a:xfrm>
-            <a:off x="6023954" y="1444125"/>
+            <a:off x="6553159" y="1749635"/>
             <a:ext cx="1586269" cy="762000"/>
           </a:xfrm>
           <a:prstGeom prst="rect">
@@ -4297,8 +4289,8 @@
         </p:blipFill>
         <p:spPr>
           <a:xfrm>
-            <a:off x="3844225" y="2407977"/>
-            <a:ext cx="581660" cy="581660"/>
+            <a:off x="3550394" y="2119644"/>
+            <a:ext cx="400544" cy="379160"/>
           </a:xfrm>
           <a:prstGeom prst="rect">
             <a:avLst/>
@@ -4334,7 +4326,7 @@
         </p:blipFill>
         <p:spPr>
           <a:xfrm>
-            <a:off x="4873615" y="3147874"/>
+            <a:off x="4369712" y="2612266"/>
             <a:ext cx="380365" cy="380365"/>
           </a:xfrm>
           <a:prstGeom prst="rect">
@@ -4356,21 +4348,15 @@
         </p:nvSpPr>
         <p:spPr>
           <a:xfrm>
-            <a:off x="3812825" y="3496713"/>
+            <a:off x="2982902" y="2973013"/>
             <a:ext cx="2076716" cy="1324924"/>
           </a:xfrm>
           <a:prstGeom prst="roundRect">
             <a:avLst/>
           </a:prstGeom>
           <a:noFill/>
-          <a:ln w="9525" cap="flat" cmpd="sng" algn="ctr">
-            <a:solidFill>
-              <a:schemeClr val="dk1"/>
-            </a:solidFill>
-            <a:prstDash val="solid"/>
-            <a:round/>
-            <a:headEnd type="none" w="med" len="med"/>
-            <a:tailEnd type="none" w="med" len="med"/>
+          <a:ln>
+            <a:noFill/>
           </a:ln>
         </p:spPr>
         <p:style>
@@ -4426,7 +4412,7 @@
         </p:blipFill>
         <p:spPr>
           <a:xfrm>
-            <a:off x="5238108" y="3680441"/>
+            <a:off x="4408185" y="3154317"/>
             <a:ext cx="381000" cy="381000"/>
           </a:xfrm>
           <a:prstGeom prst="rect">
@@ -4463,7 +4449,7 @@
         </p:blipFill>
         <p:spPr>
           <a:xfrm>
-            <a:off x="3901973" y="3559274"/>
+            <a:off x="3072050" y="3033150"/>
             <a:ext cx="529590" cy="529590"/>
           </a:xfrm>
           <a:prstGeom prst="rect">
@@ -4500,7 +4486,7 @@
         </p:blipFill>
         <p:spPr>
           <a:xfrm rot="2566580">
-            <a:off x="4735064" y="3671952"/>
+            <a:off x="3905141" y="3145828"/>
             <a:ext cx="209550" cy="209550"/>
           </a:xfrm>
           <a:prstGeom prst="rect">
@@ -4524,7 +4510,7 @@
         </p:nvSpPr>
         <p:spPr bwMode="auto">
           <a:xfrm>
-            <a:off x="3789792" y="4125563"/>
+            <a:off x="2905016" y="3612144"/>
             <a:ext cx="2209800" cy="495300"/>
           </a:xfrm>
           <a:prstGeom prst="rect">
@@ -4587,9 +4573,9 @@
           <p:nvPr/>
         </p:nvSpPr>
         <p:spPr>
-          <a:xfrm rot="10800000" flipV="1">
-            <a:off x="4067100" y="3047449"/>
-            <a:ext cx="733547" cy="333639"/>
+          <a:xfrm rot="16200000" flipH="1" flipV="1">
+            <a:off x="3642794" y="2227339"/>
+            <a:ext cx="1058771" cy="333639"/>
           </a:xfrm>
           <a:prstGeom prst="leftUpArrow">
             <a:avLst>
@@ -4598,29 +4584,23 @@
               <a:gd name="adj3" fmla="val 25000"/>
             </a:avLst>
           </a:prstGeom>
-          <a:noFill/>
-          <a:ln w="9525" cap="flat" cmpd="sng" algn="ctr">
-            <a:solidFill>
-              <a:schemeClr val="dk1"/>
-            </a:solidFill>
-            <a:prstDash val="solid"/>
-            <a:round/>
+          <a:ln>
             <a:headEnd type="none" w="med" len="med"/>
             <a:tailEnd type="none" w="med" len="med"/>
           </a:ln>
         </p:spPr>
         <p:style>
-          <a:lnRef idx="0">
-            <a:scrgbClr r="0" g="0" b="0"/>
+          <a:lnRef idx="3">
+            <a:schemeClr val="lt1"/>
           </a:lnRef>
-          <a:fillRef idx="0">
-            <a:scrgbClr r="0" g="0" b="0"/>
+          <a:fillRef idx="1">
+            <a:schemeClr val="accent5"/>
           </a:fillRef>
-          <a:effectRef idx="0">
-            <a:scrgbClr r="0" g="0" b="0"/>
+          <a:effectRef idx="1">
+            <a:schemeClr val="accent5"/>
           </a:effectRef>
           <a:fontRef idx="minor">
-            <a:schemeClr val="dk1"/>
+            <a:schemeClr val="lt1"/>
           </a:fontRef>
         </p:style>
         <p:txBody>
@@ -4662,7 +4642,7 @@
         </p:blipFill>
         <p:spPr>
           <a:xfrm rot="20529588">
-            <a:off x="7509554" y="4456170"/>
+            <a:off x="5587256" y="4447619"/>
             <a:ext cx="519430" cy="519430"/>
           </a:xfrm>
           <a:prstGeom prst="rect">
@@ -4697,7 +4677,7 @@
         </p:blipFill>
         <p:spPr bwMode="auto">
           <a:xfrm>
-            <a:off x="6749616" y="4483017"/>
+            <a:off x="4827318" y="4474466"/>
             <a:ext cx="514985" cy="514985"/>
           </a:xfrm>
           <a:prstGeom prst="rect">
@@ -4725,7 +4705,7 @@
         </p:nvSpPr>
         <p:spPr bwMode="auto">
           <a:xfrm>
-            <a:off x="6294727" y="4986702"/>
+            <a:off x="4372429" y="4978151"/>
             <a:ext cx="2209800" cy="495300"/>
           </a:xfrm>
           <a:prstGeom prst="rect">
@@ -4789,39 +4769,33 @@
         </p:nvSpPr>
         <p:spPr>
           <a:xfrm rot="10800000" flipV="1">
-            <a:off x="1055266" y="4427620"/>
-            <a:ext cx="1044575" cy="615059"/>
+            <a:off x="1055265" y="4428531"/>
+            <a:ext cx="3437985" cy="753204"/>
           </a:xfrm>
           <a:prstGeom prst="leftUpArrow">
             <a:avLst>
-              <a:gd name="adj1" fmla="val 13504"/>
-              <a:gd name="adj2" fmla="val 12785"/>
-              <a:gd name="adj3" fmla="val 17815"/>
+              <a:gd name="adj1" fmla="val 10517"/>
+              <a:gd name="adj2" fmla="val 9798"/>
+              <a:gd name="adj3" fmla="val 11842"/>
             </a:avLst>
           </a:prstGeom>
-          <a:noFill/>
-          <a:ln w="9525" cap="flat" cmpd="sng" algn="ctr">
-            <a:solidFill>
-              <a:schemeClr val="dk1"/>
-            </a:solidFill>
-            <a:prstDash val="solid"/>
-            <a:round/>
+          <a:ln>
             <a:headEnd type="none" w="med" len="med"/>
             <a:tailEnd type="none" w="med" len="med"/>
           </a:ln>
         </p:spPr>
         <p:style>
-          <a:lnRef idx="0">
-            <a:scrgbClr r="0" g="0" b="0"/>
+          <a:lnRef idx="3">
+            <a:schemeClr val="lt1"/>
           </a:lnRef>
-          <a:fillRef idx="0">
-            <a:scrgbClr r="0" g="0" b="0"/>
+          <a:fillRef idx="1">
+            <a:schemeClr val="accent5"/>
           </a:fillRef>
-          <a:effectRef idx="0">
-            <a:scrgbClr r="0" g="0" b="0"/>
+          <a:effectRef idx="1">
+            <a:schemeClr val="accent5"/>
           </a:effectRef>
           <a:fontRef idx="minor">
-            <a:schemeClr val="dk1"/>
+            <a:schemeClr val="lt1"/>
           </a:fontRef>
         </p:style>
         <p:txBody>
@@ -4833,7 +4807,7 @@
           </a:bodyPr>
           <a:lstStyle/>
           <a:p>
-            <a:endParaRPr lang="pt-BR"/>
+            <a:endParaRPr lang="pt-BR" dirty="0"/>
           </a:p>
         </p:txBody>
       </p:sp>
@@ -4866,8 +4840,8 @@
         </p:blipFill>
         <p:spPr>
           <a:xfrm>
-            <a:off x="2150565" y="4789614"/>
-            <a:ext cx="581660" cy="615059"/>
+            <a:off x="775891" y="5207748"/>
+            <a:ext cx="396129" cy="371405"/>
           </a:xfrm>
           <a:prstGeom prst="rect">
             <a:avLst/>
@@ -4887,40 +4861,34 @@
           <p:nvPr/>
         </p:nvSpPr>
         <p:spPr>
-          <a:xfrm flipV="1">
-            <a:off x="8273937" y="4632971"/>
-            <a:ext cx="2209799" cy="550543"/>
+          <a:xfrm rot="10800000">
+            <a:off x="5710381" y="3494516"/>
+            <a:ext cx="2339297" cy="872014"/>
           </a:xfrm>
           <a:prstGeom prst="leftUpArrow">
             <a:avLst>
-              <a:gd name="adj1" fmla="val 14158"/>
-              <a:gd name="adj2" fmla="val 14158"/>
-              <a:gd name="adj3" fmla="val 14895"/>
+              <a:gd name="adj1" fmla="val 9043"/>
+              <a:gd name="adj2" fmla="val 8403"/>
+              <a:gd name="adj3" fmla="val 8501"/>
             </a:avLst>
           </a:prstGeom>
-          <a:noFill/>
-          <a:ln w="9525" cap="flat" cmpd="sng" algn="ctr">
-            <a:solidFill>
-              <a:schemeClr val="dk1"/>
-            </a:solidFill>
-            <a:prstDash val="solid"/>
-            <a:round/>
+          <a:ln>
             <a:headEnd type="none" w="med" len="med"/>
             <a:tailEnd type="none" w="med" len="med"/>
           </a:ln>
         </p:spPr>
         <p:style>
-          <a:lnRef idx="0">
-            <a:scrgbClr r="0" g="0" b="0"/>
+          <a:lnRef idx="3">
+            <a:schemeClr val="lt1"/>
           </a:lnRef>
-          <a:fillRef idx="0">
-            <a:scrgbClr r="0" g="0" b="0"/>
+          <a:fillRef idx="1">
+            <a:schemeClr val="accent5"/>
           </a:fillRef>
-          <a:effectRef idx="0">
-            <a:scrgbClr r="0" g="0" b="0"/>
+          <a:effectRef idx="1">
+            <a:schemeClr val="accent5"/>
           </a:effectRef>
           <a:fontRef idx="minor">
-            <a:schemeClr val="dk1"/>
+            <a:schemeClr val="lt1"/>
           </a:fontRef>
         </p:style>
         <p:txBody>
@@ -4932,7 +4900,7 @@
           </a:bodyPr>
           <a:lstStyle/>
           <a:p>
-            <a:endParaRPr lang="pt-BR"/>
+            <a:endParaRPr lang="pt-BR" dirty="0"/>
           </a:p>
         </p:txBody>
       </p:sp>
@@ -4963,7 +4931,7 @@
         </p:blipFill>
         <p:spPr bwMode="auto">
           <a:xfrm>
-            <a:off x="10589649" y="5192644"/>
+            <a:off x="9007087" y="4742740"/>
             <a:ext cx="550545" cy="550546"/>
           </a:xfrm>
           <a:prstGeom prst="rect">
@@ -5002,7 +4970,7 @@
         </p:blipFill>
         <p:spPr bwMode="auto">
           <a:xfrm>
-            <a:off x="9721990" y="5206729"/>
+            <a:off x="8139428" y="4756825"/>
             <a:ext cx="550545" cy="550545"/>
           </a:xfrm>
           <a:prstGeom prst="rect">
@@ -5030,7 +4998,7 @@
         </p:nvSpPr>
         <p:spPr bwMode="auto">
           <a:xfrm>
-            <a:off x="9378836" y="5799315"/>
+            <a:off x="7796274" y="5349411"/>
             <a:ext cx="2103120" cy="509905"/>
           </a:xfrm>
           <a:prstGeom prst="rect">
@@ -5107,8 +5075,8 @@
         </p:blipFill>
         <p:spPr bwMode="auto">
           <a:xfrm>
-            <a:off x="9020950" y="4082427"/>
-            <a:ext cx="701040" cy="701040"/>
+            <a:off x="6803748" y="5065522"/>
+            <a:ext cx="550545" cy="550545"/>
           </a:xfrm>
           <a:prstGeom prst="rect">
             <a:avLst/>
@@ -5119,70 +5087,12 @@
           </a:ln>
         </p:spPr>
       </p:pic>
-      <p:sp>
-        <p:nvSpPr>
-          <p:cNvPr id="47" name="Seta: da Esquerda para a Direita 46">
-            <a:extLst>
-              <a:ext uri="{FF2B5EF4-FFF2-40B4-BE49-F238E27FC236}">
-                <a16:creationId xmlns:a16="http://schemas.microsoft.com/office/drawing/2014/main" id="{B1703C86-63DD-4526-A5F5-0CD40DDC32C8}"/>
-              </a:ext>
-            </a:extLst>
-          </p:cNvPr>
-          <p:cNvSpPr/>
-          <p:nvPr/>
-        </p:nvSpPr>
-        <p:spPr>
-          <a:xfrm>
-            <a:off x="2732225" y="4972445"/>
-            <a:ext cx="3659040" cy="152104"/>
-          </a:xfrm>
-          <a:prstGeom prst="leftRightArrow">
-            <a:avLst/>
-          </a:prstGeom>
-          <a:noFill/>
-          <a:ln w="9525" cap="flat" cmpd="sng" algn="ctr">
-            <a:solidFill>
-              <a:schemeClr val="dk1"/>
-            </a:solidFill>
-            <a:prstDash val="solid"/>
-            <a:round/>
-            <a:headEnd type="none" w="med" len="med"/>
-            <a:tailEnd type="none" w="med" len="med"/>
-          </a:ln>
-        </p:spPr>
-        <p:style>
-          <a:lnRef idx="0">
-            <a:scrgbClr r="0" g="0" b="0"/>
-          </a:lnRef>
-          <a:fillRef idx="0">
-            <a:scrgbClr r="0" g="0" b="0"/>
-          </a:fillRef>
-          <a:effectRef idx="0">
-            <a:scrgbClr r="0" g="0" b="0"/>
-          </a:effectRef>
-          <a:fontRef idx="minor">
-            <a:schemeClr val="dk1"/>
-          </a:fontRef>
-        </p:style>
-        <p:txBody>
-          <a:bodyPr rot="0" spcFirstLastPara="0" vert="horz" wrap="square" lIns="91440" tIns="45720" rIns="91440" bIns="45720" numCol="1" spcCol="0" rtlCol="0" fromWordArt="0" anchor="ctr" anchorCtr="0" forceAA="0" compatLnSpc="1">
-            <a:prstTxWarp prst="textNoShape">
-              <a:avLst/>
-            </a:prstTxWarp>
-            <a:noAutofit/>
-          </a:bodyPr>
-          <a:lstStyle/>
-          <a:p>
-            <a:endParaRPr lang="pt-BR"/>
-          </a:p>
-        </p:txBody>
-      </p:sp>
       <p:pic>
         <p:nvPicPr>
-          <p:cNvPr id="48" name="Imagem 47">
-            <a:extLst>
-              <a:ext uri="{FF2B5EF4-FFF2-40B4-BE49-F238E27FC236}">
-                <a16:creationId xmlns:a16="http://schemas.microsoft.com/office/drawing/2014/main" id="{8148F385-5076-46DA-9B5F-A1C363797481}"/>
+          <p:cNvPr id="50" name="Imagem 49">
+            <a:extLst>
+              <a:ext uri="{FF2B5EF4-FFF2-40B4-BE49-F238E27FC236}">
+                <a16:creationId xmlns:a16="http://schemas.microsoft.com/office/drawing/2014/main" id="{51523602-2DDD-49EC-A2C8-258A1322A2D5}"/>
               </a:ext>
             </a:extLst>
           </p:cNvPr>
@@ -5204,8 +5114,8 @@
         </p:blipFill>
         <p:spPr bwMode="auto">
           <a:xfrm>
-            <a:off x="8135223" y="2698907"/>
-            <a:ext cx="1199515" cy="520065"/>
+            <a:off x="4488649" y="5734639"/>
+            <a:ext cx="626745" cy="626745"/>
           </a:xfrm>
           <a:prstGeom prst="rect">
             <a:avLst/>
@@ -5216,45 +5126,6 @@
           </a:ln>
         </p:spPr>
       </p:pic>
-      <p:pic>
-        <p:nvPicPr>
-          <p:cNvPr id="50" name="Imagem 49">
-            <a:extLst>
-              <a:ext uri="{FF2B5EF4-FFF2-40B4-BE49-F238E27FC236}">
-                <a16:creationId xmlns:a16="http://schemas.microsoft.com/office/drawing/2014/main" id="{51523602-2DDD-49EC-A2C8-258A1322A2D5}"/>
-              </a:ext>
-            </a:extLst>
-          </p:cNvPr>
-          <p:cNvPicPr/>
-          <p:nvPr/>
-        </p:nvPicPr>
-        <p:blipFill>
-          <a:blip r:embed="rId28" cstate="print">
-            <a:extLst>
-              <a:ext uri="{28A0092B-C50C-407E-A947-70E740481C1C}">
-                <a14:useLocalDpi xmlns:a14="http://schemas.microsoft.com/office/drawing/2010/main" val="0"/>
-              </a:ext>
-            </a:extLst>
-          </a:blip>
-          <a:srcRect/>
-          <a:stretch>
-            <a:fillRect/>
-          </a:stretch>
-        </p:blipFill>
-        <p:spPr bwMode="auto">
-          <a:xfrm>
-            <a:off x="6410947" y="5743190"/>
-            <a:ext cx="626745" cy="626745"/>
-          </a:xfrm>
-          <a:prstGeom prst="rect">
-            <a:avLst/>
-          </a:prstGeom>
-          <a:noFill/>
-          <a:ln>
-            <a:noFill/>
-          </a:ln>
-        </p:spPr>
-      </p:pic>
       <p:sp>
         <p:nvSpPr>
           <p:cNvPr id="51" name="Caixa de Texto 2">
@@ -5271,7 +5142,7 @@
         </p:nvSpPr>
         <p:spPr bwMode="auto">
           <a:xfrm>
-            <a:off x="6193661" y="6323367"/>
+            <a:off x="4248376" y="6415509"/>
             <a:ext cx="1125902" cy="382270"/>
           </a:xfrm>
           <a:prstGeom prst="rect">
@@ -5334,7 +5205,7 @@
           <p:nvPr/>
         </p:nvPicPr>
         <p:blipFill>
-          <a:blip r:embed="rId29" cstate="print">
+          <a:blip r:embed="rId28" cstate="print">
             <a:extLst>
               <a:ext uri="{28A0092B-C50C-407E-A947-70E740481C1C}">
                 <a14:useLocalDpi xmlns:a14="http://schemas.microsoft.com/office/drawing/2010/main" val="0"/>
@@ -5348,7 +5219,7 @@
         </p:blipFill>
         <p:spPr bwMode="auto">
           <a:xfrm>
-            <a:off x="7913708" y="5821074"/>
+            <a:off x="5991410" y="5812523"/>
             <a:ext cx="520065" cy="520065"/>
           </a:xfrm>
           <a:prstGeom prst="rect">
@@ -5376,7 +5247,7 @@
         </p:nvSpPr>
         <p:spPr bwMode="auto">
           <a:xfrm>
-            <a:off x="7259011" y="6334162"/>
+            <a:off x="5350112" y="6342827"/>
             <a:ext cx="1674103" cy="371475"/>
           </a:xfrm>
           <a:prstGeom prst="rect">
@@ -5439,7 +5310,7 @@
           <p:nvPr/>
         </p:nvPicPr>
         <p:blipFill>
-          <a:blip r:embed="rId30" cstate="print">
+          <a:blip r:embed="rId29" cstate="print">
             <a:extLst>
               <a:ext uri="{28A0092B-C50C-407E-A947-70E740481C1C}">
                 <a14:useLocalDpi xmlns:a14="http://schemas.microsoft.com/office/drawing/2010/main" val="0"/>
@@ -5452,7 +5323,7 @@
         </p:blipFill>
         <p:spPr>
           <a:xfrm>
-            <a:off x="10108038" y="2666399"/>
+            <a:off x="10446390" y="2579660"/>
             <a:ext cx="508635" cy="508635"/>
           </a:xfrm>
           <a:prstGeom prst="rect">
@@ -5476,8 +5347,8 @@
         </p:nvSpPr>
         <p:spPr bwMode="auto">
           <a:xfrm>
-            <a:off x="9257456" y="3190430"/>
-            <a:ext cx="2209800" cy="382270"/>
+            <a:off x="10003725" y="3153047"/>
+            <a:ext cx="1359853" cy="382270"/>
           </a:xfrm>
           <a:prstGeom prst="rect">
             <a:avLst/>
@@ -5539,36 +5410,30 @@
           <p:nvPr/>
         </p:nvSpPr>
         <p:spPr>
-          <a:xfrm rot="16200000">
-            <a:off x="6392429" y="3589921"/>
-            <a:ext cx="280262" cy="1223302"/>
+          <a:xfrm flipV="1">
+            <a:off x="5104399" y="3318766"/>
+            <a:ext cx="291267" cy="1046213"/>
           </a:xfrm>
           <a:prstGeom prst="leftUpArrow">
             <a:avLst/>
           </a:prstGeom>
-          <a:noFill/>
-          <a:ln w="9525" cap="flat" cmpd="sng" algn="ctr">
-            <a:solidFill>
-              <a:schemeClr val="dk1"/>
-            </a:solidFill>
-            <a:prstDash val="solid"/>
-            <a:round/>
+          <a:ln>
             <a:headEnd type="none" w="med" len="med"/>
             <a:tailEnd type="none" w="med" len="med"/>
           </a:ln>
         </p:spPr>
         <p:style>
-          <a:lnRef idx="0">
-            <a:scrgbClr r="0" g="0" b="0"/>
+          <a:lnRef idx="3">
+            <a:schemeClr val="lt1"/>
           </a:lnRef>
-          <a:fillRef idx="0">
-            <a:scrgbClr r="0" g="0" b="0"/>
+          <a:fillRef idx="1">
+            <a:schemeClr val="accent5"/>
           </a:fillRef>
-          <a:effectRef idx="0">
-            <a:scrgbClr r="0" g="0" b="0"/>
+          <a:effectRef idx="1">
+            <a:schemeClr val="accent5"/>
           </a:effectRef>
           <a:fontRef idx="minor">
-            <a:schemeClr val="dk1"/>
+            <a:schemeClr val="lt1"/>
           </a:fontRef>
         </p:style>
         <p:txBody>
@@ -5598,35 +5463,29 @@
         </p:nvSpPr>
         <p:spPr>
           <a:xfrm rot="5400000">
-            <a:off x="6564646" y="5495948"/>
-            <a:ext cx="319155" cy="183515"/>
+            <a:off x="4642347" y="5487398"/>
+            <a:ext cx="319155" cy="183514"/>
           </a:xfrm>
           <a:prstGeom prst="leftRightArrow">
             <a:avLst/>
           </a:prstGeom>
-          <a:noFill/>
-          <a:ln w="9525" cap="flat" cmpd="sng" algn="ctr">
-            <a:solidFill>
-              <a:schemeClr val="dk1"/>
-            </a:solidFill>
-            <a:prstDash val="solid"/>
-            <a:round/>
+          <a:ln>
             <a:headEnd type="none" w="med" len="med"/>
             <a:tailEnd type="none" w="med" len="med"/>
           </a:ln>
         </p:spPr>
         <p:style>
-          <a:lnRef idx="0">
-            <a:scrgbClr r="0" g="0" b="0"/>
+          <a:lnRef idx="3">
+            <a:schemeClr val="lt1"/>
           </a:lnRef>
-          <a:fillRef idx="0">
-            <a:scrgbClr r="0" g="0" b="0"/>
+          <a:fillRef idx="1">
+            <a:schemeClr val="accent5"/>
           </a:fillRef>
-          <a:effectRef idx="0">
-            <a:scrgbClr r="0" g="0" b="0"/>
+          <a:effectRef idx="1">
+            <a:schemeClr val="accent5"/>
           </a:effectRef>
           <a:fontRef idx="minor">
-            <a:schemeClr val="dk1"/>
+            <a:schemeClr val="lt1"/>
           </a:fontRef>
         </p:style>
         <p:txBody>
@@ -5642,12 +5501,48 @@
           </a:p>
         </p:txBody>
       </p:sp>
-      <p:sp>
-        <p:nvSpPr>
-          <p:cNvPr id="60" name="Seta: da Esquerda para a Direita 59">
-            <a:extLst>
-              <a:ext uri="{FF2B5EF4-FFF2-40B4-BE49-F238E27FC236}">
-                <a16:creationId xmlns:a16="http://schemas.microsoft.com/office/drawing/2014/main" id="{AF0D8BC1-87A2-4D01-ACA5-8B27C1590819}"/>
+      <p:pic>
+        <p:nvPicPr>
+          <p:cNvPr id="59" name="Imagem 58" descr="Desenho de animal com fundo preto&#10;&#10;Descrição gerada automaticamente com confiança média">
+            <a:extLst>
+              <a:ext uri="{FF2B5EF4-FFF2-40B4-BE49-F238E27FC236}">
+                <a16:creationId xmlns:a16="http://schemas.microsoft.com/office/drawing/2014/main" id="{315FC3E6-B325-4D2C-99A3-FE156BC9C3F0}"/>
+              </a:ext>
+            </a:extLst>
+          </p:cNvPr>
+          <p:cNvPicPr>
+            <a:picLocks noChangeAspect="1"/>
+          </p:cNvPicPr>
+          <p:nvPr/>
+        </p:nvPicPr>
+        <p:blipFill>
+          <a:blip r:embed="rId30">
+            <a:extLst>
+              <a:ext uri="{28A0092B-C50C-407E-A947-70E740481C1C}">
+                <a14:useLocalDpi xmlns:a14="http://schemas.microsoft.com/office/drawing/2010/main" val="0"/>
+              </a:ext>
+            </a:extLst>
+          </a:blip>
+          <a:stretch>
+            <a:fillRect/>
+          </a:stretch>
+        </p:blipFill>
+        <p:spPr>
+          <a:xfrm>
+            <a:off x="8165776" y="3121057"/>
+            <a:ext cx="1520017" cy="658874"/>
+          </a:xfrm>
+          <a:prstGeom prst="rect">
+            <a:avLst/>
+          </a:prstGeom>
+        </p:spPr>
+      </p:pic>
+      <p:sp>
+        <p:nvSpPr>
+          <p:cNvPr id="61" name="Seta: para a Esquerda e para Cima 60">
+            <a:extLst>
+              <a:ext uri="{FF2B5EF4-FFF2-40B4-BE49-F238E27FC236}">
+                <a16:creationId xmlns:a16="http://schemas.microsoft.com/office/drawing/2014/main" id="{BDD2A7EB-CDA0-4B54-8E29-9C75DE798584}"/>
               </a:ext>
             </a:extLst>
           </p:cNvPr>
@@ -5655,36 +5550,34 @@
           <p:nvPr/>
         </p:nvSpPr>
         <p:spPr>
-          <a:xfrm rot="5400000">
-            <a:off x="7929288" y="5495947"/>
-            <a:ext cx="319155" cy="183515"/>
-          </a:xfrm>
-          <a:prstGeom prst="leftRightArrow">
-            <a:avLst/>
-          </a:prstGeom>
-          <a:noFill/>
-          <a:ln w="9525" cap="flat" cmpd="sng" algn="ctr">
-            <a:solidFill>
-              <a:schemeClr val="dk1"/>
-            </a:solidFill>
-            <a:prstDash val="solid"/>
-            <a:round/>
+          <a:xfrm flipH="1" flipV="1">
+            <a:off x="8759926" y="2794464"/>
+            <a:ext cx="1580946" cy="333639"/>
+          </a:xfrm>
+          <a:prstGeom prst="leftUpArrow">
+            <a:avLst>
+              <a:gd name="adj1" fmla="val 19634"/>
+              <a:gd name="adj2" fmla="val 22317"/>
+              <a:gd name="adj3" fmla="val 25000"/>
+            </a:avLst>
+          </a:prstGeom>
+          <a:ln>
             <a:headEnd type="none" w="med" len="med"/>
             <a:tailEnd type="none" w="med" len="med"/>
           </a:ln>
         </p:spPr>
         <p:style>
-          <a:lnRef idx="0">
-            <a:scrgbClr r="0" g="0" b="0"/>
+          <a:lnRef idx="3">
+            <a:schemeClr val="lt1"/>
           </a:lnRef>
-          <a:fillRef idx="0">
-            <a:scrgbClr r="0" g="0" b="0"/>
+          <a:fillRef idx="1">
+            <a:schemeClr val="accent5"/>
           </a:fillRef>
-          <a:effectRef idx="0">
-            <a:scrgbClr r="0" g="0" b="0"/>
+          <a:effectRef idx="1">
+            <a:schemeClr val="accent5"/>
           </a:effectRef>
           <a:fontRef idx="minor">
-            <a:schemeClr val="dk1"/>
+            <a:schemeClr val="lt1"/>
           </a:fontRef>
         </p:style>
         <p:txBody>
@@ -5702,10 +5595,10 @@
       </p:sp>
       <p:sp>
         <p:nvSpPr>
-          <p:cNvPr id="66" name="Seta: da Esquerda para a Direita 65">
-            <a:extLst>
-              <a:ext uri="{FF2B5EF4-FFF2-40B4-BE49-F238E27FC236}">
-                <a16:creationId xmlns:a16="http://schemas.microsoft.com/office/drawing/2014/main" id="{DA2308ED-6825-41E8-B40E-64E43FE5E803}"/>
+          <p:cNvPr id="62" name="Seta: da Esquerda para a Direita 61">
+            <a:extLst>
+              <a:ext uri="{FF2B5EF4-FFF2-40B4-BE49-F238E27FC236}">
+                <a16:creationId xmlns:a16="http://schemas.microsoft.com/office/drawing/2014/main" id="{41C8A440-33E8-41A6-ABBD-56D67C38E7A4}"/>
               </a:ext>
             </a:extLst>
           </p:cNvPr>
@@ -5714,35 +5607,29 @@
         </p:nvSpPr>
         <p:spPr>
           <a:xfrm rot="10800000">
-            <a:off x="7318563" y="5962509"/>
-            <a:ext cx="319155" cy="183515"/>
+            <a:off x="6458913" y="5038714"/>
+            <a:ext cx="1548730" cy="126236"/>
           </a:xfrm>
           <a:prstGeom prst="leftRightArrow">
             <a:avLst/>
           </a:prstGeom>
-          <a:noFill/>
-          <a:ln w="9525" cap="flat" cmpd="sng" algn="ctr">
-            <a:solidFill>
-              <a:schemeClr val="dk1"/>
-            </a:solidFill>
-            <a:prstDash val="solid"/>
-            <a:round/>
+          <a:ln>
             <a:headEnd type="none" w="med" len="med"/>
             <a:tailEnd type="none" w="med" len="med"/>
           </a:ln>
         </p:spPr>
         <p:style>
-          <a:lnRef idx="0">
-            <a:scrgbClr r="0" g="0" b="0"/>
+          <a:lnRef idx="3">
+            <a:schemeClr val="lt1"/>
           </a:lnRef>
-          <a:fillRef idx="0">
-            <a:scrgbClr r="0" g="0" b="0"/>
+          <a:fillRef idx="1">
+            <a:schemeClr val="accent5"/>
           </a:fillRef>
-          <a:effectRef idx="0">
-            <a:scrgbClr r="0" g="0" b="0"/>
+          <a:effectRef idx="1">
+            <a:schemeClr val="accent5"/>
           </a:effectRef>
           <a:fontRef idx="minor">
-            <a:schemeClr val="dk1"/>
+            <a:schemeClr val="lt1"/>
           </a:fontRef>
         </p:style>
         <p:txBody>
@@ -5754,16 +5641,16 @@
           </a:bodyPr>
           <a:lstStyle/>
           <a:p>
-            <a:endParaRPr lang="pt-BR"/>
-          </a:p>
-        </p:txBody>
-      </p:sp>
-      <p:sp>
-        <p:nvSpPr>
-          <p:cNvPr id="2" name="Seta: para a Direita 1">
-            <a:extLst>
-              <a:ext uri="{FF2B5EF4-FFF2-40B4-BE49-F238E27FC236}">
-                <a16:creationId xmlns:a16="http://schemas.microsoft.com/office/drawing/2014/main" id="{AEF29182-498B-4D76-8EBE-B46DE39E7A1D}"/>
+            <a:endParaRPr lang="pt-BR" dirty="0"/>
+          </a:p>
+        </p:txBody>
+      </p:sp>
+      <p:sp>
+        <p:nvSpPr>
+          <p:cNvPr id="65" name="Seta: da Esquerda para a Direita 64">
+            <a:extLst>
+              <a:ext uri="{FF2B5EF4-FFF2-40B4-BE49-F238E27FC236}">
+                <a16:creationId xmlns:a16="http://schemas.microsoft.com/office/drawing/2014/main" id="{5DE215B7-F89C-4587-A4C8-F8C3CE139387}"/>
               </a:ext>
             </a:extLst>
           </p:cNvPr>
@@ -5771,144 +5658,30 @@
           <p:nvPr/>
         </p:nvSpPr>
         <p:spPr>
-          <a:xfrm>
-            <a:off x="9382406" y="2906675"/>
-            <a:ext cx="508635" cy="125387"/>
-          </a:xfrm>
-          <a:prstGeom prst="rightArrow">
-            <a:avLst/>
-          </a:prstGeom>
-          <a:noFill/>
-          <a:ln w="9525" cap="flat" cmpd="sng" algn="ctr">
-            <a:solidFill>
-              <a:schemeClr val="dk1"/>
-            </a:solidFill>
-            <a:prstDash val="solid"/>
-            <a:round/>
+          <a:xfrm rot="5400000">
+            <a:off x="5990820" y="5512289"/>
+            <a:ext cx="319155" cy="183514"/>
+          </a:xfrm>
+          <a:prstGeom prst="leftRightArrow">
+            <a:avLst/>
+          </a:prstGeom>
+          <a:ln>
             <a:headEnd type="none" w="med" len="med"/>
             <a:tailEnd type="none" w="med" len="med"/>
           </a:ln>
         </p:spPr>
         <p:style>
-          <a:lnRef idx="0">
-            <a:scrgbClr r="0" g="0" b="0"/>
+          <a:lnRef idx="3">
+            <a:schemeClr val="lt1"/>
           </a:lnRef>
-          <a:fillRef idx="0">
-            <a:scrgbClr r="0" g="0" b="0"/>
+          <a:fillRef idx="1">
+            <a:schemeClr val="accent5"/>
           </a:fillRef>
-          <a:effectRef idx="0">
-            <a:scrgbClr r="0" g="0" b="0"/>
+          <a:effectRef idx="1">
+            <a:schemeClr val="accent5"/>
           </a:effectRef>
           <a:fontRef idx="minor">
-            <a:schemeClr val="dk1"/>
-          </a:fontRef>
-        </p:style>
-        <p:txBody>
-          <a:bodyPr rtlCol="0" anchor="ctr"/>
-          <a:lstStyle/>
-          <a:p>
-            <a:pPr algn="ctr"/>
-            <a:endParaRPr lang="pt-BR"/>
-          </a:p>
-        </p:txBody>
-      </p:sp>
-      <p:sp>
-        <p:nvSpPr>
-          <p:cNvPr id="3" name="Seta: Dobrada para Cima 2">
-            <a:extLst>
-              <a:ext uri="{FF2B5EF4-FFF2-40B4-BE49-F238E27FC236}">
-                <a16:creationId xmlns:a16="http://schemas.microsoft.com/office/drawing/2014/main" id="{2A4129D8-08DA-445D-9325-84C0C455719B}"/>
-              </a:ext>
-            </a:extLst>
-          </p:cNvPr>
-          <p:cNvSpPr/>
-          <p:nvPr/>
-        </p:nvSpPr>
-        <p:spPr>
-          <a:xfrm rot="5400000" flipH="1">
-            <a:off x="7248976" y="3520578"/>
-            <a:ext cx="1482352" cy="290142"/>
-          </a:xfrm>
-          <a:prstGeom prst="bentUpArrow">
-            <a:avLst/>
-          </a:prstGeom>
-          <a:noFill/>
-          <a:ln w="9525" cap="flat" cmpd="sng" algn="ctr">
-            <a:solidFill>
-              <a:schemeClr val="dk1"/>
-            </a:solidFill>
-            <a:prstDash val="solid"/>
-            <a:round/>
-            <a:headEnd type="none" w="med" len="med"/>
-            <a:tailEnd type="none" w="med" len="med"/>
-          </a:ln>
-        </p:spPr>
-        <p:style>
-          <a:lnRef idx="0">
-            <a:scrgbClr r="0" g="0" b="0"/>
-          </a:lnRef>
-          <a:fillRef idx="0">
-            <a:scrgbClr r="0" g="0" b="0"/>
-          </a:fillRef>
-          <a:effectRef idx="0">
-            <a:scrgbClr r="0" g="0" b="0"/>
-          </a:effectRef>
-          <a:fontRef idx="minor">
-            <a:schemeClr val="dk1"/>
-          </a:fontRef>
-        </p:style>
-        <p:txBody>
-          <a:bodyPr rtlCol="0" anchor="ctr"/>
-          <a:lstStyle/>
-          <a:p>
-            <a:pPr algn="ctr"/>
-            <a:endParaRPr lang="pt-BR"/>
-          </a:p>
-        </p:txBody>
-      </p:sp>
-      <p:sp>
-        <p:nvSpPr>
-          <p:cNvPr id="54" name="Seta: da Esquerda para a Direita 53">
-            <a:extLst>
-              <a:ext uri="{FF2B5EF4-FFF2-40B4-BE49-F238E27FC236}">
-                <a16:creationId xmlns:a16="http://schemas.microsoft.com/office/drawing/2014/main" id="{C826E196-2720-4428-9F74-C5E9FC4CC57E}"/>
-              </a:ext>
-            </a:extLst>
-          </p:cNvPr>
-          <p:cNvSpPr/>
-          <p:nvPr/>
-        </p:nvSpPr>
-        <p:spPr>
-          <a:xfrm rot="16200000">
-            <a:off x="864578" y="2356829"/>
-            <a:ext cx="547767" cy="101828"/>
-          </a:xfrm>
-          <a:prstGeom prst="leftRightArrow">
-            <a:avLst/>
-          </a:prstGeom>
-          <a:noFill/>
-          <a:ln w="9525" cap="flat" cmpd="sng" algn="ctr">
-            <a:solidFill>
-              <a:schemeClr val="dk1"/>
-            </a:solidFill>
-            <a:prstDash val="solid"/>
-            <a:round/>
-            <a:headEnd type="none" w="med" len="med"/>
-            <a:tailEnd type="none" w="med" len="med"/>
-          </a:ln>
-        </p:spPr>
-        <p:style>
-          <a:lnRef idx="0">
-            <a:scrgbClr r="0" g="0" b="0"/>
-          </a:lnRef>
-          <a:fillRef idx="0">
-            <a:scrgbClr r="0" g="0" b="0"/>
-          </a:fillRef>
-          <a:effectRef idx="0">
-            <a:scrgbClr r="0" g="0" b="0"/>
-          </a:effectRef>
-          <a:fontRef idx="minor">
-            <a:schemeClr val="dk1"/>
+            <a:schemeClr val="lt1"/>
           </a:fontRef>
         </p:style>
         <p:txBody>
@@ -5926,10 +5699,10 @@
       </p:sp>
       <p:sp>
         <p:nvSpPr>
-          <p:cNvPr id="55" name="Seta: da Esquerda para a Direita 54">
-            <a:extLst>
-              <a:ext uri="{FF2B5EF4-FFF2-40B4-BE49-F238E27FC236}">
-                <a16:creationId xmlns:a16="http://schemas.microsoft.com/office/drawing/2014/main" id="{6C57AA11-1527-4C9D-8E57-055543DE1290}"/>
+          <p:cNvPr id="67" name="Seta: da Esquerda para a Direita 66">
+            <a:extLst>
+              <a:ext uri="{FF2B5EF4-FFF2-40B4-BE49-F238E27FC236}">
+                <a16:creationId xmlns:a16="http://schemas.microsoft.com/office/drawing/2014/main" id="{0355EA9F-4B14-454A-B907-4D336D9615AB}"/>
               </a:ext>
             </a:extLst>
           </p:cNvPr>
@@ -5937,36 +5710,30 @@
           <p:nvPr/>
         </p:nvSpPr>
         <p:spPr>
-          <a:xfrm rot="16200000">
-            <a:off x="3861172" y="2020965"/>
-            <a:ext cx="547767" cy="150210"/>
+          <a:xfrm rot="10800000">
+            <a:off x="5250032" y="5979305"/>
+            <a:ext cx="626743" cy="183514"/>
           </a:xfrm>
           <a:prstGeom prst="leftRightArrow">
             <a:avLst/>
           </a:prstGeom>
-          <a:noFill/>
-          <a:ln w="9525" cap="flat" cmpd="sng" algn="ctr">
-            <a:solidFill>
-              <a:schemeClr val="dk1"/>
-            </a:solidFill>
-            <a:prstDash val="solid"/>
-            <a:round/>
+          <a:ln>
             <a:headEnd type="none" w="med" len="med"/>
             <a:tailEnd type="none" w="med" len="med"/>
           </a:ln>
         </p:spPr>
         <p:style>
-          <a:lnRef idx="0">
-            <a:scrgbClr r="0" g="0" b="0"/>
+          <a:lnRef idx="3">
+            <a:schemeClr val="lt1"/>
           </a:lnRef>
-          <a:fillRef idx="0">
-            <a:scrgbClr r="0" g="0" b="0"/>
+          <a:fillRef idx="1">
+            <a:schemeClr val="accent5"/>
           </a:fillRef>
-          <a:effectRef idx="0">
-            <a:scrgbClr r="0" g="0" b="0"/>
+          <a:effectRef idx="1">
+            <a:schemeClr val="accent5"/>
           </a:effectRef>
           <a:fontRef idx="minor">
-            <a:schemeClr val="dk1"/>
+            <a:schemeClr val="lt1"/>
           </a:fontRef>
         </p:style>
         <p:txBody>
@@ -9480,6 +9247,17 @@
 <file path=ppt/slides/slide4.xml><?xml version="1.0" encoding="utf-8"?>
 <p:sld xmlns:a="http://schemas.openxmlformats.org/drawingml/2006/main" xmlns:r="http://schemas.openxmlformats.org/officeDocument/2006/relationships" xmlns:p="http://schemas.openxmlformats.org/presentationml/2006/main">
   <p:cSld>
+    <p:bg>
+      <p:bgPr>
+        <a:solidFill>
+          <a:schemeClr val="accent3">
+            <a:lumMod val="20000"/>
+            <a:lumOff val="80000"/>
+          </a:schemeClr>
+        </a:solidFill>
+        <a:effectLst/>
+      </p:bgPr>
+    </p:bg>
     <p:spTree>
       <p:nvGrpSpPr>
         <p:cNvPr id="1" name=""/>
@@ -9508,32 +9286,29 @@
         </p:nvSpPr>
         <p:spPr>
           <a:xfrm>
-            <a:off x="3061691" y="112234"/>
+            <a:off x="3061598" y="70579"/>
             <a:ext cx="4860255" cy="2856252"/>
           </a:xfrm>
           <a:prstGeom prst="cloud">
             <a:avLst/>
           </a:prstGeom>
-          <a:noFill/>
-          <a:ln w="38100" cap="flat" cmpd="sng" algn="ctr">
+          <a:ln w="12700">
             <a:solidFill>
-              <a:schemeClr val="dk1"/>
+              <a:schemeClr val="bg1"/>
             </a:solidFill>
-            <a:prstDash val="solid"/>
-            <a:round/>
             <a:headEnd type="none" w="med" len="med"/>
             <a:tailEnd type="none" w="med" len="med"/>
           </a:ln>
         </p:spPr>
         <p:style>
-          <a:lnRef idx="0">
-            <a:scrgbClr r="0" g="0" b="0"/>
+          <a:lnRef idx="1">
+            <a:schemeClr val="accent5"/>
           </a:lnRef>
-          <a:fillRef idx="0">
-            <a:scrgbClr r="0" g="0" b="0"/>
+          <a:fillRef idx="2">
+            <a:schemeClr val="accent5"/>
           </a:fillRef>
-          <a:effectRef idx="0">
-            <a:scrgbClr r="0" g="0" b="0"/>
+          <a:effectRef idx="1">
+            <a:schemeClr val="accent5"/>
           </a:effectRef>
           <a:fontRef idx="minor">
             <a:schemeClr val="dk1"/>
@@ -9579,7 +9354,7 @@
         </p:blipFill>
         <p:spPr bwMode="auto">
           <a:xfrm>
-            <a:off x="5553396" y="337583"/>
+            <a:off x="5553396" y="324331"/>
             <a:ext cx="652018" cy="620541"/>
           </a:xfrm>
           <a:prstGeom prst="rect">
@@ -9807,12 +9582,64 @@
           </a:prstGeom>
         </p:spPr>
       </p:pic>
+      <p:sp>
+        <p:nvSpPr>
+          <p:cNvPr id="23" name="Seta: da Esquerda para a Direita 22">
+            <a:extLst>
+              <a:ext uri="{FF2B5EF4-FFF2-40B4-BE49-F238E27FC236}">
+                <a16:creationId xmlns:a16="http://schemas.microsoft.com/office/drawing/2014/main" id="{4382B314-E635-496A-8B8C-EC2B0D223AF9}"/>
+              </a:ext>
+            </a:extLst>
+          </p:cNvPr>
+          <p:cNvSpPr/>
+          <p:nvPr/>
+        </p:nvSpPr>
+        <p:spPr>
+          <a:xfrm>
+            <a:off x="2744737" y="710729"/>
+            <a:ext cx="729209" cy="159425"/>
+          </a:xfrm>
+          <a:prstGeom prst="leftRightArrow">
+            <a:avLst/>
+          </a:prstGeom>
+          <a:ln>
+            <a:headEnd type="none" w="med" len="med"/>
+            <a:tailEnd type="none" w="med" len="med"/>
+          </a:ln>
+        </p:spPr>
+        <p:style>
+          <a:lnRef idx="3">
+            <a:schemeClr val="lt1"/>
+          </a:lnRef>
+          <a:fillRef idx="1">
+            <a:schemeClr val="accent5"/>
+          </a:fillRef>
+          <a:effectRef idx="1">
+            <a:schemeClr val="accent5"/>
+          </a:effectRef>
+          <a:fontRef idx="minor">
+            <a:schemeClr val="lt1"/>
+          </a:fontRef>
+        </p:style>
+        <p:txBody>
+          <a:bodyPr rot="0" spcFirstLastPara="0" vert="horz" wrap="square" lIns="91440" tIns="45720" rIns="91440" bIns="45720" numCol="1" spcCol="0" rtlCol="0" fromWordArt="0" anchor="ctr" anchorCtr="0" forceAA="0" compatLnSpc="1">
+            <a:prstTxWarp prst="textNoShape">
+              <a:avLst/>
+            </a:prstTxWarp>
+            <a:noAutofit/>
+          </a:bodyPr>
+          <a:lstStyle/>
+          <a:p>
+            <a:endParaRPr lang="pt-BR" dirty="0"/>
+          </a:p>
+        </p:txBody>
+      </p:sp>
       <p:pic>
         <p:nvPicPr>
-          <p:cNvPr id="18" name="Imagem 17">
-            <a:extLst>
-              <a:ext uri="{FF2B5EF4-FFF2-40B4-BE49-F238E27FC236}">
-                <a16:creationId xmlns:a16="http://schemas.microsoft.com/office/drawing/2014/main" id="{5E6FED90-1A52-4007-B52F-5C6B20214155}"/>
+          <p:cNvPr id="25" name="Imagem 24">
+            <a:extLst>
+              <a:ext uri="{FF2B5EF4-FFF2-40B4-BE49-F238E27FC236}">
+                <a16:creationId xmlns:a16="http://schemas.microsoft.com/office/drawing/2014/main" id="{D55AF0FD-F08A-47A3-B403-97AA1A00D3CE}"/>
               </a:ext>
             </a:extLst>
           </p:cNvPr>
@@ -9834,8 +9661,8 @@
         </p:blipFill>
         <p:spPr bwMode="auto">
           <a:xfrm>
-            <a:off x="10091666" y="1477711"/>
-            <a:ext cx="1199515" cy="520065"/>
+            <a:off x="8107062" y="5538632"/>
+            <a:ext cx="550545" cy="550546"/>
           </a:xfrm>
           <a:prstGeom prst="rect">
             <a:avLst/>
@@ -9846,70 +9673,12 @@
           </a:ln>
         </p:spPr>
       </p:pic>
-      <p:sp>
-        <p:nvSpPr>
-          <p:cNvPr id="23" name="Seta: da Esquerda para a Direita 22">
-            <a:extLst>
-              <a:ext uri="{FF2B5EF4-FFF2-40B4-BE49-F238E27FC236}">
-                <a16:creationId xmlns:a16="http://schemas.microsoft.com/office/drawing/2014/main" id="{4382B314-E635-496A-8B8C-EC2B0D223AF9}"/>
-              </a:ext>
-            </a:extLst>
-          </p:cNvPr>
-          <p:cNvSpPr/>
-          <p:nvPr/>
-        </p:nvSpPr>
-        <p:spPr>
-          <a:xfrm>
-            <a:off x="2744737" y="710730"/>
-            <a:ext cx="729209" cy="94920"/>
-          </a:xfrm>
-          <a:prstGeom prst="leftRightArrow">
-            <a:avLst/>
-          </a:prstGeom>
-          <a:noFill/>
-          <a:ln w="9525" cap="flat" cmpd="sng" algn="ctr">
-            <a:solidFill>
-              <a:schemeClr val="dk1"/>
-            </a:solidFill>
-            <a:prstDash val="solid"/>
-            <a:round/>
-            <a:headEnd type="none" w="med" len="med"/>
-            <a:tailEnd type="none" w="med" len="med"/>
-          </a:ln>
-        </p:spPr>
-        <p:style>
-          <a:lnRef idx="0">
-            <a:scrgbClr r="0" g="0" b="0"/>
-          </a:lnRef>
-          <a:fillRef idx="0">
-            <a:scrgbClr r="0" g="0" b="0"/>
-          </a:fillRef>
-          <a:effectRef idx="0">
-            <a:scrgbClr r="0" g="0" b="0"/>
-          </a:effectRef>
-          <a:fontRef idx="minor">
-            <a:schemeClr val="dk1"/>
-          </a:fontRef>
-        </p:style>
-        <p:txBody>
-          <a:bodyPr rot="0" spcFirstLastPara="0" vert="horz" wrap="square" lIns="91440" tIns="45720" rIns="91440" bIns="45720" numCol="1" spcCol="0" rtlCol="0" fromWordArt="0" anchor="ctr" anchorCtr="0" forceAA="0" compatLnSpc="1">
-            <a:prstTxWarp prst="textNoShape">
-              <a:avLst/>
-            </a:prstTxWarp>
-            <a:noAutofit/>
-          </a:bodyPr>
-          <a:lstStyle/>
-          <a:p>
-            <a:endParaRPr lang="pt-BR" dirty="0"/>
-          </a:p>
-        </p:txBody>
-      </p:sp>
       <p:pic>
         <p:nvPicPr>
-          <p:cNvPr id="25" name="Imagem 24">
-            <a:extLst>
-              <a:ext uri="{FF2B5EF4-FFF2-40B4-BE49-F238E27FC236}">
-                <a16:creationId xmlns:a16="http://schemas.microsoft.com/office/drawing/2014/main" id="{D55AF0FD-F08A-47A3-B403-97AA1A00D3CE}"/>
+          <p:cNvPr id="26" name="Imagem 25">
+            <a:extLst>
+              <a:ext uri="{FF2B5EF4-FFF2-40B4-BE49-F238E27FC236}">
+                <a16:creationId xmlns:a16="http://schemas.microsoft.com/office/drawing/2014/main" id="{D5FAA85D-B44B-4F5C-80CB-91F86AC28D2B}"/>
               </a:ext>
             </a:extLst>
           </p:cNvPr>
@@ -9918,45 +9687,6 @@
         </p:nvPicPr>
         <p:blipFill>
           <a:blip r:embed="rId10" cstate="print">
-            <a:extLst>
-              <a:ext uri="{28A0092B-C50C-407E-A947-70E740481C1C}">
-                <a14:useLocalDpi xmlns:a14="http://schemas.microsoft.com/office/drawing/2010/main" val="0"/>
-              </a:ext>
-            </a:extLst>
-          </a:blip>
-          <a:srcRect/>
-          <a:stretch>
-            <a:fillRect/>
-          </a:stretch>
-        </p:blipFill>
-        <p:spPr bwMode="auto">
-          <a:xfrm>
-            <a:off x="8107062" y="5538632"/>
-            <a:ext cx="550545" cy="550546"/>
-          </a:xfrm>
-          <a:prstGeom prst="rect">
-            <a:avLst/>
-          </a:prstGeom>
-          <a:noFill/>
-          <a:ln>
-            <a:noFill/>
-          </a:ln>
-        </p:spPr>
-      </p:pic>
-      <p:pic>
-        <p:nvPicPr>
-          <p:cNvPr id="26" name="Imagem 25">
-            <a:extLst>
-              <a:ext uri="{FF2B5EF4-FFF2-40B4-BE49-F238E27FC236}">
-                <a16:creationId xmlns:a16="http://schemas.microsoft.com/office/drawing/2014/main" id="{D5FAA85D-B44B-4F5C-80CB-91F86AC28D2B}"/>
-              </a:ext>
-            </a:extLst>
-          </p:cNvPr>
-          <p:cNvPicPr/>
-          <p:nvPr/>
-        </p:nvPicPr>
-        <p:blipFill>
-          <a:blip r:embed="rId11" cstate="print">
             <a:extLst>
               <a:ext uri="{28A0092B-C50C-407E-A947-70E740481C1C}">
                 <a14:useLocalDpi xmlns:a14="http://schemas.microsoft.com/office/drawing/2010/main" val="0"/>
@@ -10099,7 +9829,7 @@
           <p:nvPr/>
         </p:nvPicPr>
         <p:blipFill>
-          <a:blip r:embed="rId12">
+          <a:blip r:embed="rId11">
             <a:extLst>
               <a:ext uri="{28A0092B-C50C-407E-A947-70E740481C1C}">
                 <a14:useLocalDpi xmlns:a14="http://schemas.microsoft.com/office/drawing/2010/main" val="0"/>
@@ -10145,7 +9875,7 @@
         </p:nvSpPr>
         <p:spPr>
           <a:xfrm>
-            <a:off x="6823975" y="3840235"/>
+            <a:off x="6822559" y="3840235"/>
             <a:ext cx="686372" cy="1574467"/>
           </a:xfrm>
           <a:prstGeom prst="leftUpArrow">
@@ -10155,29 +9885,23 @@
               <a:gd name="adj3" fmla="val 11818"/>
             </a:avLst>
           </a:prstGeom>
-          <a:noFill/>
-          <a:ln w="9525" cap="flat" cmpd="sng" algn="ctr">
-            <a:solidFill>
-              <a:schemeClr val="dk1"/>
-            </a:solidFill>
-            <a:prstDash val="solid"/>
-            <a:round/>
+          <a:ln>
             <a:headEnd type="none" w="med" len="med"/>
             <a:tailEnd type="none" w="med" len="med"/>
           </a:ln>
         </p:spPr>
         <p:style>
-          <a:lnRef idx="0">
-            <a:scrgbClr r="0" g="0" b="0"/>
+          <a:lnRef idx="3">
+            <a:schemeClr val="lt1"/>
           </a:lnRef>
-          <a:fillRef idx="0">
-            <a:scrgbClr r="0" g="0" b="0"/>
+          <a:fillRef idx="1">
+            <a:schemeClr val="accent5"/>
           </a:fillRef>
-          <a:effectRef idx="0">
-            <a:scrgbClr r="0" g="0" b="0"/>
+          <a:effectRef idx="1">
+            <a:schemeClr val="accent5"/>
           </a:effectRef>
           <a:fontRef idx="minor">
-            <a:schemeClr val="dk1"/>
+            <a:schemeClr val="lt1"/>
           </a:fontRef>
         </p:style>
         <p:txBody>
@@ -10206,22 +9930,16 @@
           <p:nvPr/>
         </p:nvSpPr>
         <p:spPr>
-          <a:xfrm rot="5400000">
-            <a:off x="328646" y="950808"/>
-            <a:ext cx="2994990" cy="1718860"/>
+          <a:xfrm rot="10800000">
+            <a:off x="0" y="416444"/>
+            <a:ext cx="2903168" cy="1944048"/>
           </a:xfrm>
           <a:prstGeom prst="roundRect">
             <a:avLst/>
           </a:prstGeom>
           <a:noFill/>
-          <a:ln w="9525" cap="flat" cmpd="sng" algn="ctr">
-            <a:solidFill>
-              <a:schemeClr val="dk1"/>
-            </a:solidFill>
-            <a:prstDash val="solid"/>
-            <a:round/>
-            <a:headEnd type="none" w="med" len="med"/>
-            <a:tailEnd type="none" w="med" len="med"/>
+          <a:ln>
+            <a:noFill/>
           </a:ln>
         </p:spPr>
         <p:style>
@@ -10260,13 +9978,13 @@
           <p:nvPr/>
         </p:nvPicPr>
         <p:blipFill>
-          <a:blip r:embed="rId13" cstate="print">
+          <a:blip r:embed="rId12" cstate="print">
             <a:extLst>
               <a:ext uri="{28A0092B-C50C-407E-A947-70E740481C1C}">
                 <a14:useLocalDpi xmlns:a14="http://schemas.microsoft.com/office/drawing/2010/main" val="0"/>
               </a:ext>
               <a:ext uri="{96DAC541-7B7A-43D3-8B79-37D633B846F1}">
-                <asvg:svgBlip xmlns:asvg="http://schemas.microsoft.com/office/drawing/2016/SVG/main" r:embed="rId14"/>
+                <asvg:svgBlip xmlns:asvg="http://schemas.microsoft.com/office/drawing/2016/SVG/main" r:embed="rId13"/>
               </a:ext>
             </a:extLst>
           </a:blip>
@@ -10276,7 +9994,7 @@
         </p:blipFill>
         <p:spPr>
           <a:xfrm>
-            <a:off x="1283552" y="500611"/>
+            <a:off x="510978" y="471241"/>
             <a:ext cx="386862" cy="437861"/>
           </a:xfrm>
           <a:prstGeom prst="rect">
@@ -10297,13 +10015,13 @@
           <p:nvPr/>
         </p:nvPicPr>
         <p:blipFill>
-          <a:blip r:embed="rId15">
+          <a:blip r:embed="rId14">
             <a:extLst>
               <a:ext uri="{28A0092B-C50C-407E-A947-70E740481C1C}">
                 <a14:useLocalDpi xmlns:a14="http://schemas.microsoft.com/office/drawing/2010/main" val="0"/>
               </a:ext>
               <a:ext uri="{96DAC541-7B7A-43D3-8B79-37D633B846F1}">
-                <asvg:svgBlip xmlns:asvg="http://schemas.microsoft.com/office/drawing/2016/SVG/main" r:embed="rId16"/>
+                <asvg:svgBlip xmlns:asvg="http://schemas.microsoft.com/office/drawing/2016/SVG/main" r:embed="rId15"/>
               </a:ext>
             </a:extLst>
           </a:blip>
@@ -10313,7 +10031,7 @@
         </p:blipFill>
         <p:spPr>
           <a:xfrm>
-            <a:off x="2101648" y="1379711"/>
+            <a:off x="1265233" y="1508547"/>
             <a:ext cx="360680" cy="336550"/>
           </a:xfrm>
           <a:prstGeom prst="rect">
@@ -10334,13 +10052,13 @@
           <p:nvPr/>
         </p:nvPicPr>
         <p:blipFill>
-          <a:blip r:embed="rId17" cstate="print">
+          <a:blip r:embed="rId16" cstate="print">
             <a:extLst>
               <a:ext uri="{28A0092B-C50C-407E-A947-70E740481C1C}">
                 <a14:useLocalDpi xmlns:a14="http://schemas.microsoft.com/office/drawing/2010/main" val="0"/>
               </a:ext>
               <a:ext uri="{96DAC541-7B7A-43D3-8B79-37D633B846F1}">
-                <asvg:svgBlip xmlns:asvg="http://schemas.microsoft.com/office/drawing/2016/SVG/main" r:embed="rId18"/>
+                <asvg:svgBlip xmlns:asvg="http://schemas.microsoft.com/office/drawing/2016/SVG/main" r:embed="rId17"/>
               </a:ext>
             </a:extLst>
           </a:blip>
@@ -10350,7 +10068,7 @@
         </p:blipFill>
         <p:spPr>
           <a:xfrm rot="2469510">
-            <a:off x="2073591" y="741453"/>
+            <a:off x="1450329" y="561125"/>
             <a:ext cx="209550" cy="209550"/>
           </a:xfrm>
           <a:prstGeom prst="rect">
@@ -10371,13 +10089,13 @@
           <p:nvPr/>
         </p:nvPicPr>
         <p:blipFill>
-          <a:blip r:embed="rId19" cstate="print">
+          <a:blip r:embed="rId18" cstate="print">
             <a:extLst>
               <a:ext uri="{28A0092B-C50C-407E-A947-70E740481C1C}">
                 <a14:useLocalDpi xmlns:a14="http://schemas.microsoft.com/office/drawing/2010/main" val="0"/>
               </a:ext>
               <a:ext uri="{96DAC541-7B7A-43D3-8B79-37D633B846F1}">
-                <asvg:svgBlip xmlns:asvg="http://schemas.microsoft.com/office/drawing/2016/SVG/main" r:embed="rId20"/>
+                <asvg:svgBlip xmlns:asvg="http://schemas.microsoft.com/office/drawing/2016/SVG/main" r:embed="rId19"/>
               </a:ext>
             </a:extLst>
           </a:blip>
@@ -10387,7 +10105,7 @@
         </p:blipFill>
         <p:spPr>
           <a:xfrm>
-            <a:off x="1566531" y="2285577"/>
+            <a:off x="1960921" y="784229"/>
             <a:ext cx="434975" cy="434975"/>
           </a:xfrm>
           <a:prstGeom prst="rect">
@@ -10411,7 +10129,7 @@
         </p:nvSpPr>
         <p:spPr bwMode="auto">
           <a:xfrm>
-            <a:off x="1172019" y="2742481"/>
+            <a:off x="1507830" y="1192867"/>
             <a:ext cx="1333500" cy="495300"/>
           </a:xfrm>
           <a:prstGeom prst="rect">
@@ -10475,21 +10193,15 @@
         </p:nvSpPr>
         <p:spPr>
           <a:xfrm>
-            <a:off x="3221570" y="3365403"/>
+            <a:off x="1397614" y="3477354"/>
             <a:ext cx="2634739" cy="1324924"/>
           </a:xfrm>
           <a:prstGeom prst="roundRect">
             <a:avLst/>
           </a:prstGeom>
           <a:noFill/>
-          <a:ln w="9525" cap="flat" cmpd="sng" algn="ctr">
-            <a:solidFill>
-              <a:schemeClr val="dk1"/>
-            </a:solidFill>
-            <a:prstDash val="solid"/>
-            <a:round/>
-            <a:headEnd type="none" w="med" len="med"/>
-            <a:tailEnd type="none" w="med" len="med"/>
+          <a:ln>
+            <a:noFill/>
           </a:ln>
         </p:spPr>
         <p:style>
@@ -10532,7 +10244,7 @@
           <p:nvPr/>
         </p:nvPicPr>
         <p:blipFill>
-          <a:blip r:embed="rId21" cstate="print">
+          <a:blip r:embed="rId20" cstate="print">
             <a:extLst>
               <a:ext uri="{28A0092B-C50C-407E-A947-70E740481C1C}">
                 <a14:useLocalDpi xmlns:a14="http://schemas.microsoft.com/office/drawing/2010/main" val="0"/>
@@ -10545,7 +10257,7 @@
         </p:blipFill>
         <p:spPr>
           <a:xfrm>
-            <a:off x="5202847" y="3441814"/>
+            <a:off x="3377197" y="3554562"/>
             <a:ext cx="381000" cy="381000"/>
           </a:xfrm>
           <a:prstGeom prst="rect">
@@ -10566,13 +10278,13 @@
           <p:nvPr/>
         </p:nvPicPr>
         <p:blipFill>
-          <a:blip r:embed="rId22" cstate="print">
+          <a:blip r:embed="rId21" cstate="print">
             <a:extLst>
               <a:ext uri="{28A0092B-C50C-407E-A947-70E740481C1C}">
                 <a14:useLocalDpi xmlns:a14="http://schemas.microsoft.com/office/drawing/2010/main" val="0"/>
               </a:ext>
               <a:ext uri="{96DAC541-7B7A-43D3-8B79-37D633B846F1}">
-                <asvg:svgBlip xmlns:asvg="http://schemas.microsoft.com/office/drawing/2016/SVG/main" r:embed="rId23"/>
+                <asvg:svgBlip xmlns:asvg="http://schemas.microsoft.com/office/drawing/2016/SVG/main" r:embed="rId22"/>
               </a:ext>
             </a:extLst>
           </a:blip>
@@ -10582,7 +10294,7 @@
         </p:blipFill>
         <p:spPr>
           <a:xfrm>
-            <a:off x="3605936" y="3417008"/>
+            <a:off x="1787107" y="3532902"/>
             <a:ext cx="529590" cy="529590"/>
           </a:xfrm>
           <a:prstGeom prst="rect">
@@ -10603,13 +10315,13 @@
           <p:nvPr/>
         </p:nvPicPr>
         <p:blipFill>
-          <a:blip r:embed="rId17" cstate="print">
+          <a:blip r:embed="rId16" cstate="print">
             <a:extLst>
               <a:ext uri="{28A0092B-C50C-407E-A947-70E740481C1C}">
                 <a14:useLocalDpi xmlns:a14="http://schemas.microsoft.com/office/drawing/2010/main" val="0"/>
               </a:ext>
               <a:ext uri="{96DAC541-7B7A-43D3-8B79-37D633B846F1}">
-                <asvg:svgBlip xmlns:asvg="http://schemas.microsoft.com/office/drawing/2016/SVG/main" r:embed="rId18"/>
+                <asvg:svgBlip xmlns:asvg="http://schemas.microsoft.com/office/drawing/2016/SVG/main" r:embed="rId17"/>
               </a:ext>
             </a:extLst>
           </a:blip>
@@ -10619,7 +10331,7 @@
         </p:blipFill>
         <p:spPr>
           <a:xfrm rot="2566580">
-            <a:off x="4403577" y="3485561"/>
+            <a:off x="2577927" y="3598309"/>
             <a:ext cx="209550" cy="209550"/>
           </a:xfrm>
           <a:prstGeom prst="rect">
@@ -10627,6 +10339,54 @@
           </a:prstGeom>
         </p:spPr>
       </p:pic>
+      <p:sp>
+        <p:nvSpPr>
+          <p:cNvPr id="57" name="Retângulo: Cantos Arredondados 56">
+            <a:extLst>
+              <a:ext uri="{FF2B5EF4-FFF2-40B4-BE49-F238E27FC236}">
+                <a16:creationId xmlns:a16="http://schemas.microsoft.com/office/drawing/2014/main" id="{B2A4EC5B-CC7E-48E3-98DD-5999D021081B}"/>
+              </a:ext>
+            </a:extLst>
+          </p:cNvPr>
+          <p:cNvSpPr/>
+          <p:nvPr/>
+        </p:nvSpPr>
+        <p:spPr>
+          <a:xfrm rot="5400000">
+            <a:off x="1913546" y="5019623"/>
+            <a:ext cx="1294548" cy="1549318"/>
+          </a:xfrm>
+          <a:prstGeom prst="roundRect">
+            <a:avLst/>
+          </a:prstGeom>
+          <a:noFill/>
+          <a:ln>
+            <a:noFill/>
+          </a:ln>
+        </p:spPr>
+        <p:style>
+          <a:lnRef idx="0">
+            <a:scrgbClr r="0" g="0" b="0"/>
+          </a:lnRef>
+          <a:fillRef idx="0">
+            <a:scrgbClr r="0" g="0" b="0"/>
+          </a:fillRef>
+          <a:effectRef idx="0">
+            <a:scrgbClr r="0" g="0" b="0"/>
+          </a:effectRef>
+          <a:fontRef idx="minor">
+            <a:schemeClr val="dk1"/>
+          </a:fontRef>
+        </p:style>
+        <p:txBody>
+          <a:bodyPr rtlCol="0" anchor="ctr"/>
+          <a:lstStyle/>
+          <a:p>
+            <a:pPr algn="ctr"/>
+            <a:endParaRPr lang="pt-BR" dirty="0"/>
+          </a:p>
+        </p:txBody>
+      </p:sp>
       <p:sp>
         <p:nvSpPr>
           <p:cNvPr id="53" name="Caixa de Texto 2">
@@ -10643,7 +10403,7 @@
         </p:nvSpPr>
         <p:spPr bwMode="auto">
           <a:xfrm>
-            <a:off x="4719834" y="3821961"/>
+            <a:off x="2894184" y="3934709"/>
             <a:ext cx="1312000" cy="875386"/>
           </a:xfrm>
           <a:prstGeom prst="rect">
@@ -10712,7 +10472,7 @@
           <p:nvPr/>
         </p:nvPicPr>
         <p:blipFill>
-          <a:blip r:embed="rId24">
+          <a:blip r:embed="rId23">
             <a:extLst>
               <a:ext uri="{28A0092B-C50C-407E-A947-70E740481C1C}">
                 <a14:useLocalDpi xmlns:a14="http://schemas.microsoft.com/office/drawing/2010/main" val="0"/>
@@ -10725,8 +10485,8 @@
         </p:blipFill>
         <p:spPr>
           <a:xfrm>
-            <a:off x="2587555" y="5187350"/>
-            <a:ext cx="667431" cy="667431"/>
+            <a:off x="2570923" y="5173345"/>
+            <a:ext cx="681436" cy="681436"/>
           </a:xfrm>
           <a:prstGeom prst="rect">
             <a:avLst/>
@@ -10746,13 +10506,13 @@
           <p:nvPr/>
         </p:nvPicPr>
         <p:blipFill>
-          <a:blip r:embed="rId19" cstate="print">
+          <a:blip r:embed="rId18" cstate="print">
             <a:extLst>
               <a:ext uri="{28A0092B-C50C-407E-A947-70E740481C1C}">
                 <a14:useLocalDpi xmlns:a14="http://schemas.microsoft.com/office/drawing/2010/main" val="0"/>
               </a:ext>
               <a:ext uri="{96DAC541-7B7A-43D3-8B79-37D633B846F1}">
-                <asvg:svgBlip xmlns:asvg="http://schemas.microsoft.com/office/drawing/2016/SVG/main" r:embed="rId20"/>
+                <asvg:svgBlip xmlns:asvg="http://schemas.microsoft.com/office/drawing/2016/SVG/main" r:embed="rId19"/>
               </a:ext>
             </a:extLst>
           </a:blip>
@@ -10842,118 +10602,6 @@
       </p:sp>
       <p:sp>
         <p:nvSpPr>
-          <p:cNvPr id="57" name="Retângulo: Cantos Arredondados 56">
-            <a:extLst>
-              <a:ext uri="{FF2B5EF4-FFF2-40B4-BE49-F238E27FC236}">
-                <a16:creationId xmlns:a16="http://schemas.microsoft.com/office/drawing/2014/main" id="{B2A4EC5B-CC7E-48E3-98DD-5999D021081B}"/>
-              </a:ext>
-            </a:extLst>
-          </p:cNvPr>
-          <p:cNvSpPr/>
-          <p:nvPr/>
-        </p:nvSpPr>
-        <p:spPr>
-          <a:xfrm rot="5400000">
-            <a:off x="1913546" y="5019623"/>
-            <a:ext cx="1294548" cy="1549318"/>
-          </a:xfrm>
-          <a:prstGeom prst="roundRect">
-            <a:avLst/>
-          </a:prstGeom>
-          <a:noFill/>
-          <a:ln w="9525" cap="flat" cmpd="sng" algn="ctr">
-            <a:solidFill>
-              <a:schemeClr val="dk1"/>
-            </a:solidFill>
-            <a:prstDash val="solid"/>
-            <a:round/>
-            <a:headEnd type="none" w="med" len="med"/>
-            <a:tailEnd type="none" w="med" len="med"/>
-          </a:ln>
-        </p:spPr>
-        <p:style>
-          <a:lnRef idx="0">
-            <a:scrgbClr r="0" g="0" b="0"/>
-          </a:lnRef>
-          <a:fillRef idx="0">
-            <a:scrgbClr r="0" g="0" b="0"/>
-          </a:fillRef>
-          <a:effectRef idx="0">
-            <a:scrgbClr r="0" g="0" b="0"/>
-          </a:effectRef>
-          <a:fontRef idx="minor">
-            <a:schemeClr val="dk1"/>
-          </a:fontRef>
-        </p:style>
-        <p:txBody>
-          <a:bodyPr rtlCol="0" anchor="ctr"/>
-          <a:lstStyle/>
-          <a:p>
-            <a:pPr algn="ctr"/>
-            <a:endParaRPr lang="pt-BR" dirty="0"/>
-          </a:p>
-        </p:txBody>
-      </p:sp>
-      <p:sp>
-        <p:nvSpPr>
-          <p:cNvPr id="60" name="Seta: da Esquerda para a Direita 59">
-            <a:extLst>
-              <a:ext uri="{FF2B5EF4-FFF2-40B4-BE49-F238E27FC236}">
-                <a16:creationId xmlns:a16="http://schemas.microsoft.com/office/drawing/2014/main" id="{E579E652-F1E1-42BD-8A70-C0A7A309DE84}"/>
-              </a:ext>
-            </a:extLst>
-          </p:cNvPr>
-          <p:cNvSpPr/>
-          <p:nvPr/>
-        </p:nvSpPr>
-        <p:spPr>
-          <a:xfrm rot="5400000">
-            <a:off x="3138015" y="2869685"/>
-            <a:ext cx="796459" cy="124600"/>
-          </a:xfrm>
-          <a:prstGeom prst="leftRightArrow">
-            <a:avLst/>
-          </a:prstGeom>
-          <a:noFill/>
-          <a:ln w="9525" cap="flat" cmpd="sng" algn="ctr">
-            <a:solidFill>
-              <a:schemeClr val="dk1"/>
-            </a:solidFill>
-            <a:prstDash val="solid"/>
-            <a:round/>
-            <a:headEnd type="none" w="med" len="med"/>
-            <a:tailEnd type="none" w="med" len="med"/>
-          </a:ln>
-        </p:spPr>
-        <p:style>
-          <a:lnRef idx="0">
-            <a:scrgbClr r="0" g="0" b="0"/>
-          </a:lnRef>
-          <a:fillRef idx="0">
-            <a:scrgbClr r="0" g="0" b="0"/>
-          </a:fillRef>
-          <a:effectRef idx="0">
-            <a:scrgbClr r="0" g="0" b="0"/>
-          </a:effectRef>
-          <a:fontRef idx="minor">
-            <a:schemeClr val="dk1"/>
-          </a:fontRef>
-        </p:style>
-        <p:txBody>
-          <a:bodyPr rot="0" spcFirstLastPara="0" vert="horz" wrap="square" lIns="91440" tIns="45720" rIns="91440" bIns="45720" numCol="1" spcCol="0" rtlCol="0" fromWordArt="0" anchor="ctr" anchorCtr="0" forceAA="0" compatLnSpc="1">
-            <a:prstTxWarp prst="textNoShape">
-              <a:avLst/>
-            </a:prstTxWarp>
-            <a:noAutofit/>
-          </a:bodyPr>
-          <a:lstStyle/>
-          <a:p>
-            <a:endParaRPr lang="pt-BR" dirty="0"/>
-          </a:p>
-        </p:txBody>
-      </p:sp>
-      <p:sp>
-        <p:nvSpPr>
           <p:cNvPr id="61" name="Caixa de Texto 2">
             <a:extLst>
               <a:ext uri="{FF2B5EF4-FFF2-40B4-BE49-F238E27FC236}">
@@ -10968,7 +10616,7 @@
         </p:nvSpPr>
         <p:spPr bwMode="auto">
           <a:xfrm>
-            <a:off x="931974" y="935665"/>
+            <a:off x="159400" y="906295"/>
             <a:ext cx="1131505" cy="1092607"/>
           </a:xfrm>
           <a:prstGeom prst="rect">
@@ -11059,7 +10707,7 @@
         </p:nvSpPr>
         <p:spPr bwMode="auto">
           <a:xfrm>
-            <a:off x="1765008" y="1745475"/>
+            <a:off x="945926" y="1867260"/>
             <a:ext cx="967519" cy="730328"/>
           </a:xfrm>
           <a:prstGeom prst="rect">
@@ -11147,7 +10795,7 @@
         </p:nvSpPr>
         <p:spPr bwMode="auto">
           <a:xfrm>
-            <a:off x="3142483" y="3910810"/>
+            <a:off x="1316833" y="4023558"/>
             <a:ext cx="1549318" cy="911468"/>
           </a:xfrm>
           <a:prstGeom prst="rect">
@@ -11266,21 +10914,15 @@
         </p:nvSpPr>
         <p:spPr>
           <a:xfrm>
-            <a:off x="4557495" y="4870975"/>
+            <a:off x="4556618" y="4870973"/>
             <a:ext cx="2184400" cy="1806293"/>
           </a:xfrm>
           <a:prstGeom prst="roundRect">
             <a:avLst/>
           </a:prstGeom>
           <a:noFill/>
-          <a:ln w="9525" cap="flat" cmpd="sng" algn="ctr">
-            <a:solidFill>
-              <a:schemeClr val="dk1"/>
-            </a:solidFill>
-            <a:prstDash val="solid"/>
-            <a:round/>
-            <a:headEnd type="none" w="med" len="med"/>
-            <a:tailEnd type="none" w="med" len="med"/>
+          <a:ln>
+            <a:noFill/>
           </a:ln>
         </p:spPr>
         <p:style>
@@ -11323,7 +10965,7 @@
           <p:nvPr/>
         </p:nvPicPr>
         <p:blipFill>
-          <a:blip r:embed="rId25" cstate="print">
+          <a:blip r:embed="rId24" cstate="print">
             <a:extLst>
               <a:ext uri="{28A0092B-C50C-407E-A947-70E740481C1C}">
                 <a14:useLocalDpi xmlns:a14="http://schemas.microsoft.com/office/drawing/2010/main" val="0"/>
@@ -11362,7 +11004,7 @@
           <p:nvPr/>
         </p:nvPicPr>
         <p:blipFill>
-          <a:blip r:embed="rId26" cstate="print">
+          <a:blip r:embed="rId25" cstate="print">
             <a:extLst>
               <a:ext uri="{28A0092B-C50C-407E-A947-70E740481C1C}">
                 <a14:useLocalDpi xmlns:a14="http://schemas.microsoft.com/office/drawing/2010/main" val="0"/>
@@ -11481,35 +11123,29 @@
         </p:nvSpPr>
         <p:spPr>
           <a:xfrm>
-            <a:off x="3375545" y="5711821"/>
+            <a:off x="3376720" y="5708992"/>
             <a:ext cx="1153227" cy="124600"/>
           </a:xfrm>
           <a:prstGeom prst="leftRightArrow">
             <a:avLst/>
           </a:prstGeom>
-          <a:noFill/>
-          <a:ln w="9525" cap="flat" cmpd="sng" algn="ctr">
-            <a:solidFill>
-              <a:schemeClr val="dk1"/>
-            </a:solidFill>
-            <a:prstDash val="solid"/>
-            <a:round/>
+          <a:ln>
             <a:headEnd type="none" w="med" len="med"/>
             <a:tailEnd type="none" w="med" len="med"/>
           </a:ln>
         </p:spPr>
         <p:style>
-          <a:lnRef idx="0">
-            <a:scrgbClr r="0" g="0" b="0"/>
+          <a:lnRef idx="3">
+            <a:schemeClr val="lt1"/>
           </a:lnRef>
-          <a:fillRef idx="0">
-            <a:scrgbClr r="0" g="0" b="0"/>
+          <a:fillRef idx="1">
+            <a:schemeClr val="accent5"/>
           </a:fillRef>
-          <a:effectRef idx="0">
-            <a:scrgbClr r="0" g="0" b="0"/>
+          <a:effectRef idx="1">
+            <a:schemeClr val="accent5"/>
           </a:effectRef>
           <a:fontRef idx="minor">
-            <a:schemeClr val="dk1"/>
+            <a:schemeClr val="lt1"/>
           </a:fontRef>
         </p:style>
         <p:txBody>
@@ -11539,35 +11175,29 @@
         </p:nvSpPr>
         <p:spPr>
           <a:xfrm>
-            <a:off x="6814110" y="5705741"/>
+            <a:off x="6819875" y="5708992"/>
             <a:ext cx="1153227" cy="124600"/>
           </a:xfrm>
           <a:prstGeom prst="leftRightArrow">
             <a:avLst/>
           </a:prstGeom>
-          <a:noFill/>
-          <a:ln w="9525" cap="flat" cmpd="sng" algn="ctr">
-            <a:solidFill>
-              <a:schemeClr val="dk1"/>
-            </a:solidFill>
-            <a:prstDash val="solid"/>
-            <a:round/>
+          <a:ln>
             <a:headEnd type="none" w="med" len="med"/>
             <a:tailEnd type="none" w="med" len="med"/>
           </a:ln>
         </p:spPr>
         <p:style>
-          <a:lnRef idx="0">
-            <a:scrgbClr r="0" g="0" b="0"/>
+          <a:lnRef idx="3">
+            <a:schemeClr val="lt1"/>
           </a:lnRef>
-          <a:fillRef idx="0">
-            <a:scrgbClr r="0" g="0" b="0"/>
+          <a:fillRef idx="1">
+            <a:schemeClr val="accent5"/>
           </a:fillRef>
-          <a:effectRef idx="0">
-            <a:scrgbClr r="0" g="0" b="0"/>
+          <a:effectRef idx="1">
+            <a:schemeClr val="accent5"/>
           </a:effectRef>
           <a:fontRef idx="minor">
-            <a:schemeClr val="dk1"/>
+            <a:schemeClr val="lt1"/>
           </a:fontRef>
         </p:style>
         <p:txBody>
@@ -11596,9 +11226,9 @@
           <p:nvPr/>
         </p:nvSpPr>
         <p:spPr>
-          <a:xfrm rot="10800000" flipH="1">
-            <a:off x="5917987" y="3817771"/>
-            <a:ext cx="549477" cy="1022012"/>
+          <a:xfrm rot="10800000">
+            <a:off x="2523777" y="2234370"/>
+            <a:ext cx="728582" cy="1219207"/>
           </a:xfrm>
           <a:prstGeom prst="leftUpArrow">
             <a:avLst>
@@ -11607,29 +11237,23 @@
               <a:gd name="adj3" fmla="val 11818"/>
             </a:avLst>
           </a:prstGeom>
-          <a:noFill/>
-          <a:ln w="9525" cap="flat" cmpd="sng" algn="ctr">
-            <a:solidFill>
-              <a:schemeClr val="dk1"/>
-            </a:solidFill>
-            <a:prstDash val="solid"/>
-            <a:round/>
+          <a:ln>
             <a:headEnd type="none" w="med" len="med"/>
             <a:tailEnd type="none" w="med" len="med"/>
           </a:ln>
         </p:spPr>
         <p:style>
-          <a:lnRef idx="0">
-            <a:scrgbClr r="0" g="0" b="0"/>
+          <a:lnRef idx="3">
+            <a:schemeClr val="lt1"/>
           </a:lnRef>
-          <a:fillRef idx="0">
-            <a:scrgbClr r="0" g="0" b="0"/>
+          <a:fillRef idx="1">
+            <a:schemeClr val="accent5"/>
           </a:fillRef>
-          <a:effectRef idx="0">
-            <a:scrgbClr r="0" g="0" b="0"/>
+          <a:effectRef idx="1">
+            <a:schemeClr val="accent5"/>
           </a:effectRef>
           <a:fontRef idx="minor">
-            <a:schemeClr val="dk1"/>
+            <a:schemeClr val="lt1"/>
           </a:fontRef>
         </p:style>
         <p:txBody>
@@ -11746,7 +11370,7 @@
           <p:nvPr/>
         </p:nvPicPr>
         <p:blipFill>
-          <a:blip r:embed="rId27" cstate="print">
+          <a:blip r:embed="rId26" cstate="print">
             <a:extLst>
               <a:ext uri="{28A0092B-C50C-407E-A947-70E740481C1C}">
                 <a14:useLocalDpi xmlns:a14="http://schemas.microsoft.com/office/drawing/2010/main" val="0"/>
@@ -11786,8 +11410,8 @@
         </p:nvSpPr>
         <p:spPr>
           <a:xfrm>
-            <a:off x="7483629" y="4543302"/>
-            <a:ext cx="1876735" cy="844972"/>
+            <a:off x="7397309" y="4543302"/>
+            <a:ext cx="1963055" cy="844972"/>
           </a:xfrm>
           <a:prstGeom prst="bentUpArrow">
             <a:avLst>
@@ -11796,29 +11420,23 @@
               <a:gd name="adj3" fmla="val 12544"/>
             </a:avLst>
           </a:prstGeom>
-          <a:noFill/>
-          <a:ln w="9525" cap="flat" cmpd="sng" algn="ctr">
-            <a:solidFill>
-              <a:schemeClr val="dk1"/>
-            </a:solidFill>
-            <a:prstDash val="solid"/>
-            <a:round/>
+          <a:ln>
             <a:headEnd type="none" w="med" len="med"/>
             <a:tailEnd type="none" w="med" len="med"/>
           </a:ln>
         </p:spPr>
         <p:style>
-          <a:lnRef idx="0">
-            <a:scrgbClr r="0" g="0" b="0"/>
+          <a:lnRef idx="3">
+            <a:schemeClr val="lt1"/>
           </a:lnRef>
-          <a:fillRef idx="0">
-            <a:scrgbClr r="0" g="0" b="0"/>
+          <a:fillRef idx="1">
+            <a:schemeClr val="accent5"/>
           </a:fillRef>
-          <a:effectRef idx="0">
-            <a:scrgbClr r="0" g="0" b="0"/>
+          <a:effectRef idx="1">
+            <a:schemeClr val="accent5"/>
           </a:effectRef>
           <a:fontRef idx="minor">
-            <a:schemeClr val="dk1"/>
+            <a:schemeClr val="lt1"/>
           </a:fontRef>
         </p:style>
         <p:txBody>
@@ -11931,7 +11549,7 @@
           <p:nvPr/>
         </p:nvPicPr>
         <p:blipFill>
-          <a:blip r:embed="rId28" cstate="print">
+          <a:blip r:embed="rId27" cstate="print">
             <a:extLst>
               <a:ext uri="{28A0092B-C50C-407E-A947-70E740481C1C}">
                 <a14:useLocalDpi xmlns:a14="http://schemas.microsoft.com/office/drawing/2010/main" val="0"/>
@@ -11972,7 +11590,7 @@
           <p:nvPr/>
         </p:nvPicPr>
         <p:blipFill>
-          <a:blip r:embed="rId24">
+          <a:blip r:embed="rId23">
             <a:extLst>
               <a:ext uri="{28A0092B-C50C-407E-A947-70E740481C1C}">
                 <a14:useLocalDpi xmlns:a14="http://schemas.microsoft.com/office/drawing/2010/main" val="0"/>
@@ -12007,8 +11625,8 @@
         </p:nvSpPr>
         <p:spPr>
           <a:xfrm rot="16200000">
-            <a:off x="8384464" y="2317974"/>
-            <a:ext cx="686372" cy="1265428"/>
+            <a:off x="8462327" y="2395837"/>
+            <a:ext cx="686372" cy="1109702"/>
           </a:xfrm>
           <a:prstGeom prst="leftUpArrow">
             <a:avLst>
@@ -12017,29 +11635,23 @@
               <a:gd name="adj3" fmla="val 11818"/>
             </a:avLst>
           </a:prstGeom>
-          <a:noFill/>
-          <a:ln w="9525" cap="flat" cmpd="sng" algn="ctr">
-            <a:solidFill>
-              <a:schemeClr val="dk1"/>
-            </a:solidFill>
-            <a:prstDash val="solid"/>
-            <a:round/>
+          <a:ln>
             <a:headEnd type="none" w="med" len="med"/>
             <a:tailEnd type="none" w="med" len="med"/>
           </a:ln>
         </p:spPr>
         <p:style>
-          <a:lnRef idx="0">
-            <a:scrgbClr r="0" g="0" b="0"/>
+          <a:lnRef idx="3">
+            <a:schemeClr val="lt1"/>
           </a:lnRef>
-          <a:fillRef idx="0">
-            <a:scrgbClr r="0" g="0" b="0"/>
+          <a:fillRef idx="1">
+            <a:schemeClr val="accent5"/>
           </a:fillRef>
-          <a:effectRef idx="0">
-            <a:scrgbClr r="0" g="0" b="0"/>
+          <a:effectRef idx="1">
+            <a:schemeClr val="accent5"/>
           </a:effectRef>
           <a:fontRef idx="minor">
-            <a:schemeClr val="dk1"/>
+            <a:schemeClr val="lt1"/>
           </a:fontRef>
         </p:style>
         <p:txBody>
@@ -12069,8 +11681,8 @@
         </p:nvSpPr>
         <p:spPr>
           <a:xfrm rot="5400000" flipH="1">
-            <a:off x="9190421" y="1737251"/>
-            <a:ext cx="961293" cy="841196"/>
+            <a:off x="9153375" y="1783575"/>
+            <a:ext cx="1044689" cy="829264"/>
           </a:xfrm>
           <a:prstGeom prst="bentUpArrow">
             <a:avLst>
@@ -12079,29 +11691,23 @@
               <a:gd name="adj3" fmla="val 12544"/>
             </a:avLst>
           </a:prstGeom>
-          <a:noFill/>
-          <a:ln w="9525" cap="flat" cmpd="sng" algn="ctr">
-            <a:solidFill>
-              <a:schemeClr val="dk1"/>
-            </a:solidFill>
-            <a:prstDash val="solid"/>
-            <a:round/>
+          <a:ln>
             <a:headEnd type="none" w="med" len="med"/>
             <a:tailEnd type="none" w="med" len="med"/>
           </a:ln>
         </p:spPr>
         <p:style>
-          <a:lnRef idx="0">
-            <a:scrgbClr r="0" g="0" b="0"/>
+          <a:lnRef idx="3">
+            <a:schemeClr val="lt1"/>
           </a:lnRef>
-          <a:fillRef idx="0">
-            <a:scrgbClr r="0" g="0" b="0"/>
+          <a:fillRef idx="1">
+            <a:schemeClr val="accent5"/>
           </a:fillRef>
-          <a:effectRef idx="0">
-            <a:scrgbClr r="0" g="0" b="0"/>
+          <a:effectRef idx="1">
+            <a:schemeClr val="accent5"/>
           </a:effectRef>
           <a:fontRef idx="minor">
-            <a:schemeClr val="dk1"/>
+            <a:schemeClr val="lt1"/>
           </a:fontRef>
         </p:style>
         <p:txBody>
@@ -12129,7 +11735,7 @@
         </p:nvSpPr>
         <p:spPr bwMode="auto">
           <a:xfrm>
-            <a:off x="9716480" y="2013376"/>
+            <a:off x="9892450" y="2028272"/>
             <a:ext cx="2066006" cy="911468"/>
           </a:xfrm>
           <a:prstGeom prst="rect">
@@ -12198,6 +11804,188 @@
               </a:rPr>
               <a:t> </a:t>
             </a:r>
+          </a:p>
+        </p:txBody>
+      </p:sp>
+      <p:pic>
+        <p:nvPicPr>
+          <p:cNvPr id="4" name="Imagem 3" descr="Desenho de animal com fundo preto&#10;&#10;Descrição gerada automaticamente com confiança média">
+            <a:extLst>
+              <a:ext uri="{FF2B5EF4-FFF2-40B4-BE49-F238E27FC236}">
+                <a16:creationId xmlns:a16="http://schemas.microsoft.com/office/drawing/2014/main" id="{7C010200-D959-4FCA-84FB-F9823ED0DC0E}"/>
+              </a:ext>
+            </a:extLst>
+          </p:cNvPr>
+          <p:cNvPicPr>
+            <a:picLocks noChangeAspect="1"/>
+          </p:cNvPicPr>
+          <p:nvPr/>
+        </p:nvPicPr>
+        <p:blipFill>
+          <a:blip r:embed="rId28">
+            <a:extLst>
+              <a:ext uri="{28A0092B-C50C-407E-A947-70E740481C1C}">
+                <a14:useLocalDpi xmlns:a14="http://schemas.microsoft.com/office/drawing/2010/main" val="0"/>
+              </a:ext>
+            </a:extLst>
+          </a:blip>
+          <a:stretch>
+            <a:fillRect/>
+          </a:stretch>
+        </p:blipFill>
+        <p:spPr>
+          <a:xfrm>
+            <a:off x="10176410" y="1325687"/>
+            <a:ext cx="1520017" cy="658874"/>
+          </a:xfrm>
+          <a:prstGeom prst="rect">
+            <a:avLst/>
+          </a:prstGeom>
+        </p:spPr>
+      </p:pic>
+      <p:sp>
+        <p:nvSpPr>
+          <p:cNvPr id="58" name="Caixa de Texto 2">
+            <a:extLst>
+              <a:ext uri="{FF2B5EF4-FFF2-40B4-BE49-F238E27FC236}">
+                <a16:creationId xmlns:a16="http://schemas.microsoft.com/office/drawing/2014/main" id="{4BF8F5B3-1B08-4959-9E4F-6E8F1AFA3514}"/>
+              </a:ext>
+            </a:extLst>
+          </p:cNvPr>
+          <p:cNvSpPr txBox="1">
+            <a:spLocks noChangeArrowheads="1"/>
+          </p:cNvSpPr>
+          <p:nvPr/>
+        </p:nvSpPr>
+        <p:spPr bwMode="auto">
+          <a:xfrm>
+            <a:off x="1357678" y="273320"/>
+            <a:ext cx="2052955" cy="318770"/>
+          </a:xfrm>
+          <a:prstGeom prst="rect">
+            <a:avLst/>
+          </a:prstGeom>
+          <a:noFill/>
+          <a:ln>
+            <a:noFill/>
+          </a:ln>
+        </p:spPr>
+        <p:style>
+          <a:lnRef idx="0">
+            <a:scrgbClr r="0" g="0" b="0"/>
+          </a:lnRef>
+          <a:fillRef idx="0">
+            <a:scrgbClr r="0" g="0" b="0"/>
+          </a:fillRef>
+          <a:effectRef idx="0">
+            <a:scrgbClr r="0" g="0" b="0"/>
+          </a:effectRef>
+          <a:fontRef idx="minor">
+            <a:schemeClr val="dk1"/>
+          </a:fontRef>
+        </p:style>
+        <p:txBody>
+          <a:bodyPr rot="0" vert="horz" wrap="square" lIns="91440" tIns="45720" rIns="91440" bIns="45720" anchor="t" anchorCtr="0">
+            <a:noAutofit/>
+          </a:bodyPr>
+          <a:lstStyle/>
+          <a:p>
+            <a:pPr algn="ctr">
+              <a:lnSpc>
+                <a:spcPct val="107000"/>
+              </a:lnSpc>
+              <a:spcAft>
+                <a:spcPts val="800"/>
+              </a:spcAft>
+            </a:pPr>
+            <a:r>
+              <a:rPr lang="pt-BR" sz="1100" dirty="0">
+                <a:effectLst/>
+                <a:latin typeface="Adobe Devanagari" panose="02040503050201020203" pitchFamily="18" charset="0"/>
+                <a:ea typeface="Calibri" panose="020F0502020204030204" pitchFamily="34" charset="0"/>
+                <a:cs typeface="Times New Roman" panose="02020603050405020304" pitchFamily="18" charset="0"/>
+              </a:rPr>
+              <a:t>Internet </a:t>
+            </a:r>
+            <a:r>
+              <a:rPr lang="pt-BR" sz="1100" dirty="0" err="1">
+                <a:effectLst/>
+                <a:latin typeface="Adobe Devanagari" panose="02040503050201020203" pitchFamily="18" charset="0"/>
+                <a:ea typeface="Calibri" panose="020F0502020204030204" pitchFamily="34" charset="0"/>
+                <a:cs typeface="Times New Roman" panose="02020603050405020304" pitchFamily="18" charset="0"/>
+              </a:rPr>
+              <a:t>NobreakNet</a:t>
+            </a:r>
+            <a:r>
+              <a:rPr lang="pt-BR" sz="1100" dirty="0">
+                <a:effectLst/>
+                <a:latin typeface="Adobe Devanagari" panose="02040503050201020203" pitchFamily="18" charset="0"/>
+                <a:ea typeface="Calibri" panose="020F0502020204030204" pitchFamily="34" charset="0"/>
+                <a:cs typeface="Times New Roman" panose="02020603050405020304" pitchFamily="18" charset="0"/>
+              </a:rPr>
+              <a:t> de 200Mbps</a:t>
+            </a:r>
+            <a:endParaRPr lang="pt-BR" sz="1100" dirty="0">
+              <a:effectLst/>
+              <a:ea typeface="Calibri" panose="020F0502020204030204" pitchFamily="34" charset="0"/>
+              <a:cs typeface="Times New Roman" panose="02020603050405020304" pitchFamily="18" charset="0"/>
+            </a:endParaRPr>
+          </a:p>
+        </p:txBody>
+      </p:sp>
+      <p:sp>
+        <p:nvSpPr>
+          <p:cNvPr id="59" name="Seta: para a Esquerda e para Cima 58">
+            <a:extLst>
+              <a:ext uri="{FF2B5EF4-FFF2-40B4-BE49-F238E27FC236}">
+                <a16:creationId xmlns:a16="http://schemas.microsoft.com/office/drawing/2014/main" id="{A6BB8A9A-9A4E-4CAF-929E-D90773D61F1C}"/>
+              </a:ext>
+            </a:extLst>
+          </p:cNvPr>
+          <p:cNvSpPr/>
+          <p:nvPr/>
+        </p:nvSpPr>
+        <p:spPr>
+          <a:xfrm rot="16200000">
+            <a:off x="4570294" y="3699491"/>
+            <a:ext cx="752184" cy="1687621"/>
+          </a:xfrm>
+          <a:prstGeom prst="leftUpArrow">
+            <a:avLst>
+              <a:gd name="adj1" fmla="val 10647"/>
+              <a:gd name="adj2" fmla="val 9793"/>
+              <a:gd name="adj3" fmla="val 11818"/>
+            </a:avLst>
+          </a:prstGeom>
+          <a:ln>
+            <a:headEnd type="none" w="med" len="med"/>
+            <a:tailEnd type="none" w="med" len="med"/>
+          </a:ln>
+        </p:spPr>
+        <p:style>
+          <a:lnRef idx="3">
+            <a:schemeClr val="lt1"/>
+          </a:lnRef>
+          <a:fillRef idx="1">
+            <a:schemeClr val="accent5"/>
+          </a:fillRef>
+          <a:effectRef idx="1">
+            <a:schemeClr val="accent5"/>
+          </a:effectRef>
+          <a:fontRef idx="minor">
+            <a:schemeClr val="lt1"/>
+          </a:fontRef>
+        </p:style>
+        <p:txBody>
+          <a:bodyPr rot="0" spcFirstLastPara="0" vert="horz" wrap="square" lIns="91440" tIns="45720" rIns="91440" bIns="45720" numCol="1" spcCol="0" rtlCol="0" fromWordArt="0" anchor="ctr" anchorCtr="0" forceAA="0" compatLnSpc="1">
+            <a:prstTxWarp prst="textNoShape">
+              <a:avLst/>
+            </a:prstTxWarp>
+            <a:noAutofit/>
+          </a:bodyPr>
+          <a:lstStyle/>
+          <a:p>
+            <a:endParaRPr lang="pt-BR"/>
           </a:p>
         </p:txBody>
       </p:sp>

</xml_diff>

<commit_message>
adicionando alterações finais e apresentando o projeto
</commit_message>
<xml_diff>
--- a/documentacao/HLD_LLD.pptx
+++ b/documentacao/HLD_LLD.pptx
@@ -5,7 +5,7 @@
     <p:sldMasterId id="2147483648" r:id="rId1"/>
   </p:sldMasterIdLst>
   <p:sldIdLst>
-    <p:sldId id="257" r:id="rId2"/>
+    <p:sldId id="260" r:id="rId2"/>
     <p:sldId id="259" r:id="rId3"/>
   </p:sldIdLst>
   <p:sldSz cx="12192000" cy="6858000"/>
@@ -260,7 +260,7 @@
           <a:p>
             <a:fld id="{9C051C65-7635-434F-9E39-2D893C4FB771}" type="datetimeFigureOut">
               <a:rPr lang="pt-BR" smtClean="0"/>
-              <a:t>30/05/2021</a:t>
+              <a:t>31/05/2021</a:t>
             </a:fld>
             <a:endParaRPr lang="pt-BR"/>
           </a:p>
@@ -458,7 +458,7 @@
           <a:p>
             <a:fld id="{9C051C65-7635-434F-9E39-2D893C4FB771}" type="datetimeFigureOut">
               <a:rPr lang="pt-BR" smtClean="0"/>
-              <a:t>30/05/2021</a:t>
+              <a:t>31/05/2021</a:t>
             </a:fld>
             <a:endParaRPr lang="pt-BR"/>
           </a:p>
@@ -666,7 +666,7 @@
           <a:p>
             <a:fld id="{9C051C65-7635-434F-9E39-2D893C4FB771}" type="datetimeFigureOut">
               <a:rPr lang="pt-BR" smtClean="0"/>
-              <a:t>30/05/2021</a:t>
+              <a:t>31/05/2021</a:t>
             </a:fld>
             <a:endParaRPr lang="pt-BR"/>
           </a:p>
@@ -864,7 +864,7 @@
           <a:p>
             <a:fld id="{9C051C65-7635-434F-9E39-2D893C4FB771}" type="datetimeFigureOut">
               <a:rPr lang="pt-BR" smtClean="0"/>
-              <a:t>30/05/2021</a:t>
+              <a:t>31/05/2021</a:t>
             </a:fld>
             <a:endParaRPr lang="pt-BR"/>
           </a:p>
@@ -1139,7 +1139,7 @@
           <a:p>
             <a:fld id="{9C051C65-7635-434F-9E39-2D893C4FB771}" type="datetimeFigureOut">
               <a:rPr lang="pt-BR" smtClean="0"/>
-              <a:t>30/05/2021</a:t>
+              <a:t>31/05/2021</a:t>
             </a:fld>
             <a:endParaRPr lang="pt-BR"/>
           </a:p>
@@ -1404,7 +1404,7 @@
           <a:p>
             <a:fld id="{9C051C65-7635-434F-9E39-2D893C4FB771}" type="datetimeFigureOut">
               <a:rPr lang="pt-BR" smtClean="0"/>
-              <a:t>30/05/2021</a:t>
+              <a:t>31/05/2021</a:t>
             </a:fld>
             <a:endParaRPr lang="pt-BR"/>
           </a:p>
@@ -1816,7 +1816,7 @@
           <a:p>
             <a:fld id="{9C051C65-7635-434F-9E39-2D893C4FB771}" type="datetimeFigureOut">
               <a:rPr lang="pt-BR" smtClean="0"/>
-              <a:t>30/05/2021</a:t>
+              <a:t>31/05/2021</a:t>
             </a:fld>
             <a:endParaRPr lang="pt-BR"/>
           </a:p>
@@ -1957,7 +1957,7 @@
           <a:p>
             <a:fld id="{9C051C65-7635-434F-9E39-2D893C4FB771}" type="datetimeFigureOut">
               <a:rPr lang="pt-BR" smtClean="0"/>
-              <a:t>30/05/2021</a:t>
+              <a:t>31/05/2021</a:t>
             </a:fld>
             <a:endParaRPr lang="pt-BR"/>
           </a:p>
@@ -2070,7 +2070,7 @@
           <a:p>
             <a:fld id="{9C051C65-7635-434F-9E39-2D893C4FB771}" type="datetimeFigureOut">
               <a:rPr lang="pt-BR" smtClean="0"/>
-              <a:t>30/05/2021</a:t>
+              <a:t>31/05/2021</a:t>
             </a:fld>
             <a:endParaRPr lang="pt-BR"/>
           </a:p>
@@ -2381,7 +2381,7 @@
           <a:p>
             <a:fld id="{9C051C65-7635-434F-9E39-2D893C4FB771}" type="datetimeFigureOut">
               <a:rPr lang="pt-BR" smtClean="0"/>
-              <a:t>30/05/2021</a:t>
+              <a:t>31/05/2021</a:t>
             </a:fld>
             <a:endParaRPr lang="pt-BR"/>
           </a:p>
@@ -2669,7 +2669,7 @@
           <a:p>
             <a:fld id="{9C051C65-7635-434F-9E39-2D893C4FB771}" type="datetimeFigureOut">
               <a:rPr lang="pt-BR" smtClean="0"/>
-              <a:t>30/05/2021</a:t>
+              <a:t>31/05/2021</a:t>
             </a:fld>
             <a:endParaRPr lang="pt-BR"/>
           </a:p>
@@ -2910,7 +2910,7 @@
           <a:p>
             <a:fld id="{9C051C65-7635-434F-9E39-2D893C4FB771}" type="datetimeFigureOut">
               <a:rPr lang="pt-BR" smtClean="0"/>
-              <a:t>30/05/2021</a:t>
+              <a:t>31/05/2021</a:t>
             </a:fld>
             <a:endParaRPr lang="pt-BR"/>
           </a:p>
@@ -3316,9 +3316,8 @@
     <p:bg>
       <p:bgPr>
         <a:solidFill>
-          <a:schemeClr val="accent3">
-            <a:lumMod val="20000"/>
-            <a:lumOff val="80000"/>
+          <a:schemeClr val="bg1">
+            <a:lumMod val="95000"/>
           </a:schemeClr>
         </a:solidFill>
         <a:effectLst/>
@@ -3338,12 +3337,115 @@
           <a:chExt cx="0" cy="0"/>
         </a:xfrm>
       </p:grpSpPr>
-      <p:sp>
-        <p:nvSpPr>
-          <p:cNvPr id="4" name="Nuvem 3">
-            <a:extLst>
-              <a:ext uri="{FF2B5EF4-FFF2-40B4-BE49-F238E27FC236}">
-                <a16:creationId xmlns:a16="http://schemas.microsoft.com/office/drawing/2014/main" id="{D5D7608D-3778-4D03-92A1-EE8689A90A5A}"/>
+      <p:pic>
+        <p:nvPicPr>
+          <p:cNvPr id="5" name="Gráfico 8">
+            <a:extLst>
+              <a:ext uri="{FF2B5EF4-FFF2-40B4-BE49-F238E27FC236}">
+                <a16:creationId xmlns:a16="http://schemas.microsoft.com/office/drawing/2014/main" id="{8964798C-8235-4B8A-B017-A000C93D1D47}"/>
+              </a:ext>
+            </a:extLst>
+          </p:cNvPr>
+          <p:cNvPicPr/>
+          <p:nvPr/>
+        </p:nvPicPr>
+        <p:blipFill>
+          <a:blip r:embed="rId2" cstate="print">
+            <a:extLst>
+              <a:ext uri="{28A0092B-C50C-407E-A947-70E740481C1C}">
+                <a14:useLocalDpi xmlns:a14="http://schemas.microsoft.com/office/drawing/2010/main" val="0"/>
+              </a:ext>
+              <a:ext uri="{96DAC541-7B7A-43D3-8B79-37D633B846F1}">
+                <asvg:svgBlip xmlns:asvg="http://schemas.microsoft.com/office/drawing/2016/SVG/main" r:embed="rId3"/>
+              </a:ext>
+            </a:extLst>
+          </a:blip>
+          <a:stretch>
+            <a:fillRect/>
+          </a:stretch>
+        </p:blipFill>
+        <p:spPr>
+          <a:xfrm>
+            <a:off x="1363747" y="2694666"/>
+            <a:ext cx="434975" cy="434975"/>
+          </a:xfrm>
+          <a:prstGeom prst="rect">
+            <a:avLst/>
+          </a:prstGeom>
+        </p:spPr>
+      </p:pic>
+      <p:sp>
+        <p:nvSpPr>
+          <p:cNvPr id="6" name="Caixa de Texto 2">
+            <a:extLst>
+              <a:ext uri="{FF2B5EF4-FFF2-40B4-BE49-F238E27FC236}">
+                <a16:creationId xmlns:a16="http://schemas.microsoft.com/office/drawing/2014/main" id="{0AA07F53-1DF3-420E-8173-50E1054BF1C6}"/>
+              </a:ext>
+            </a:extLst>
+          </p:cNvPr>
+          <p:cNvSpPr txBox="1">
+            <a:spLocks noChangeArrowheads="1"/>
+          </p:cNvSpPr>
+          <p:nvPr/>
+        </p:nvSpPr>
+        <p:spPr bwMode="auto">
+          <a:xfrm>
+            <a:off x="909956" y="3129641"/>
+            <a:ext cx="1333500" cy="386412"/>
+          </a:xfrm>
+          <a:prstGeom prst="rect">
+            <a:avLst/>
+          </a:prstGeom>
+          <a:noFill/>
+          <a:ln>
+            <a:noFill/>
+          </a:ln>
+        </p:spPr>
+        <p:style>
+          <a:lnRef idx="0">
+            <a:scrgbClr r="0" g="0" b="0"/>
+          </a:lnRef>
+          <a:fillRef idx="0">
+            <a:scrgbClr r="0" g="0" b="0"/>
+          </a:fillRef>
+          <a:effectRef idx="0">
+            <a:scrgbClr r="0" g="0" b="0"/>
+          </a:effectRef>
+          <a:fontRef idx="minor">
+            <a:schemeClr val="dk1"/>
+          </a:fontRef>
+        </p:style>
+        <p:txBody>
+          <a:bodyPr rot="0" vert="horz" wrap="square" lIns="91440" tIns="45720" rIns="91440" bIns="45720" anchor="t" anchorCtr="0">
+            <a:noAutofit/>
+          </a:bodyPr>
+          <a:lstStyle/>
+          <a:p>
+            <a:pPr algn="ctr">
+              <a:lnSpc>
+                <a:spcPct val="107000"/>
+              </a:lnSpc>
+              <a:spcAft>
+                <a:spcPts val="800"/>
+              </a:spcAft>
+            </a:pPr>
+            <a:r>
+              <a:rPr lang="pt-BR" sz="1100" dirty="0">
+                <a:effectLst/>
+                <a:ea typeface="Calibri" panose="020F0502020204030204" pitchFamily="34" charset="0"/>
+                <a:cs typeface="Times New Roman" panose="02020603050405020304" pitchFamily="18" charset="0"/>
+              </a:rPr>
+              <a:t>Usuário</a:t>
+            </a:r>
+          </a:p>
+        </p:txBody>
+      </p:sp>
+      <p:sp>
+        <p:nvSpPr>
+          <p:cNvPr id="7" name="Nuvem 6">
+            <a:extLst>
+              <a:ext uri="{FF2B5EF4-FFF2-40B4-BE49-F238E27FC236}">
+                <a16:creationId xmlns:a16="http://schemas.microsoft.com/office/drawing/2014/main" id="{030EE986-8A95-4BEF-8EAA-946FCB3FBC87}"/>
               </a:ext>
             </a:extLst>
           </p:cNvPr>
@@ -3395,10 +3497,10 @@
       </p:sp>
       <p:sp>
         <p:nvSpPr>
-          <p:cNvPr id="5" name="Caixa de Texto 2">
-            <a:extLst>
-              <a:ext uri="{FF2B5EF4-FFF2-40B4-BE49-F238E27FC236}">
-                <a16:creationId xmlns:a16="http://schemas.microsoft.com/office/drawing/2014/main" id="{CB21072E-5AED-4EF5-8033-94D76E533BDE}"/>
+          <p:cNvPr id="8" name="Caixa de Texto 2">
+            <a:extLst>
+              <a:ext uri="{FF2B5EF4-FFF2-40B4-BE49-F238E27FC236}">
+                <a16:creationId xmlns:a16="http://schemas.microsoft.com/office/drawing/2014/main" id="{023141AF-FAEF-4E12-BCAB-E9171B3D89F6}"/>
               </a:ext>
             </a:extLst>
           </p:cNvPr>
@@ -3466,10 +3568,10 @@
       </p:sp>
       <p:pic>
         <p:nvPicPr>
-          <p:cNvPr id="6" name="Imagem 5">
-            <a:extLst>
-              <a:ext uri="{FF2B5EF4-FFF2-40B4-BE49-F238E27FC236}">
-                <a16:creationId xmlns:a16="http://schemas.microsoft.com/office/drawing/2014/main" id="{7A8809D4-A8A2-49FD-A7CE-FBF59C180314}"/>
+          <p:cNvPr id="9" name="Imagem 8">
+            <a:extLst>
+              <a:ext uri="{FF2B5EF4-FFF2-40B4-BE49-F238E27FC236}">
+                <a16:creationId xmlns:a16="http://schemas.microsoft.com/office/drawing/2014/main" id="{853270C6-8085-4DD4-A136-D0BA84644C62}"/>
               </a:ext>
             </a:extLst>
           </p:cNvPr>
@@ -3477,7 +3579,7 @@
           <p:nvPr/>
         </p:nvPicPr>
         <p:blipFill>
-          <a:blip r:embed="rId2" cstate="print">
+          <a:blip r:embed="rId4" cstate="print">
             <a:extLst>
               <a:ext uri="{28A0092B-C50C-407E-A947-70E740481C1C}">
                 <a14:useLocalDpi xmlns:a14="http://schemas.microsoft.com/office/drawing/2010/main" val="0"/>
@@ -3505,10 +3607,10 @@
       </p:pic>
       <p:sp>
         <p:nvSpPr>
-          <p:cNvPr id="7" name="Caixa de Texto 2">
-            <a:extLst>
-              <a:ext uri="{FF2B5EF4-FFF2-40B4-BE49-F238E27FC236}">
-                <a16:creationId xmlns:a16="http://schemas.microsoft.com/office/drawing/2014/main" id="{F9C1BF61-388E-4C98-8B32-0EE8E38F0865}"/>
+          <p:cNvPr id="10" name="Caixa de Texto 2">
+            <a:extLst>
+              <a:ext uri="{FF2B5EF4-FFF2-40B4-BE49-F238E27FC236}">
+                <a16:creationId xmlns:a16="http://schemas.microsoft.com/office/drawing/2014/main" id="{64746EB9-31EB-45C6-9F6A-BFC211956EF9}"/>
               </a:ext>
             </a:extLst>
           </p:cNvPr>
@@ -3571,10 +3673,10 @@
       </p:sp>
       <p:pic>
         <p:nvPicPr>
-          <p:cNvPr id="8" name="Imagem 7">
-            <a:extLst>
-              <a:ext uri="{FF2B5EF4-FFF2-40B4-BE49-F238E27FC236}">
-                <a16:creationId xmlns:a16="http://schemas.microsoft.com/office/drawing/2014/main" id="{64FF325F-3ED0-4D85-8F85-026A34A4F1DC}"/>
+          <p:cNvPr id="11" name="Imagem 10">
+            <a:extLst>
+              <a:ext uri="{FF2B5EF4-FFF2-40B4-BE49-F238E27FC236}">
+                <a16:creationId xmlns:a16="http://schemas.microsoft.com/office/drawing/2014/main" id="{545FDDE8-3DC7-4AEC-860D-6AF0EF526CC2}"/>
               </a:ext>
             </a:extLst>
           </p:cNvPr>
@@ -3582,7 +3684,7 @@
           <p:nvPr/>
         </p:nvPicPr>
         <p:blipFill>
-          <a:blip r:embed="rId3" cstate="print">
+          <a:blip r:embed="rId5" cstate="print">
             <a:extLst>
               <a:ext uri="{28A0092B-C50C-407E-A947-70E740481C1C}">
                 <a14:useLocalDpi xmlns:a14="http://schemas.microsoft.com/office/drawing/2010/main" val="0"/>
@@ -3610,10 +3712,10 @@
       </p:pic>
       <p:pic>
         <p:nvPicPr>
-          <p:cNvPr id="10" name="Imagem 9">
-            <a:extLst>
-              <a:ext uri="{FF2B5EF4-FFF2-40B4-BE49-F238E27FC236}">
-                <a16:creationId xmlns:a16="http://schemas.microsoft.com/office/drawing/2014/main" id="{6A60313F-A7E2-4972-997B-CA65811562CE}"/>
+          <p:cNvPr id="12" name="Imagem 11">
+            <a:extLst>
+              <a:ext uri="{FF2B5EF4-FFF2-40B4-BE49-F238E27FC236}">
+                <a16:creationId xmlns:a16="http://schemas.microsoft.com/office/drawing/2014/main" id="{FF7C184E-A345-4218-9683-57C9FC5C5B47}"/>
               </a:ext>
             </a:extLst>
           </p:cNvPr>
@@ -3621,7 +3723,7 @@
           <p:nvPr/>
         </p:nvPicPr>
         <p:blipFill>
-          <a:blip r:embed="rId4" cstate="print">
+          <a:blip r:embed="rId6" cstate="print">
             <a:extLst>
               <a:ext uri="{28A0092B-C50C-407E-A947-70E740481C1C}">
                 <a14:useLocalDpi xmlns:a14="http://schemas.microsoft.com/office/drawing/2010/main" val="0"/>
@@ -3649,10 +3751,10 @@
       </p:pic>
       <p:pic>
         <p:nvPicPr>
-          <p:cNvPr id="11" name="Gráfico 3">
-            <a:extLst>
-              <a:ext uri="{FF2B5EF4-FFF2-40B4-BE49-F238E27FC236}">
-                <a16:creationId xmlns:a16="http://schemas.microsoft.com/office/drawing/2014/main" id="{54C4D65F-6DCA-4935-9FEC-6CBED34A7EFE}"/>
+          <p:cNvPr id="14" name="Gráfico 37">
+            <a:extLst>
+              <a:ext uri="{FF2B5EF4-FFF2-40B4-BE49-F238E27FC236}">
+                <a16:creationId xmlns:a16="http://schemas.microsoft.com/office/drawing/2014/main" id="{187799CA-E044-4942-9EE2-1ED22E199F81}"/>
               </a:ext>
             </a:extLst>
           </p:cNvPr>
@@ -3660,13 +3762,13 @@
           <p:nvPr/>
         </p:nvPicPr>
         <p:blipFill>
-          <a:blip r:embed="rId5" cstate="print">
+          <a:blip r:embed="rId7" cstate="print">
             <a:extLst>
               <a:ext uri="{28A0092B-C50C-407E-A947-70E740481C1C}">
                 <a14:useLocalDpi xmlns:a14="http://schemas.microsoft.com/office/drawing/2010/main" val="0"/>
               </a:ext>
               <a:ext uri="{96DAC541-7B7A-43D3-8B79-37D633B846F1}">
-                <asvg:svgBlip xmlns:asvg="http://schemas.microsoft.com/office/drawing/2016/SVG/main" r:embed="rId6"/>
+                <asvg:svgBlip xmlns:asvg="http://schemas.microsoft.com/office/drawing/2016/SVG/main" r:embed="rId8"/>
               </a:ext>
             </a:extLst>
           </a:blip>
@@ -3676,8 +3778,8 @@
         </p:blipFill>
         <p:spPr>
           <a:xfrm>
-            <a:off x="1454673" y="514277"/>
-            <a:ext cx="380365" cy="380366"/>
+            <a:off x="5122327" y="2638302"/>
+            <a:ext cx="529590" cy="529590"/>
           </a:xfrm>
           <a:prstGeom prst="rect">
             <a:avLst/>
@@ -3686,10 +3788,112 @@
       </p:pic>
       <p:sp>
         <p:nvSpPr>
-          <p:cNvPr id="12" name="Seta: para a Esquerda e para Cima 11">
-            <a:extLst>
-              <a:ext uri="{FF2B5EF4-FFF2-40B4-BE49-F238E27FC236}">
-                <a16:creationId xmlns:a16="http://schemas.microsoft.com/office/drawing/2014/main" id="{CDDB235C-405C-4D12-8A25-73F07F411A41}"/>
+          <p:cNvPr id="15" name="Caixa de Texto 2">
+            <a:extLst>
+              <a:ext uri="{FF2B5EF4-FFF2-40B4-BE49-F238E27FC236}">
+                <a16:creationId xmlns:a16="http://schemas.microsoft.com/office/drawing/2014/main" id="{D6A30F88-4C94-47F2-9391-4B9F1DE5499A}"/>
+              </a:ext>
+            </a:extLst>
+          </p:cNvPr>
+          <p:cNvSpPr txBox="1">
+            <a:spLocks noChangeArrowheads="1"/>
+          </p:cNvSpPr>
+          <p:nvPr/>
+        </p:nvSpPr>
+        <p:spPr bwMode="auto">
+          <a:xfrm>
+            <a:off x="3905258" y="3182793"/>
+            <a:ext cx="2209800" cy="495300"/>
+          </a:xfrm>
+          <a:prstGeom prst="rect">
+            <a:avLst/>
+          </a:prstGeom>
+          <a:noFill/>
+          <a:ln>
+            <a:noFill/>
+          </a:ln>
+        </p:spPr>
+        <p:style>
+          <a:lnRef idx="0">
+            <a:scrgbClr r="0" g="0" b="0"/>
+          </a:lnRef>
+          <a:fillRef idx="0">
+            <a:scrgbClr r="0" g="0" b="0"/>
+          </a:fillRef>
+          <a:effectRef idx="0">
+            <a:scrgbClr r="0" g="0" b="0"/>
+          </a:effectRef>
+          <a:fontRef idx="minor">
+            <a:schemeClr val="dk1"/>
+          </a:fontRef>
+        </p:style>
+        <p:txBody>
+          <a:bodyPr rot="0" vert="horz" wrap="square" lIns="91440" tIns="45720" rIns="91440" bIns="45720" anchor="t" anchorCtr="0">
+            <a:noAutofit/>
+          </a:bodyPr>
+          <a:lstStyle/>
+          <a:p>
+            <a:pPr algn="ctr">
+              <a:lnSpc>
+                <a:spcPct val="107000"/>
+              </a:lnSpc>
+              <a:spcAft>
+                <a:spcPts val="800"/>
+              </a:spcAft>
+            </a:pPr>
+            <a:r>
+              <a:rPr lang="pt-BR" sz="1100" dirty="0">
+                <a:effectLst/>
+                <a:ea typeface="Calibri" panose="020F0502020204030204" pitchFamily="34" charset="0"/>
+                <a:cs typeface="Times New Roman" panose="02020603050405020304" pitchFamily="18" charset="0"/>
+              </a:rPr>
+              <a:t>Funcionários </a:t>
+            </a:r>
+          </a:p>
+        </p:txBody>
+      </p:sp>
+      <p:pic>
+        <p:nvPicPr>
+          <p:cNvPr id="16" name="Imagem 15" descr="Forma&#10;&#10;Descrição gerada automaticamente com confiança baixa">
+            <a:extLst>
+              <a:ext uri="{FF2B5EF4-FFF2-40B4-BE49-F238E27FC236}">
+                <a16:creationId xmlns:a16="http://schemas.microsoft.com/office/drawing/2014/main" id="{5066F2F7-9481-472F-A296-72FB9B443035}"/>
+              </a:ext>
+            </a:extLst>
+          </p:cNvPr>
+          <p:cNvPicPr>
+            <a:picLocks noChangeAspect="1"/>
+          </p:cNvPicPr>
+          <p:nvPr/>
+        </p:nvPicPr>
+        <p:blipFill>
+          <a:blip r:embed="rId9">
+            <a:extLst>
+              <a:ext uri="{28A0092B-C50C-407E-A947-70E740481C1C}">
+                <a14:useLocalDpi xmlns:a14="http://schemas.microsoft.com/office/drawing/2010/main" val="0"/>
+              </a:ext>
+            </a:extLst>
+          </a:blip>
+          <a:stretch>
+            <a:fillRect/>
+          </a:stretch>
+        </p:blipFill>
+        <p:spPr>
+          <a:xfrm>
+            <a:off x="4366312" y="2703916"/>
+            <a:ext cx="425725" cy="425725"/>
+          </a:xfrm>
+          <a:prstGeom prst="rect">
+            <a:avLst/>
+          </a:prstGeom>
+        </p:spPr>
+      </p:pic>
+      <p:sp>
+        <p:nvSpPr>
+          <p:cNvPr id="17" name="Seta: para a Esquerda e para Cima 16">
+            <a:extLst>
+              <a:ext uri="{FF2B5EF4-FFF2-40B4-BE49-F238E27FC236}">
+                <a16:creationId xmlns:a16="http://schemas.microsoft.com/office/drawing/2014/main" id="{50F6330E-E55D-48CA-BE2D-7EA944724ABC}"/>
               </a:ext>
             </a:extLst>
           </p:cNvPr>
@@ -3740,12 +3944,64 @@
           </a:p>
         </p:txBody>
       </p:sp>
+      <p:sp>
+        <p:nvSpPr>
+          <p:cNvPr id="18" name="Seta: da Esquerda para a Direita 17">
+            <a:extLst>
+              <a:ext uri="{FF2B5EF4-FFF2-40B4-BE49-F238E27FC236}">
+                <a16:creationId xmlns:a16="http://schemas.microsoft.com/office/drawing/2014/main" id="{C90159E4-7610-4A71-AEC5-5028329EAD3A}"/>
+              </a:ext>
+            </a:extLst>
+          </p:cNvPr>
+          <p:cNvSpPr/>
+          <p:nvPr/>
+        </p:nvSpPr>
+        <p:spPr>
+          <a:xfrm rot="16200000">
+            <a:off x="4756970" y="2152906"/>
+            <a:ext cx="556472" cy="232677"/>
+          </a:xfrm>
+          <a:prstGeom prst="leftRightArrow">
+            <a:avLst/>
+          </a:prstGeom>
+          <a:ln>
+            <a:headEnd type="none" w="med" len="med"/>
+            <a:tailEnd type="none" w="med" len="med"/>
+          </a:ln>
+        </p:spPr>
+        <p:style>
+          <a:lnRef idx="3">
+            <a:schemeClr val="lt1"/>
+          </a:lnRef>
+          <a:fillRef idx="1">
+            <a:schemeClr val="accent5"/>
+          </a:fillRef>
+          <a:effectRef idx="1">
+            <a:schemeClr val="accent5"/>
+          </a:effectRef>
+          <a:fontRef idx="minor">
+            <a:schemeClr val="lt1"/>
+          </a:fontRef>
+        </p:style>
+        <p:txBody>
+          <a:bodyPr rot="0" spcFirstLastPara="0" vert="horz" wrap="square" lIns="91440" tIns="45720" rIns="91440" bIns="45720" numCol="1" spcCol="0" rtlCol="0" fromWordArt="0" anchor="ctr" anchorCtr="0" forceAA="0" compatLnSpc="1">
+            <a:prstTxWarp prst="textNoShape">
+              <a:avLst/>
+            </a:prstTxWarp>
+            <a:noAutofit/>
+          </a:bodyPr>
+          <a:lstStyle/>
+          <a:p>
+            <a:endParaRPr lang="pt-BR" dirty="0"/>
+          </a:p>
+        </p:txBody>
+      </p:sp>
       <p:pic>
         <p:nvPicPr>
-          <p:cNvPr id="13" name="Gráfico 7">
-            <a:extLst>
-              <a:ext uri="{FF2B5EF4-FFF2-40B4-BE49-F238E27FC236}">
-                <a16:creationId xmlns:a16="http://schemas.microsoft.com/office/drawing/2014/main" id="{5C3376D8-C929-47A6-82E1-ECDBDC73A1E5}"/>
+          <p:cNvPr id="19" name="Gráfico 8">
+            <a:extLst>
+              <a:ext uri="{FF2B5EF4-FFF2-40B4-BE49-F238E27FC236}">
+                <a16:creationId xmlns:a16="http://schemas.microsoft.com/office/drawing/2014/main" id="{6C0E9257-3049-4A99-981B-902658028DCB}"/>
               </a:ext>
             </a:extLst>
           </p:cNvPr>
@@ -3753,13 +4009,13 @@
           <p:nvPr/>
         </p:nvPicPr>
         <p:blipFill>
-          <a:blip r:embed="rId7" cstate="print">
+          <a:blip r:embed="rId2" cstate="print">
             <a:extLst>
               <a:ext uri="{28A0092B-C50C-407E-A947-70E740481C1C}">
                 <a14:useLocalDpi xmlns:a14="http://schemas.microsoft.com/office/drawing/2010/main" val="0"/>
               </a:ext>
               <a:ext uri="{96DAC541-7B7A-43D3-8B79-37D633B846F1}">
-                <asvg:svgBlip xmlns:asvg="http://schemas.microsoft.com/office/drawing/2016/SVG/main" r:embed="rId8"/>
+                <asvg:svgBlip xmlns:asvg="http://schemas.microsoft.com/office/drawing/2016/SVG/main" r:embed="rId3"/>
               </a:ext>
             </a:extLst>
           </a:blip>
@@ -3769,32 +4025,73 @@
         </p:blipFill>
         <p:spPr>
           <a:xfrm>
-            <a:off x="1393669" y="2729198"/>
-            <a:ext cx="380365" cy="380365"/>
+            <a:off x="1950687" y="4478918"/>
+            <a:ext cx="434975" cy="434975"/>
           </a:xfrm>
           <a:prstGeom prst="rect">
             <a:avLst/>
           </a:prstGeom>
         </p:spPr>
       </p:pic>
-      <p:sp>
-        <p:nvSpPr>
-          <p:cNvPr id="15" name="Retângulo: Cantos Arredondados 14">
-            <a:extLst>
-              <a:ext uri="{FF2B5EF4-FFF2-40B4-BE49-F238E27FC236}">
-                <a16:creationId xmlns:a16="http://schemas.microsoft.com/office/drawing/2014/main" id="{3345E1AE-73DE-4872-891B-FE861FA891FA}"/>
-              </a:ext>
-            </a:extLst>
-          </p:cNvPr>
-          <p:cNvSpPr/>
-          <p:nvPr/>
-        </p:nvSpPr>
-        <p:spPr>
-          <a:xfrm>
-            <a:off x="561332" y="3074671"/>
-            <a:ext cx="1589233" cy="1285875"/>
-          </a:xfrm>
-          <a:prstGeom prst="roundRect">
+      <p:pic>
+        <p:nvPicPr>
+          <p:cNvPr id="20" name="Imagem 19">
+            <a:extLst>
+              <a:ext uri="{FF2B5EF4-FFF2-40B4-BE49-F238E27FC236}">
+                <a16:creationId xmlns:a16="http://schemas.microsoft.com/office/drawing/2014/main" id="{56AA74FF-2FC6-4B9B-8E65-BA778C416E59}"/>
+              </a:ext>
+            </a:extLst>
+          </p:cNvPr>
+          <p:cNvPicPr/>
+          <p:nvPr/>
+        </p:nvPicPr>
+        <p:blipFill>
+          <a:blip r:embed="rId10" cstate="print">
+            <a:extLst>
+              <a:ext uri="{28A0092B-C50C-407E-A947-70E740481C1C}">
+                <a14:useLocalDpi xmlns:a14="http://schemas.microsoft.com/office/drawing/2010/main" val="0"/>
+              </a:ext>
+            </a:extLst>
+          </a:blip>
+          <a:srcRect/>
+          <a:stretch>
+            <a:fillRect/>
+          </a:stretch>
+        </p:blipFill>
+        <p:spPr bwMode="auto">
+          <a:xfrm>
+            <a:off x="2643227" y="4478918"/>
+            <a:ext cx="550545" cy="550545"/>
+          </a:xfrm>
+          <a:prstGeom prst="rect">
+            <a:avLst/>
+          </a:prstGeom>
+          <a:noFill/>
+          <a:ln>
+            <a:noFill/>
+          </a:ln>
+        </p:spPr>
+      </p:pic>
+      <p:sp>
+        <p:nvSpPr>
+          <p:cNvPr id="21" name="Caixa de Texto 2">
+            <a:extLst>
+              <a:ext uri="{FF2B5EF4-FFF2-40B4-BE49-F238E27FC236}">
+                <a16:creationId xmlns:a16="http://schemas.microsoft.com/office/drawing/2014/main" id="{D6369C52-6486-409C-9E5B-52B4FF2A30C7}"/>
+              </a:ext>
+            </a:extLst>
+          </p:cNvPr>
+          <p:cNvSpPr txBox="1">
+            <a:spLocks noChangeArrowheads="1"/>
+          </p:cNvSpPr>
+          <p:nvPr/>
+        </p:nvSpPr>
+        <p:spPr bwMode="auto">
+          <a:xfrm>
+            <a:off x="1470956" y="4921512"/>
+            <a:ext cx="2209800" cy="495300"/>
+          </a:xfrm>
+          <a:prstGeom prst="rect">
             <a:avLst/>
           </a:prstGeom>
           <a:noFill/>
@@ -3817,6 +4114,74 @@
           </a:fontRef>
         </p:style>
         <p:txBody>
+          <a:bodyPr rot="0" vert="horz" wrap="square" lIns="91440" tIns="45720" rIns="91440" bIns="45720" anchor="t" anchorCtr="0">
+            <a:noAutofit/>
+          </a:bodyPr>
+          <a:lstStyle/>
+          <a:p>
+            <a:pPr algn="ctr">
+              <a:lnSpc>
+                <a:spcPct val="107000"/>
+              </a:lnSpc>
+              <a:spcAft>
+                <a:spcPts val="800"/>
+              </a:spcAft>
+            </a:pPr>
+            <a:r>
+              <a:rPr lang="pt-BR" sz="1100" dirty="0">
+                <a:ea typeface="Calibri" panose="020F0502020204030204" pitchFamily="34" charset="0"/>
+                <a:cs typeface="Times New Roman" panose="02020603050405020304" pitchFamily="18" charset="0"/>
+              </a:rPr>
+              <a:t>Usuário quer ser cliente</a:t>
+            </a:r>
+            <a:endParaRPr lang="pt-BR" sz="1100" dirty="0">
+              <a:effectLst/>
+              <a:ea typeface="Calibri" panose="020F0502020204030204" pitchFamily="34" charset="0"/>
+              <a:cs typeface="Times New Roman" panose="02020603050405020304" pitchFamily="18" charset="0"/>
+            </a:endParaRPr>
+          </a:p>
+        </p:txBody>
+      </p:sp>
+      <p:sp>
+        <p:nvSpPr>
+          <p:cNvPr id="22" name="Seta: da Esquerda para a Direita 21">
+            <a:extLst>
+              <a:ext uri="{FF2B5EF4-FFF2-40B4-BE49-F238E27FC236}">
+                <a16:creationId xmlns:a16="http://schemas.microsoft.com/office/drawing/2014/main" id="{BC62DB43-B952-414E-9B69-3416EBAEE5B5}"/>
+              </a:ext>
+            </a:extLst>
+          </p:cNvPr>
+          <p:cNvSpPr/>
+          <p:nvPr/>
+        </p:nvSpPr>
+        <p:spPr>
+          <a:xfrm rot="10800000">
+            <a:off x="3451334" y="4612937"/>
+            <a:ext cx="947277" cy="266980"/>
+          </a:xfrm>
+          <a:prstGeom prst="leftRightArrow">
+            <a:avLst/>
+          </a:prstGeom>
+          <a:ln>
+            <a:headEnd type="none" w="med" len="med"/>
+            <a:tailEnd type="none" w="med" len="med"/>
+          </a:ln>
+        </p:spPr>
+        <p:style>
+          <a:lnRef idx="3">
+            <a:schemeClr val="lt1"/>
+          </a:lnRef>
+          <a:fillRef idx="1">
+            <a:schemeClr val="accent5"/>
+          </a:fillRef>
+          <a:effectRef idx="1">
+            <a:schemeClr val="accent5"/>
+          </a:effectRef>
+          <a:fontRef idx="minor">
+            <a:schemeClr val="lt1"/>
+          </a:fontRef>
+        </p:style>
+        <p:txBody>
           <a:bodyPr rot="0" spcFirstLastPara="0" vert="horz" wrap="square" lIns="91440" tIns="45720" rIns="91440" bIns="45720" numCol="1" spcCol="0" rtlCol="0" fromWordArt="0" anchor="ctr" anchorCtr="0" forceAA="0" compatLnSpc="1">
             <a:prstTxWarp prst="textNoShape">
               <a:avLst/>
@@ -3831,10 +4196,10 @@
       </p:sp>
       <p:pic>
         <p:nvPicPr>
-          <p:cNvPr id="16" name="Gráfico 8">
-            <a:extLst>
-              <a:ext uri="{FF2B5EF4-FFF2-40B4-BE49-F238E27FC236}">
-                <a16:creationId xmlns:a16="http://schemas.microsoft.com/office/drawing/2014/main" id="{2E912DC5-187C-42C4-8336-C4B01335B430}"/>
+          <p:cNvPr id="23" name="Imagem 22">
+            <a:extLst>
+              <a:ext uri="{FF2B5EF4-FFF2-40B4-BE49-F238E27FC236}">
+                <a16:creationId xmlns:a16="http://schemas.microsoft.com/office/drawing/2014/main" id="{6D93C844-2086-4EC3-B24A-A9F4F53A0365}"/>
               </a:ext>
             </a:extLst>
           </p:cNvPr>
@@ -3842,147 +4207,38 @@
           <p:nvPr/>
         </p:nvPicPr>
         <p:blipFill>
-          <a:blip r:embed="rId9" cstate="print">
+          <a:blip r:embed="rId11" cstate="print">
             <a:extLst>
               <a:ext uri="{28A0092B-C50C-407E-A947-70E740481C1C}">
                 <a14:useLocalDpi xmlns:a14="http://schemas.microsoft.com/office/drawing/2010/main" val="0"/>
               </a:ext>
-              <a:ext uri="{96DAC541-7B7A-43D3-8B79-37D633B846F1}">
-                <asvg:svgBlip xmlns:asvg="http://schemas.microsoft.com/office/drawing/2016/SVG/main" r:embed="rId10"/>
-              </a:ext>
             </a:extLst>
           </a:blip>
+          <a:srcRect/>
           <a:stretch>
             <a:fillRect/>
           </a:stretch>
         </p:blipFill>
-        <p:spPr>
-          <a:xfrm>
-            <a:off x="1138460" y="3462953"/>
-            <a:ext cx="434975" cy="434975"/>
+        <p:spPr bwMode="auto">
+          <a:xfrm>
+            <a:off x="4782939" y="4375945"/>
+            <a:ext cx="514985" cy="514985"/>
           </a:xfrm>
           <a:prstGeom prst="rect">
             <a:avLst/>
           </a:prstGeom>
+          <a:noFill/>
+          <a:ln>
+            <a:noFill/>
+          </a:ln>
         </p:spPr>
       </p:pic>
-      <p:pic>
-        <p:nvPicPr>
-          <p:cNvPr id="17" name="Gráfico 1">
-            <a:extLst>
-              <a:ext uri="{FF2B5EF4-FFF2-40B4-BE49-F238E27FC236}">
-                <a16:creationId xmlns:a16="http://schemas.microsoft.com/office/drawing/2014/main" id="{BF71FA2E-4BE1-4A86-9521-AF74BE072DD8}"/>
-              </a:ext>
-            </a:extLst>
-          </p:cNvPr>
-          <p:cNvPicPr/>
-          <p:nvPr/>
-        </p:nvPicPr>
-        <p:blipFill>
-          <a:blip r:embed="rId11" cstate="print">
-            <a:extLst>
-              <a:ext uri="{28A0092B-C50C-407E-A947-70E740481C1C}">
-                <a14:useLocalDpi xmlns:a14="http://schemas.microsoft.com/office/drawing/2010/main" val="0"/>
-              </a:ext>
-              <a:ext uri="{96DAC541-7B7A-43D3-8B79-37D633B846F1}">
-                <asvg:svgBlip xmlns:asvg="http://schemas.microsoft.com/office/drawing/2016/SVG/main" r:embed="rId12"/>
-              </a:ext>
-            </a:extLst>
-          </a:blip>
-          <a:stretch>
-            <a:fillRect/>
-          </a:stretch>
-        </p:blipFill>
-        <p:spPr>
-          <a:xfrm>
-            <a:off x="664741" y="3185190"/>
-            <a:ext cx="390525" cy="390525"/>
-          </a:xfrm>
-          <a:prstGeom prst="rect">
-            <a:avLst/>
-          </a:prstGeom>
-        </p:spPr>
-      </p:pic>
-      <p:pic>
-        <p:nvPicPr>
-          <p:cNvPr id="18" name="Gráfico 6">
-            <a:extLst>
-              <a:ext uri="{FF2B5EF4-FFF2-40B4-BE49-F238E27FC236}">
-                <a16:creationId xmlns:a16="http://schemas.microsoft.com/office/drawing/2014/main" id="{20DA31CC-3E90-49F1-B6BC-C578F793FBB0}"/>
-              </a:ext>
-            </a:extLst>
-          </p:cNvPr>
-          <p:cNvPicPr/>
-          <p:nvPr/>
-        </p:nvPicPr>
-        <p:blipFill>
-          <a:blip r:embed="rId13">
-            <a:extLst>
-              <a:ext uri="{28A0092B-C50C-407E-A947-70E740481C1C}">
-                <a14:useLocalDpi xmlns:a14="http://schemas.microsoft.com/office/drawing/2010/main" val="0"/>
-              </a:ext>
-              <a:ext uri="{96DAC541-7B7A-43D3-8B79-37D633B846F1}">
-                <asvg:svgBlip xmlns:asvg="http://schemas.microsoft.com/office/drawing/2016/SVG/main" r:embed="rId14"/>
-              </a:ext>
-            </a:extLst>
-          </a:blip>
-          <a:stretch>
-            <a:fillRect/>
-          </a:stretch>
-        </p:blipFill>
-        <p:spPr>
-          <a:xfrm>
-            <a:off x="1621173" y="3212178"/>
-            <a:ext cx="360680" cy="336550"/>
-          </a:xfrm>
-          <a:prstGeom prst="rect">
-            <a:avLst/>
-          </a:prstGeom>
-        </p:spPr>
-      </p:pic>
-      <p:pic>
-        <p:nvPicPr>
-          <p:cNvPr id="19" name="Gráfico 4">
-            <a:extLst>
-              <a:ext uri="{FF2B5EF4-FFF2-40B4-BE49-F238E27FC236}">
-                <a16:creationId xmlns:a16="http://schemas.microsoft.com/office/drawing/2014/main" id="{DB5F871E-0861-4F7F-945B-1D3DD9E49D69}"/>
-              </a:ext>
-            </a:extLst>
-          </p:cNvPr>
-          <p:cNvPicPr/>
-          <p:nvPr/>
-        </p:nvPicPr>
-        <p:blipFill>
-          <a:blip r:embed="rId15" cstate="print">
-            <a:extLst>
-              <a:ext uri="{28A0092B-C50C-407E-A947-70E740481C1C}">
-                <a14:useLocalDpi xmlns:a14="http://schemas.microsoft.com/office/drawing/2010/main" val="0"/>
-              </a:ext>
-              <a:ext uri="{96DAC541-7B7A-43D3-8B79-37D633B846F1}">
-                <asvg:svgBlip xmlns:asvg="http://schemas.microsoft.com/office/drawing/2016/SVG/main" r:embed="rId16"/>
-              </a:ext>
-            </a:extLst>
-          </a:blip>
-          <a:stretch>
-            <a:fillRect/>
-          </a:stretch>
-        </p:blipFill>
-        <p:spPr>
-          <a:xfrm rot="20026507">
-            <a:off x="1288894" y="3163619"/>
-            <a:ext cx="209550" cy="209550"/>
-          </a:xfrm>
-          <a:prstGeom prst="rect">
-            <a:avLst/>
-          </a:prstGeom>
-        </p:spPr>
-      </p:pic>
-      <p:sp>
-        <p:nvSpPr>
-          <p:cNvPr id="20" name="Caixa de Texto 2">
-            <a:extLst>
-              <a:ext uri="{FF2B5EF4-FFF2-40B4-BE49-F238E27FC236}">
-                <a16:creationId xmlns:a16="http://schemas.microsoft.com/office/drawing/2014/main" id="{8F877C01-BA23-4964-9E7A-45FA20A40796}"/>
+      <p:sp>
+        <p:nvSpPr>
+          <p:cNvPr id="24" name="Caixa de Texto 2">
+            <a:extLst>
+              <a:ext uri="{FF2B5EF4-FFF2-40B4-BE49-F238E27FC236}">
+                <a16:creationId xmlns:a16="http://schemas.microsoft.com/office/drawing/2014/main" id="{8EA2A516-09F1-47E3-B698-88F077B50C15}"/>
               </a:ext>
             </a:extLst>
           </p:cNvPr>
@@ -3993,8 +4249,8 @@
         </p:nvSpPr>
         <p:spPr bwMode="auto">
           <a:xfrm>
-            <a:off x="664741" y="3911525"/>
-            <a:ext cx="1333500" cy="495300"/>
+            <a:off x="4859980" y="4957087"/>
+            <a:ext cx="1345402" cy="355601"/>
           </a:xfrm>
           <a:prstGeom prst="rect">
             <a:avLst/>
@@ -4038,17 +4294,120 @@
                 <a:ea typeface="Calibri" panose="020F0502020204030204" pitchFamily="34" charset="0"/>
                 <a:cs typeface="Times New Roman" panose="02020603050405020304" pitchFamily="18" charset="0"/>
               </a:rPr>
-              <a:t>Usuário acessando a aplicação</a:t>
-            </a:r>
-          </a:p>
-        </p:txBody>
-      </p:sp>
-      <p:sp>
-        <p:nvSpPr>
-          <p:cNvPr id="21" name="Caixa de Texto 2">
-            <a:extLst>
-              <a:ext uri="{FF2B5EF4-FFF2-40B4-BE49-F238E27FC236}">
-                <a16:creationId xmlns:a16="http://schemas.microsoft.com/office/drawing/2014/main" id="{832EE2B5-FB43-4C9D-9D09-746F6B5DCE93}"/>
+              <a:t>Equi</a:t>
+            </a:r>
+            <a:r>
+              <a:rPr lang="pt-BR" sz="1100" dirty="0">
+                <a:ea typeface="Calibri" panose="020F0502020204030204" pitchFamily="34" charset="0"/>
+                <a:cs typeface="Times New Roman" panose="02020603050405020304" pitchFamily="18" charset="0"/>
+              </a:rPr>
+              <a:t>pe mecânica</a:t>
+            </a:r>
+            <a:endParaRPr lang="pt-BR" sz="1100" dirty="0">
+              <a:effectLst/>
+              <a:ea typeface="Calibri" panose="020F0502020204030204" pitchFamily="34" charset="0"/>
+              <a:cs typeface="Times New Roman" panose="02020603050405020304" pitchFamily="18" charset="0"/>
+            </a:endParaRPr>
+          </a:p>
+        </p:txBody>
+      </p:sp>
+      <p:sp>
+        <p:nvSpPr>
+          <p:cNvPr id="25" name="Seta: da Esquerda para a Direita 24">
+            <a:extLst>
+              <a:ext uri="{FF2B5EF4-FFF2-40B4-BE49-F238E27FC236}">
+                <a16:creationId xmlns:a16="http://schemas.microsoft.com/office/drawing/2014/main" id="{E4C5DAA4-F188-4E6B-8139-D3FB93B0C96D}"/>
+              </a:ext>
+            </a:extLst>
+          </p:cNvPr>
+          <p:cNvSpPr/>
+          <p:nvPr/>
+        </p:nvSpPr>
+        <p:spPr>
+          <a:xfrm rot="16200000">
+            <a:off x="4774476" y="3791076"/>
+            <a:ext cx="556472" cy="232677"/>
+          </a:xfrm>
+          <a:prstGeom prst="leftRightArrow">
+            <a:avLst/>
+          </a:prstGeom>
+          <a:ln>
+            <a:headEnd type="none" w="med" len="med"/>
+            <a:tailEnd type="none" w="med" len="med"/>
+          </a:ln>
+        </p:spPr>
+        <p:style>
+          <a:lnRef idx="3">
+            <a:schemeClr val="lt1"/>
+          </a:lnRef>
+          <a:fillRef idx="1">
+            <a:schemeClr val="accent5"/>
+          </a:fillRef>
+          <a:effectRef idx="1">
+            <a:schemeClr val="accent5"/>
+          </a:effectRef>
+          <a:fontRef idx="minor">
+            <a:schemeClr val="lt1"/>
+          </a:fontRef>
+        </p:style>
+        <p:txBody>
+          <a:bodyPr rot="0" spcFirstLastPara="0" vert="horz" wrap="square" lIns="91440" tIns="45720" rIns="91440" bIns="45720" numCol="1" spcCol="0" rtlCol="0" fromWordArt="0" anchor="ctr" anchorCtr="0" forceAA="0" compatLnSpc="1">
+            <a:prstTxWarp prst="textNoShape">
+              <a:avLst/>
+            </a:prstTxWarp>
+            <a:noAutofit/>
+          </a:bodyPr>
+          <a:lstStyle/>
+          <a:p>
+            <a:endParaRPr lang="pt-BR" dirty="0"/>
+          </a:p>
+        </p:txBody>
+      </p:sp>
+      <p:pic>
+        <p:nvPicPr>
+          <p:cNvPr id="26" name="Imagem 25">
+            <a:extLst>
+              <a:ext uri="{FF2B5EF4-FFF2-40B4-BE49-F238E27FC236}">
+                <a16:creationId xmlns:a16="http://schemas.microsoft.com/office/drawing/2014/main" id="{FE6E5281-BDF4-48CF-9C20-40543609F0BB}"/>
+              </a:ext>
+            </a:extLst>
+          </p:cNvPr>
+          <p:cNvPicPr/>
+          <p:nvPr/>
+        </p:nvPicPr>
+        <p:blipFill>
+          <a:blip r:embed="rId12" cstate="print">
+            <a:extLst>
+              <a:ext uri="{28A0092B-C50C-407E-A947-70E740481C1C}">
+                <a14:useLocalDpi xmlns:a14="http://schemas.microsoft.com/office/drawing/2010/main" val="0"/>
+              </a:ext>
+            </a:extLst>
+          </a:blip>
+          <a:srcRect/>
+          <a:stretch>
+            <a:fillRect/>
+          </a:stretch>
+        </p:blipFill>
+        <p:spPr bwMode="auto">
+          <a:xfrm>
+            <a:off x="4582266" y="5567513"/>
+            <a:ext cx="626745" cy="626745"/>
+          </a:xfrm>
+          <a:prstGeom prst="rect">
+            <a:avLst/>
+          </a:prstGeom>
+          <a:noFill/>
+          <a:ln>
+            <a:noFill/>
+          </a:ln>
+        </p:spPr>
+      </p:pic>
+      <p:sp>
+        <p:nvSpPr>
+          <p:cNvPr id="27" name="Caixa de Texto 2">
+            <a:extLst>
+              <a:ext uri="{FF2B5EF4-FFF2-40B4-BE49-F238E27FC236}">
+                <a16:creationId xmlns:a16="http://schemas.microsoft.com/office/drawing/2014/main" id="{75DCBCE2-57E5-491A-8791-F1B4F6366D17}"/>
               </a:ext>
             </a:extLst>
           </p:cNvPr>
@@ -4059,8 +4418,8 @@
         </p:nvSpPr>
         <p:spPr bwMode="auto">
           <a:xfrm>
-            <a:off x="6553159" y="1749635"/>
-            <a:ext cx="1586269" cy="762000"/>
+            <a:off x="4355916" y="6194258"/>
+            <a:ext cx="1125902" cy="286683"/>
           </a:xfrm>
           <a:prstGeom prst="rect">
             <a:avLst/>
@@ -4090,49 +4449,13 @@
           </a:bodyPr>
           <a:lstStyle/>
           <a:p>
-            <a:pPr marL="342900" lvl="0" indent="-342900">
-              <a:lnSpc>
-                <a:spcPct val="107000"/>
-              </a:lnSpc>
-              <a:buFont typeface="Symbol" panose="05050102010706020507" pitchFamily="18" charset="2"/>
-              <a:buChar char=""/>
-            </a:pPr>
-            <a:r>
-              <a:rPr lang="pt-BR" sz="1100" dirty="0">
-                <a:effectLst/>
-                <a:ea typeface="Calibri" panose="020F0502020204030204" pitchFamily="34" charset="0"/>
-                <a:cs typeface="Times New Roman" panose="02020603050405020304" pitchFamily="18" charset="0"/>
-              </a:rPr>
-              <a:t>Banco de dados;</a:t>
-            </a:r>
-          </a:p>
-          <a:p>
-            <a:pPr marL="342900" lvl="0" indent="-342900">
-              <a:lnSpc>
-                <a:spcPct val="107000"/>
-              </a:lnSpc>
-              <a:buFont typeface="Symbol" panose="05050102010706020507" pitchFamily="18" charset="2"/>
-              <a:buChar char=""/>
-            </a:pPr>
-            <a:r>
-              <a:rPr lang="pt-BR" sz="1100" dirty="0">
-                <a:effectLst/>
-                <a:ea typeface="Calibri" panose="020F0502020204030204" pitchFamily="34" charset="0"/>
-                <a:cs typeface="Times New Roman" panose="02020603050405020304" pitchFamily="18" charset="0"/>
-              </a:rPr>
-              <a:t>Site;</a:t>
-            </a:r>
-          </a:p>
-          <a:p>
-            <a:pPr marL="342900" lvl="0" indent="-342900">
+            <a:pPr algn="ctr">
               <a:lnSpc>
                 <a:spcPct val="107000"/>
               </a:lnSpc>
               <a:spcAft>
                 <a:spcPts val="800"/>
               </a:spcAft>
-              <a:buFont typeface="Symbol" panose="05050102010706020507" pitchFamily="18" charset="2"/>
-              <a:buChar char=""/>
             </a:pPr>
             <a:r>
               <a:rPr lang="pt-BR" sz="1100" dirty="0">
@@ -4140,17 +4463,17 @@
                 <a:ea typeface="Calibri" panose="020F0502020204030204" pitchFamily="34" charset="0"/>
                 <a:cs typeface="Times New Roman" panose="02020603050405020304" pitchFamily="18" charset="0"/>
               </a:rPr>
-              <a:t>Comunidade.</a:t>
+              <a:t>Mecânica</a:t>
             </a:r>
           </a:p>
         </p:txBody>
       </p:sp>
       <p:pic>
         <p:nvPicPr>
-          <p:cNvPr id="22" name="Gráfico 46">
-            <a:extLst>
-              <a:ext uri="{FF2B5EF4-FFF2-40B4-BE49-F238E27FC236}">
-                <a16:creationId xmlns:a16="http://schemas.microsoft.com/office/drawing/2014/main" id="{7064C349-6ABA-472F-A085-12A80E1D9A4A}"/>
+          <p:cNvPr id="28" name="Imagem 27">
+            <a:extLst>
+              <a:ext uri="{FF2B5EF4-FFF2-40B4-BE49-F238E27FC236}">
+                <a16:creationId xmlns:a16="http://schemas.microsoft.com/office/drawing/2014/main" id="{46D6E7C8-5F6C-41EB-ABB8-1B9B71596370}"/>
               </a:ext>
             </a:extLst>
           </p:cNvPr>
@@ -4158,85 +4481,156 @@
           <p:nvPr/>
         </p:nvPicPr>
         <p:blipFill>
-          <a:blip r:embed="rId5" cstate="print">
+          <a:blip r:embed="rId13" cstate="print">
             <a:extLst>
               <a:ext uri="{28A0092B-C50C-407E-A947-70E740481C1C}">
                 <a14:useLocalDpi xmlns:a14="http://schemas.microsoft.com/office/drawing/2010/main" val="0"/>
               </a:ext>
-              <a:ext uri="{96DAC541-7B7A-43D3-8B79-37D633B846F1}">
-                <asvg:svgBlip xmlns:asvg="http://schemas.microsoft.com/office/drawing/2016/SVG/main" r:embed="rId6"/>
-              </a:ext>
             </a:extLst>
           </a:blip>
+          <a:srcRect/>
           <a:stretch>
             <a:fillRect/>
           </a:stretch>
         </p:blipFill>
+        <p:spPr bwMode="auto">
+          <a:xfrm>
+            <a:off x="5963738" y="5651179"/>
+            <a:ext cx="520065" cy="520065"/>
+          </a:xfrm>
+          <a:prstGeom prst="rect">
+            <a:avLst/>
+          </a:prstGeom>
+          <a:noFill/>
+          <a:ln>
+            <a:noFill/>
+          </a:ln>
+        </p:spPr>
+      </p:pic>
+      <p:sp>
+        <p:nvSpPr>
+          <p:cNvPr id="29" name="Seta: da Esquerda para a Direita 28">
+            <a:extLst>
+              <a:ext uri="{FF2B5EF4-FFF2-40B4-BE49-F238E27FC236}">
+                <a16:creationId xmlns:a16="http://schemas.microsoft.com/office/drawing/2014/main" id="{606F4B7F-B8B4-4213-9AF8-E28964BA48E7}"/>
+              </a:ext>
+            </a:extLst>
+          </p:cNvPr>
+          <p:cNvSpPr/>
+          <p:nvPr/>
+        </p:nvSpPr>
         <p:spPr>
-          <a:xfrm>
-            <a:off x="3550394" y="2119644"/>
-            <a:ext cx="400544" cy="379160"/>
+          <a:xfrm rot="5400000">
+            <a:off x="5988172" y="5317038"/>
+            <a:ext cx="319155" cy="183514"/>
+          </a:xfrm>
+          <a:prstGeom prst="leftRightArrow">
+            <a:avLst/>
+          </a:prstGeom>
+          <a:ln>
+            <a:headEnd type="none" w="med" len="med"/>
+            <a:tailEnd type="none" w="med" len="med"/>
+          </a:ln>
+        </p:spPr>
+        <p:style>
+          <a:lnRef idx="3">
+            <a:schemeClr val="lt1"/>
+          </a:lnRef>
+          <a:fillRef idx="1">
+            <a:schemeClr val="accent5"/>
+          </a:fillRef>
+          <a:effectRef idx="1">
+            <a:schemeClr val="accent5"/>
+          </a:effectRef>
+          <a:fontRef idx="minor">
+            <a:schemeClr val="lt1"/>
+          </a:fontRef>
+        </p:style>
+        <p:txBody>
+          <a:bodyPr rot="0" spcFirstLastPara="0" vert="horz" wrap="square" lIns="91440" tIns="45720" rIns="91440" bIns="45720" numCol="1" spcCol="0" rtlCol="0" fromWordArt="0" anchor="ctr" anchorCtr="0" forceAA="0" compatLnSpc="1">
+            <a:prstTxWarp prst="textNoShape">
+              <a:avLst/>
+            </a:prstTxWarp>
+            <a:noAutofit/>
+          </a:bodyPr>
+          <a:lstStyle/>
+          <a:p>
+            <a:endParaRPr lang="pt-BR"/>
+          </a:p>
+        </p:txBody>
+      </p:sp>
+      <p:sp>
+        <p:nvSpPr>
+          <p:cNvPr id="30" name="Seta: da Esquerda para a Direita 29">
+            <a:extLst>
+              <a:ext uri="{FF2B5EF4-FFF2-40B4-BE49-F238E27FC236}">
+                <a16:creationId xmlns:a16="http://schemas.microsoft.com/office/drawing/2014/main" id="{93F0A8C1-3D5D-4295-8050-FC7D2C1E8522}"/>
+              </a:ext>
+            </a:extLst>
+          </p:cNvPr>
+          <p:cNvSpPr/>
+          <p:nvPr/>
+        </p:nvSpPr>
+        <p:spPr>
+          <a:xfrm rot="10800000">
+            <a:off x="5352149" y="5815818"/>
+            <a:ext cx="520064" cy="183514"/>
+          </a:xfrm>
+          <a:prstGeom prst="leftRightArrow">
+            <a:avLst/>
+          </a:prstGeom>
+          <a:ln>
+            <a:headEnd type="none" w="med" len="med"/>
+            <a:tailEnd type="none" w="med" len="med"/>
+          </a:ln>
+        </p:spPr>
+        <p:style>
+          <a:lnRef idx="3">
+            <a:schemeClr val="lt1"/>
+          </a:lnRef>
+          <a:fillRef idx="1">
+            <a:schemeClr val="accent5"/>
+          </a:fillRef>
+          <a:effectRef idx="1">
+            <a:schemeClr val="accent5"/>
+          </a:effectRef>
+          <a:fontRef idx="minor">
+            <a:schemeClr val="lt1"/>
+          </a:fontRef>
+        </p:style>
+        <p:txBody>
+          <a:bodyPr rot="0" spcFirstLastPara="0" vert="horz" wrap="square" lIns="91440" tIns="45720" rIns="91440" bIns="45720" numCol="1" spcCol="0" rtlCol="0" fromWordArt="0" anchor="ctr" anchorCtr="0" forceAA="0" compatLnSpc="1">
+            <a:prstTxWarp prst="textNoShape">
+              <a:avLst/>
+            </a:prstTxWarp>
+            <a:noAutofit/>
+          </a:bodyPr>
+          <a:lstStyle/>
+          <a:p>
+            <a:endParaRPr lang="pt-BR"/>
+          </a:p>
+        </p:txBody>
+      </p:sp>
+      <p:sp>
+        <p:nvSpPr>
+          <p:cNvPr id="31" name="Caixa de Texto 2">
+            <a:extLst>
+              <a:ext uri="{FF2B5EF4-FFF2-40B4-BE49-F238E27FC236}">
+                <a16:creationId xmlns:a16="http://schemas.microsoft.com/office/drawing/2014/main" id="{4D6BBEFC-CDA1-4B3B-9C5B-CAD101034B06}"/>
+              </a:ext>
+            </a:extLst>
+          </p:cNvPr>
+          <p:cNvSpPr txBox="1">
+            <a:spLocks noChangeArrowheads="1"/>
+          </p:cNvSpPr>
+          <p:nvPr/>
+        </p:nvSpPr>
+        <p:spPr bwMode="auto">
+          <a:xfrm>
+            <a:off x="5601156" y="6201395"/>
+            <a:ext cx="1125902" cy="382270"/>
           </a:xfrm>
           <a:prstGeom prst="rect">
-            <a:avLst/>
-          </a:prstGeom>
-        </p:spPr>
-      </p:pic>
-      <p:pic>
-        <p:nvPicPr>
-          <p:cNvPr id="25" name="Gráfico 7">
-            <a:extLst>
-              <a:ext uri="{FF2B5EF4-FFF2-40B4-BE49-F238E27FC236}">
-                <a16:creationId xmlns:a16="http://schemas.microsoft.com/office/drawing/2014/main" id="{FA5B2B38-0CD9-49CE-84E0-8222CCB181F0}"/>
-              </a:ext>
-            </a:extLst>
-          </p:cNvPr>
-          <p:cNvPicPr/>
-          <p:nvPr/>
-        </p:nvPicPr>
-        <p:blipFill>
-          <a:blip r:embed="rId7" cstate="print">
-            <a:extLst>
-              <a:ext uri="{28A0092B-C50C-407E-A947-70E740481C1C}">
-                <a14:useLocalDpi xmlns:a14="http://schemas.microsoft.com/office/drawing/2010/main" val="0"/>
-              </a:ext>
-              <a:ext uri="{96DAC541-7B7A-43D3-8B79-37D633B846F1}">
-                <asvg:svgBlip xmlns:asvg="http://schemas.microsoft.com/office/drawing/2016/SVG/main" r:embed="rId8"/>
-              </a:ext>
-            </a:extLst>
-          </a:blip>
-          <a:stretch>
-            <a:fillRect/>
-          </a:stretch>
-        </p:blipFill>
-        <p:spPr>
-          <a:xfrm>
-            <a:off x="4369712" y="2612266"/>
-            <a:ext cx="380365" cy="380365"/>
-          </a:xfrm>
-          <a:prstGeom prst="rect">
-            <a:avLst/>
-          </a:prstGeom>
-        </p:spPr>
-      </p:pic>
-      <p:sp>
-        <p:nvSpPr>
-          <p:cNvPr id="26" name="Retângulo: Cantos Arredondados 25">
-            <a:extLst>
-              <a:ext uri="{FF2B5EF4-FFF2-40B4-BE49-F238E27FC236}">
-                <a16:creationId xmlns:a16="http://schemas.microsoft.com/office/drawing/2014/main" id="{26509C0C-F813-42ED-B78D-8E9BD409F8AC}"/>
-              </a:ext>
-            </a:extLst>
-          </p:cNvPr>
-          <p:cNvSpPr/>
-          <p:nvPr/>
-        </p:nvSpPr>
-        <p:spPr>
-          <a:xfrm>
-            <a:off x="2982902" y="2973013"/>
-            <a:ext cx="2076716" cy="1324924"/>
-          </a:xfrm>
-          <a:prstGeom prst="roundRect">
             <a:avLst/>
           </a:prstGeom>
           <a:noFill/>
@@ -4259,6 +4653,74 @@
           </a:fontRef>
         </p:style>
         <p:txBody>
+          <a:bodyPr rot="0" vert="horz" wrap="square" lIns="91440" tIns="45720" rIns="91440" bIns="45720" anchor="t" anchorCtr="0">
+            <a:noAutofit/>
+          </a:bodyPr>
+          <a:lstStyle/>
+          <a:p>
+            <a:pPr algn="ctr">
+              <a:lnSpc>
+                <a:spcPct val="107000"/>
+              </a:lnSpc>
+              <a:spcAft>
+                <a:spcPts val="800"/>
+              </a:spcAft>
+            </a:pPr>
+            <a:r>
+              <a:rPr lang="pt-BR" sz="1100" dirty="0">
+                <a:ea typeface="Calibri" panose="020F0502020204030204" pitchFamily="34" charset="0"/>
+                <a:cs typeface="Times New Roman" panose="02020603050405020304" pitchFamily="18" charset="0"/>
+              </a:rPr>
+              <a:t>Oficina</a:t>
+            </a:r>
+            <a:endParaRPr lang="pt-BR" sz="1100" dirty="0">
+              <a:effectLst/>
+              <a:ea typeface="Calibri" panose="020F0502020204030204" pitchFamily="34" charset="0"/>
+              <a:cs typeface="Times New Roman" panose="02020603050405020304" pitchFamily="18" charset="0"/>
+            </a:endParaRPr>
+          </a:p>
+        </p:txBody>
+      </p:sp>
+      <p:sp>
+        <p:nvSpPr>
+          <p:cNvPr id="32" name="Seta: da Esquerda para a Direita 31">
+            <a:extLst>
+              <a:ext uri="{FF2B5EF4-FFF2-40B4-BE49-F238E27FC236}">
+                <a16:creationId xmlns:a16="http://schemas.microsoft.com/office/drawing/2014/main" id="{0C843C79-9B40-4288-A28A-E76F517832E8}"/>
+              </a:ext>
+            </a:extLst>
+          </p:cNvPr>
+          <p:cNvSpPr/>
+          <p:nvPr/>
+        </p:nvSpPr>
+        <p:spPr>
+          <a:xfrm rot="5400000">
+            <a:off x="4721115" y="5279578"/>
+            <a:ext cx="319155" cy="183514"/>
+          </a:xfrm>
+          <a:prstGeom prst="leftRightArrow">
+            <a:avLst/>
+          </a:prstGeom>
+          <a:ln>
+            <a:headEnd type="none" w="med" len="med"/>
+            <a:tailEnd type="none" w="med" len="med"/>
+          </a:ln>
+        </p:spPr>
+        <p:style>
+          <a:lnRef idx="3">
+            <a:schemeClr val="lt1"/>
+          </a:lnRef>
+          <a:fillRef idx="1">
+            <a:schemeClr val="accent5"/>
+          </a:fillRef>
+          <a:effectRef idx="1">
+            <a:schemeClr val="accent5"/>
+          </a:effectRef>
+          <a:fontRef idx="minor">
+            <a:schemeClr val="lt1"/>
+          </a:fontRef>
+        </p:style>
+        <p:txBody>
           <a:bodyPr rot="0" spcFirstLastPara="0" vert="horz" wrap="square" lIns="91440" tIns="45720" rIns="91440" bIns="45720" numCol="1" spcCol="0" rtlCol="0" fromWordArt="0" anchor="ctr" anchorCtr="0" forceAA="0" compatLnSpc="1">
             <a:prstTxWarp prst="textNoShape">
               <a:avLst/>
@@ -4273,10 +4735,10 @@
       </p:sp>
       <p:pic>
         <p:nvPicPr>
-          <p:cNvPr id="27" name="Imagem 26" descr="Forma&#10;&#10;Descrição gerada automaticamente com confiança baixa">
-            <a:extLst>
-              <a:ext uri="{FF2B5EF4-FFF2-40B4-BE49-F238E27FC236}">
-                <a16:creationId xmlns:a16="http://schemas.microsoft.com/office/drawing/2014/main" id="{BFA5B051-79A7-4DB3-9302-4AFC370AB37F}"/>
+          <p:cNvPr id="35" name="Imagem 34">
+            <a:extLst>
+              <a:ext uri="{FF2B5EF4-FFF2-40B4-BE49-F238E27FC236}">
+                <a16:creationId xmlns:a16="http://schemas.microsoft.com/office/drawing/2014/main" id="{B1606E5B-230F-4C64-AE2E-8E97E5EC9FA4}"/>
               </a:ext>
             </a:extLst>
           </p:cNvPr>
@@ -4284,107 +4746,38 @@
           <p:nvPr/>
         </p:nvPicPr>
         <p:blipFill>
-          <a:blip r:embed="rId17" cstate="print">
+          <a:blip r:embed="rId14" cstate="print">
             <a:extLst>
               <a:ext uri="{28A0092B-C50C-407E-A947-70E740481C1C}">
                 <a14:useLocalDpi xmlns:a14="http://schemas.microsoft.com/office/drawing/2010/main" val="0"/>
               </a:ext>
             </a:extLst>
           </a:blip>
+          <a:srcRect/>
           <a:stretch>
             <a:fillRect/>
           </a:stretch>
         </p:blipFill>
-        <p:spPr>
-          <a:xfrm>
-            <a:off x="4408185" y="3154317"/>
-            <a:ext cx="381000" cy="381000"/>
+        <p:spPr bwMode="auto">
+          <a:xfrm>
+            <a:off x="8362706" y="4337542"/>
+            <a:ext cx="550545" cy="550545"/>
           </a:xfrm>
           <a:prstGeom prst="rect">
             <a:avLst/>
           </a:prstGeom>
+          <a:noFill/>
+          <a:ln>
+            <a:noFill/>
+          </a:ln>
         </p:spPr>
       </p:pic>
-      <p:pic>
-        <p:nvPicPr>
-          <p:cNvPr id="28" name="Gráfico 37">
-            <a:extLst>
-              <a:ext uri="{FF2B5EF4-FFF2-40B4-BE49-F238E27FC236}">
-                <a16:creationId xmlns:a16="http://schemas.microsoft.com/office/drawing/2014/main" id="{2136C48C-0928-4B8C-AF47-76AF8957BAAC}"/>
-              </a:ext>
-            </a:extLst>
-          </p:cNvPr>
-          <p:cNvPicPr/>
-          <p:nvPr/>
-        </p:nvPicPr>
-        <p:blipFill>
-          <a:blip r:embed="rId18" cstate="print">
-            <a:extLst>
-              <a:ext uri="{28A0092B-C50C-407E-A947-70E740481C1C}">
-                <a14:useLocalDpi xmlns:a14="http://schemas.microsoft.com/office/drawing/2010/main" val="0"/>
-              </a:ext>
-              <a:ext uri="{96DAC541-7B7A-43D3-8B79-37D633B846F1}">
-                <asvg:svgBlip xmlns:asvg="http://schemas.microsoft.com/office/drawing/2016/SVG/main" r:embed="rId19"/>
-              </a:ext>
-            </a:extLst>
-          </a:blip>
-          <a:stretch>
-            <a:fillRect/>
-          </a:stretch>
-        </p:blipFill>
-        <p:spPr>
-          <a:xfrm>
-            <a:off x="3072050" y="3033150"/>
-            <a:ext cx="529590" cy="529590"/>
-          </a:xfrm>
-          <a:prstGeom prst="rect">
-            <a:avLst/>
-          </a:prstGeom>
-        </p:spPr>
-      </p:pic>
-      <p:pic>
-        <p:nvPicPr>
-          <p:cNvPr id="29" name="Gráfico 47">
-            <a:extLst>
-              <a:ext uri="{FF2B5EF4-FFF2-40B4-BE49-F238E27FC236}">
-                <a16:creationId xmlns:a16="http://schemas.microsoft.com/office/drawing/2014/main" id="{008590B2-6EF8-49F3-8182-6045AE304616}"/>
-              </a:ext>
-            </a:extLst>
-          </p:cNvPr>
-          <p:cNvPicPr/>
-          <p:nvPr/>
-        </p:nvPicPr>
-        <p:blipFill>
-          <a:blip r:embed="rId15" cstate="print">
-            <a:extLst>
-              <a:ext uri="{28A0092B-C50C-407E-A947-70E740481C1C}">
-                <a14:useLocalDpi xmlns:a14="http://schemas.microsoft.com/office/drawing/2010/main" val="0"/>
-              </a:ext>
-              <a:ext uri="{96DAC541-7B7A-43D3-8B79-37D633B846F1}">
-                <asvg:svgBlip xmlns:asvg="http://schemas.microsoft.com/office/drawing/2016/SVG/main" r:embed="rId16"/>
-              </a:ext>
-            </a:extLst>
-          </a:blip>
-          <a:stretch>
-            <a:fillRect/>
-          </a:stretch>
-        </p:blipFill>
-        <p:spPr>
-          <a:xfrm rot="2566580">
-            <a:off x="3644928" y="2852787"/>
-            <a:ext cx="209550" cy="209550"/>
-          </a:xfrm>
-          <a:prstGeom prst="rect">
-            <a:avLst/>
-          </a:prstGeom>
-        </p:spPr>
-      </p:pic>
-      <p:sp>
-        <p:nvSpPr>
-          <p:cNvPr id="30" name="Caixa de Texto 2">
-            <a:extLst>
-              <a:ext uri="{FF2B5EF4-FFF2-40B4-BE49-F238E27FC236}">
-                <a16:creationId xmlns:a16="http://schemas.microsoft.com/office/drawing/2014/main" id="{F319D67E-56C7-4085-9F31-0A49FF8D9287}"/>
+      <p:sp>
+        <p:nvSpPr>
+          <p:cNvPr id="36" name="Caixa de Texto 2">
+            <a:extLst>
+              <a:ext uri="{FF2B5EF4-FFF2-40B4-BE49-F238E27FC236}">
+                <a16:creationId xmlns:a16="http://schemas.microsoft.com/office/drawing/2014/main" id="{BA7F02F8-C3FD-4391-9FAF-3FDF5DB4C833}"/>
               </a:ext>
             </a:extLst>
           </p:cNvPr>
@@ -4395,8 +4788,8 @@
         </p:nvSpPr>
         <p:spPr bwMode="auto">
           <a:xfrm>
-            <a:off x="2905016" y="3612144"/>
-            <a:ext cx="2209800" cy="495300"/>
+            <a:off x="8125782" y="4956758"/>
+            <a:ext cx="1024392" cy="300476"/>
           </a:xfrm>
           <a:prstGeom prst="rect">
             <a:avLst/>
@@ -4440,17 +4833,56 @@
                 <a:ea typeface="Calibri" panose="020F0502020204030204" pitchFamily="34" charset="0"/>
                 <a:cs typeface="Times New Roman" panose="02020603050405020304" pitchFamily="18" charset="0"/>
               </a:rPr>
-              <a:t>Funcionários responsáveis pela manutenção do site</a:t>
-            </a:r>
-          </a:p>
-        </p:txBody>
-      </p:sp>
-      <p:sp>
-        <p:nvSpPr>
-          <p:cNvPr id="32" name="Seta: para a Esquerda e para Cima 31">
-            <a:extLst>
-              <a:ext uri="{FF2B5EF4-FFF2-40B4-BE49-F238E27FC236}">
-                <a16:creationId xmlns:a16="http://schemas.microsoft.com/office/drawing/2014/main" id="{5496BD22-2B19-46CB-B3D7-8289805B0B93}"/>
+              <a:t>Reunião</a:t>
+            </a:r>
+          </a:p>
+        </p:txBody>
+      </p:sp>
+      <p:pic>
+        <p:nvPicPr>
+          <p:cNvPr id="37" name="Imagem 36">
+            <a:extLst>
+              <a:ext uri="{FF2B5EF4-FFF2-40B4-BE49-F238E27FC236}">
+                <a16:creationId xmlns:a16="http://schemas.microsoft.com/office/drawing/2014/main" id="{E5CD264E-D41F-499E-A5AB-FC1E660EEF3E}"/>
+              </a:ext>
+            </a:extLst>
+          </p:cNvPr>
+          <p:cNvPicPr/>
+          <p:nvPr/>
+        </p:nvPicPr>
+        <p:blipFill>
+          <a:blip r:embed="rId10" cstate="print">
+            <a:extLst>
+              <a:ext uri="{28A0092B-C50C-407E-A947-70E740481C1C}">
+                <a14:useLocalDpi xmlns:a14="http://schemas.microsoft.com/office/drawing/2010/main" val="0"/>
+              </a:ext>
+            </a:extLst>
+          </a:blip>
+          <a:srcRect/>
+          <a:stretch>
+            <a:fillRect/>
+          </a:stretch>
+        </p:blipFill>
+        <p:spPr bwMode="auto">
+          <a:xfrm>
+            <a:off x="7066145" y="4323158"/>
+            <a:ext cx="425334" cy="383224"/>
+          </a:xfrm>
+          <a:prstGeom prst="rect">
+            <a:avLst/>
+          </a:prstGeom>
+          <a:noFill/>
+          <a:ln>
+            <a:noFill/>
+          </a:ln>
+        </p:spPr>
+      </p:pic>
+      <p:sp>
+        <p:nvSpPr>
+          <p:cNvPr id="38" name="Seta: da Esquerda para a Direita 37">
+            <a:extLst>
+              <a:ext uri="{FF2B5EF4-FFF2-40B4-BE49-F238E27FC236}">
+                <a16:creationId xmlns:a16="http://schemas.microsoft.com/office/drawing/2014/main" id="{9974E987-BB49-4A0A-A6C5-B1F45CB4F314}"/>
               </a:ext>
             </a:extLst>
           </p:cNvPr>
@@ -4458,16 +4890,12 @@
           <p:nvPr/>
         </p:nvSpPr>
         <p:spPr>
-          <a:xfrm rot="16200000" flipH="1" flipV="1">
-            <a:off x="3642794" y="2227339"/>
-            <a:ext cx="1058771" cy="333639"/>
-          </a:xfrm>
-          <a:prstGeom prst="leftUpArrow">
-            <a:avLst>
-              <a:gd name="adj1" fmla="val 19634"/>
-              <a:gd name="adj2" fmla="val 22317"/>
-              <a:gd name="adj3" fmla="val 25000"/>
-            </a:avLst>
+          <a:xfrm rot="10800000">
+            <a:off x="6682191" y="4619431"/>
+            <a:ext cx="1548730" cy="126236"/>
+          </a:xfrm>
+          <a:prstGeom prst="leftRightArrow">
+            <a:avLst/>
           </a:prstGeom>
           <a:ln>
             <a:headEnd type="none" w="med" len="med"/>
@@ -4497,16 +4925,16 @@
           </a:bodyPr>
           <a:lstStyle/>
           <a:p>
-            <a:endParaRPr lang="pt-BR"/>
+            <a:endParaRPr lang="pt-BR" dirty="0"/>
           </a:p>
         </p:txBody>
       </p:sp>
       <p:pic>
         <p:nvPicPr>
-          <p:cNvPr id="34" name="Imagem 33" descr="Forma&#10;&#10;Descrição gerada automaticamente com confiança baixa">
-            <a:extLst>
-              <a:ext uri="{FF2B5EF4-FFF2-40B4-BE49-F238E27FC236}">
-                <a16:creationId xmlns:a16="http://schemas.microsoft.com/office/drawing/2014/main" id="{88524CEA-6175-4B76-97DF-9410EE8F7470}"/>
+          <p:cNvPr id="39" name="Imagem 38" descr="Forma&#10;&#10;Descrição gerada automaticamente com confiança baixa">
+            <a:extLst>
+              <a:ext uri="{FF2B5EF4-FFF2-40B4-BE49-F238E27FC236}">
+                <a16:creationId xmlns:a16="http://schemas.microsoft.com/office/drawing/2014/main" id="{216CF561-67CA-4D0C-AA69-872887706AFE}"/>
               </a:ext>
             </a:extLst>
           </p:cNvPr>
@@ -4514,7 +4942,7 @@
           <p:nvPr/>
         </p:nvPicPr>
         <p:blipFill>
-          <a:blip r:embed="rId20" cstate="print">
+          <a:blip r:embed="rId15" cstate="print">
             <a:extLst>
               <a:ext uri="{28A0092B-C50C-407E-A947-70E740481C1C}">
                 <a14:useLocalDpi xmlns:a14="http://schemas.microsoft.com/office/drawing/2010/main" val="0"/>
@@ -4527,7 +4955,7 @@
         </p:blipFill>
         <p:spPr>
           <a:xfrm rot="20529588">
-            <a:off x="5587256" y="4447619"/>
+            <a:off x="5709516" y="4337568"/>
             <a:ext cx="519430" cy="519430"/>
           </a:xfrm>
           <a:prstGeom prst="rect">
@@ -4535,12 +4963,68 @@
           </a:prstGeom>
         </p:spPr>
       </p:pic>
+      <p:sp>
+        <p:nvSpPr>
+          <p:cNvPr id="40" name="Seta: para a Esquerda e para Cima 39">
+            <a:extLst>
+              <a:ext uri="{FF2B5EF4-FFF2-40B4-BE49-F238E27FC236}">
+                <a16:creationId xmlns:a16="http://schemas.microsoft.com/office/drawing/2014/main" id="{9131FB6F-EDC4-4F7A-9C80-F83EF1FECF40}"/>
+              </a:ext>
+            </a:extLst>
+          </p:cNvPr>
+          <p:cNvSpPr/>
+          <p:nvPr/>
+        </p:nvSpPr>
+        <p:spPr>
+          <a:xfrm rot="10800000">
+            <a:off x="5872214" y="3404900"/>
+            <a:ext cx="2339297" cy="872014"/>
+          </a:xfrm>
+          <a:prstGeom prst="leftUpArrow">
+            <a:avLst>
+              <a:gd name="adj1" fmla="val 9043"/>
+              <a:gd name="adj2" fmla="val 8403"/>
+              <a:gd name="adj3" fmla="val 8501"/>
+            </a:avLst>
+          </a:prstGeom>
+          <a:ln>
+            <a:headEnd type="none" w="med" len="med"/>
+            <a:tailEnd type="none" w="med" len="med"/>
+          </a:ln>
+        </p:spPr>
+        <p:style>
+          <a:lnRef idx="3">
+            <a:schemeClr val="lt1"/>
+          </a:lnRef>
+          <a:fillRef idx="1">
+            <a:schemeClr val="accent5"/>
+          </a:fillRef>
+          <a:effectRef idx="1">
+            <a:schemeClr val="accent5"/>
+          </a:effectRef>
+          <a:fontRef idx="minor">
+            <a:schemeClr val="lt1"/>
+          </a:fontRef>
+        </p:style>
+        <p:txBody>
+          <a:bodyPr rot="0" spcFirstLastPara="0" vert="horz" wrap="square" lIns="91440" tIns="45720" rIns="91440" bIns="45720" numCol="1" spcCol="0" rtlCol="0" fromWordArt="0" anchor="ctr" anchorCtr="0" forceAA="0" compatLnSpc="1">
+            <a:prstTxWarp prst="textNoShape">
+              <a:avLst/>
+            </a:prstTxWarp>
+            <a:noAutofit/>
+          </a:bodyPr>
+          <a:lstStyle/>
+          <a:p>
+            <a:endParaRPr lang="pt-BR" dirty="0"/>
+          </a:p>
+        </p:txBody>
+      </p:sp>
       <p:pic>
         <p:nvPicPr>
-          <p:cNvPr id="35" name="Imagem 34">
-            <a:extLst>
-              <a:ext uri="{FF2B5EF4-FFF2-40B4-BE49-F238E27FC236}">
-                <a16:creationId xmlns:a16="http://schemas.microsoft.com/office/drawing/2014/main" id="{082C0DB5-A7DF-4197-A76B-6BB799A05499}"/>
+          <p:cNvPr id="41" name="Imagem 40" descr="Forma&#10;&#10;Descrição gerada automaticamente com confiança baixa">
+            <a:extLst>
+              <a:ext uri="{FF2B5EF4-FFF2-40B4-BE49-F238E27FC236}">
+                <a16:creationId xmlns:a16="http://schemas.microsoft.com/office/drawing/2014/main" id="{C4D2E333-4C73-46E1-A60E-3AF9BDF5C1C1}"/>
               </a:ext>
             </a:extLst>
           </p:cNvPr>
@@ -4548,38 +5032,33 @@
           <p:nvPr/>
         </p:nvPicPr>
         <p:blipFill>
-          <a:blip r:embed="rId21" cstate="print">
+          <a:blip r:embed="rId16" cstate="print">
             <a:extLst>
               <a:ext uri="{28A0092B-C50C-407E-A947-70E740481C1C}">
                 <a14:useLocalDpi xmlns:a14="http://schemas.microsoft.com/office/drawing/2010/main" val="0"/>
               </a:ext>
             </a:extLst>
           </a:blip>
-          <a:srcRect/>
           <a:stretch>
             <a:fillRect/>
           </a:stretch>
         </p:blipFill>
-        <p:spPr bwMode="auto">
-          <a:xfrm>
-            <a:off x="4827318" y="4474466"/>
-            <a:ext cx="514985" cy="514985"/>
+        <p:spPr>
+          <a:xfrm>
+            <a:off x="10608223" y="2490044"/>
+            <a:ext cx="508635" cy="508635"/>
           </a:xfrm>
           <a:prstGeom prst="rect">
             <a:avLst/>
           </a:prstGeom>
-          <a:noFill/>
-          <a:ln>
-            <a:noFill/>
-          </a:ln>
         </p:spPr>
       </p:pic>
       <p:sp>
         <p:nvSpPr>
-          <p:cNvPr id="36" name="Caixa de Texto 2">
-            <a:extLst>
-              <a:ext uri="{FF2B5EF4-FFF2-40B4-BE49-F238E27FC236}">
-                <a16:creationId xmlns:a16="http://schemas.microsoft.com/office/drawing/2014/main" id="{774367AE-5669-406F-8CA4-1568A3B38FDB}"/>
+          <p:cNvPr id="42" name="Caixa de Texto 2">
+            <a:extLst>
+              <a:ext uri="{FF2B5EF4-FFF2-40B4-BE49-F238E27FC236}">
+                <a16:creationId xmlns:a16="http://schemas.microsoft.com/office/drawing/2014/main" id="{135E70C3-F1C4-48D6-BE46-A4165A8FE8DC}"/>
               </a:ext>
             </a:extLst>
           </p:cNvPr>
@@ -4590,8 +5069,8 @@
         </p:nvSpPr>
         <p:spPr bwMode="auto">
           <a:xfrm>
-            <a:off x="4372429" y="4978151"/>
-            <a:ext cx="2209800" cy="495300"/>
+            <a:off x="10165558" y="3063431"/>
+            <a:ext cx="1359853" cy="382270"/>
           </a:xfrm>
           <a:prstGeom prst="rect">
             <a:avLst/>
@@ -4635,17 +5114,53 @@
                 <a:ea typeface="Calibri" panose="020F0502020204030204" pitchFamily="34" charset="0"/>
                 <a:cs typeface="Times New Roman" panose="02020603050405020304" pitchFamily="18" charset="0"/>
               </a:rPr>
-              <a:t>Usuário entra em contato com equipe de modificação</a:t>
-            </a:r>
-          </a:p>
-        </p:txBody>
-      </p:sp>
-      <p:sp>
-        <p:nvSpPr>
-          <p:cNvPr id="37" name="Seta: para a Esquerda e para Cima 36">
-            <a:extLst>
-              <a:ext uri="{FF2B5EF4-FFF2-40B4-BE49-F238E27FC236}">
-                <a16:creationId xmlns:a16="http://schemas.microsoft.com/office/drawing/2014/main" id="{655B7F3F-C2DD-43FA-B0F1-E745E3FF16EE}"/>
+              <a:t>Cliente satisfeito</a:t>
+            </a:r>
+          </a:p>
+        </p:txBody>
+      </p:sp>
+      <p:pic>
+        <p:nvPicPr>
+          <p:cNvPr id="43" name="Imagem 42" descr="Desenho de animal com fundo preto&#10;&#10;Descrição gerada automaticamente com confiança média">
+            <a:extLst>
+              <a:ext uri="{FF2B5EF4-FFF2-40B4-BE49-F238E27FC236}">
+                <a16:creationId xmlns:a16="http://schemas.microsoft.com/office/drawing/2014/main" id="{35167923-312B-466B-AF2B-111979BE5316}"/>
+              </a:ext>
+            </a:extLst>
+          </p:cNvPr>
+          <p:cNvPicPr>
+            <a:picLocks noChangeAspect="1"/>
+          </p:cNvPicPr>
+          <p:nvPr/>
+        </p:nvPicPr>
+        <p:blipFill>
+          <a:blip r:embed="rId17">
+            <a:extLst>
+              <a:ext uri="{28A0092B-C50C-407E-A947-70E740481C1C}">
+                <a14:useLocalDpi xmlns:a14="http://schemas.microsoft.com/office/drawing/2010/main" val="0"/>
+              </a:ext>
+            </a:extLst>
+          </a:blip>
+          <a:stretch>
+            <a:fillRect/>
+          </a:stretch>
+        </p:blipFill>
+        <p:spPr>
+          <a:xfrm>
+            <a:off x="8327609" y="3031441"/>
+            <a:ext cx="1520017" cy="658874"/>
+          </a:xfrm>
+          <a:prstGeom prst="rect">
+            <a:avLst/>
+          </a:prstGeom>
+        </p:spPr>
+      </p:pic>
+      <p:sp>
+        <p:nvSpPr>
+          <p:cNvPr id="44" name="Seta: para a Esquerda e para Cima 43">
+            <a:extLst>
+              <a:ext uri="{FF2B5EF4-FFF2-40B4-BE49-F238E27FC236}">
+                <a16:creationId xmlns:a16="http://schemas.microsoft.com/office/drawing/2014/main" id="{FDCA2AAE-4A77-47B0-A865-A6975E8ED189}"/>
               </a:ext>
             </a:extLst>
           </p:cNvPr>
@@ -4653,15 +5168,15 @@
           <p:nvPr/>
         </p:nvSpPr>
         <p:spPr>
-          <a:xfrm rot="10800000" flipV="1">
-            <a:off x="1055265" y="4428531"/>
-            <a:ext cx="3437985" cy="753204"/>
+          <a:xfrm flipH="1" flipV="1">
+            <a:off x="8921759" y="2704848"/>
+            <a:ext cx="1580946" cy="333639"/>
           </a:xfrm>
           <a:prstGeom prst="leftUpArrow">
             <a:avLst>
-              <a:gd name="adj1" fmla="val 10517"/>
-              <a:gd name="adj2" fmla="val 9798"/>
-              <a:gd name="adj3" fmla="val 11842"/>
+              <a:gd name="adj1" fmla="val 19634"/>
+              <a:gd name="adj2" fmla="val 22317"/>
+              <a:gd name="adj3" fmla="val 25000"/>
             </a:avLst>
           </a:prstGeom>
           <a:ln>
@@ -4692,16 +5207,16 @@
           </a:bodyPr>
           <a:lstStyle/>
           <a:p>
-            <a:endParaRPr lang="pt-BR" dirty="0"/>
+            <a:endParaRPr lang="pt-BR"/>
           </a:p>
         </p:txBody>
       </p:sp>
       <p:pic>
         <p:nvPicPr>
-          <p:cNvPr id="38" name="Gráfico 46">
-            <a:extLst>
-              <a:ext uri="{FF2B5EF4-FFF2-40B4-BE49-F238E27FC236}">
-                <a16:creationId xmlns:a16="http://schemas.microsoft.com/office/drawing/2014/main" id="{6D90F829-ED32-44E2-A1B5-E5C2E257F4E4}"/>
+          <p:cNvPr id="45" name="Gráfico 3">
+            <a:extLst>
+              <a:ext uri="{FF2B5EF4-FFF2-40B4-BE49-F238E27FC236}">
+                <a16:creationId xmlns:a16="http://schemas.microsoft.com/office/drawing/2014/main" id="{228E2923-B863-46AB-970F-186AEBDC7C49}"/>
               </a:ext>
             </a:extLst>
           </p:cNvPr>
@@ -4709,13 +5224,13 @@
           <p:nvPr/>
         </p:nvPicPr>
         <p:blipFill>
-          <a:blip r:embed="rId5" cstate="print">
+          <a:blip r:embed="rId18" cstate="print">
             <a:extLst>
               <a:ext uri="{28A0092B-C50C-407E-A947-70E740481C1C}">
                 <a14:useLocalDpi xmlns:a14="http://schemas.microsoft.com/office/drawing/2010/main" val="0"/>
               </a:ext>
               <a:ext uri="{96DAC541-7B7A-43D3-8B79-37D633B846F1}">
-                <asvg:svgBlip xmlns:asvg="http://schemas.microsoft.com/office/drawing/2016/SVG/main" r:embed="rId6"/>
+                <asvg:svgBlip xmlns:asvg="http://schemas.microsoft.com/office/drawing/2016/SVG/main" r:embed="rId19"/>
               </a:ext>
             </a:extLst>
           </a:blip>
@@ -4725,115 +5240,20 @@
         </p:blipFill>
         <p:spPr>
           <a:xfrm>
-            <a:off x="775891" y="5207748"/>
-            <a:ext cx="396129" cy="371405"/>
+            <a:off x="1278713" y="485864"/>
+            <a:ext cx="380365" cy="380366"/>
           </a:xfrm>
           <a:prstGeom prst="rect">
             <a:avLst/>
           </a:prstGeom>
-        </p:spPr>
-      </p:pic>
-      <p:sp>
-        <p:nvSpPr>
-          <p:cNvPr id="39" name="Seta: para a Esquerda e para Cima 38">
-            <a:extLst>
-              <a:ext uri="{FF2B5EF4-FFF2-40B4-BE49-F238E27FC236}">
-                <a16:creationId xmlns:a16="http://schemas.microsoft.com/office/drawing/2014/main" id="{D130859D-B541-43FC-94EB-E56B6379F44B}"/>
-              </a:ext>
-            </a:extLst>
-          </p:cNvPr>
-          <p:cNvSpPr/>
-          <p:nvPr/>
-        </p:nvSpPr>
-        <p:spPr>
-          <a:xfrm rot="10800000">
-            <a:off x="5710381" y="3494516"/>
-            <a:ext cx="2339297" cy="872014"/>
-          </a:xfrm>
-          <a:prstGeom prst="leftUpArrow">
-            <a:avLst>
-              <a:gd name="adj1" fmla="val 9043"/>
-              <a:gd name="adj2" fmla="val 8403"/>
-              <a:gd name="adj3" fmla="val 8501"/>
-            </a:avLst>
-          </a:prstGeom>
-          <a:ln>
-            <a:headEnd type="none" w="med" len="med"/>
-            <a:tailEnd type="none" w="med" len="med"/>
-          </a:ln>
-        </p:spPr>
-        <p:style>
-          <a:lnRef idx="3">
-            <a:schemeClr val="lt1"/>
-          </a:lnRef>
-          <a:fillRef idx="1">
-            <a:schemeClr val="accent5"/>
-          </a:fillRef>
-          <a:effectRef idx="1">
-            <a:schemeClr val="accent5"/>
-          </a:effectRef>
-          <a:fontRef idx="minor">
-            <a:schemeClr val="lt1"/>
-          </a:fontRef>
-        </p:style>
-        <p:txBody>
-          <a:bodyPr rot="0" spcFirstLastPara="0" vert="horz" wrap="square" lIns="91440" tIns="45720" rIns="91440" bIns="45720" numCol="1" spcCol="0" rtlCol="0" fromWordArt="0" anchor="ctr" anchorCtr="0" forceAA="0" compatLnSpc="1">
-            <a:prstTxWarp prst="textNoShape">
-              <a:avLst/>
-            </a:prstTxWarp>
-            <a:noAutofit/>
-          </a:bodyPr>
-          <a:lstStyle/>
-          <a:p>
-            <a:endParaRPr lang="pt-BR" dirty="0"/>
-          </a:p>
-        </p:txBody>
-      </p:sp>
-      <p:pic>
-        <p:nvPicPr>
-          <p:cNvPr id="42" name="Imagem 41">
-            <a:extLst>
-              <a:ext uri="{FF2B5EF4-FFF2-40B4-BE49-F238E27FC236}">
-                <a16:creationId xmlns:a16="http://schemas.microsoft.com/office/drawing/2014/main" id="{2694F079-673D-4DD2-B88B-701F413495CC}"/>
-              </a:ext>
-            </a:extLst>
-          </p:cNvPr>
-          <p:cNvPicPr/>
-          <p:nvPr/>
-        </p:nvPicPr>
-        <p:blipFill>
-          <a:blip r:embed="rId22" cstate="print">
-            <a:extLst>
-              <a:ext uri="{28A0092B-C50C-407E-A947-70E740481C1C}">
-                <a14:useLocalDpi xmlns:a14="http://schemas.microsoft.com/office/drawing/2010/main" val="0"/>
-              </a:ext>
-            </a:extLst>
-          </a:blip>
-          <a:srcRect/>
-          <a:stretch>
-            <a:fillRect/>
-          </a:stretch>
-        </p:blipFill>
-        <p:spPr bwMode="auto">
-          <a:xfrm>
-            <a:off x="9007087" y="4742740"/>
-            <a:ext cx="550545" cy="550546"/>
-          </a:xfrm>
-          <a:prstGeom prst="rect">
-            <a:avLst/>
-          </a:prstGeom>
-          <a:noFill/>
-          <a:ln>
-            <a:noFill/>
-          </a:ln>
         </p:spPr>
       </p:pic>
       <p:pic>
         <p:nvPicPr>
-          <p:cNvPr id="43" name="Imagem 42">
-            <a:extLst>
-              <a:ext uri="{FF2B5EF4-FFF2-40B4-BE49-F238E27FC236}">
-                <a16:creationId xmlns:a16="http://schemas.microsoft.com/office/drawing/2014/main" id="{EA433D55-F576-4799-B237-66C620CDC551}"/>
+          <p:cNvPr id="46" name="Gráfico 3">
+            <a:extLst>
+              <a:ext uri="{FF2B5EF4-FFF2-40B4-BE49-F238E27FC236}">
+                <a16:creationId xmlns:a16="http://schemas.microsoft.com/office/drawing/2014/main" id="{191DDACC-BD53-4928-81B8-08D0061D52EA}"/>
               </a:ext>
             </a:extLst>
           </p:cNvPr>
@@ -4841,364 +5261,13 @@
           <p:nvPr/>
         </p:nvPicPr>
         <p:blipFill>
-          <a:blip r:embed="rId23" cstate="print">
+          <a:blip r:embed="rId18" cstate="print">
             <a:extLst>
               <a:ext uri="{28A0092B-C50C-407E-A947-70E740481C1C}">
                 <a14:useLocalDpi xmlns:a14="http://schemas.microsoft.com/office/drawing/2010/main" val="0"/>
               </a:ext>
-            </a:extLst>
-          </a:blip>
-          <a:srcRect/>
-          <a:stretch>
-            <a:fillRect/>
-          </a:stretch>
-        </p:blipFill>
-        <p:spPr bwMode="auto">
-          <a:xfrm>
-            <a:off x="8139428" y="4756825"/>
-            <a:ext cx="550545" cy="550545"/>
-          </a:xfrm>
-          <a:prstGeom prst="rect">
-            <a:avLst/>
-          </a:prstGeom>
-          <a:noFill/>
-          <a:ln>
-            <a:noFill/>
-          </a:ln>
-        </p:spPr>
-      </p:pic>
-      <p:sp>
-        <p:nvSpPr>
-          <p:cNvPr id="44" name="Caixa de Texto 2">
-            <a:extLst>
-              <a:ext uri="{FF2B5EF4-FFF2-40B4-BE49-F238E27FC236}">
-                <a16:creationId xmlns:a16="http://schemas.microsoft.com/office/drawing/2014/main" id="{5D84FF84-1521-40BB-9439-EA49F642FDA8}"/>
-              </a:ext>
-            </a:extLst>
-          </p:cNvPr>
-          <p:cNvSpPr txBox="1">
-            <a:spLocks noChangeArrowheads="1"/>
-          </p:cNvSpPr>
-          <p:nvPr/>
-        </p:nvSpPr>
-        <p:spPr bwMode="auto">
-          <a:xfrm>
-            <a:off x="7796274" y="5349411"/>
-            <a:ext cx="2103120" cy="509905"/>
-          </a:xfrm>
-          <a:prstGeom prst="rect">
-            <a:avLst/>
-          </a:prstGeom>
-          <a:noFill/>
-          <a:ln>
-            <a:noFill/>
-          </a:ln>
-        </p:spPr>
-        <p:style>
-          <a:lnRef idx="0">
-            <a:scrgbClr r="0" g="0" b="0"/>
-          </a:lnRef>
-          <a:fillRef idx="0">
-            <a:scrgbClr r="0" g="0" b="0"/>
-          </a:fillRef>
-          <a:effectRef idx="0">
-            <a:scrgbClr r="0" g="0" b="0"/>
-          </a:effectRef>
-          <a:fontRef idx="minor">
-            <a:schemeClr val="dk1"/>
-          </a:fontRef>
-        </p:style>
-        <p:txBody>
-          <a:bodyPr rot="0" vert="horz" wrap="square" lIns="91440" tIns="45720" rIns="91440" bIns="45720" anchor="t" anchorCtr="0">
-            <a:noAutofit/>
-          </a:bodyPr>
-          <a:lstStyle/>
-          <a:p>
-            <a:pPr algn="ctr">
-              <a:lnSpc>
-                <a:spcPct val="107000"/>
-              </a:lnSpc>
-              <a:spcAft>
-                <a:spcPts val="800"/>
-              </a:spcAft>
-            </a:pPr>
-            <a:r>
-              <a:rPr lang="pt-BR" sz="1100" dirty="0">
-                <a:effectLst/>
-                <a:ea typeface="Calibri" panose="020F0502020204030204" pitchFamily="34" charset="0"/>
-                <a:cs typeface="Times New Roman" panose="02020603050405020304" pitchFamily="18" charset="0"/>
-              </a:rPr>
-              <a:t>Reunião para decidir como e o que o cliente deseja modificar</a:t>
-            </a:r>
-          </a:p>
-        </p:txBody>
-      </p:sp>
-      <p:pic>
-        <p:nvPicPr>
-          <p:cNvPr id="45" name="Imagem 44">
-            <a:extLst>
-              <a:ext uri="{FF2B5EF4-FFF2-40B4-BE49-F238E27FC236}">
-                <a16:creationId xmlns:a16="http://schemas.microsoft.com/office/drawing/2014/main" id="{A2C4E18C-61E3-4D26-93D8-42B61FB55518}"/>
-              </a:ext>
-            </a:extLst>
-          </p:cNvPr>
-          <p:cNvPicPr/>
-          <p:nvPr/>
-        </p:nvPicPr>
-        <p:blipFill>
-          <a:blip r:embed="rId24" cstate="print">
-            <a:extLst>
-              <a:ext uri="{28A0092B-C50C-407E-A947-70E740481C1C}">
-                <a14:useLocalDpi xmlns:a14="http://schemas.microsoft.com/office/drawing/2010/main" val="0"/>
-              </a:ext>
-            </a:extLst>
-          </a:blip>
-          <a:srcRect/>
-          <a:stretch>
-            <a:fillRect/>
-          </a:stretch>
-        </p:blipFill>
-        <p:spPr bwMode="auto">
-          <a:xfrm>
-            <a:off x="6803748" y="5065522"/>
-            <a:ext cx="550545" cy="550545"/>
-          </a:xfrm>
-          <a:prstGeom prst="rect">
-            <a:avLst/>
-          </a:prstGeom>
-          <a:noFill/>
-          <a:ln>
-            <a:noFill/>
-          </a:ln>
-        </p:spPr>
-      </p:pic>
-      <p:pic>
-        <p:nvPicPr>
-          <p:cNvPr id="50" name="Imagem 49">
-            <a:extLst>
-              <a:ext uri="{FF2B5EF4-FFF2-40B4-BE49-F238E27FC236}">
-                <a16:creationId xmlns:a16="http://schemas.microsoft.com/office/drawing/2014/main" id="{51523602-2DDD-49EC-A2C8-258A1322A2D5}"/>
-              </a:ext>
-            </a:extLst>
-          </p:cNvPr>
-          <p:cNvPicPr/>
-          <p:nvPr/>
-        </p:nvPicPr>
-        <p:blipFill>
-          <a:blip r:embed="rId25" cstate="print">
-            <a:extLst>
-              <a:ext uri="{28A0092B-C50C-407E-A947-70E740481C1C}">
-                <a14:useLocalDpi xmlns:a14="http://schemas.microsoft.com/office/drawing/2010/main" val="0"/>
-              </a:ext>
-            </a:extLst>
-          </a:blip>
-          <a:srcRect/>
-          <a:stretch>
-            <a:fillRect/>
-          </a:stretch>
-        </p:blipFill>
-        <p:spPr bwMode="auto">
-          <a:xfrm>
-            <a:off x="4488649" y="5734639"/>
-            <a:ext cx="626745" cy="626745"/>
-          </a:xfrm>
-          <a:prstGeom prst="rect">
-            <a:avLst/>
-          </a:prstGeom>
-          <a:noFill/>
-          <a:ln>
-            <a:noFill/>
-          </a:ln>
-        </p:spPr>
-      </p:pic>
-      <p:sp>
-        <p:nvSpPr>
-          <p:cNvPr id="51" name="Caixa de Texto 2">
-            <a:extLst>
-              <a:ext uri="{FF2B5EF4-FFF2-40B4-BE49-F238E27FC236}">
-                <a16:creationId xmlns:a16="http://schemas.microsoft.com/office/drawing/2014/main" id="{D350F5E3-A9CB-4858-95CC-B400E65FAE75}"/>
-              </a:ext>
-            </a:extLst>
-          </p:cNvPr>
-          <p:cNvSpPr txBox="1">
-            <a:spLocks noChangeArrowheads="1"/>
-          </p:cNvSpPr>
-          <p:nvPr/>
-        </p:nvSpPr>
-        <p:spPr bwMode="auto">
-          <a:xfrm>
-            <a:off x="4248376" y="6415509"/>
-            <a:ext cx="1125902" cy="382270"/>
-          </a:xfrm>
-          <a:prstGeom prst="rect">
-            <a:avLst/>
-          </a:prstGeom>
-          <a:noFill/>
-          <a:ln>
-            <a:noFill/>
-          </a:ln>
-        </p:spPr>
-        <p:style>
-          <a:lnRef idx="0">
-            <a:scrgbClr r="0" g="0" b="0"/>
-          </a:lnRef>
-          <a:fillRef idx="0">
-            <a:scrgbClr r="0" g="0" b="0"/>
-          </a:fillRef>
-          <a:effectRef idx="0">
-            <a:scrgbClr r="0" g="0" b="0"/>
-          </a:effectRef>
-          <a:fontRef idx="minor">
-            <a:schemeClr val="dk1"/>
-          </a:fontRef>
-        </p:style>
-        <p:txBody>
-          <a:bodyPr rot="0" vert="horz" wrap="square" lIns="91440" tIns="45720" rIns="91440" bIns="45720" anchor="t" anchorCtr="0">
-            <a:noAutofit/>
-          </a:bodyPr>
-          <a:lstStyle/>
-          <a:p>
-            <a:pPr algn="ctr">
-              <a:lnSpc>
-                <a:spcPct val="107000"/>
-              </a:lnSpc>
-              <a:spcAft>
-                <a:spcPts val="800"/>
-              </a:spcAft>
-            </a:pPr>
-            <a:r>
-              <a:rPr lang="pt-BR" sz="1100" dirty="0">
-                <a:effectLst/>
-                <a:ea typeface="Calibri" panose="020F0502020204030204" pitchFamily="34" charset="0"/>
-                <a:cs typeface="Times New Roman" panose="02020603050405020304" pitchFamily="18" charset="0"/>
-              </a:rPr>
-              <a:t>Mecânica</a:t>
-            </a:r>
-          </a:p>
-        </p:txBody>
-      </p:sp>
-      <p:pic>
-        <p:nvPicPr>
-          <p:cNvPr id="56" name="Imagem 55">
-            <a:extLst>
-              <a:ext uri="{FF2B5EF4-FFF2-40B4-BE49-F238E27FC236}">
-                <a16:creationId xmlns:a16="http://schemas.microsoft.com/office/drawing/2014/main" id="{C7C4B593-0DDA-4F8C-9381-B08EC987864F}"/>
-              </a:ext>
-            </a:extLst>
-          </p:cNvPr>
-          <p:cNvPicPr/>
-          <p:nvPr/>
-        </p:nvPicPr>
-        <p:blipFill>
-          <a:blip r:embed="rId26" cstate="print">
-            <a:extLst>
-              <a:ext uri="{28A0092B-C50C-407E-A947-70E740481C1C}">
-                <a14:useLocalDpi xmlns:a14="http://schemas.microsoft.com/office/drawing/2010/main" val="0"/>
-              </a:ext>
-            </a:extLst>
-          </a:blip>
-          <a:srcRect/>
-          <a:stretch>
-            <a:fillRect/>
-          </a:stretch>
-        </p:blipFill>
-        <p:spPr bwMode="auto">
-          <a:xfrm>
-            <a:off x="5991410" y="5812523"/>
-            <a:ext cx="520065" cy="520065"/>
-          </a:xfrm>
-          <a:prstGeom prst="rect">
-            <a:avLst/>
-          </a:prstGeom>
-          <a:noFill/>
-          <a:ln>
-            <a:noFill/>
-          </a:ln>
-        </p:spPr>
-      </p:pic>
-      <p:sp>
-        <p:nvSpPr>
-          <p:cNvPr id="57" name="Caixa de Texto 2">
-            <a:extLst>
-              <a:ext uri="{FF2B5EF4-FFF2-40B4-BE49-F238E27FC236}">
-                <a16:creationId xmlns:a16="http://schemas.microsoft.com/office/drawing/2014/main" id="{9920C27E-6D88-413C-A431-7593E507BBCC}"/>
-              </a:ext>
-            </a:extLst>
-          </p:cNvPr>
-          <p:cNvSpPr txBox="1">
-            <a:spLocks noChangeArrowheads="1"/>
-          </p:cNvSpPr>
-          <p:nvPr/>
-        </p:nvSpPr>
-        <p:spPr bwMode="auto">
-          <a:xfrm>
-            <a:off x="5350112" y="6342827"/>
-            <a:ext cx="1674103" cy="371475"/>
-          </a:xfrm>
-          <a:prstGeom prst="rect">
-            <a:avLst/>
-          </a:prstGeom>
-          <a:noFill/>
-          <a:ln>
-            <a:noFill/>
-          </a:ln>
-        </p:spPr>
-        <p:style>
-          <a:lnRef idx="0">
-            <a:scrgbClr r="0" g="0" b="0"/>
-          </a:lnRef>
-          <a:fillRef idx="0">
-            <a:scrgbClr r="0" g="0" b="0"/>
-          </a:fillRef>
-          <a:effectRef idx="0">
-            <a:scrgbClr r="0" g="0" b="0"/>
-          </a:effectRef>
-          <a:fontRef idx="minor">
-            <a:schemeClr val="dk1"/>
-          </a:fontRef>
-        </p:style>
-        <p:txBody>
-          <a:bodyPr rot="0" vert="horz" wrap="square" lIns="91440" tIns="45720" rIns="91440" bIns="45720" anchor="t" anchorCtr="0">
-            <a:noAutofit/>
-          </a:bodyPr>
-          <a:lstStyle/>
-          <a:p>
-            <a:pPr algn="ctr">
-              <a:lnSpc>
-                <a:spcPct val="107000"/>
-              </a:lnSpc>
-              <a:spcAft>
-                <a:spcPts val="800"/>
-              </a:spcAft>
-            </a:pPr>
-            <a:r>
-              <a:rPr lang="pt-BR" sz="1100" dirty="0">
-                <a:effectLst/>
-                <a:ea typeface="Calibri" panose="020F0502020204030204" pitchFamily="34" charset="0"/>
-                <a:cs typeface="Times New Roman" panose="02020603050405020304" pitchFamily="18" charset="0"/>
-              </a:rPr>
-              <a:t>Oficina de pintura</a:t>
-            </a:r>
-          </a:p>
-        </p:txBody>
-      </p:sp>
-      <p:pic>
-        <p:nvPicPr>
-          <p:cNvPr id="63" name="Imagem 62" descr="Forma&#10;&#10;Descrição gerada automaticamente com confiança baixa">
-            <a:extLst>
-              <a:ext uri="{FF2B5EF4-FFF2-40B4-BE49-F238E27FC236}">
-                <a16:creationId xmlns:a16="http://schemas.microsoft.com/office/drawing/2014/main" id="{004C6537-F452-4B3D-9EB1-28D872B4A0D0}"/>
-              </a:ext>
-            </a:extLst>
-          </p:cNvPr>
-          <p:cNvPicPr/>
-          <p:nvPr/>
-        </p:nvPicPr>
-        <p:blipFill>
-          <a:blip r:embed="rId27" cstate="print">
-            <a:extLst>
-              <a:ext uri="{28A0092B-C50C-407E-A947-70E740481C1C}">
-                <a14:useLocalDpi xmlns:a14="http://schemas.microsoft.com/office/drawing/2010/main" val="0"/>
+              <a:ext uri="{96DAC541-7B7A-43D3-8B79-37D633B846F1}">
+                <asvg:svgBlip xmlns:asvg="http://schemas.microsoft.com/office/drawing/2016/SVG/main" r:embed="rId19"/>
               </a:ext>
             </a:extLst>
           </a:blip>
@@ -5208,462 +5277,8 @@
         </p:blipFill>
         <p:spPr>
           <a:xfrm>
-            <a:off x="10446390" y="2579660"/>
-            <a:ext cx="508635" cy="508635"/>
-          </a:xfrm>
-          <a:prstGeom prst="rect">
-            <a:avLst/>
-          </a:prstGeom>
-        </p:spPr>
-      </p:pic>
-      <p:sp>
-        <p:nvSpPr>
-          <p:cNvPr id="64" name="Caixa de Texto 2">
-            <a:extLst>
-              <a:ext uri="{FF2B5EF4-FFF2-40B4-BE49-F238E27FC236}">
-                <a16:creationId xmlns:a16="http://schemas.microsoft.com/office/drawing/2014/main" id="{05AF41CD-90DD-4208-8A18-239281707FDB}"/>
-              </a:ext>
-            </a:extLst>
-          </p:cNvPr>
-          <p:cNvSpPr txBox="1">
-            <a:spLocks noChangeArrowheads="1"/>
-          </p:cNvSpPr>
-          <p:nvPr/>
-        </p:nvSpPr>
-        <p:spPr bwMode="auto">
-          <a:xfrm>
-            <a:off x="10003725" y="3153047"/>
-            <a:ext cx="1359853" cy="382270"/>
-          </a:xfrm>
-          <a:prstGeom prst="rect">
-            <a:avLst/>
-          </a:prstGeom>
-          <a:noFill/>
-          <a:ln>
-            <a:noFill/>
-          </a:ln>
-        </p:spPr>
-        <p:style>
-          <a:lnRef idx="0">
-            <a:scrgbClr r="0" g="0" b="0"/>
-          </a:lnRef>
-          <a:fillRef idx="0">
-            <a:scrgbClr r="0" g="0" b="0"/>
-          </a:fillRef>
-          <a:effectRef idx="0">
-            <a:scrgbClr r="0" g="0" b="0"/>
-          </a:effectRef>
-          <a:fontRef idx="minor">
-            <a:schemeClr val="dk1"/>
-          </a:fontRef>
-        </p:style>
-        <p:txBody>
-          <a:bodyPr rot="0" vert="horz" wrap="square" lIns="91440" tIns="45720" rIns="91440" bIns="45720" anchor="t" anchorCtr="0">
-            <a:noAutofit/>
-          </a:bodyPr>
-          <a:lstStyle/>
-          <a:p>
-            <a:pPr algn="ctr">
-              <a:lnSpc>
-                <a:spcPct val="107000"/>
-              </a:lnSpc>
-              <a:spcAft>
-                <a:spcPts val="800"/>
-              </a:spcAft>
-            </a:pPr>
-            <a:r>
-              <a:rPr lang="pt-BR" sz="1100" dirty="0">
-                <a:effectLst/>
-                <a:ea typeface="Calibri" panose="020F0502020204030204" pitchFamily="34" charset="0"/>
-                <a:cs typeface="Times New Roman" panose="02020603050405020304" pitchFamily="18" charset="0"/>
-              </a:rPr>
-              <a:t>Cliente satisfeito</a:t>
-            </a:r>
-          </a:p>
-        </p:txBody>
-      </p:sp>
-      <p:sp>
-        <p:nvSpPr>
-          <p:cNvPr id="53" name="Seta: para a Esquerda e para Cima 52">
-            <a:extLst>
-              <a:ext uri="{FF2B5EF4-FFF2-40B4-BE49-F238E27FC236}">
-                <a16:creationId xmlns:a16="http://schemas.microsoft.com/office/drawing/2014/main" id="{19361BCE-4905-4A83-B10F-355170D0BD2E}"/>
-              </a:ext>
-            </a:extLst>
-          </p:cNvPr>
-          <p:cNvSpPr/>
-          <p:nvPr/>
-        </p:nvSpPr>
-        <p:spPr>
-          <a:xfrm flipV="1">
-            <a:off x="5104399" y="3318766"/>
-            <a:ext cx="291267" cy="1046213"/>
-          </a:xfrm>
-          <a:prstGeom prst="leftUpArrow">
-            <a:avLst/>
-          </a:prstGeom>
-          <a:ln>
-            <a:headEnd type="none" w="med" len="med"/>
-            <a:tailEnd type="none" w="med" len="med"/>
-          </a:ln>
-        </p:spPr>
-        <p:style>
-          <a:lnRef idx="3">
-            <a:schemeClr val="lt1"/>
-          </a:lnRef>
-          <a:fillRef idx="1">
-            <a:schemeClr val="accent5"/>
-          </a:fillRef>
-          <a:effectRef idx="1">
-            <a:schemeClr val="accent5"/>
-          </a:effectRef>
-          <a:fontRef idx="minor">
-            <a:schemeClr val="lt1"/>
-          </a:fontRef>
-        </p:style>
-        <p:txBody>
-          <a:bodyPr rot="0" spcFirstLastPara="0" vert="horz" wrap="square" lIns="91440" tIns="45720" rIns="91440" bIns="45720" numCol="1" spcCol="0" rtlCol="0" fromWordArt="0" anchor="ctr" anchorCtr="0" forceAA="0" compatLnSpc="1">
-            <a:prstTxWarp prst="textNoShape">
-              <a:avLst/>
-            </a:prstTxWarp>
-            <a:noAutofit/>
-          </a:bodyPr>
-          <a:lstStyle/>
-          <a:p>
-            <a:endParaRPr lang="pt-BR"/>
-          </a:p>
-        </p:txBody>
-      </p:sp>
-      <p:sp>
-        <p:nvSpPr>
-          <p:cNvPr id="58" name="Seta: da Esquerda para a Direita 57">
-            <a:extLst>
-              <a:ext uri="{FF2B5EF4-FFF2-40B4-BE49-F238E27FC236}">
-                <a16:creationId xmlns:a16="http://schemas.microsoft.com/office/drawing/2014/main" id="{2A933F51-507C-4868-B992-B5444D296D2C}"/>
-              </a:ext>
-            </a:extLst>
-          </p:cNvPr>
-          <p:cNvSpPr/>
-          <p:nvPr/>
-        </p:nvSpPr>
-        <p:spPr>
-          <a:xfrm rot="5400000">
-            <a:off x="4642347" y="5487398"/>
-            <a:ext cx="319155" cy="183514"/>
-          </a:xfrm>
-          <a:prstGeom prst="leftRightArrow">
-            <a:avLst/>
-          </a:prstGeom>
-          <a:ln>
-            <a:headEnd type="none" w="med" len="med"/>
-            <a:tailEnd type="none" w="med" len="med"/>
-          </a:ln>
-        </p:spPr>
-        <p:style>
-          <a:lnRef idx="3">
-            <a:schemeClr val="lt1"/>
-          </a:lnRef>
-          <a:fillRef idx="1">
-            <a:schemeClr val="accent5"/>
-          </a:fillRef>
-          <a:effectRef idx="1">
-            <a:schemeClr val="accent5"/>
-          </a:effectRef>
-          <a:fontRef idx="minor">
-            <a:schemeClr val="lt1"/>
-          </a:fontRef>
-        </p:style>
-        <p:txBody>
-          <a:bodyPr rot="0" spcFirstLastPara="0" vert="horz" wrap="square" lIns="91440" tIns="45720" rIns="91440" bIns="45720" numCol="1" spcCol="0" rtlCol="0" fromWordArt="0" anchor="ctr" anchorCtr="0" forceAA="0" compatLnSpc="1">
-            <a:prstTxWarp prst="textNoShape">
-              <a:avLst/>
-            </a:prstTxWarp>
-            <a:noAutofit/>
-          </a:bodyPr>
-          <a:lstStyle/>
-          <a:p>
-            <a:endParaRPr lang="pt-BR"/>
-          </a:p>
-        </p:txBody>
-      </p:sp>
-      <p:pic>
-        <p:nvPicPr>
-          <p:cNvPr id="59" name="Imagem 58" descr="Desenho de animal com fundo preto&#10;&#10;Descrição gerada automaticamente com confiança média">
-            <a:extLst>
-              <a:ext uri="{FF2B5EF4-FFF2-40B4-BE49-F238E27FC236}">
-                <a16:creationId xmlns:a16="http://schemas.microsoft.com/office/drawing/2014/main" id="{315FC3E6-B325-4D2C-99A3-FE156BC9C3F0}"/>
-              </a:ext>
-            </a:extLst>
-          </p:cNvPr>
-          <p:cNvPicPr>
-            <a:picLocks noChangeAspect="1"/>
-          </p:cNvPicPr>
-          <p:nvPr/>
-        </p:nvPicPr>
-        <p:blipFill>
-          <a:blip r:embed="rId28">
-            <a:extLst>
-              <a:ext uri="{28A0092B-C50C-407E-A947-70E740481C1C}">
-                <a14:useLocalDpi xmlns:a14="http://schemas.microsoft.com/office/drawing/2010/main" val="0"/>
-              </a:ext>
-            </a:extLst>
-          </a:blip>
-          <a:stretch>
-            <a:fillRect/>
-          </a:stretch>
-        </p:blipFill>
-        <p:spPr>
-          <a:xfrm>
-            <a:off x="8165776" y="3121057"/>
-            <a:ext cx="1520017" cy="658874"/>
-          </a:xfrm>
-          <a:prstGeom prst="rect">
-            <a:avLst/>
-          </a:prstGeom>
-        </p:spPr>
-      </p:pic>
-      <p:sp>
-        <p:nvSpPr>
-          <p:cNvPr id="61" name="Seta: para a Esquerda e para Cima 60">
-            <a:extLst>
-              <a:ext uri="{FF2B5EF4-FFF2-40B4-BE49-F238E27FC236}">
-                <a16:creationId xmlns:a16="http://schemas.microsoft.com/office/drawing/2014/main" id="{BDD2A7EB-CDA0-4B54-8E29-9C75DE798584}"/>
-              </a:ext>
-            </a:extLst>
-          </p:cNvPr>
-          <p:cNvSpPr/>
-          <p:nvPr/>
-        </p:nvSpPr>
-        <p:spPr>
-          <a:xfrm flipH="1" flipV="1">
-            <a:off x="8759926" y="2794464"/>
-            <a:ext cx="1580946" cy="333639"/>
-          </a:xfrm>
-          <a:prstGeom prst="leftUpArrow">
-            <a:avLst>
-              <a:gd name="adj1" fmla="val 19634"/>
-              <a:gd name="adj2" fmla="val 22317"/>
-              <a:gd name="adj3" fmla="val 25000"/>
-            </a:avLst>
-          </a:prstGeom>
-          <a:ln>
-            <a:headEnd type="none" w="med" len="med"/>
-            <a:tailEnd type="none" w="med" len="med"/>
-          </a:ln>
-        </p:spPr>
-        <p:style>
-          <a:lnRef idx="3">
-            <a:schemeClr val="lt1"/>
-          </a:lnRef>
-          <a:fillRef idx="1">
-            <a:schemeClr val="accent5"/>
-          </a:fillRef>
-          <a:effectRef idx="1">
-            <a:schemeClr val="accent5"/>
-          </a:effectRef>
-          <a:fontRef idx="minor">
-            <a:schemeClr val="lt1"/>
-          </a:fontRef>
-        </p:style>
-        <p:txBody>
-          <a:bodyPr rot="0" spcFirstLastPara="0" vert="horz" wrap="square" lIns="91440" tIns="45720" rIns="91440" bIns="45720" numCol="1" spcCol="0" rtlCol="0" fromWordArt="0" anchor="ctr" anchorCtr="0" forceAA="0" compatLnSpc="1">
-            <a:prstTxWarp prst="textNoShape">
-              <a:avLst/>
-            </a:prstTxWarp>
-            <a:noAutofit/>
-          </a:bodyPr>
-          <a:lstStyle/>
-          <a:p>
-            <a:endParaRPr lang="pt-BR"/>
-          </a:p>
-        </p:txBody>
-      </p:sp>
-      <p:sp>
-        <p:nvSpPr>
-          <p:cNvPr id="62" name="Seta: da Esquerda para a Direita 61">
-            <a:extLst>
-              <a:ext uri="{FF2B5EF4-FFF2-40B4-BE49-F238E27FC236}">
-                <a16:creationId xmlns:a16="http://schemas.microsoft.com/office/drawing/2014/main" id="{41C8A440-33E8-41A6-ABBD-56D67C38E7A4}"/>
-              </a:ext>
-            </a:extLst>
-          </p:cNvPr>
-          <p:cNvSpPr/>
-          <p:nvPr/>
-        </p:nvSpPr>
-        <p:spPr>
-          <a:xfrm rot="10800000">
-            <a:off x="6458913" y="5038714"/>
-            <a:ext cx="1548730" cy="126236"/>
-          </a:xfrm>
-          <a:prstGeom prst="leftRightArrow">
-            <a:avLst/>
-          </a:prstGeom>
-          <a:ln>
-            <a:headEnd type="none" w="med" len="med"/>
-            <a:tailEnd type="none" w="med" len="med"/>
-          </a:ln>
-        </p:spPr>
-        <p:style>
-          <a:lnRef idx="3">
-            <a:schemeClr val="lt1"/>
-          </a:lnRef>
-          <a:fillRef idx="1">
-            <a:schemeClr val="accent5"/>
-          </a:fillRef>
-          <a:effectRef idx="1">
-            <a:schemeClr val="accent5"/>
-          </a:effectRef>
-          <a:fontRef idx="minor">
-            <a:schemeClr val="lt1"/>
-          </a:fontRef>
-        </p:style>
-        <p:txBody>
-          <a:bodyPr rot="0" spcFirstLastPara="0" vert="horz" wrap="square" lIns="91440" tIns="45720" rIns="91440" bIns="45720" numCol="1" spcCol="0" rtlCol="0" fromWordArt="0" anchor="ctr" anchorCtr="0" forceAA="0" compatLnSpc="1">
-            <a:prstTxWarp prst="textNoShape">
-              <a:avLst/>
-            </a:prstTxWarp>
-            <a:noAutofit/>
-          </a:bodyPr>
-          <a:lstStyle/>
-          <a:p>
-            <a:endParaRPr lang="pt-BR" dirty="0"/>
-          </a:p>
-        </p:txBody>
-      </p:sp>
-      <p:sp>
-        <p:nvSpPr>
-          <p:cNvPr id="65" name="Seta: da Esquerda para a Direita 64">
-            <a:extLst>
-              <a:ext uri="{FF2B5EF4-FFF2-40B4-BE49-F238E27FC236}">
-                <a16:creationId xmlns:a16="http://schemas.microsoft.com/office/drawing/2014/main" id="{5DE215B7-F89C-4587-A4C8-F8C3CE139387}"/>
-              </a:ext>
-            </a:extLst>
-          </p:cNvPr>
-          <p:cNvSpPr/>
-          <p:nvPr/>
-        </p:nvSpPr>
-        <p:spPr>
-          <a:xfrm rot="5400000">
-            <a:off x="5990820" y="5512289"/>
-            <a:ext cx="319155" cy="183514"/>
-          </a:xfrm>
-          <a:prstGeom prst="leftRightArrow">
-            <a:avLst/>
-          </a:prstGeom>
-          <a:ln>
-            <a:headEnd type="none" w="med" len="med"/>
-            <a:tailEnd type="none" w="med" len="med"/>
-          </a:ln>
-        </p:spPr>
-        <p:style>
-          <a:lnRef idx="3">
-            <a:schemeClr val="lt1"/>
-          </a:lnRef>
-          <a:fillRef idx="1">
-            <a:schemeClr val="accent5"/>
-          </a:fillRef>
-          <a:effectRef idx="1">
-            <a:schemeClr val="accent5"/>
-          </a:effectRef>
-          <a:fontRef idx="minor">
-            <a:schemeClr val="lt1"/>
-          </a:fontRef>
-        </p:style>
-        <p:txBody>
-          <a:bodyPr rot="0" spcFirstLastPara="0" vert="horz" wrap="square" lIns="91440" tIns="45720" rIns="91440" bIns="45720" numCol="1" spcCol="0" rtlCol="0" fromWordArt="0" anchor="ctr" anchorCtr="0" forceAA="0" compatLnSpc="1">
-            <a:prstTxWarp prst="textNoShape">
-              <a:avLst/>
-            </a:prstTxWarp>
-            <a:noAutofit/>
-          </a:bodyPr>
-          <a:lstStyle/>
-          <a:p>
-            <a:endParaRPr lang="pt-BR"/>
-          </a:p>
-        </p:txBody>
-      </p:sp>
-      <p:sp>
-        <p:nvSpPr>
-          <p:cNvPr id="67" name="Seta: da Esquerda para a Direita 66">
-            <a:extLst>
-              <a:ext uri="{FF2B5EF4-FFF2-40B4-BE49-F238E27FC236}">
-                <a16:creationId xmlns:a16="http://schemas.microsoft.com/office/drawing/2014/main" id="{0355EA9F-4B14-454A-B907-4D336D9615AB}"/>
-              </a:ext>
-            </a:extLst>
-          </p:cNvPr>
-          <p:cNvSpPr/>
-          <p:nvPr/>
-        </p:nvSpPr>
-        <p:spPr>
-          <a:xfrm rot="10800000">
-            <a:off x="5250032" y="5979305"/>
-            <a:ext cx="626743" cy="183514"/>
-          </a:xfrm>
-          <a:prstGeom prst="leftRightArrow">
-            <a:avLst/>
-          </a:prstGeom>
-          <a:ln>
-            <a:headEnd type="none" w="med" len="med"/>
-            <a:tailEnd type="none" w="med" len="med"/>
-          </a:ln>
-        </p:spPr>
-        <p:style>
-          <a:lnRef idx="3">
-            <a:schemeClr val="lt1"/>
-          </a:lnRef>
-          <a:fillRef idx="1">
-            <a:schemeClr val="accent5"/>
-          </a:fillRef>
-          <a:effectRef idx="1">
-            <a:schemeClr val="accent5"/>
-          </a:effectRef>
-          <a:fontRef idx="minor">
-            <a:schemeClr val="lt1"/>
-          </a:fontRef>
-        </p:style>
-        <p:txBody>
-          <a:bodyPr rot="0" spcFirstLastPara="0" vert="horz" wrap="square" lIns="91440" tIns="45720" rIns="91440" bIns="45720" numCol="1" spcCol="0" rtlCol="0" fromWordArt="0" anchor="ctr" anchorCtr="0" forceAA="0" compatLnSpc="1">
-            <a:prstTxWarp prst="textNoShape">
-              <a:avLst/>
-            </a:prstTxWarp>
-            <a:noAutofit/>
-          </a:bodyPr>
-          <a:lstStyle/>
-          <a:p>
-            <a:endParaRPr lang="pt-BR"/>
-          </a:p>
-        </p:txBody>
-      </p:sp>
-      <p:pic>
-        <p:nvPicPr>
-          <p:cNvPr id="52" name="Imagem 51" descr="Forma&#10;&#10;Descrição gerada automaticamente com confiança baixa">
-            <a:extLst>
-              <a:ext uri="{FF2B5EF4-FFF2-40B4-BE49-F238E27FC236}">
-                <a16:creationId xmlns:a16="http://schemas.microsoft.com/office/drawing/2014/main" id="{64A59C5C-5002-42A2-A2CF-73C9B59AA78E}"/>
-              </a:ext>
-            </a:extLst>
-          </p:cNvPr>
-          <p:cNvPicPr>
-            <a:picLocks noChangeAspect="1"/>
-          </p:cNvPicPr>
-          <p:nvPr/>
-        </p:nvPicPr>
-        <p:blipFill>
-          <a:blip r:embed="rId29">
-            <a:extLst>
-              <a:ext uri="{28A0092B-C50C-407E-A947-70E740481C1C}">
-                <a14:useLocalDpi xmlns:a14="http://schemas.microsoft.com/office/drawing/2010/main" val="0"/>
-              </a:ext>
-            </a:extLst>
-          </a:blip>
-          <a:stretch>
-            <a:fillRect/>
-          </a:stretch>
-        </p:blipFill>
-        <p:spPr>
-          <a:xfrm>
-            <a:off x="3792497" y="3137935"/>
-            <a:ext cx="425725" cy="425725"/>
+            <a:off x="4536835" y="1973089"/>
+            <a:ext cx="310723" cy="310846"/>
           </a:xfrm>
           <a:prstGeom prst="rect">
             <a:avLst/>
@@ -5673,7 +5288,7 @@
     </p:spTree>
     <p:extLst>
       <p:ext uri="{BB962C8B-B14F-4D97-AF65-F5344CB8AC3E}">
-        <p14:creationId xmlns:p14="http://schemas.microsoft.com/office/powerpoint/2010/main" val="3221236252"/>
+        <p14:creationId xmlns:p14="http://schemas.microsoft.com/office/powerpoint/2010/main" val="1359436191"/>
       </p:ext>
     </p:extLst>
   </p:cSld>

</xml_diff>